<commit_message>
a lot of figures are corrected
</commit_message>
<xml_diff>
--- a/journalWallFriction/pictures/pdf/Reflection.pptx
+++ b/journalWallFriction/pictures/pdf/Reflection.pptx
@@ -104,6 +104,22 @@
       </a:defRPr>
     </a:lvl9pPr>
   </p:defaultTextStyle>
+  <p:extLst>
+    <p:ext uri="{EFAFB233-063F-42B5-8137-9DF3F51BA10A}">
+      <p15:sldGuideLst xmlns:p15="http://schemas.microsoft.com/office/powerpoint/2012/main">
+        <p15:guide id="1" orient="horz" pos="2160">
+          <p15:clr>
+            <a:srgbClr val="A4A3A4"/>
+          </p15:clr>
+        </p15:guide>
+        <p15:guide id="2" pos="2304">
+          <p15:clr>
+            <a:srgbClr val="A4A3A4"/>
+          </p15:clr>
+        </p15:guide>
+      </p15:sldGuideLst>
+    </p:ext>
+  </p:extLst>
 </p:presentation>
 </file>
 
@@ -145,10 +161,9 @@
           <a:lstStyle/>
           <a:p>
             <a:r>
-              <a:rPr lang="en-US" smtClean="0"/>
+              <a:rPr lang="en-US"/>
               <a:t>Click to edit Master title style</a:t>
             </a:r>
-            <a:endParaRPr lang="en-US"/>
           </a:p>
         </p:txBody>
       </p:sp>
@@ -264,10 +279,9 @@
           </a:lstStyle>
           <a:p>
             <a:r>
-              <a:rPr lang="en-US" smtClean="0"/>
+              <a:rPr lang="en-US"/>
               <a:t>Click to edit Master subtitle style</a:t>
             </a:r>
-            <a:endParaRPr lang="en-US"/>
           </a:p>
         </p:txBody>
       </p:sp>
@@ -288,7 +302,7 @@
           <a:p>
             <a:fld id="{E46B84FF-1CFF-E849-8ACF-6EE548EC4909}" type="datetimeFigureOut">
               <a:rPr lang="en-US" smtClean="0"/>
-              <a:t>3/28/17</a:t>
+              <a:t>4/24/18</a:t>
             </a:fld>
             <a:endParaRPr lang="en-US"/>
           </a:p>
@@ -382,10 +396,9 @@
           <a:lstStyle/>
           <a:p>
             <a:r>
-              <a:rPr lang="en-US" smtClean="0"/>
+              <a:rPr lang="en-US"/>
               <a:t>Click to edit Master title style</a:t>
             </a:r>
-            <a:endParaRPr lang="en-US"/>
           </a:p>
         </p:txBody>
       </p:sp>
@@ -406,38 +419,37 @@
           <a:p>
             <a:pPr lvl="0"/>
             <a:r>
-              <a:rPr lang="en-US" smtClean="0"/>
+              <a:rPr lang="en-US"/>
               <a:t>Click to edit Master text styles</a:t>
             </a:r>
           </a:p>
           <a:p>
             <a:pPr lvl="1"/>
             <a:r>
-              <a:rPr lang="en-US" smtClean="0"/>
+              <a:rPr lang="en-US"/>
               <a:t>Second level</a:t>
             </a:r>
           </a:p>
           <a:p>
             <a:pPr lvl="2"/>
             <a:r>
-              <a:rPr lang="en-US" smtClean="0"/>
+              <a:rPr lang="en-US"/>
               <a:t>Third level</a:t>
             </a:r>
           </a:p>
           <a:p>
             <a:pPr lvl="3"/>
             <a:r>
-              <a:rPr lang="en-US" smtClean="0"/>
+              <a:rPr lang="en-US"/>
               <a:t>Fourth level</a:t>
             </a:r>
           </a:p>
           <a:p>
             <a:pPr lvl="4"/>
             <a:r>
-              <a:rPr lang="en-US" smtClean="0"/>
+              <a:rPr lang="en-US"/>
               <a:t>Fifth level</a:t>
             </a:r>
-            <a:endParaRPr lang="en-US"/>
           </a:p>
         </p:txBody>
       </p:sp>
@@ -458,7 +470,7 @@
           <a:p>
             <a:fld id="{E46B84FF-1CFF-E849-8ACF-6EE548EC4909}" type="datetimeFigureOut">
               <a:rPr lang="en-US" smtClean="0"/>
-              <a:t>3/28/17</a:t>
+              <a:t>4/24/18</a:t>
             </a:fld>
             <a:endParaRPr lang="en-US"/>
           </a:p>
@@ -557,10 +569,9 @@
           <a:lstStyle/>
           <a:p>
             <a:r>
-              <a:rPr lang="en-US" smtClean="0"/>
+              <a:rPr lang="en-US"/>
               <a:t>Click to edit Master title style</a:t>
             </a:r>
-            <a:endParaRPr lang="en-US"/>
           </a:p>
         </p:txBody>
       </p:sp>
@@ -586,38 +597,37 @@
           <a:p>
             <a:pPr lvl="0"/>
             <a:r>
-              <a:rPr lang="en-US" smtClean="0"/>
+              <a:rPr lang="en-US"/>
               <a:t>Click to edit Master text styles</a:t>
             </a:r>
           </a:p>
           <a:p>
             <a:pPr lvl="1"/>
             <a:r>
-              <a:rPr lang="en-US" smtClean="0"/>
+              <a:rPr lang="en-US"/>
               <a:t>Second level</a:t>
             </a:r>
           </a:p>
           <a:p>
             <a:pPr lvl="2"/>
             <a:r>
-              <a:rPr lang="en-US" smtClean="0"/>
+              <a:rPr lang="en-US"/>
               <a:t>Third level</a:t>
             </a:r>
           </a:p>
           <a:p>
             <a:pPr lvl="3"/>
             <a:r>
-              <a:rPr lang="en-US" smtClean="0"/>
+              <a:rPr lang="en-US"/>
               <a:t>Fourth level</a:t>
             </a:r>
           </a:p>
           <a:p>
             <a:pPr lvl="4"/>
             <a:r>
-              <a:rPr lang="en-US" smtClean="0"/>
+              <a:rPr lang="en-US"/>
               <a:t>Fifth level</a:t>
             </a:r>
-            <a:endParaRPr lang="en-US"/>
           </a:p>
         </p:txBody>
       </p:sp>
@@ -638,7 +648,7 @@
           <a:p>
             <a:fld id="{E46B84FF-1CFF-E849-8ACF-6EE548EC4909}" type="datetimeFigureOut">
               <a:rPr lang="en-US" smtClean="0"/>
-              <a:t>3/28/17</a:t>
+              <a:t>4/24/18</a:t>
             </a:fld>
             <a:endParaRPr lang="en-US"/>
           </a:p>
@@ -732,10 +742,9 @@
           <a:lstStyle/>
           <a:p>
             <a:r>
-              <a:rPr lang="en-US" smtClean="0"/>
+              <a:rPr lang="en-US"/>
               <a:t>Click to edit Master title style</a:t>
             </a:r>
-            <a:endParaRPr lang="en-US"/>
           </a:p>
         </p:txBody>
       </p:sp>
@@ -756,38 +765,37 @@
           <a:p>
             <a:pPr lvl="0"/>
             <a:r>
-              <a:rPr lang="en-US" smtClean="0"/>
+              <a:rPr lang="en-US"/>
               <a:t>Click to edit Master text styles</a:t>
             </a:r>
           </a:p>
           <a:p>
             <a:pPr lvl="1"/>
             <a:r>
-              <a:rPr lang="en-US" smtClean="0"/>
+              <a:rPr lang="en-US"/>
               <a:t>Second level</a:t>
             </a:r>
           </a:p>
           <a:p>
             <a:pPr lvl="2"/>
             <a:r>
-              <a:rPr lang="en-US" smtClean="0"/>
+              <a:rPr lang="en-US"/>
               <a:t>Third level</a:t>
             </a:r>
           </a:p>
           <a:p>
             <a:pPr lvl="3"/>
             <a:r>
-              <a:rPr lang="en-US" smtClean="0"/>
+              <a:rPr lang="en-US"/>
               <a:t>Fourth level</a:t>
             </a:r>
           </a:p>
           <a:p>
             <a:pPr lvl="4"/>
             <a:r>
-              <a:rPr lang="en-US" smtClean="0"/>
+              <a:rPr lang="en-US"/>
               <a:t>Fifth level</a:t>
             </a:r>
-            <a:endParaRPr lang="en-US"/>
           </a:p>
         </p:txBody>
       </p:sp>
@@ -808,7 +816,7 @@
           <a:p>
             <a:fld id="{E46B84FF-1CFF-E849-8ACF-6EE548EC4909}" type="datetimeFigureOut">
               <a:rPr lang="en-US" smtClean="0"/>
-              <a:t>3/28/17</a:t>
+              <a:t>4/24/18</a:t>
             </a:fld>
             <a:endParaRPr lang="en-US"/>
           </a:p>
@@ -911,10 +919,9 @@
           </a:lstStyle>
           <a:p>
             <a:r>
-              <a:rPr lang="en-US" smtClean="0"/>
+              <a:rPr lang="en-US"/>
               <a:t>Click to edit Master title style</a:t>
             </a:r>
-            <a:endParaRPr lang="en-US"/>
           </a:p>
         </p:txBody>
       </p:sp>
@@ -1031,7 +1038,7 @@
           <a:p>
             <a:pPr lvl="0"/>
             <a:r>
-              <a:rPr lang="en-US" smtClean="0"/>
+              <a:rPr lang="en-US"/>
               <a:t>Click to edit Master text styles</a:t>
             </a:r>
           </a:p>
@@ -1054,7 +1061,7 @@
           <a:p>
             <a:fld id="{E46B84FF-1CFF-E849-8ACF-6EE548EC4909}" type="datetimeFigureOut">
               <a:rPr lang="en-US" smtClean="0"/>
-              <a:t>3/28/17</a:t>
+              <a:t>4/24/18</a:t>
             </a:fld>
             <a:endParaRPr lang="en-US"/>
           </a:p>
@@ -1148,10 +1155,9 @@
           <a:lstStyle/>
           <a:p>
             <a:r>
-              <a:rPr lang="en-US" smtClean="0"/>
+              <a:rPr lang="en-US"/>
               <a:t>Click to edit Master title style</a:t>
             </a:r>
-            <a:endParaRPr lang="en-US"/>
           </a:p>
         </p:txBody>
       </p:sp>
@@ -1205,38 +1211,37 @@
           <a:p>
             <a:pPr lvl="0"/>
             <a:r>
-              <a:rPr lang="en-US" smtClean="0"/>
+              <a:rPr lang="en-US"/>
               <a:t>Click to edit Master text styles</a:t>
             </a:r>
           </a:p>
           <a:p>
             <a:pPr lvl="1"/>
             <a:r>
-              <a:rPr lang="en-US" smtClean="0"/>
+              <a:rPr lang="en-US"/>
               <a:t>Second level</a:t>
             </a:r>
           </a:p>
           <a:p>
             <a:pPr lvl="2"/>
             <a:r>
-              <a:rPr lang="en-US" smtClean="0"/>
+              <a:rPr lang="en-US"/>
               <a:t>Third level</a:t>
             </a:r>
           </a:p>
           <a:p>
             <a:pPr lvl="3"/>
             <a:r>
-              <a:rPr lang="en-US" smtClean="0"/>
+              <a:rPr lang="en-US"/>
               <a:t>Fourth level</a:t>
             </a:r>
           </a:p>
           <a:p>
             <a:pPr lvl="4"/>
             <a:r>
-              <a:rPr lang="en-US" smtClean="0"/>
+              <a:rPr lang="en-US"/>
               <a:t>Fifth level</a:t>
             </a:r>
-            <a:endParaRPr lang="en-US"/>
           </a:p>
         </p:txBody>
       </p:sp>
@@ -1290,38 +1295,37 @@
           <a:p>
             <a:pPr lvl="0"/>
             <a:r>
-              <a:rPr lang="en-US" smtClean="0"/>
+              <a:rPr lang="en-US"/>
               <a:t>Click to edit Master text styles</a:t>
             </a:r>
           </a:p>
           <a:p>
             <a:pPr lvl="1"/>
             <a:r>
-              <a:rPr lang="en-US" smtClean="0"/>
+              <a:rPr lang="en-US"/>
               <a:t>Second level</a:t>
             </a:r>
           </a:p>
           <a:p>
             <a:pPr lvl="2"/>
             <a:r>
-              <a:rPr lang="en-US" smtClean="0"/>
+              <a:rPr lang="en-US"/>
               <a:t>Third level</a:t>
             </a:r>
           </a:p>
           <a:p>
             <a:pPr lvl="3"/>
             <a:r>
-              <a:rPr lang="en-US" smtClean="0"/>
+              <a:rPr lang="en-US"/>
               <a:t>Fourth level</a:t>
             </a:r>
           </a:p>
           <a:p>
             <a:pPr lvl="4"/>
             <a:r>
-              <a:rPr lang="en-US" smtClean="0"/>
+              <a:rPr lang="en-US"/>
               <a:t>Fifth level</a:t>
             </a:r>
-            <a:endParaRPr lang="en-US"/>
           </a:p>
         </p:txBody>
       </p:sp>
@@ -1342,7 +1346,7 @@
           <a:p>
             <a:fld id="{E46B84FF-1CFF-E849-8ACF-6EE548EC4909}" type="datetimeFigureOut">
               <a:rPr lang="en-US" smtClean="0"/>
-              <a:t>3/28/17</a:t>
+              <a:t>4/24/18</a:t>
             </a:fld>
             <a:endParaRPr lang="en-US"/>
           </a:p>
@@ -1440,10 +1444,9 @@
           </a:lstStyle>
           <a:p>
             <a:r>
-              <a:rPr lang="en-US" smtClean="0"/>
+              <a:rPr lang="en-US"/>
               <a:t>Click to edit Master title style</a:t>
             </a:r>
-            <a:endParaRPr lang="en-US"/>
           </a:p>
         </p:txBody>
       </p:sp>
@@ -1506,7 +1509,7 @@
           <a:p>
             <a:pPr lvl="0"/>
             <a:r>
-              <a:rPr lang="en-US" smtClean="0"/>
+              <a:rPr lang="en-US"/>
               <a:t>Click to edit Master text styles</a:t>
             </a:r>
           </a:p>
@@ -1562,38 +1565,37 @@
           <a:p>
             <a:pPr lvl="0"/>
             <a:r>
-              <a:rPr lang="en-US" smtClean="0"/>
+              <a:rPr lang="en-US"/>
               <a:t>Click to edit Master text styles</a:t>
             </a:r>
           </a:p>
           <a:p>
             <a:pPr lvl="1"/>
             <a:r>
-              <a:rPr lang="en-US" smtClean="0"/>
+              <a:rPr lang="en-US"/>
               <a:t>Second level</a:t>
             </a:r>
           </a:p>
           <a:p>
             <a:pPr lvl="2"/>
             <a:r>
-              <a:rPr lang="en-US" smtClean="0"/>
+              <a:rPr lang="en-US"/>
               <a:t>Third level</a:t>
             </a:r>
           </a:p>
           <a:p>
             <a:pPr lvl="3"/>
             <a:r>
-              <a:rPr lang="en-US" smtClean="0"/>
+              <a:rPr lang="en-US"/>
               <a:t>Fourth level</a:t>
             </a:r>
           </a:p>
           <a:p>
             <a:pPr lvl="4"/>
             <a:r>
-              <a:rPr lang="en-US" smtClean="0"/>
+              <a:rPr lang="en-US"/>
               <a:t>Fifth level</a:t>
             </a:r>
-            <a:endParaRPr lang="en-US"/>
           </a:p>
         </p:txBody>
       </p:sp>
@@ -1656,7 +1658,7 @@
           <a:p>
             <a:pPr lvl="0"/>
             <a:r>
-              <a:rPr lang="en-US" smtClean="0"/>
+              <a:rPr lang="en-US"/>
               <a:t>Click to edit Master text styles</a:t>
             </a:r>
           </a:p>
@@ -1712,38 +1714,37 @@
           <a:p>
             <a:pPr lvl="0"/>
             <a:r>
-              <a:rPr lang="en-US" smtClean="0"/>
+              <a:rPr lang="en-US"/>
               <a:t>Click to edit Master text styles</a:t>
             </a:r>
           </a:p>
           <a:p>
             <a:pPr lvl="1"/>
             <a:r>
-              <a:rPr lang="en-US" smtClean="0"/>
+              <a:rPr lang="en-US"/>
               <a:t>Second level</a:t>
             </a:r>
           </a:p>
           <a:p>
             <a:pPr lvl="2"/>
             <a:r>
-              <a:rPr lang="en-US" smtClean="0"/>
+              <a:rPr lang="en-US"/>
               <a:t>Third level</a:t>
             </a:r>
           </a:p>
           <a:p>
             <a:pPr lvl="3"/>
             <a:r>
-              <a:rPr lang="en-US" smtClean="0"/>
+              <a:rPr lang="en-US"/>
               <a:t>Fourth level</a:t>
             </a:r>
           </a:p>
           <a:p>
             <a:pPr lvl="4"/>
             <a:r>
-              <a:rPr lang="en-US" smtClean="0"/>
+              <a:rPr lang="en-US"/>
               <a:t>Fifth level</a:t>
             </a:r>
-            <a:endParaRPr lang="en-US"/>
           </a:p>
         </p:txBody>
       </p:sp>
@@ -1764,7 +1765,7 @@
           <a:p>
             <a:fld id="{E46B84FF-1CFF-E849-8ACF-6EE548EC4909}" type="datetimeFigureOut">
               <a:rPr lang="en-US" smtClean="0"/>
-              <a:t>3/28/17</a:t>
+              <a:t>4/24/18</a:t>
             </a:fld>
             <a:endParaRPr lang="en-US"/>
           </a:p>
@@ -1858,10 +1859,9 @@
           <a:lstStyle/>
           <a:p>
             <a:r>
-              <a:rPr lang="en-US" smtClean="0"/>
+              <a:rPr lang="en-US"/>
               <a:t>Click to edit Master title style</a:t>
             </a:r>
-            <a:endParaRPr lang="en-US"/>
           </a:p>
         </p:txBody>
       </p:sp>
@@ -1882,7 +1882,7 @@
           <a:p>
             <a:fld id="{E46B84FF-1CFF-E849-8ACF-6EE548EC4909}" type="datetimeFigureOut">
               <a:rPr lang="en-US" smtClean="0"/>
-              <a:t>3/28/17</a:t>
+              <a:t>4/24/18</a:t>
             </a:fld>
             <a:endParaRPr lang="en-US"/>
           </a:p>
@@ -1977,7 +1977,7 @@
           <a:p>
             <a:fld id="{E46B84FF-1CFF-E849-8ACF-6EE548EC4909}" type="datetimeFigureOut">
               <a:rPr lang="en-US" smtClean="0"/>
-              <a:t>3/28/17</a:t>
+              <a:t>4/24/18</a:t>
             </a:fld>
             <a:endParaRPr lang="en-US"/>
           </a:p>
@@ -2080,10 +2080,9 @@
           </a:lstStyle>
           <a:p>
             <a:r>
-              <a:rPr lang="en-US" smtClean="0"/>
+              <a:rPr lang="en-US"/>
               <a:t>Click to edit Master title style</a:t>
             </a:r>
-            <a:endParaRPr lang="en-US"/>
           </a:p>
         </p:txBody>
       </p:sp>
@@ -2137,38 +2136,37 @@
           <a:p>
             <a:pPr lvl="0"/>
             <a:r>
-              <a:rPr lang="en-US" smtClean="0"/>
+              <a:rPr lang="en-US"/>
               <a:t>Click to edit Master text styles</a:t>
             </a:r>
           </a:p>
           <a:p>
             <a:pPr lvl="1"/>
             <a:r>
-              <a:rPr lang="en-US" smtClean="0"/>
+              <a:rPr lang="en-US"/>
               <a:t>Second level</a:t>
             </a:r>
           </a:p>
           <a:p>
             <a:pPr lvl="2"/>
             <a:r>
-              <a:rPr lang="en-US" smtClean="0"/>
+              <a:rPr lang="en-US"/>
               <a:t>Third level</a:t>
             </a:r>
           </a:p>
           <a:p>
             <a:pPr lvl="3"/>
             <a:r>
-              <a:rPr lang="en-US" smtClean="0"/>
+              <a:rPr lang="en-US"/>
               <a:t>Fourth level</a:t>
             </a:r>
           </a:p>
           <a:p>
             <a:pPr lvl="4"/>
             <a:r>
-              <a:rPr lang="en-US" smtClean="0"/>
+              <a:rPr lang="en-US"/>
               <a:t>Fifth level</a:t>
             </a:r>
-            <a:endParaRPr lang="en-US"/>
           </a:p>
         </p:txBody>
       </p:sp>
@@ -2231,7 +2229,7 @@
           <a:p>
             <a:pPr lvl="0"/>
             <a:r>
-              <a:rPr lang="en-US" smtClean="0"/>
+              <a:rPr lang="en-US"/>
               <a:t>Click to edit Master text styles</a:t>
             </a:r>
           </a:p>
@@ -2254,7 +2252,7 @@
           <a:p>
             <a:fld id="{E46B84FF-1CFF-E849-8ACF-6EE548EC4909}" type="datetimeFigureOut">
               <a:rPr lang="en-US" smtClean="0"/>
-              <a:t>3/28/17</a:t>
+              <a:t>4/24/18</a:t>
             </a:fld>
             <a:endParaRPr lang="en-US"/>
           </a:p>
@@ -2357,10 +2355,9 @@
           </a:lstStyle>
           <a:p>
             <a:r>
-              <a:rPr lang="en-US" smtClean="0"/>
+              <a:rPr lang="en-US"/>
               <a:t>Click to edit Master title style</a:t>
             </a:r>
-            <a:endParaRPr lang="en-US"/>
           </a:p>
         </p:txBody>
       </p:sp>
@@ -2484,7 +2481,7 @@
           <a:p>
             <a:pPr lvl="0"/>
             <a:r>
-              <a:rPr lang="en-US" smtClean="0"/>
+              <a:rPr lang="en-US"/>
               <a:t>Click to edit Master text styles</a:t>
             </a:r>
           </a:p>
@@ -2507,7 +2504,7 @@
           <a:p>
             <a:fld id="{E46B84FF-1CFF-E849-8ACF-6EE548EC4909}" type="datetimeFigureOut">
               <a:rPr lang="en-US" smtClean="0"/>
-              <a:t>3/28/17</a:t>
+              <a:t>4/24/18</a:t>
             </a:fld>
             <a:endParaRPr lang="en-US"/>
           </a:p>
@@ -2616,10 +2613,9 @@
           <a:lstStyle/>
           <a:p>
             <a:r>
-              <a:rPr lang="en-US" smtClean="0"/>
+              <a:rPr lang="en-US"/>
               <a:t>Click to edit Master title style</a:t>
             </a:r>
-            <a:endParaRPr lang="en-US"/>
           </a:p>
         </p:txBody>
       </p:sp>
@@ -2650,38 +2646,37 @@
           <a:p>
             <a:pPr lvl="0"/>
             <a:r>
-              <a:rPr lang="en-US" smtClean="0"/>
+              <a:rPr lang="en-US"/>
               <a:t>Click to edit Master text styles</a:t>
             </a:r>
           </a:p>
           <a:p>
             <a:pPr lvl="1"/>
             <a:r>
-              <a:rPr lang="en-US" smtClean="0"/>
+              <a:rPr lang="en-US"/>
               <a:t>Second level</a:t>
             </a:r>
           </a:p>
           <a:p>
             <a:pPr lvl="2"/>
             <a:r>
-              <a:rPr lang="en-US" smtClean="0"/>
+              <a:rPr lang="en-US"/>
               <a:t>Third level</a:t>
             </a:r>
           </a:p>
           <a:p>
             <a:pPr lvl="3"/>
             <a:r>
-              <a:rPr lang="en-US" smtClean="0"/>
+              <a:rPr lang="en-US"/>
               <a:t>Fourth level</a:t>
             </a:r>
           </a:p>
           <a:p>
             <a:pPr lvl="4"/>
             <a:r>
-              <a:rPr lang="en-US" smtClean="0"/>
+              <a:rPr lang="en-US"/>
               <a:t>Fifth level</a:t>
             </a:r>
-            <a:endParaRPr lang="en-US"/>
           </a:p>
         </p:txBody>
       </p:sp>
@@ -2720,7 +2715,7 @@
           <a:p>
             <a:fld id="{E46B84FF-1CFF-E849-8ACF-6EE548EC4909}" type="datetimeFigureOut">
               <a:rPr lang="en-US" smtClean="0"/>
-              <a:t>3/28/17</a:t>
+              <a:t>4/24/18</a:t>
             </a:fld>
             <a:endParaRPr lang="en-US"/>
           </a:p>
@@ -3276,7 +3271,7 @@
             <a:p>
               <a:pPr algn="ctr"/>
               <a:r>
-                <a:rPr lang="en-US" sz="3400" b="1" dirty="0" smtClean="0">
+                <a:rPr lang="en-US" sz="3400" b="1" dirty="0">
                   <a:effectLst>
                     <a:reflection dist="76200" dir="5400000" sy="-100000" algn="bl" rotWithShape="0"/>
                   </a:effectLst>
@@ -3285,13 +3280,6 @@
                 </a:rPr>
                 <a:t>Reflection</a:t>
               </a:r>
-              <a:endParaRPr lang="en-US" sz="3400" b="1" dirty="0">
-                <a:effectLst>
-                  <a:reflection dist="76200" dir="5400000" sy="-100000" algn="bl" rotWithShape="0"/>
-                </a:effectLst>
-                <a:latin typeface="Times New Roman"/>
-                <a:cs typeface="Times New Roman"/>
-              </a:endParaRPr>
             </a:p>
           </p:txBody>
         </p:sp>
@@ -3362,23 +3350,19 @@
             <a:lstStyle/>
             <a:p>
               <a:r>
-                <a:rPr lang="en-US" sz="4800" i="1" dirty="0" smtClean="0">
+                <a:rPr lang="en-US" sz="4800" i="1" dirty="0">
                   <a:latin typeface="Times New Roman"/>
                   <a:cs typeface="Times New Roman"/>
                 </a:rPr>
                 <a:t>m</a:t>
               </a:r>
               <a:r>
-                <a:rPr lang="en-US" sz="4800" i="1" baseline="-25000" dirty="0" smtClean="0">
+                <a:rPr lang="en-US" sz="4800" i="1" baseline="-25000" dirty="0">
                   <a:latin typeface="Times New Roman"/>
                   <a:cs typeface="Times New Roman"/>
                 </a:rPr>
                 <a:t>3</a:t>
               </a:r>
-              <a:endParaRPr lang="en-US" sz="4800" i="1" baseline="-25000" dirty="0">
-                <a:latin typeface="Times New Roman"/>
-                <a:cs typeface="Times New Roman"/>
-              </a:endParaRPr>
             </a:p>
           </p:txBody>
         </p:sp>
@@ -3405,23 +3389,19 @@
             <a:lstStyle/>
             <a:p>
               <a:r>
-                <a:rPr lang="en-US" sz="4800" i="1" dirty="0" smtClean="0">
+                <a:rPr lang="en-US" sz="4800" i="1" dirty="0">
                   <a:latin typeface="Times New Roman"/>
                   <a:cs typeface="Times New Roman"/>
                 </a:rPr>
                 <a:t>m</a:t>
               </a:r>
               <a:r>
-                <a:rPr lang="en-US" sz="4800" i="1" baseline="-25000" dirty="0" smtClean="0">
+                <a:rPr lang="en-US" sz="4800" i="1" baseline="-25000" dirty="0">
                   <a:latin typeface="Times New Roman"/>
                   <a:cs typeface="Times New Roman"/>
                 </a:rPr>
                 <a:t>2</a:t>
               </a:r>
-              <a:endParaRPr lang="en-US" sz="4800" i="1" baseline="-25000" dirty="0">
-                <a:latin typeface="Times New Roman"/>
-                <a:cs typeface="Times New Roman"/>
-              </a:endParaRPr>
             </a:p>
           </p:txBody>
         </p:sp>
@@ -3448,23 +3428,19 @@
             <a:lstStyle/>
             <a:p>
               <a:r>
-                <a:rPr lang="en-US" sz="4800" i="1" dirty="0" smtClean="0">
+                <a:rPr lang="en-US" sz="4800" i="1" dirty="0">
                   <a:latin typeface="Times New Roman"/>
                   <a:cs typeface="Times New Roman"/>
                 </a:rPr>
                 <a:t>m</a:t>
               </a:r>
               <a:r>
-                <a:rPr lang="en-US" sz="4800" i="1" baseline="-25000" dirty="0" smtClean="0">
+                <a:rPr lang="en-US" sz="4800" i="1" baseline="-25000" dirty="0">
                   <a:latin typeface="Times New Roman"/>
                   <a:cs typeface="Times New Roman"/>
                 </a:rPr>
                 <a:t>1</a:t>
               </a:r>
-              <a:endParaRPr lang="en-US" sz="4800" i="1" baseline="-25000" dirty="0">
-                <a:latin typeface="Times New Roman"/>
-                <a:cs typeface="Times New Roman"/>
-              </a:endParaRPr>
             </a:p>
           </p:txBody>
         </p:sp>
@@ -3543,78 +3519,6 @@
       </p:cxnSp>
       <p:sp>
         <p:nvSpPr>
-          <p:cNvPr id="15" name="TextBox 14"/>
-          <p:cNvSpPr txBox="1"/>
-          <p:nvPr/>
-        </p:nvSpPr>
-        <p:spPr>
-          <a:xfrm>
-            <a:off x="2945752" y="834485"/>
-            <a:ext cx="2128777" cy="830997"/>
-          </a:xfrm>
-          <a:prstGeom prst="rect">
-            <a:avLst/>
-          </a:prstGeom>
-          <a:noFill/>
-        </p:spPr>
-        <p:txBody>
-          <a:bodyPr wrap="square" rtlCol="0">
-            <a:spAutoFit/>
-          </a:bodyPr>
-          <a:lstStyle/>
-          <a:p>
-            <a:r>
-              <a:rPr lang="en-US" sz="4800" dirty="0" err="1" smtClean="0">
-                <a:latin typeface="Times New Roman"/>
-                <a:cs typeface="Times New Roman"/>
-              </a:rPr>
-              <a:t>Δe.x</a:t>
-            </a:r>
-            <a:endParaRPr lang="en-US" sz="4800" dirty="0">
-              <a:latin typeface="Times New Roman"/>
-              <a:cs typeface="Times New Roman"/>
-            </a:endParaRPr>
-          </a:p>
-        </p:txBody>
-      </p:sp>
-      <p:sp>
-        <p:nvSpPr>
-          <p:cNvPr id="23" name="TextBox 22"/>
-          <p:cNvSpPr txBox="1"/>
-          <p:nvPr/>
-        </p:nvSpPr>
-        <p:spPr>
-          <a:xfrm>
-            <a:off x="3900995" y="2031461"/>
-            <a:ext cx="1402374" cy="830997"/>
-          </a:xfrm>
-          <a:prstGeom prst="rect">
-            <a:avLst/>
-          </a:prstGeom>
-          <a:noFill/>
-        </p:spPr>
-        <p:txBody>
-          <a:bodyPr wrap="square" rtlCol="0">
-            <a:spAutoFit/>
-          </a:bodyPr>
-          <a:lstStyle/>
-          <a:p>
-            <a:r>
-              <a:rPr lang="en-US" sz="4800" dirty="0" err="1" smtClean="0">
-                <a:latin typeface="Times New Roman"/>
-                <a:cs typeface="Times New Roman"/>
-              </a:rPr>
-              <a:t>Δe.y</a:t>
-            </a:r>
-            <a:endParaRPr lang="en-US" sz="4800" dirty="0">
-              <a:latin typeface="Times New Roman"/>
-              <a:cs typeface="Times New Roman"/>
-            </a:endParaRPr>
-          </a:p>
-        </p:txBody>
-      </p:sp>
-      <p:sp>
-        <p:nvSpPr>
           <p:cNvPr id="24" name="TextBox 23"/>
           <p:cNvSpPr txBox="1"/>
           <p:nvPr/>
@@ -3636,23 +3540,19 @@
           <a:lstStyle/>
           <a:p>
             <a:r>
-              <a:rPr lang="en-US" sz="4800" i="1" dirty="0" smtClean="0">
+              <a:rPr lang="en-US" sz="4800" i="1" dirty="0">
                 <a:latin typeface="Times New Roman"/>
                 <a:cs typeface="Times New Roman"/>
               </a:rPr>
               <a:t>m</a:t>
             </a:r>
             <a:r>
-              <a:rPr lang="en-US" sz="4800" i="1" baseline="-25000" dirty="0" smtClean="0">
+              <a:rPr lang="en-US" sz="4800" i="1" baseline="-25000" dirty="0">
                 <a:latin typeface="Times New Roman"/>
                 <a:cs typeface="Times New Roman"/>
               </a:rPr>
               <a:t>3</a:t>
             </a:r>
-            <a:endParaRPr lang="en-US" sz="4800" i="1" baseline="-25000" dirty="0">
-              <a:latin typeface="Times New Roman"/>
-              <a:cs typeface="Times New Roman"/>
-            </a:endParaRPr>
           </a:p>
         </p:txBody>
       </p:sp>
@@ -3679,23 +3579,19 @@
           <a:lstStyle/>
           <a:p>
             <a:r>
-              <a:rPr lang="en-US" sz="4800" i="1" dirty="0" smtClean="0">
+              <a:rPr lang="en-US" sz="4800" i="1" dirty="0">
                 <a:latin typeface="Times New Roman"/>
                 <a:cs typeface="Times New Roman"/>
               </a:rPr>
               <a:t>m</a:t>
             </a:r>
             <a:r>
-              <a:rPr lang="en-US" sz="4800" i="1" baseline="-25000" dirty="0" smtClean="0">
+              <a:rPr lang="en-US" sz="4800" i="1" baseline="-25000" dirty="0">
                 <a:latin typeface="Times New Roman"/>
                 <a:cs typeface="Times New Roman"/>
               </a:rPr>
               <a:t>1</a:t>
             </a:r>
-            <a:endParaRPr lang="en-US" sz="4800" i="1" baseline="-25000" dirty="0">
-              <a:latin typeface="Times New Roman"/>
-              <a:cs typeface="Times New Roman"/>
-            </a:endParaRPr>
           </a:p>
         </p:txBody>
       </p:sp>

</xml_diff>

<commit_message>
Added New pictures to The paper
</commit_message>
<xml_diff>
--- a/journalWallFriction/pictures/pdf/Reflection.pptx
+++ b/journalWallFriction/pictures/pdf/Reflection.pptx
@@ -2,18 +2,18 @@
 <file path=ppt/presentation.xml><?xml version="1.0" encoding="utf-8"?>
 <p:presentation xmlns:a="http://schemas.openxmlformats.org/drawingml/2006/main" xmlns:r="http://schemas.openxmlformats.org/officeDocument/2006/relationships" xmlns:p="http://schemas.openxmlformats.org/presentationml/2006/main" saveSubsetFonts="1" autoCompressPictures="0">
   <p:sldMasterIdLst>
-    <p:sldMasterId id="2147483648" r:id="rId1"/>
+    <p:sldMasterId id="2147483660" r:id="rId1"/>
   </p:sldMasterIdLst>
   <p:sldIdLst>
     <p:sldId id="256" r:id="rId2"/>
   </p:sldIdLst>
-  <p:sldSz cx="7315200" cy="6858000"/>
+  <p:sldSz cx="12192000" cy="5486400"/>
   <p:notesSz cx="6858000" cy="9144000"/>
   <p:defaultTextStyle>
     <a:defPPr>
       <a:defRPr lang="en-US"/>
     </a:defPPr>
-    <a:lvl1pPr marL="0" algn="l" defTabSz="457200" rtl="0" eaLnBrk="1" latinLnBrk="0" hangingPunct="1">
+    <a:lvl1pPr marL="0" algn="l" defTabSz="914400" rtl="0" eaLnBrk="1" latinLnBrk="0" hangingPunct="1">
       <a:defRPr sz="1800" kern="1200">
         <a:solidFill>
           <a:schemeClr val="tx1"/>
@@ -23,7 +23,7 @@
         <a:cs typeface="+mn-cs"/>
       </a:defRPr>
     </a:lvl1pPr>
-    <a:lvl2pPr marL="457200" algn="l" defTabSz="457200" rtl="0" eaLnBrk="1" latinLnBrk="0" hangingPunct="1">
+    <a:lvl2pPr marL="457200" algn="l" defTabSz="914400" rtl="0" eaLnBrk="1" latinLnBrk="0" hangingPunct="1">
       <a:defRPr sz="1800" kern="1200">
         <a:solidFill>
           <a:schemeClr val="tx1"/>
@@ -33,7 +33,7 @@
         <a:cs typeface="+mn-cs"/>
       </a:defRPr>
     </a:lvl2pPr>
-    <a:lvl3pPr marL="914400" algn="l" defTabSz="457200" rtl="0" eaLnBrk="1" latinLnBrk="0" hangingPunct="1">
+    <a:lvl3pPr marL="914400" algn="l" defTabSz="914400" rtl="0" eaLnBrk="1" latinLnBrk="0" hangingPunct="1">
       <a:defRPr sz="1800" kern="1200">
         <a:solidFill>
           <a:schemeClr val="tx1"/>
@@ -43,7 +43,7 @@
         <a:cs typeface="+mn-cs"/>
       </a:defRPr>
     </a:lvl3pPr>
-    <a:lvl4pPr marL="1371600" algn="l" defTabSz="457200" rtl="0" eaLnBrk="1" latinLnBrk="0" hangingPunct="1">
+    <a:lvl4pPr marL="1371600" algn="l" defTabSz="914400" rtl="0" eaLnBrk="1" latinLnBrk="0" hangingPunct="1">
       <a:defRPr sz="1800" kern="1200">
         <a:solidFill>
           <a:schemeClr val="tx1"/>
@@ -53,7 +53,7 @@
         <a:cs typeface="+mn-cs"/>
       </a:defRPr>
     </a:lvl4pPr>
-    <a:lvl5pPr marL="1828800" algn="l" defTabSz="457200" rtl="0" eaLnBrk="1" latinLnBrk="0" hangingPunct="1">
+    <a:lvl5pPr marL="1828800" algn="l" defTabSz="914400" rtl="0" eaLnBrk="1" latinLnBrk="0" hangingPunct="1">
       <a:defRPr sz="1800" kern="1200">
         <a:solidFill>
           <a:schemeClr val="tx1"/>
@@ -63,7 +63,7 @@
         <a:cs typeface="+mn-cs"/>
       </a:defRPr>
     </a:lvl5pPr>
-    <a:lvl6pPr marL="2286000" algn="l" defTabSz="457200" rtl="0" eaLnBrk="1" latinLnBrk="0" hangingPunct="1">
+    <a:lvl6pPr marL="2286000" algn="l" defTabSz="914400" rtl="0" eaLnBrk="1" latinLnBrk="0" hangingPunct="1">
       <a:defRPr sz="1800" kern="1200">
         <a:solidFill>
           <a:schemeClr val="tx1"/>
@@ -73,7 +73,7 @@
         <a:cs typeface="+mn-cs"/>
       </a:defRPr>
     </a:lvl6pPr>
-    <a:lvl7pPr marL="2743200" algn="l" defTabSz="457200" rtl="0" eaLnBrk="1" latinLnBrk="0" hangingPunct="1">
+    <a:lvl7pPr marL="2743200" algn="l" defTabSz="914400" rtl="0" eaLnBrk="1" latinLnBrk="0" hangingPunct="1">
       <a:defRPr sz="1800" kern="1200">
         <a:solidFill>
           <a:schemeClr val="tx1"/>
@@ -83,7 +83,7 @@
         <a:cs typeface="+mn-cs"/>
       </a:defRPr>
     </a:lvl7pPr>
-    <a:lvl8pPr marL="3200400" algn="l" defTabSz="457200" rtl="0" eaLnBrk="1" latinLnBrk="0" hangingPunct="1">
+    <a:lvl8pPr marL="3200400" algn="l" defTabSz="914400" rtl="0" eaLnBrk="1" latinLnBrk="0" hangingPunct="1">
       <a:defRPr sz="1800" kern="1200">
         <a:solidFill>
           <a:schemeClr val="tx1"/>
@@ -93,7 +93,7 @@
         <a:cs typeface="+mn-cs"/>
       </a:defRPr>
     </a:lvl8pPr>
-    <a:lvl9pPr marL="3657600" algn="l" defTabSz="457200" rtl="0" eaLnBrk="1" latinLnBrk="0" hangingPunct="1">
+    <a:lvl9pPr marL="3657600" algn="l" defTabSz="914400" rtl="0" eaLnBrk="1" latinLnBrk="0" hangingPunct="1">
       <a:defRPr sz="1800" kern="1200">
         <a:solidFill>
           <a:schemeClr val="tx1"/>
@@ -104,22 +104,6 @@
       </a:defRPr>
     </a:lvl9pPr>
   </p:defaultTextStyle>
-  <p:extLst>
-    <p:ext uri="{EFAFB233-063F-42B5-8137-9DF3F51BA10A}">
-      <p15:sldGuideLst xmlns:p15="http://schemas.microsoft.com/office/powerpoint/2012/main">
-        <p15:guide id="1" orient="horz" pos="2160">
-          <p15:clr>
-            <a:srgbClr val="A4A3A4"/>
-          </p15:clr>
-        </p15:guide>
-        <p15:guide id="2" pos="2304">
-          <p15:clr>
-            <a:srgbClr val="A4A3A4"/>
-          </p15:clr>
-        </p15:guide>
-      </p15:sldGuideLst>
-    </p:ext>
-  </p:extLst>
 </p:presentation>
 </file>
 
@@ -152,18 +136,23 @@
         </p:nvSpPr>
         <p:spPr>
           <a:xfrm>
-            <a:off x="548640" y="2130427"/>
-            <a:ext cx="6217920" cy="1470025"/>
+            <a:off x="1524000" y="897890"/>
+            <a:ext cx="9144000" cy="1910080"/>
           </a:xfrm>
         </p:spPr>
         <p:txBody>
-          <a:bodyPr/>
-          <a:lstStyle/>
+          <a:bodyPr anchor="b"/>
+          <a:lstStyle>
+            <a:lvl1pPr algn="ctr">
+              <a:defRPr sz="4800"/>
+            </a:lvl1pPr>
+          </a:lstStyle>
           <a:p>
             <a:r>
               <a:rPr lang="en-US"/>
               <a:t>Click to edit Master title style</a:t>
             </a:r>
+            <a:endParaRPr lang="en-US" dirty="0"/>
           </a:p>
         </p:txBody>
       </p:sp>
@@ -179,8 +168,8 @@
         </p:nvSpPr>
         <p:spPr>
           <a:xfrm>
-            <a:off x="1097280" y="3886200"/>
-            <a:ext cx="5120640" cy="1752600"/>
+            <a:off x="1524000" y="2881630"/>
+            <a:ext cx="9144000" cy="1324610"/>
           </a:xfrm>
         </p:spPr>
         <p:txBody>
@@ -188,93 +177,39 @@
           <a:lstStyle>
             <a:lvl1pPr marL="0" indent="0" algn="ctr">
               <a:buNone/>
-              <a:defRPr>
-                <a:solidFill>
-                  <a:schemeClr val="tx1">
-                    <a:tint val="75000"/>
-                  </a:schemeClr>
-                </a:solidFill>
-              </a:defRPr>
+              <a:defRPr sz="1920"/>
             </a:lvl1pPr>
-            <a:lvl2pPr marL="457200" indent="0" algn="ctr">
-              <a:buNone/>
-              <a:defRPr>
-                <a:solidFill>
-                  <a:schemeClr val="tx1">
-                    <a:tint val="75000"/>
-                  </a:schemeClr>
-                </a:solidFill>
-              </a:defRPr>
+            <a:lvl2pPr marL="365760" indent="0" algn="ctr">
+              <a:buNone/>
+              <a:defRPr sz="1600"/>
             </a:lvl2pPr>
-            <a:lvl3pPr marL="914400" indent="0" algn="ctr">
-              <a:buNone/>
-              <a:defRPr>
-                <a:solidFill>
-                  <a:schemeClr val="tx1">
-                    <a:tint val="75000"/>
-                  </a:schemeClr>
-                </a:solidFill>
-              </a:defRPr>
+            <a:lvl3pPr marL="731520" indent="0" algn="ctr">
+              <a:buNone/>
+              <a:defRPr sz="1440"/>
             </a:lvl3pPr>
-            <a:lvl4pPr marL="1371600" indent="0" algn="ctr">
-              <a:buNone/>
-              <a:defRPr>
-                <a:solidFill>
-                  <a:schemeClr val="tx1">
-                    <a:tint val="75000"/>
-                  </a:schemeClr>
-                </a:solidFill>
-              </a:defRPr>
+            <a:lvl4pPr marL="1097280" indent="0" algn="ctr">
+              <a:buNone/>
+              <a:defRPr sz="1280"/>
             </a:lvl4pPr>
-            <a:lvl5pPr marL="1828800" indent="0" algn="ctr">
-              <a:buNone/>
-              <a:defRPr>
-                <a:solidFill>
-                  <a:schemeClr val="tx1">
-                    <a:tint val="75000"/>
-                  </a:schemeClr>
-                </a:solidFill>
-              </a:defRPr>
+            <a:lvl5pPr marL="1463040" indent="0" algn="ctr">
+              <a:buNone/>
+              <a:defRPr sz="1280"/>
             </a:lvl5pPr>
-            <a:lvl6pPr marL="2286000" indent="0" algn="ctr">
-              <a:buNone/>
-              <a:defRPr>
-                <a:solidFill>
-                  <a:schemeClr val="tx1">
-                    <a:tint val="75000"/>
-                  </a:schemeClr>
-                </a:solidFill>
-              </a:defRPr>
+            <a:lvl6pPr marL="1828800" indent="0" algn="ctr">
+              <a:buNone/>
+              <a:defRPr sz="1280"/>
             </a:lvl6pPr>
-            <a:lvl7pPr marL="2743200" indent="0" algn="ctr">
-              <a:buNone/>
-              <a:defRPr>
-                <a:solidFill>
-                  <a:schemeClr val="tx1">
-                    <a:tint val="75000"/>
-                  </a:schemeClr>
-                </a:solidFill>
-              </a:defRPr>
+            <a:lvl7pPr marL="2194560" indent="0" algn="ctr">
+              <a:buNone/>
+              <a:defRPr sz="1280"/>
             </a:lvl7pPr>
-            <a:lvl8pPr marL="3200400" indent="0" algn="ctr">
-              <a:buNone/>
-              <a:defRPr>
-                <a:solidFill>
-                  <a:schemeClr val="tx1">
-                    <a:tint val="75000"/>
-                  </a:schemeClr>
-                </a:solidFill>
-              </a:defRPr>
+            <a:lvl8pPr marL="2560320" indent="0" algn="ctr">
+              <a:buNone/>
+              <a:defRPr sz="1280"/>
             </a:lvl8pPr>
-            <a:lvl9pPr marL="3657600" indent="0" algn="ctr">
-              <a:buNone/>
-              <a:defRPr>
-                <a:solidFill>
-                  <a:schemeClr val="tx1">
-                    <a:tint val="75000"/>
-                  </a:schemeClr>
-                </a:solidFill>
-              </a:defRPr>
+            <a:lvl9pPr marL="2926080" indent="0" algn="ctr">
+              <a:buNone/>
+              <a:defRPr sz="1280"/>
             </a:lvl9pPr>
           </a:lstStyle>
           <a:p>
@@ -282,6 +217,7 @@
               <a:rPr lang="en-US"/>
               <a:t>Click to edit Master subtitle style</a:t>
             </a:r>
+            <a:endParaRPr lang="en-US" dirty="0"/>
           </a:p>
         </p:txBody>
       </p:sp>
@@ -300,9 +236,9 @@
           <a:bodyPr/>
           <a:lstStyle/>
           <a:p>
-            <a:fld id="{E46B84FF-1CFF-E849-8ACF-6EE548EC4909}" type="datetimeFigureOut">
+            <a:fld id="{DCE07B5D-B400-BC43-987A-7D391B225B8E}" type="datetimeFigureOut">
               <a:rPr lang="en-US" smtClean="0"/>
-              <a:t>4/24/18</a:t>
+              <a:t>5/8/18</a:t>
             </a:fld>
             <a:endParaRPr lang="en-US"/>
           </a:p>
@@ -342,7 +278,7 @@
           <a:bodyPr/>
           <a:lstStyle/>
           <a:p>
-            <a:fld id="{41E21619-B06F-8741-841E-1304CC122878}" type="slidenum">
+            <a:fld id="{3F532232-9CF6-5745-B370-2A4C99755DBD}" type="slidenum">
               <a:rPr lang="en-US" smtClean="0"/>
               <a:t>‹#›</a:t>
             </a:fld>
@@ -353,7 +289,7 @@
     </p:spTree>
     <p:extLst>
       <p:ext uri="{BB962C8B-B14F-4D97-AF65-F5344CB8AC3E}">
-        <p14:creationId xmlns:p14="http://schemas.microsoft.com/office/powerpoint/2010/main" val="1199833558"/>
+        <p14:creationId xmlns:p14="http://schemas.microsoft.com/office/powerpoint/2010/main" val="4023275150"/>
       </p:ext>
     </p:extLst>
   </p:cSld>
@@ -399,6 +335,7 @@
               <a:rPr lang="en-US"/>
               <a:t>Click to edit Master title style</a:t>
             </a:r>
+            <a:endParaRPr lang="en-US" dirty="0"/>
           </a:p>
         </p:txBody>
       </p:sp>
@@ -420,7 +357,7 @@
             <a:pPr lvl="0"/>
             <a:r>
               <a:rPr lang="en-US"/>
-              <a:t>Click to edit Master text styles</a:t>
+              <a:t>Edit Master text styles</a:t>
             </a:r>
           </a:p>
           <a:p>
@@ -450,6 +387,7 @@
               <a:rPr lang="en-US"/>
               <a:t>Fifth level</a:t>
             </a:r>
+            <a:endParaRPr lang="en-US" dirty="0"/>
           </a:p>
         </p:txBody>
       </p:sp>
@@ -468,9 +406,9 @@
           <a:bodyPr/>
           <a:lstStyle/>
           <a:p>
-            <a:fld id="{E46B84FF-1CFF-E849-8ACF-6EE548EC4909}" type="datetimeFigureOut">
+            <a:fld id="{DCE07B5D-B400-BC43-987A-7D391B225B8E}" type="datetimeFigureOut">
               <a:rPr lang="en-US" smtClean="0"/>
-              <a:t>4/24/18</a:t>
+              <a:t>5/8/18</a:t>
             </a:fld>
             <a:endParaRPr lang="en-US"/>
           </a:p>
@@ -510,7 +448,7 @@
           <a:bodyPr/>
           <a:lstStyle/>
           <a:p>
-            <a:fld id="{41E21619-B06F-8741-841E-1304CC122878}" type="slidenum">
+            <a:fld id="{3F532232-9CF6-5745-B370-2A4C99755DBD}" type="slidenum">
               <a:rPr lang="en-US" smtClean="0"/>
               <a:t>‹#›</a:t>
             </a:fld>
@@ -521,7 +459,7 @@
     </p:spTree>
     <p:extLst>
       <p:ext uri="{BB962C8B-B14F-4D97-AF65-F5344CB8AC3E}">
-        <p14:creationId xmlns:p14="http://schemas.microsoft.com/office/powerpoint/2010/main" val="2789407353"/>
+        <p14:creationId xmlns:p14="http://schemas.microsoft.com/office/powerpoint/2010/main" val="600004049"/>
       </p:ext>
     </p:extLst>
   </p:cSld>
@@ -560,8 +498,8 @@
         </p:nvSpPr>
         <p:spPr>
           <a:xfrm>
-            <a:off x="5303520" y="274640"/>
-            <a:ext cx="1645920" cy="5851525"/>
+            <a:off x="8724900" y="292100"/>
+            <a:ext cx="2628900" cy="4649470"/>
           </a:xfrm>
         </p:spPr>
         <p:txBody>
@@ -572,6 +510,7 @@
               <a:rPr lang="en-US"/>
               <a:t>Click to edit Master title style</a:t>
             </a:r>
+            <a:endParaRPr lang="en-US" dirty="0"/>
           </a:p>
         </p:txBody>
       </p:sp>
@@ -587,8 +526,8 @@
         </p:nvSpPr>
         <p:spPr>
           <a:xfrm>
-            <a:off x="365760" y="274640"/>
-            <a:ext cx="4815840" cy="5851525"/>
+            <a:off x="838200" y="292100"/>
+            <a:ext cx="7734300" cy="4649470"/>
           </a:xfrm>
         </p:spPr>
         <p:txBody>
@@ -598,7 +537,7 @@
             <a:pPr lvl="0"/>
             <a:r>
               <a:rPr lang="en-US"/>
-              <a:t>Click to edit Master text styles</a:t>
+              <a:t>Edit Master text styles</a:t>
             </a:r>
           </a:p>
           <a:p>
@@ -628,6 +567,7 @@
               <a:rPr lang="en-US"/>
               <a:t>Fifth level</a:t>
             </a:r>
+            <a:endParaRPr lang="en-US" dirty="0"/>
           </a:p>
         </p:txBody>
       </p:sp>
@@ -646,9 +586,9 @@
           <a:bodyPr/>
           <a:lstStyle/>
           <a:p>
-            <a:fld id="{E46B84FF-1CFF-E849-8ACF-6EE548EC4909}" type="datetimeFigureOut">
+            <a:fld id="{DCE07B5D-B400-BC43-987A-7D391B225B8E}" type="datetimeFigureOut">
               <a:rPr lang="en-US" smtClean="0"/>
-              <a:t>4/24/18</a:t>
+              <a:t>5/8/18</a:t>
             </a:fld>
             <a:endParaRPr lang="en-US"/>
           </a:p>
@@ -688,7 +628,7 @@
           <a:bodyPr/>
           <a:lstStyle/>
           <a:p>
-            <a:fld id="{41E21619-B06F-8741-841E-1304CC122878}" type="slidenum">
+            <a:fld id="{3F532232-9CF6-5745-B370-2A4C99755DBD}" type="slidenum">
               <a:rPr lang="en-US" smtClean="0"/>
               <a:t>‹#›</a:t>
             </a:fld>
@@ -699,7 +639,7 @@
     </p:spTree>
     <p:extLst>
       <p:ext uri="{BB962C8B-B14F-4D97-AF65-F5344CB8AC3E}">
-        <p14:creationId xmlns:p14="http://schemas.microsoft.com/office/powerpoint/2010/main" val="4265790926"/>
+        <p14:creationId xmlns:p14="http://schemas.microsoft.com/office/powerpoint/2010/main" val="803929241"/>
       </p:ext>
     </p:extLst>
   </p:cSld>
@@ -745,6 +685,7 @@
               <a:rPr lang="en-US"/>
               <a:t>Click to edit Master title style</a:t>
             </a:r>
+            <a:endParaRPr lang="en-US" dirty="0"/>
           </a:p>
         </p:txBody>
       </p:sp>
@@ -766,7 +707,7 @@
             <a:pPr lvl="0"/>
             <a:r>
               <a:rPr lang="en-US"/>
-              <a:t>Click to edit Master text styles</a:t>
+              <a:t>Edit Master text styles</a:t>
             </a:r>
           </a:p>
           <a:p>
@@ -796,6 +737,7 @@
               <a:rPr lang="en-US"/>
               <a:t>Fifth level</a:t>
             </a:r>
+            <a:endParaRPr lang="en-US" dirty="0"/>
           </a:p>
         </p:txBody>
       </p:sp>
@@ -814,9 +756,9 @@
           <a:bodyPr/>
           <a:lstStyle/>
           <a:p>
-            <a:fld id="{E46B84FF-1CFF-E849-8ACF-6EE548EC4909}" type="datetimeFigureOut">
+            <a:fld id="{DCE07B5D-B400-BC43-987A-7D391B225B8E}" type="datetimeFigureOut">
               <a:rPr lang="en-US" smtClean="0"/>
-              <a:t>4/24/18</a:t>
+              <a:t>5/8/18</a:t>
             </a:fld>
             <a:endParaRPr lang="en-US"/>
           </a:p>
@@ -856,7 +798,7 @@
           <a:bodyPr/>
           <a:lstStyle/>
           <a:p>
-            <a:fld id="{41E21619-B06F-8741-841E-1304CC122878}" type="slidenum">
+            <a:fld id="{3F532232-9CF6-5745-B370-2A4C99755DBD}" type="slidenum">
               <a:rPr lang="en-US" smtClean="0"/>
               <a:t>‹#›</a:t>
             </a:fld>
@@ -867,7 +809,7 @@
     </p:spTree>
     <p:extLst>
       <p:ext uri="{BB962C8B-B14F-4D97-AF65-F5344CB8AC3E}">
-        <p14:creationId xmlns:p14="http://schemas.microsoft.com/office/powerpoint/2010/main" val="131702214"/>
+        <p14:creationId xmlns:p14="http://schemas.microsoft.com/office/powerpoint/2010/main" val="490622949"/>
       </p:ext>
     </p:extLst>
   </p:cSld>
@@ -906,15 +848,15 @@
         </p:nvSpPr>
         <p:spPr>
           <a:xfrm>
-            <a:off x="577851" y="4406902"/>
-            <a:ext cx="6217920" cy="1362075"/>
+            <a:off x="831850" y="1367791"/>
+            <a:ext cx="10515600" cy="2282190"/>
           </a:xfrm>
         </p:spPr>
         <p:txBody>
-          <a:bodyPr anchor="t"/>
+          <a:bodyPr anchor="b"/>
           <a:lstStyle>
-            <a:lvl1pPr algn="l">
-              <a:defRPr sz="4000" b="1" cap="all"/>
+            <a:lvl1pPr>
+              <a:defRPr sz="4800"/>
             </a:lvl1pPr>
           </a:lstStyle>
           <a:p>
@@ -922,6 +864,7 @@
               <a:rPr lang="en-US"/>
               <a:t>Click to edit Master title style</a:t>
             </a:r>
+            <a:endParaRPr lang="en-US" dirty="0"/>
           </a:p>
         </p:txBody>
       </p:sp>
@@ -937,16 +880,16 @@
         </p:nvSpPr>
         <p:spPr>
           <a:xfrm>
-            <a:off x="577851" y="2906713"/>
-            <a:ext cx="6217920" cy="1500187"/>
+            <a:off x="831850" y="3671571"/>
+            <a:ext cx="10515600" cy="1200150"/>
           </a:xfrm>
         </p:spPr>
         <p:txBody>
-          <a:bodyPr anchor="b"/>
+          <a:bodyPr/>
           <a:lstStyle>
             <a:lvl1pPr marL="0" indent="0">
               <a:buNone/>
-              <a:defRPr sz="2000">
+              <a:defRPr sz="1920">
                 <a:solidFill>
                   <a:schemeClr val="tx1">
                     <a:tint val="75000"/>
@@ -954,9 +897,9 @@
                 </a:solidFill>
               </a:defRPr>
             </a:lvl1pPr>
-            <a:lvl2pPr marL="457200" indent="0">
-              <a:buNone/>
-              <a:defRPr sz="1800">
+            <a:lvl2pPr marL="365760" indent="0">
+              <a:buNone/>
+              <a:defRPr sz="1600">
                 <a:solidFill>
                   <a:schemeClr val="tx1">
                     <a:tint val="75000"/>
@@ -964,9 +907,9 @@
                 </a:solidFill>
               </a:defRPr>
             </a:lvl2pPr>
-            <a:lvl3pPr marL="914400" indent="0">
-              <a:buNone/>
-              <a:defRPr sz="1600">
+            <a:lvl3pPr marL="731520" indent="0">
+              <a:buNone/>
+              <a:defRPr sz="1440">
                 <a:solidFill>
                   <a:schemeClr val="tx1">
                     <a:tint val="75000"/>
@@ -974,9 +917,9 @@
                 </a:solidFill>
               </a:defRPr>
             </a:lvl3pPr>
-            <a:lvl4pPr marL="1371600" indent="0">
-              <a:buNone/>
-              <a:defRPr sz="1400">
+            <a:lvl4pPr marL="1097280" indent="0">
+              <a:buNone/>
+              <a:defRPr sz="1280">
                 <a:solidFill>
                   <a:schemeClr val="tx1">
                     <a:tint val="75000"/>
@@ -984,9 +927,9 @@
                 </a:solidFill>
               </a:defRPr>
             </a:lvl4pPr>
-            <a:lvl5pPr marL="1828800" indent="0">
-              <a:buNone/>
-              <a:defRPr sz="1400">
+            <a:lvl5pPr marL="1463040" indent="0">
+              <a:buNone/>
+              <a:defRPr sz="1280">
                 <a:solidFill>
                   <a:schemeClr val="tx1">
                     <a:tint val="75000"/>
@@ -994,9 +937,9 @@
                 </a:solidFill>
               </a:defRPr>
             </a:lvl5pPr>
-            <a:lvl6pPr marL="2286000" indent="0">
-              <a:buNone/>
-              <a:defRPr sz="1400">
+            <a:lvl6pPr marL="1828800" indent="0">
+              <a:buNone/>
+              <a:defRPr sz="1280">
                 <a:solidFill>
                   <a:schemeClr val="tx1">
                     <a:tint val="75000"/>
@@ -1004,9 +947,9 @@
                 </a:solidFill>
               </a:defRPr>
             </a:lvl6pPr>
-            <a:lvl7pPr marL="2743200" indent="0">
-              <a:buNone/>
-              <a:defRPr sz="1400">
+            <a:lvl7pPr marL="2194560" indent="0">
+              <a:buNone/>
+              <a:defRPr sz="1280">
                 <a:solidFill>
                   <a:schemeClr val="tx1">
                     <a:tint val="75000"/>
@@ -1014,9 +957,9 @@
                 </a:solidFill>
               </a:defRPr>
             </a:lvl7pPr>
-            <a:lvl8pPr marL="3200400" indent="0">
-              <a:buNone/>
-              <a:defRPr sz="1400">
+            <a:lvl8pPr marL="2560320" indent="0">
+              <a:buNone/>
+              <a:defRPr sz="1280">
                 <a:solidFill>
                   <a:schemeClr val="tx1">
                     <a:tint val="75000"/>
@@ -1024,9 +967,9 @@
                 </a:solidFill>
               </a:defRPr>
             </a:lvl8pPr>
-            <a:lvl9pPr marL="3657600" indent="0">
-              <a:buNone/>
-              <a:defRPr sz="1400">
+            <a:lvl9pPr marL="2926080" indent="0">
+              <a:buNone/>
+              <a:defRPr sz="1280">
                 <a:solidFill>
                   <a:schemeClr val="tx1">
                     <a:tint val="75000"/>
@@ -1039,7 +982,7 @@
             <a:pPr lvl="0"/>
             <a:r>
               <a:rPr lang="en-US"/>
-              <a:t>Click to edit Master text styles</a:t>
+              <a:t>Edit Master text styles</a:t>
             </a:r>
           </a:p>
         </p:txBody>
@@ -1059,9 +1002,9 @@
           <a:bodyPr/>
           <a:lstStyle/>
           <a:p>
-            <a:fld id="{E46B84FF-1CFF-E849-8ACF-6EE548EC4909}" type="datetimeFigureOut">
+            <a:fld id="{DCE07B5D-B400-BC43-987A-7D391B225B8E}" type="datetimeFigureOut">
               <a:rPr lang="en-US" smtClean="0"/>
-              <a:t>4/24/18</a:t>
+              <a:t>5/8/18</a:t>
             </a:fld>
             <a:endParaRPr lang="en-US"/>
           </a:p>
@@ -1101,7 +1044,7 @@
           <a:bodyPr/>
           <a:lstStyle/>
           <a:p>
-            <a:fld id="{41E21619-B06F-8741-841E-1304CC122878}" type="slidenum">
+            <a:fld id="{3F532232-9CF6-5745-B370-2A4C99755DBD}" type="slidenum">
               <a:rPr lang="en-US" smtClean="0"/>
               <a:t>‹#›</a:t>
             </a:fld>
@@ -1112,7 +1055,7 @@
     </p:spTree>
     <p:extLst>
       <p:ext uri="{BB962C8B-B14F-4D97-AF65-F5344CB8AC3E}">
-        <p14:creationId xmlns:p14="http://schemas.microsoft.com/office/powerpoint/2010/main" val="794223562"/>
+        <p14:creationId xmlns:p14="http://schemas.microsoft.com/office/powerpoint/2010/main" val="1244655996"/>
       </p:ext>
     </p:extLst>
   </p:cSld>
@@ -1158,6 +1101,7 @@
               <a:rPr lang="en-US"/>
               <a:t>Click to edit Master title style</a:t>
             </a:r>
+            <a:endParaRPr lang="en-US" dirty="0"/>
           </a:p>
         </p:txBody>
       </p:sp>
@@ -1173,46 +1117,18 @@
         </p:nvSpPr>
         <p:spPr>
           <a:xfrm>
-            <a:off x="365760" y="1600202"/>
-            <a:ext cx="3230880" cy="4525963"/>
+            <a:off x="838200" y="1460500"/>
+            <a:ext cx="5181600" cy="3481070"/>
           </a:xfrm>
         </p:spPr>
         <p:txBody>
           <a:bodyPr/>
-          <a:lstStyle>
-            <a:lvl1pPr>
-              <a:defRPr sz="2800"/>
-            </a:lvl1pPr>
-            <a:lvl2pPr>
-              <a:defRPr sz="2400"/>
-            </a:lvl2pPr>
-            <a:lvl3pPr>
-              <a:defRPr sz="2000"/>
-            </a:lvl3pPr>
-            <a:lvl4pPr>
-              <a:defRPr sz="1800"/>
-            </a:lvl4pPr>
-            <a:lvl5pPr>
-              <a:defRPr sz="1800"/>
-            </a:lvl5pPr>
-            <a:lvl6pPr>
-              <a:defRPr sz="1800"/>
-            </a:lvl6pPr>
-            <a:lvl7pPr>
-              <a:defRPr sz="1800"/>
-            </a:lvl7pPr>
-            <a:lvl8pPr>
-              <a:defRPr sz="1800"/>
-            </a:lvl8pPr>
-            <a:lvl9pPr>
-              <a:defRPr sz="1800"/>
-            </a:lvl9pPr>
-          </a:lstStyle>
+          <a:lstStyle/>
           <a:p>
             <a:pPr lvl="0"/>
             <a:r>
               <a:rPr lang="en-US"/>
-              <a:t>Click to edit Master text styles</a:t>
+              <a:t>Edit Master text styles</a:t>
             </a:r>
           </a:p>
           <a:p>
@@ -1242,6 +1158,7 @@
               <a:rPr lang="en-US"/>
               <a:t>Fifth level</a:t>
             </a:r>
+            <a:endParaRPr lang="en-US" dirty="0"/>
           </a:p>
         </p:txBody>
       </p:sp>
@@ -1257,46 +1174,18 @@
         </p:nvSpPr>
         <p:spPr>
           <a:xfrm>
-            <a:off x="3718560" y="1600202"/>
-            <a:ext cx="3230880" cy="4525963"/>
+            <a:off x="6172200" y="1460500"/>
+            <a:ext cx="5181600" cy="3481070"/>
           </a:xfrm>
         </p:spPr>
         <p:txBody>
           <a:bodyPr/>
-          <a:lstStyle>
-            <a:lvl1pPr>
-              <a:defRPr sz="2800"/>
-            </a:lvl1pPr>
-            <a:lvl2pPr>
-              <a:defRPr sz="2400"/>
-            </a:lvl2pPr>
-            <a:lvl3pPr>
-              <a:defRPr sz="2000"/>
-            </a:lvl3pPr>
-            <a:lvl4pPr>
-              <a:defRPr sz="1800"/>
-            </a:lvl4pPr>
-            <a:lvl5pPr>
-              <a:defRPr sz="1800"/>
-            </a:lvl5pPr>
-            <a:lvl6pPr>
-              <a:defRPr sz="1800"/>
-            </a:lvl6pPr>
-            <a:lvl7pPr>
-              <a:defRPr sz="1800"/>
-            </a:lvl7pPr>
-            <a:lvl8pPr>
-              <a:defRPr sz="1800"/>
-            </a:lvl8pPr>
-            <a:lvl9pPr>
-              <a:defRPr sz="1800"/>
-            </a:lvl9pPr>
-          </a:lstStyle>
+          <a:lstStyle/>
           <a:p>
             <a:pPr lvl="0"/>
             <a:r>
               <a:rPr lang="en-US"/>
-              <a:t>Click to edit Master text styles</a:t>
+              <a:t>Edit Master text styles</a:t>
             </a:r>
           </a:p>
           <a:p>
@@ -1326,6 +1215,7 @@
               <a:rPr lang="en-US"/>
               <a:t>Fifth level</a:t>
             </a:r>
+            <a:endParaRPr lang="en-US" dirty="0"/>
           </a:p>
         </p:txBody>
       </p:sp>
@@ -1344,9 +1234,9 @@
           <a:bodyPr/>
           <a:lstStyle/>
           <a:p>
-            <a:fld id="{E46B84FF-1CFF-E849-8ACF-6EE548EC4909}" type="datetimeFigureOut">
+            <a:fld id="{DCE07B5D-B400-BC43-987A-7D391B225B8E}" type="datetimeFigureOut">
               <a:rPr lang="en-US" smtClean="0"/>
-              <a:t>4/24/18</a:t>
+              <a:t>5/8/18</a:t>
             </a:fld>
             <a:endParaRPr lang="en-US"/>
           </a:p>
@@ -1386,7 +1276,7 @@
           <a:bodyPr/>
           <a:lstStyle/>
           <a:p>
-            <a:fld id="{41E21619-B06F-8741-841E-1304CC122878}" type="slidenum">
+            <a:fld id="{3F532232-9CF6-5745-B370-2A4C99755DBD}" type="slidenum">
               <a:rPr lang="en-US" smtClean="0"/>
               <a:t>‹#›</a:t>
             </a:fld>
@@ -1397,7 +1287,7 @@
     </p:spTree>
     <p:extLst>
       <p:ext uri="{BB962C8B-B14F-4D97-AF65-F5344CB8AC3E}">
-        <p14:creationId xmlns:p14="http://schemas.microsoft.com/office/powerpoint/2010/main" val="1630862932"/>
+        <p14:creationId xmlns:p14="http://schemas.microsoft.com/office/powerpoint/2010/main" val="2789841517"/>
       </p:ext>
     </p:extLst>
   </p:cSld>
@@ -1434,36 +1324,38 @@
             <p:ph type="title"/>
           </p:nvPr>
         </p:nvSpPr>
-        <p:spPr/>
-        <p:txBody>
-          <a:bodyPr/>
-          <a:lstStyle>
-            <a:lvl1pPr>
-              <a:defRPr/>
-            </a:lvl1pPr>
-          </a:lstStyle>
-          <a:p>
-            <a:r>
-              <a:rPr lang="en-US"/>
-              <a:t>Click to edit Master title style</a:t>
-            </a:r>
-          </a:p>
-        </p:txBody>
-      </p:sp>
-      <p:sp>
-        <p:nvSpPr>
-          <p:cNvPr id="3" name="Text Placeholder 2"/>
-          <p:cNvSpPr>
-            <a:spLocks noGrp="1"/>
-          </p:cNvSpPr>
-          <p:nvPr>
-            <p:ph type="body" idx="1"/>
-          </p:nvPr>
-        </p:nvSpPr>
         <p:spPr>
           <a:xfrm>
-            <a:off x="365761" y="1535113"/>
-            <a:ext cx="3232150" cy="639762"/>
+            <a:off x="839788" y="292101"/>
+            <a:ext cx="10515600" cy="1060450"/>
+          </a:xfrm>
+        </p:spPr>
+        <p:txBody>
+          <a:bodyPr/>
+          <a:lstStyle/>
+          <a:p>
+            <a:r>
+              <a:rPr lang="en-US"/>
+              <a:t>Click to edit Master title style</a:t>
+            </a:r>
+            <a:endParaRPr lang="en-US" dirty="0"/>
+          </a:p>
+        </p:txBody>
+      </p:sp>
+      <p:sp>
+        <p:nvSpPr>
+          <p:cNvPr id="3" name="Text Placeholder 2"/>
+          <p:cNvSpPr>
+            <a:spLocks noGrp="1"/>
+          </p:cNvSpPr>
+          <p:nvPr>
+            <p:ph type="body" idx="1"/>
+          </p:nvPr>
+        </p:nvSpPr>
+        <p:spPr>
+          <a:xfrm>
+            <a:off x="839789" y="1344930"/>
+            <a:ext cx="5157787" cy="659130"/>
           </a:xfrm>
         </p:spPr>
         <p:txBody>
@@ -1471,46 +1363,46 @@
           <a:lstStyle>
             <a:lvl1pPr marL="0" indent="0">
               <a:buNone/>
-              <a:defRPr sz="2400" b="1"/>
+              <a:defRPr sz="1920" b="1"/>
             </a:lvl1pPr>
-            <a:lvl2pPr marL="457200" indent="0">
-              <a:buNone/>
-              <a:defRPr sz="2000" b="1"/>
+            <a:lvl2pPr marL="365760" indent="0">
+              <a:buNone/>
+              <a:defRPr sz="1600" b="1"/>
             </a:lvl2pPr>
-            <a:lvl3pPr marL="914400" indent="0">
-              <a:buNone/>
-              <a:defRPr sz="1800" b="1"/>
+            <a:lvl3pPr marL="731520" indent="0">
+              <a:buNone/>
+              <a:defRPr sz="1440" b="1"/>
             </a:lvl3pPr>
-            <a:lvl4pPr marL="1371600" indent="0">
-              <a:buNone/>
-              <a:defRPr sz="1600" b="1"/>
+            <a:lvl4pPr marL="1097280" indent="0">
+              <a:buNone/>
+              <a:defRPr sz="1280" b="1"/>
             </a:lvl4pPr>
-            <a:lvl5pPr marL="1828800" indent="0">
-              <a:buNone/>
-              <a:defRPr sz="1600" b="1"/>
+            <a:lvl5pPr marL="1463040" indent="0">
+              <a:buNone/>
+              <a:defRPr sz="1280" b="1"/>
             </a:lvl5pPr>
-            <a:lvl6pPr marL="2286000" indent="0">
-              <a:buNone/>
-              <a:defRPr sz="1600" b="1"/>
+            <a:lvl6pPr marL="1828800" indent="0">
+              <a:buNone/>
+              <a:defRPr sz="1280" b="1"/>
             </a:lvl6pPr>
-            <a:lvl7pPr marL="2743200" indent="0">
-              <a:buNone/>
-              <a:defRPr sz="1600" b="1"/>
+            <a:lvl7pPr marL="2194560" indent="0">
+              <a:buNone/>
+              <a:defRPr sz="1280" b="1"/>
             </a:lvl7pPr>
-            <a:lvl8pPr marL="3200400" indent="0">
-              <a:buNone/>
-              <a:defRPr sz="1600" b="1"/>
+            <a:lvl8pPr marL="2560320" indent="0">
+              <a:buNone/>
+              <a:defRPr sz="1280" b="1"/>
             </a:lvl8pPr>
-            <a:lvl9pPr marL="3657600" indent="0">
-              <a:buNone/>
-              <a:defRPr sz="1600" b="1"/>
+            <a:lvl9pPr marL="2926080" indent="0">
+              <a:buNone/>
+              <a:defRPr sz="1280" b="1"/>
             </a:lvl9pPr>
           </a:lstStyle>
           <a:p>
             <a:pPr lvl="0"/>
             <a:r>
               <a:rPr lang="en-US"/>
-              <a:t>Click to edit Master text styles</a:t>
+              <a:t>Edit Master text styles</a:t>
             </a:r>
           </a:p>
         </p:txBody>
@@ -1527,46 +1419,18 @@
         </p:nvSpPr>
         <p:spPr>
           <a:xfrm>
-            <a:off x="365761" y="2174875"/>
-            <a:ext cx="3232150" cy="3951288"/>
+            <a:off x="839789" y="2004060"/>
+            <a:ext cx="5157787" cy="2947670"/>
           </a:xfrm>
         </p:spPr>
         <p:txBody>
           <a:bodyPr/>
-          <a:lstStyle>
-            <a:lvl1pPr>
-              <a:defRPr sz="2400"/>
-            </a:lvl1pPr>
-            <a:lvl2pPr>
-              <a:defRPr sz="2000"/>
-            </a:lvl2pPr>
-            <a:lvl3pPr>
-              <a:defRPr sz="1800"/>
-            </a:lvl3pPr>
-            <a:lvl4pPr>
-              <a:defRPr sz="1600"/>
-            </a:lvl4pPr>
-            <a:lvl5pPr>
-              <a:defRPr sz="1600"/>
-            </a:lvl5pPr>
-            <a:lvl6pPr>
-              <a:defRPr sz="1600"/>
-            </a:lvl6pPr>
-            <a:lvl7pPr>
-              <a:defRPr sz="1600"/>
-            </a:lvl7pPr>
-            <a:lvl8pPr>
-              <a:defRPr sz="1600"/>
-            </a:lvl8pPr>
-            <a:lvl9pPr>
-              <a:defRPr sz="1600"/>
-            </a:lvl9pPr>
-          </a:lstStyle>
+          <a:lstStyle/>
           <a:p>
             <a:pPr lvl="0"/>
             <a:r>
               <a:rPr lang="en-US"/>
-              <a:t>Click to edit Master text styles</a:t>
+              <a:t>Edit Master text styles</a:t>
             </a:r>
           </a:p>
           <a:p>
@@ -1596,6 +1460,7 @@
               <a:rPr lang="en-US"/>
               <a:t>Fifth level</a:t>
             </a:r>
+            <a:endParaRPr lang="en-US" dirty="0"/>
           </a:p>
         </p:txBody>
       </p:sp>
@@ -1611,8 +1476,8 @@
         </p:nvSpPr>
         <p:spPr>
           <a:xfrm>
-            <a:off x="3716021" y="1535113"/>
-            <a:ext cx="3233420" cy="639762"/>
+            <a:off x="6172200" y="1344930"/>
+            <a:ext cx="5183188" cy="659130"/>
           </a:xfrm>
         </p:spPr>
         <p:txBody>
@@ -1620,46 +1485,46 @@
           <a:lstStyle>
             <a:lvl1pPr marL="0" indent="0">
               <a:buNone/>
-              <a:defRPr sz="2400" b="1"/>
+              <a:defRPr sz="1920" b="1"/>
             </a:lvl1pPr>
-            <a:lvl2pPr marL="457200" indent="0">
-              <a:buNone/>
-              <a:defRPr sz="2000" b="1"/>
+            <a:lvl2pPr marL="365760" indent="0">
+              <a:buNone/>
+              <a:defRPr sz="1600" b="1"/>
             </a:lvl2pPr>
-            <a:lvl3pPr marL="914400" indent="0">
-              <a:buNone/>
-              <a:defRPr sz="1800" b="1"/>
+            <a:lvl3pPr marL="731520" indent="0">
+              <a:buNone/>
+              <a:defRPr sz="1440" b="1"/>
             </a:lvl3pPr>
-            <a:lvl4pPr marL="1371600" indent="0">
-              <a:buNone/>
-              <a:defRPr sz="1600" b="1"/>
+            <a:lvl4pPr marL="1097280" indent="0">
+              <a:buNone/>
+              <a:defRPr sz="1280" b="1"/>
             </a:lvl4pPr>
-            <a:lvl5pPr marL="1828800" indent="0">
-              <a:buNone/>
-              <a:defRPr sz="1600" b="1"/>
+            <a:lvl5pPr marL="1463040" indent="0">
+              <a:buNone/>
+              <a:defRPr sz="1280" b="1"/>
             </a:lvl5pPr>
-            <a:lvl6pPr marL="2286000" indent="0">
-              <a:buNone/>
-              <a:defRPr sz="1600" b="1"/>
+            <a:lvl6pPr marL="1828800" indent="0">
+              <a:buNone/>
+              <a:defRPr sz="1280" b="1"/>
             </a:lvl6pPr>
-            <a:lvl7pPr marL="2743200" indent="0">
-              <a:buNone/>
-              <a:defRPr sz="1600" b="1"/>
+            <a:lvl7pPr marL="2194560" indent="0">
+              <a:buNone/>
+              <a:defRPr sz="1280" b="1"/>
             </a:lvl7pPr>
-            <a:lvl8pPr marL="3200400" indent="0">
-              <a:buNone/>
-              <a:defRPr sz="1600" b="1"/>
+            <a:lvl8pPr marL="2560320" indent="0">
+              <a:buNone/>
+              <a:defRPr sz="1280" b="1"/>
             </a:lvl8pPr>
-            <a:lvl9pPr marL="3657600" indent="0">
-              <a:buNone/>
-              <a:defRPr sz="1600" b="1"/>
+            <a:lvl9pPr marL="2926080" indent="0">
+              <a:buNone/>
+              <a:defRPr sz="1280" b="1"/>
             </a:lvl9pPr>
           </a:lstStyle>
           <a:p>
             <a:pPr lvl="0"/>
             <a:r>
               <a:rPr lang="en-US"/>
-              <a:t>Click to edit Master text styles</a:t>
+              <a:t>Edit Master text styles</a:t>
             </a:r>
           </a:p>
         </p:txBody>
@@ -1676,46 +1541,18 @@
         </p:nvSpPr>
         <p:spPr>
           <a:xfrm>
-            <a:off x="3716021" y="2174875"/>
-            <a:ext cx="3233420" cy="3951288"/>
+            <a:off x="6172200" y="2004060"/>
+            <a:ext cx="5183188" cy="2947670"/>
           </a:xfrm>
         </p:spPr>
         <p:txBody>
           <a:bodyPr/>
-          <a:lstStyle>
-            <a:lvl1pPr>
-              <a:defRPr sz="2400"/>
-            </a:lvl1pPr>
-            <a:lvl2pPr>
-              <a:defRPr sz="2000"/>
-            </a:lvl2pPr>
-            <a:lvl3pPr>
-              <a:defRPr sz="1800"/>
-            </a:lvl3pPr>
-            <a:lvl4pPr>
-              <a:defRPr sz="1600"/>
-            </a:lvl4pPr>
-            <a:lvl5pPr>
-              <a:defRPr sz="1600"/>
-            </a:lvl5pPr>
-            <a:lvl6pPr>
-              <a:defRPr sz="1600"/>
-            </a:lvl6pPr>
-            <a:lvl7pPr>
-              <a:defRPr sz="1600"/>
-            </a:lvl7pPr>
-            <a:lvl8pPr>
-              <a:defRPr sz="1600"/>
-            </a:lvl8pPr>
-            <a:lvl9pPr>
-              <a:defRPr sz="1600"/>
-            </a:lvl9pPr>
-          </a:lstStyle>
+          <a:lstStyle/>
           <a:p>
             <a:pPr lvl="0"/>
             <a:r>
               <a:rPr lang="en-US"/>
-              <a:t>Click to edit Master text styles</a:t>
+              <a:t>Edit Master text styles</a:t>
             </a:r>
           </a:p>
           <a:p>
@@ -1745,6 +1582,7 @@
               <a:rPr lang="en-US"/>
               <a:t>Fifth level</a:t>
             </a:r>
+            <a:endParaRPr lang="en-US" dirty="0"/>
           </a:p>
         </p:txBody>
       </p:sp>
@@ -1763,9 +1601,9 @@
           <a:bodyPr/>
           <a:lstStyle/>
           <a:p>
-            <a:fld id="{E46B84FF-1CFF-E849-8ACF-6EE548EC4909}" type="datetimeFigureOut">
+            <a:fld id="{DCE07B5D-B400-BC43-987A-7D391B225B8E}" type="datetimeFigureOut">
               <a:rPr lang="en-US" smtClean="0"/>
-              <a:t>4/24/18</a:t>
+              <a:t>5/8/18</a:t>
             </a:fld>
             <a:endParaRPr lang="en-US"/>
           </a:p>
@@ -1805,7 +1643,7 @@
           <a:bodyPr/>
           <a:lstStyle/>
           <a:p>
-            <a:fld id="{41E21619-B06F-8741-841E-1304CC122878}" type="slidenum">
+            <a:fld id="{3F532232-9CF6-5745-B370-2A4C99755DBD}" type="slidenum">
               <a:rPr lang="en-US" smtClean="0"/>
               <a:t>‹#›</a:t>
             </a:fld>
@@ -1816,7 +1654,7 @@
     </p:spTree>
     <p:extLst>
       <p:ext uri="{BB962C8B-B14F-4D97-AF65-F5344CB8AC3E}">
-        <p14:creationId xmlns:p14="http://schemas.microsoft.com/office/powerpoint/2010/main" val="1665378788"/>
+        <p14:creationId xmlns:p14="http://schemas.microsoft.com/office/powerpoint/2010/main" val="3966341586"/>
       </p:ext>
     </p:extLst>
   </p:cSld>
@@ -1862,6 +1700,7 @@
               <a:rPr lang="en-US"/>
               <a:t>Click to edit Master title style</a:t>
             </a:r>
+            <a:endParaRPr lang="en-US" dirty="0"/>
           </a:p>
         </p:txBody>
       </p:sp>
@@ -1880,9 +1719,9 @@
           <a:bodyPr/>
           <a:lstStyle/>
           <a:p>
-            <a:fld id="{E46B84FF-1CFF-E849-8ACF-6EE548EC4909}" type="datetimeFigureOut">
+            <a:fld id="{DCE07B5D-B400-BC43-987A-7D391B225B8E}" type="datetimeFigureOut">
               <a:rPr lang="en-US" smtClean="0"/>
-              <a:t>4/24/18</a:t>
+              <a:t>5/8/18</a:t>
             </a:fld>
             <a:endParaRPr lang="en-US"/>
           </a:p>
@@ -1922,7 +1761,7 @@
           <a:bodyPr/>
           <a:lstStyle/>
           <a:p>
-            <a:fld id="{41E21619-B06F-8741-841E-1304CC122878}" type="slidenum">
+            <a:fld id="{3F532232-9CF6-5745-B370-2A4C99755DBD}" type="slidenum">
               <a:rPr lang="en-US" smtClean="0"/>
               <a:t>‹#›</a:t>
             </a:fld>
@@ -1933,7 +1772,7 @@
     </p:spTree>
     <p:extLst>
       <p:ext uri="{BB962C8B-B14F-4D97-AF65-F5344CB8AC3E}">
-        <p14:creationId xmlns:p14="http://schemas.microsoft.com/office/powerpoint/2010/main" val="2479505938"/>
+        <p14:creationId xmlns:p14="http://schemas.microsoft.com/office/powerpoint/2010/main" val="3203756976"/>
       </p:ext>
     </p:extLst>
   </p:cSld>
@@ -1975,9 +1814,9 @@
           <a:bodyPr/>
           <a:lstStyle/>
           <a:p>
-            <a:fld id="{E46B84FF-1CFF-E849-8ACF-6EE548EC4909}" type="datetimeFigureOut">
+            <a:fld id="{DCE07B5D-B400-BC43-987A-7D391B225B8E}" type="datetimeFigureOut">
               <a:rPr lang="en-US" smtClean="0"/>
-              <a:t>4/24/18</a:t>
+              <a:t>5/8/18</a:t>
             </a:fld>
             <a:endParaRPr lang="en-US"/>
           </a:p>
@@ -2017,7 +1856,7 @@
           <a:bodyPr/>
           <a:lstStyle/>
           <a:p>
-            <a:fld id="{41E21619-B06F-8741-841E-1304CC122878}" type="slidenum">
+            <a:fld id="{3F532232-9CF6-5745-B370-2A4C99755DBD}" type="slidenum">
               <a:rPr lang="en-US" smtClean="0"/>
               <a:t>‹#›</a:t>
             </a:fld>
@@ -2028,7 +1867,7 @@
     </p:spTree>
     <p:extLst>
       <p:ext uri="{BB962C8B-B14F-4D97-AF65-F5344CB8AC3E}">
-        <p14:creationId xmlns:p14="http://schemas.microsoft.com/office/powerpoint/2010/main" val="616143013"/>
+        <p14:creationId xmlns:p14="http://schemas.microsoft.com/office/powerpoint/2010/main" val="4198135225"/>
       </p:ext>
     </p:extLst>
   </p:cSld>
@@ -2067,15 +1906,15 @@
         </p:nvSpPr>
         <p:spPr>
           <a:xfrm>
-            <a:off x="365760" y="273050"/>
-            <a:ext cx="2406651" cy="1162050"/>
+            <a:off x="839789" y="365760"/>
+            <a:ext cx="3932237" cy="1280160"/>
           </a:xfrm>
         </p:spPr>
         <p:txBody>
           <a:bodyPr anchor="b"/>
           <a:lstStyle>
-            <a:lvl1pPr algn="l">
-              <a:defRPr sz="2000" b="1"/>
+            <a:lvl1pPr>
+              <a:defRPr sz="2560"/>
             </a:lvl1pPr>
           </a:lstStyle>
           <a:p>
@@ -2083,6 +1922,7 @@
               <a:rPr lang="en-US"/>
               <a:t>Click to edit Master title style</a:t>
             </a:r>
+            <a:endParaRPr lang="en-US" dirty="0"/>
           </a:p>
         </p:txBody>
       </p:sp>
@@ -2098,46 +1938,46 @@
         </p:nvSpPr>
         <p:spPr>
           <a:xfrm>
-            <a:off x="2860040" y="273052"/>
-            <a:ext cx="4089400" cy="5853113"/>
+            <a:off x="5183188" y="789940"/>
+            <a:ext cx="6172200" cy="3898900"/>
           </a:xfrm>
         </p:spPr>
         <p:txBody>
           <a:bodyPr/>
           <a:lstStyle>
             <a:lvl1pPr>
-              <a:defRPr sz="3200"/>
+              <a:defRPr sz="2560"/>
             </a:lvl1pPr>
             <a:lvl2pPr>
-              <a:defRPr sz="2800"/>
+              <a:defRPr sz="2240"/>
             </a:lvl2pPr>
             <a:lvl3pPr>
-              <a:defRPr sz="2400"/>
+              <a:defRPr sz="1920"/>
             </a:lvl3pPr>
             <a:lvl4pPr>
-              <a:defRPr sz="2000"/>
+              <a:defRPr sz="1600"/>
             </a:lvl4pPr>
             <a:lvl5pPr>
-              <a:defRPr sz="2000"/>
+              <a:defRPr sz="1600"/>
             </a:lvl5pPr>
             <a:lvl6pPr>
-              <a:defRPr sz="2000"/>
+              <a:defRPr sz="1600"/>
             </a:lvl6pPr>
             <a:lvl7pPr>
-              <a:defRPr sz="2000"/>
+              <a:defRPr sz="1600"/>
             </a:lvl7pPr>
             <a:lvl8pPr>
-              <a:defRPr sz="2000"/>
+              <a:defRPr sz="1600"/>
             </a:lvl8pPr>
             <a:lvl9pPr>
-              <a:defRPr sz="2000"/>
+              <a:defRPr sz="1600"/>
             </a:lvl9pPr>
           </a:lstStyle>
           <a:p>
             <a:pPr lvl="0"/>
             <a:r>
               <a:rPr lang="en-US"/>
-              <a:t>Click to edit Master text styles</a:t>
+              <a:t>Edit Master text styles</a:t>
             </a:r>
           </a:p>
           <a:p>
@@ -2167,6 +2007,7 @@
               <a:rPr lang="en-US"/>
               <a:t>Fifth level</a:t>
             </a:r>
+            <a:endParaRPr lang="en-US" dirty="0"/>
           </a:p>
         </p:txBody>
       </p:sp>
@@ -2182,8 +2023,8 @@
         </p:nvSpPr>
         <p:spPr>
           <a:xfrm>
-            <a:off x="365760" y="1435102"/>
-            <a:ext cx="2406651" cy="4691063"/>
+            <a:off x="839789" y="1645920"/>
+            <a:ext cx="3932237" cy="3049270"/>
           </a:xfrm>
         </p:spPr>
         <p:txBody>
@@ -2191,46 +2032,46 @@
           <a:lstStyle>
             <a:lvl1pPr marL="0" indent="0">
               <a:buNone/>
-              <a:defRPr sz="1400"/>
+              <a:defRPr sz="1280"/>
             </a:lvl1pPr>
-            <a:lvl2pPr marL="457200" indent="0">
-              <a:buNone/>
-              <a:defRPr sz="1200"/>
+            <a:lvl2pPr marL="365760" indent="0">
+              <a:buNone/>
+              <a:defRPr sz="1120"/>
             </a:lvl2pPr>
-            <a:lvl3pPr marL="914400" indent="0">
-              <a:buNone/>
-              <a:defRPr sz="1000"/>
+            <a:lvl3pPr marL="731520" indent="0">
+              <a:buNone/>
+              <a:defRPr sz="960"/>
             </a:lvl3pPr>
-            <a:lvl4pPr marL="1371600" indent="0">
-              <a:buNone/>
-              <a:defRPr sz="900"/>
+            <a:lvl4pPr marL="1097280" indent="0">
+              <a:buNone/>
+              <a:defRPr sz="800"/>
             </a:lvl4pPr>
-            <a:lvl5pPr marL="1828800" indent="0">
-              <a:buNone/>
-              <a:defRPr sz="900"/>
+            <a:lvl5pPr marL="1463040" indent="0">
+              <a:buNone/>
+              <a:defRPr sz="800"/>
             </a:lvl5pPr>
-            <a:lvl6pPr marL="2286000" indent="0">
-              <a:buNone/>
-              <a:defRPr sz="900"/>
+            <a:lvl6pPr marL="1828800" indent="0">
+              <a:buNone/>
+              <a:defRPr sz="800"/>
             </a:lvl6pPr>
-            <a:lvl7pPr marL="2743200" indent="0">
-              <a:buNone/>
-              <a:defRPr sz="900"/>
+            <a:lvl7pPr marL="2194560" indent="0">
+              <a:buNone/>
+              <a:defRPr sz="800"/>
             </a:lvl7pPr>
-            <a:lvl8pPr marL="3200400" indent="0">
-              <a:buNone/>
-              <a:defRPr sz="900"/>
+            <a:lvl8pPr marL="2560320" indent="0">
+              <a:buNone/>
+              <a:defRPr sz="800"/>
             </a:lvl8pPr>
-            <a:lvl9pPr marL="3657600" indent="0">
-              <a:buNone/>
-              <a:defRPr sz="900"/>
+            <a:lvl9pPr marL="2926080" indent="0">
+              <a:buNone/>
+              <a:defRPr sz="800"/>
             </a:lvl9pPr>
           </a:lstStyle>
           <a:p>
             <a:pPr lvl="0"/>
             <a:r>
               <a:rPr lang="en-US"/>
-              <a:t>Click to edit Master text styles</a:t>
+              <a:t>Edit Master text styles</a:t>
             </a:r>
           </a:p>
         </p:txBody>
@@ -2250,9 +2091,9 @@
           <a:bodyPr/>
           <a:lstStyle/>
           <a:p>
-            <a:fld id="{E46B84FF-1CFF-E849-8ACF-6EE548EC4909}" type="datetimeFigureOut">
+            <a:fld id="{DCE07B5D-B400-BC43-987A-7D391B225B8E}" type="datetimeFigureOut">
               <a:rPr lang="en-US" smtClean="0"/>
-              <a:t>4/24/18</a:t>
+              <a:t>5/8/18</a:t>
             </a:fld>
             <a:endParaRPr lang="en-US"/>
           </a:p>
@@ -2292,7 +2133,7 @@
           <a:bodyPr/>
           <a:lstStyle/>
           <a:p>
-            <a:fld id="{41E21619-B06F-8741-841E-1304CC122878}" type="slidenum">
+            <a:fld id="{3F532232-9CF6-5745-B370-2A4C99755DBD}" type="slidenum">
               <a:rPr lang="en-US" smtClean="0"/>
               <a:t>‹#›</a:t>
             </a:fld>
@@ -2303,7 +2144,7 @@
     </p:spTree>
     <p:extLst>
       <p:ext uri="{BB962C8B-B14F-4D97-AF65-F5344CB8AC3E}">
-        <p14:creationId xmlns:p14="http://schemas.microsoft.com/office/powerpoint/2010/main" val="2437819185"/>
+        <p14:creationId xmlns:p14="http://schemas.microsoft.com/office/powerpoint/2010/main" val="2622330944"/>
       </p:ext>
     </p:extLst>
   </p:cSld>
@@ -2342,15 +2183,15 @@
         </p:nvSpPr>
         <p:spPr>
           <a:xfrm>
-            <a:off x="1433830" y="4800600"/>
-            <a:ext cx="4389120" cy="566738"/>
+            <a:off x="839789" y="365760"/>
+            <a:ext cx="3932237" cy="1280160"/>
           </a:xfrm>
         </p:spPr>
         <p:txBody>
           <a:bodyPr anchor="b"/>
           <a:lstStyle>
-            <a:lvl1pPr algn="l">
-              <a:defRPr sz="2000" b="1"/>
+            <a:lvl1pPr>
+              <a:defRPr sz="2560"/>
             </a:lvl1pPr>
           </a:lstStyle>
           <a:p>
@@ -2358,6 +2199,7 @@
               <a:rPr lang="en-US"/>
               <a:t>Click to edit Master title style</a:t>
             </a:r>
+            <a:endParaRPr lang="en-US" dirty="0"/>
           </a:p>
         </p:txBody>
       </p:sp>
@@ -2365,7 +2207,7 @@
         <p:nvSpPr>
           <p:cNvPr id="3" name="Picture Placeholder 2"/>
           <p:cNvSpPr>
-            <a:spLocks noGrp="1"/>
+            <a:spLocks noGrp="1" noChangeAspect="1"/>
           </p:cNvSpPr>
           <p:nvPr>
             <p:ph type="pic" idx="1"/>
@@ -2373,52 +2215,56 @@
         </p:nvSpPr>
         <p:spPr>
           <a:xfrm>
-            <a:off x="1433830" y="612775"/>
-            <a:ext cx="4389120" cy="4114800"/>
+            <a:off x="5183188" y="789940"/>
+            <a:ext cx="6172200" cy="3898900"/>
           </a:xfrm>
         </p:spPr>
         <p:txBody>
-          <a:bodyPr/>
+          <a:bodyPr anchor="t"/>
           <a:lstStyle>
             <a:lvl1pPr marL="0" indent="0">
               <a:buNone/>
-              <a:defRPr sz="3200"/>
+              <a:defRPr sz="2560"/>
             </a:lvl1pPr>
-            <a:lvl2pPr marL="457200" indent="0">
-              <a:buNone/>
-              <a:defRPr sz="2800"/>
+            <a:lvl2pPr marL="365760" indent="0">
+              <a:buNone/>
+              <a:defRPr sz="2240"/>
             </a:lvl2pPr>
-            <a:lvl3pPr marL="914400" indent="0">
-              <a:buNone/>
-              <a:defRPr sz="2400"/>
+            <a:lvl3pPr marL="731520" indent="0">
+              <a:buNone/>
+              <a:defRPr sz="1920"/>
             </a:lvl3pPr>
-            <a:lvl4pPr marL="1371600" indent="0">
-              <a:buNone/>
-              <a:defRPr sz="2000"/>
+            <a:lvl4pPr marL="1097280" indent="0">
+              <a:buNone/>
+              <a:defRPr sz="1600"/>
             </a:lvl4pPr>
-            <a:lvl5pPr marL="1828800" indent="0">
-              <a:buNone/>
-              <a:defRPr sz="2000"/>
+            <a:lvl5pPr marL="1463040" indent="0">
+              <a:buNone/>
+              <a:defRPr sz="1600"/>
             </a:lvl5pPr>
-            <a:lvl6pPr marL="2286000" indent="0">
-              <a:buNone/>
-              <a:defRPr sz="2000"/>
+            <a:lvl6pPr marL="1828800" indent="0">
+              <a:buNone/>
+              <a:defRPr sz="1600"/>
             </a:lvl6pPr>
-            <a:lvl7pPr marL="2743200" indent="0">
-              <a:buNone/>
-              <a:defRPr sz="2000"/>
+            <a:lvl7pPr marL="2194560" indent="0">
+              <a:buNone/>
+              <a:defRPr sz="1600"/>
             </a:lvl7pPr>
-            <a:lvl8pPr marL="3200400" indent="0">
-              <a:buNone/>
-              <a:defRPr sz="2000"/>
+            <a:lvl8pPr marL="2560320" indent="0">
+              <a:buNone/>
+              <a:defRPr sz="1600"/>
             </a:lvl8pPr>
-            <a:lvl9pPr marL="3657600" indent="0">
-              <a:buNone/>
-              <a:defRPr sz="2000"/>
+            <a:lvl9pPr marL="2926080" indent="0">
+              <a:buNone/>
+              <a:defRPr sz="1600"/>
             </a:lvl9pPr>
           </a:lstStyle>
           <a:p>
-            <a:endParaRPr lang="en-US"/>
+            <a:r>
+              <a:rPr lang="en-US"/>
+              <a:t>Click icon to add picture</a:t>
+            </a:r>
+            <a:endParaRPr lang="en-US" dirty="0"/>
           </a:p>
         </p:txBody>
       </p:sp>
@@ -2434,8 +2280,8 @@
         </p:nvSpPr>
         <p:spPr>
           <a:xfrm>
-            <a:off x="1433830" y="5367338"/>
-            <a:ext cx="4389120" cy="804862"/>
+            <a:off x="839789" y="1645920"/>
+            <a:ext cx="3932237" cy="3049270"/>
           </a:xfrm>
         </p:spPr>
         <p:txBody>
@@ -2443,46 +2289,46 @@
           <a:lstStyle>
             <a:lvl1pPr marL="0" indent="0">
               <a:buNone/>
-              <a:defRPr sz="1400"/>
+              <a:defRPr sz="1280"/>
             </a:lvl1pPr>
-            <a:lvl2pPr marL="457200" indent="0">
-              <a:buNone/>
-              <a:defRPr sz="1200"/>
+            <a:lvl2pPr marL="365760" indent="0">
+              <a:buNone/>
+              <a:defRPr sz="1120"/>
             </a:lvl2pPr>
-            <a:lvl3pPr marL="914400" indent="0">
-              <a:buNone/>
-              <a:defRPr sz="1000"/>
+            <a:lvl3pPr marL="731520" indent="0">
+              <a:buNone/>
+              <a:defRPr sz="960"/>
             </a:lvl3pPr>
-            <a:lvl4pPr marL="1371600" indent="0">
-              <a:buNone/>
-              <a:defRPr sz="900"/>
+            <a:lvl4pPr marL="1097280" indent="0">
+              <a:buNone/>
+              <a:defRPr sz="800"/>
             </a:lvl4pPr>
-            <a:lvl5pPr marL="1828800" indent="0">
-              <a:buNone/>
-              <a:defRPr sz="900"/>
+            <a:lvl5pPr marL="1463040" indent="0">
+              <a:buNone/>
+              <a:defRPr sz="800"/>
             </a:lvl5pPr>
-            <a:lvl6pPr marL="2286000" indent="0">
-              <a:buNone/>
-              <a:defRPr sz="900"/>
+            <a:lvl6pPr marL="1828800" indent="0">
+              <a:buNone/>
+              <a:defRPr sz="800"/>
             </a:lvl6pPr>
-            <a:lvl7pPr marL="2743200" indent="0">
-              <a:buNone/>
-              <a:defRPr sz="900"/>
+            <a:lvl7pPr marL="2194560" indent="0">
+              <a:buNone/>
+              <a:defRPr sz="800"/>
             </a:lvl7pPr>
-            <a:lvl8pPr marL="3200400" indent="0">
-              <a:buNone/>
-              <a:defRPr sz="900"/>
+            <a:lvl8pPr marL="2560320" indent="0">
+              <a:buNone/>
+              <a:defRPr sz="800"/>
             </a:lvl8pPr>
-            <a:lvl9pPr marL="3657600" indent="0">
-              <a:buNone/>
-              <a:defRPr sz="900"/>
+            <a:lvl9pPr marL="2926080" indent="0">
+              <a:buNone/>
+              <a:defRPr sz="800"/>
             </a:lvl9pPr>
           </a:lstStyle>
           <a:p>
             <a:pPr lvl="0"/>
             <a:r>
               <a:rPr lang="en-US"/>
-              <a:t>Click to edit Master text styles</a:t>
+              <a:t>Edit Master text styles</a:t>
             </a:r>
           </a:p>
         </p:txBody>
@@ -2502,9 +2348,9 @@
           <a:bodyPr/>
           <a:lstStyle/>
           <a:p>
-            <a:fld id="{E46B84FF-1CFF-E849-8ACF-6EE548EC4909}" type="datetimeFigureOut">
+            <a:fld id="{DCE07B5D-B400-BC43-987A-7D391B225B8E}" type="datetimeFigureOut">
               <a:rPr lang="en-US" smtClean="0"/>
-              <a:t>4/24/18</a:t>
+              <a:t>5/8/18</a:t>
             </a:fld>
             <a:endParaRPr lang="en-US"/>
           </a:p>
@@ -2544,7 +2390,7 @@
           <a:bodyPr/>
           <a:lstStyle/>
           <a:p>
-            <a:fld id="{41E21619-B06F-8741-841E-1304CC122878}" type="slidenum">
+            <a:fld id="{3F532232-9CF6-5745-B370-2A4C99755DBD}" type="slidenum">
               <a:rPr lang="en-US" smtClean="0"/>
               <a:t>‹#›</a:t>
             </a:fld>
@@ -2555,7 +2401,7 @@
     </p:spTree>
     <p:extLst>
       <p:ext uri="{BB962C8B-B14F-4D97-AF65-F5344CB8AC3E}">
-        <p14:creationId xmlns:p14="http://schemas.microsoft.com/office/powerpoint/2010/main" val="1664027951"/>
+        <p14:creationId xmlns:p14="http://schemas.microsoft.com/office/powerpoint/2010/main" val="3108839005"/>
       </p:ext>
     </p:extLst>
   </p:cSld>
@@ -2599,8 +2445,8 @@
         </p:nvSpPr>
         <p:spPr>
           <a:xfrm>
-            <a:off x="365760" y="274638"/>
-            <a:ext cx="6583680" cy="1143000"/>
+            <a:off x="838200" y="292101"/>
+            <a:ext cx="10515600" cy="1060450"/>
           </a:xfrm>
           <a:prstGeom prst="rect">
             <a:avLst/>
@@ -2616,6 +2462,7 @@
               <a:rPr lang="en-US"/>
               <a:t>Click to edit Master title style</a:t>
             </a:r>
+            <a:endParaRPr lang="en-US" dirty="0"/>
           </a:p>
         </p:txBody>
       </p:sp>
@@ -2631,8 +2478,8 @@
         </p:nvSpPr>
         <p:spPr>
           <a:xfrm>
-            <a:off x="365760" y="1600202"/>
-            <a:ext cx="6583680" cy="4525963"/>
+            <a:off x="838200" y="1460500"/>
+            <a:ext cx="10515600" cy="3481070"/>
           </a:xfrm>
           <a:prstGeom prst="rect">
             <a:avLst/>
@@ -2647,7 +2494,7 @@
             <a:pPr lvl="0"/>
             <a:r>
               <a:rPr lang="en-US"/>
-              <a:t>Click to edit Master text styles</a:t>
+              <a:t>Edit Master text styles</a:t>
             </a:r>
           </a:p>
           <a:p>
@@ -2677,6 +2524,7 @@
               <a:rPr lang="en-US"/>
               <a:t>Fifth level</a:t>
             </a:r>
+            <a:endParaRPr lang="en-US" dirty="0"/>
           </a:p>
         </p:txBody>
       </p:sp>
@@ -2692,8 +2540,8 @@
         </p:nvSpPr>
         <p:spPr>
           <a:xfrm>
-            <a:off x="365760" y="6356352"/>
-            <a:ext cx="1706880" cy="365125"/>
+            <a:off x="838200" y="5085080"/>
+            <a:ext cx="2743200" cy="292100"/>
           </a:xfrm>
           <a:prstGeom prst="rect">
             <a:avLst/>
@@ -2703,7 +2551,7 @@
           <a:bodyPr vert="horz" lIns="91440" tIns="45720" rIns="91440" bIns="45720" rtlCol="0" anchor="ctr"/>
           <a:lstStyle>
             <a:lvl1pPr algn="l">
-              <a:defRPr sz="1200">
+              <a:defRPr sz="960">
                 <a:solidFill>
                   <a:schemeClr val="tx1">
                     <a:tint val="75000"/>
@@ -2713,9 +2561,9 @@
             </a:lvl1pPr>
           </a:lstStyle>
           <a:p>
-            <a:fld id="{E46B84FF-1CFF-E849-8ACF-6EE548EC4909}" type="datetimeFigureOut">
+            <a:fld id="{DCE07B5D-B400-BC43-987A-7D391B225B8E}" type="datetimeFigureOut">
               <a:rPr lang="en-US" smtClean="0"/>
-              <a:t>4/24/18</a:t>
+              <a:t>5/8/18</a:t>
             </a:fld>
             <a:endParaRPr lang="en-US"/>
           </a:p>
@@ -2733,8 +2581,8 @@
         </p:nvSpPr>
         <p:spPr>
           <a:xfrm>
-            <a:off x="2499360" y="6356352"/>
-            <a:ext cx="2316480" cy="365125"/>
+            <a:off x="4038600" y="5085080"/>
+            <a:ext cx="4114800" cy="292100"/>
           </a:xfrm>
           <a:prstGeom prst="rect">
             <a:avLst/>
@@ -2744,7 +2592,7 @@
           <a:bodyPr vert="horz" lIns="91440" tIns="45720" rIns="91440" bIns="45720" rtlCol="0" anchor="ctr"/>
           <a:lstStyle>
             <a:lvl1pPr algn="ctr">
-              <a:defRPr sz="1200">
+              <a:defRPr sz="960">
                 <a:solidFill>
                   <a:schemeClr val="tx1">
                     <a:tint val="75000"/>
@@ -2770,8 +2618,8 @@
         </p:nvSpPr>
         <p:spPr>
           <a:xfrm>
-            <a:off x="5242560" y="6356352"/>
-            <a:ext cx="1706880" cy="365125"/>
+            <a:off x="8610600" y="5085080"/>
+            <a:ext cx="2743200" cy="292100"/>
           </a:xfrm>
           <a:prstGeom prst="rect">
             <a:avLst/>
@@ -2781,7 +2629,7 @@
           <a:bodyPr vert="horz" lIns="91440" tIns="45720" rIns="91440" bIns="45720" rtlCol="0" anchor="ctr"/>
           <a:lstStyle>
             <a:lvl1pPr algn="r">
-              <a:defRPr sz="1200">
+              <a:defRPr sz="960">
                 <a:solidFill>
                   <a:schemeClr val="tx1">
                     <a:tint val="75000"/>
@@ -2791,7 +2639,7 @@
             </a:lvl1pPr>
           </a:lstStyle>
           <a:p>
-            <a:fld id="{41E21619-B06F-8741-841E-1304CC122878}" type="slidenum">
+            <a:fld id="{3F532232-9CF6-5745-B370-2A4C99755DBD}" type="slidenum">
               <a:rPr lang="en-US" smtClean="0"/>
               <a:t>‹#›</a:t>
             </a:fld>
@@ -2802,32 +2650,35 @@
     </p:spTree>
     <p:extLst>
       <p:ext uri="{BB962C8B-B14F-4D97-AF65-F5344CB8AC3E}">
-        <p14:creationId xmlns:p14="http://schemas.microsoft.com/office/powerpoint/2010/main" val="2569144993"/>
+        <p14:creationId xmlns:p14="http://schemas.microsoft.com/office/powerpoint/2010/main" val="4224428619"/>
       </p:ext>
     </p:extLst>
   </p:cSld>
   <p:clrMap bg1="lt1" tx1="dk1" bg2="lt2" tx2="dk2" accent1="accent1" accent2="accent2" accent3="accent3" accent4="accent4" accent5="accent5" accent6="accent6" hlink="hlink" folHlink="folHlink"/>
   <p:sldLayoutIdLst>
-    <p:sldLayoutId id="2147483649" r:id="rId1"/>
-    <p:sldLayoutId id="2147483650" r:id="rId2"/>
-    <p:sldLayoutId id="2147483651" r:id="rId3"/>
-    <p:sldLayoutId id="2147483652" r:id="rId4"/>
-    <p:sldLayoutId id="2147483653" r:id="rId5"/>
-    <p:sldLayoutId id="2147483654" r:id="rId6"/>
-    <p:sldLayoutId id="2147483655" r:id="rId7"/>
-    <p:sldLayoutId id="2147483656" r:id="rId8"/>
-    <p:sldLayoutId id="2147483657" r:id="rId9"/>
-    <p:sldLayoutId id="2147483658" r:id="rId10"/>
-    <p:sldLayoutId id="2147483659" r:id="rId11"/>
+    <p:sldLayoutId id="2147483661" r:id="rId1"/>
+    <p:sldLayoutId id="2147483662" r:id="rId2"/>
+    <p:sldLayoutId id="2147483663" r:id="rId3"/>
+    <p:sldLayoutId id="2147483664" r:id="rId4"/>
+    <p:sldLayoutId id="2147483665" r:id="rId5"/>
+    <p:sldLayoutId id="2147483666" r:id="rId6"/>
+    <p:sldLayoutId id="2147483667" r:id="rId7"/>
+    <p:sldLayoutId id="2147483668" r:id="rId8"/>
+    <p:sldLayoutId id="2147483669" r:id="rId9"/>
+    <p:sldLayoutId id="2147483670" r:id="rId10"/>
+    <p:sldLayoutId id="2147483671" r:id="rId11"/>
   </p:sldLayoutIdLst>
   <p:txStyles>
     <p:titleStyle>
-      <a:lvl1pPr algn="ctr" defTabSz="457200" rtl="0" eaLnBrk="1" latinLnBrk="0" hangingPunct="1">
+      <a:lvl1pPr algn="l" defTabSz="731520" rtl="0" eaLnBrk="1" latinLnBrk="0" hangingPunct="1">
+        <a:lnSpc>
+          <a:spcPct val="90000"/>
+        </a:lnSpc>
         <a:spcBef>
           <a:spcPct val="0"/>
         </a:spcBef>
         <a:buNone/>
-        <a:defRPr sz="4400" kern="1200">
+        <a:defRPr sz="3520" kern="1200">
           <a:solidFill>
             <a:schemeClr val="tx1"/>
           </a:solidFill>
@@ -2838,13 +2689,16 @@
       </a:lvl1pPr>
     </p:titleStyle>
     <p:bodyStyle>
-      <a:lvl1pPr marL="342900" indent="-342900" algn="l" defTabSz="457200" rtl="0" eaLnBrk="1" latinLnBrk="0" hangingPunct="1">
+      <a:lvl1pPr marL="182880" indent="-182880" algn="l" defTabSz="731520" rtl="0" eaLnBrk="1" latinLnBrk="0" hangingPunct="1">
+        <a:lnSpc>
+          <a:spcPct val="90000"/>
+        </a:lnSpc>
         <a:spcBef>
-          <a:spcPct val="20000"/>
+          <a:spcPts val="800"/>
         </a:spcBef>
-        <a:buFont typeface="Arial"/>
+        <a:buFont typeface="Arial" panose="020B0604020202020204" pitchFamily="34" charset="0"/>
         <a:buChar char="•"/>
-        <a:defRPr sz="3200" kern="1200">
+        <a:defRPr sz="2240" kern="1200">
           <a:solidFill>
             <a:schemeClr val="tx1"/>
           </a:solidFill>
@@ -2853,13 +2707,16 @@
           <a:cs typeface="+mn-cs"/>
         </a:defRPr>
       </a:lvl1pPr>
-      <a:lvl2pPr marL="742950" indent="-285750" algn="l" defTabSz="457200" rtl="0" eaLnBrk="1" latinLnBrk="0" hangingPunct="1">
+      <a:lvl2pPr marL="548640" indent="-182880" algn="l" defTabSz="731520" rtl="0" eaLnBrk="1" latinLnBrk="0" hangingPunct="1">
+        <a:lnSpc>
+          <a:spcPct val="90000"/>
+        </a:lnSpc>
         <a:spcBef>
-          <a:spcPct val="20000"/>
+          <a:spcPts val="400"/>
         </a:spcBef>
-        <a:buFont typeface="Arial"/>
-        <a:buChar char="–"/>
-        <a:defRPr sz="2800" kern="1200">
+        <a:buFont typeface="Arial" panose="020B0604020202020204" pitchFamily="34" charset="0"/>
+        <a:buChar char="•"/>
+        <a:defRPr sz="1920" kern="1200">
           <a:solidFill>
             <a:schemeClr val="tx1"/>
           </a:solidFill>
@@ -2868,13 +2725,16 @@
           <a:cs typeface="+mn-cs"/>
         </a:defRPr>
       </a:lvl2pPr>
-      <a:lvl3pPr marL="1143000" indent="-228600" algn="l" defTabSz="457200" rtl="0" eaLnBrk="1" latinLnBrk="0" hangingPunct="1">
+      <a:lvl3pPr marL="914400" indent="-182880" algn="l" defTabSz="731520" rtl="0" eaLnBrk="1" latinLnBrk="0" hangingPunct="1">
+        <a:lnSpc>
+          <a:spcPct val="90000"/>
+        </a:lnSpc>
         <a:spcBef>
-          <a:spcPct val="20000"/>
+          <a:spcPts val="400"/>
         </a:spcBef>
-        <a:buFont typeface="Arial"/>
+        <a:buFont typeface="Arial" panose="020B0604020202020204" pitchFamily="34" charset="0"/>
         <a:buChar char="•"/>
-        <a:defRPr sz="2400" kern="1200">
+        <a:defRPr sz="1600" kern="1200">
           <a:solidFill>
             <a:schemeClr val="tx1"/>
           </a:solidFill>
@@ -2883,13 +2743,16 @@
           <a:cs typeface="+mn-cs"/>
         </a:defRPr>
       </a:lvl3pPr>
-      <a:lvl4pPr marL="1600200" indent="-228600" algn="l" defTabSz="457200" rtl="0" eaLnBrk="1" latinLnBrk="0" hangingPunct="1">
+      <a:lvl4pPr marL="1280160" indent="-182880" algn="l" defTabSz="731520" rtl="0" eaLnBrk="1" latinLnBrk="0" hangingPunct="1">
+        <a:lnSpc>
+          <a:spcPct val="90000"/>
+        </a:lnSpc>
         <a:spcBef>
-          <a:spcPct val="20000"/>
+          <a:spcPts val="400"/>
         </a:spcBef>
-        <a:buFont typeface="Arial"/>
-        <a:buChar char="–"/>
-        <a:defRPr sz="2000" kern="1200">
+        <a:buFont typeface="Arial" panose="020B0604020202020204" pitchFamily="34" charset="0"/>
+        <a:buChar char="•"/>
+        <a:defRPr sz="1440" kern="1200">
           <a:solidFill>
             <a:schemeClr val="tx1"/>
           </a:solidFill>
@@ -2898,13 +2761,16 @@
           <a:cs typeface="+mn-cs"/>
         </a:defRPr>
       </a:lvl4pPr>
-      <a:lvl5pPr marL="2057400" indent="-228600" algn="l" defTabSz="457200" rtl="0" eaLnBrk="1" latinLnBrk="0" hangingPunct="1">
+      <a:lvl5pPr marL="1645920" indent="-182880" algn="l" defTabSz="731520" rtl="0" eaLnBrk="1" latinLnBrk="0" hangingPunct="1">
+        <a:lnSpc>
+          <a:spcPct val="90000"/>
+        </a:lnSpc>
         <a:spcBef>
-          <a:spcPct val="20000"/>
+          <a:spcPts val="400"/>
         </a:spcBef>
-        <a:buFont typeface="Arial"/>
-        <a:buChar char="»"/>
-        <a:defRPr sz="2000" kern="1200">
+        <a:buFont typeface="Arial" panose="020B0604020202020204" pitchFamily="34" charset="0"/>
+        <a:buChar char="•"/>
+        <a:defRPr sz="1440" kern="1200">
           <a:solidFill>
             <a:schemeClr val="tx1"/>
           </a:solidFill>
@@ -2913,13 +2779,16 @@
           <a:cs typeface="+mn-cs"/>
         </a:defRPr>
       </a:lvl5pPr>
-      <a:lvl6pPr marL="2514600" indent="-228600" algn="l" defTabSz="457200" rtl="0" eaLnBrk="1" latinLnBrk="0" hangingPunct="1">
+      <a:lvl6pPr marL="2011680" indent="-182880" algn="l" defTabSz="731520" rtl="0" eaLnBrk="1" latinLnBrk="0" hangingPunct="1">
+        <a:lnSpc>
+          <a:spcPct val="90000"/>
+        </a:lnSpc>
         <a:spcBef>
-          <a:spcPct val="20000"/>
+          <a:spcPts val="400"/>
         </a:spcBef>
-        <a:buFont typeface="Arial"/>
+        <a:buFont typeface="Arial" panose="020B0604020202020204" pitchFamily="34" charset="0"/>
         <a:buChar char="•"/>
-        <a:defRPr sz="2000" kern="1200">
+        <a:defRPr sz="1440" kern="1200">
           <a:solidFill>
             <a:schemeClr val="tx1"/>
           </a:solidFill>
@@ -2928,13 +2797,16 @@
           <a:cs typeface="+mn-cs"/>
         </a:defRPr>
       </a:lvl6pPr>
-      <a:lvl7pPr marL="2971800" indent="-228600" algn="l" defTabSz="457200" rtl="0" eaLnBrk="1" latinLnBrk="0" hangingPunct="1">
+      <a:lvl7pPr marL="2377440" indent="-182880" algn="l" defTabSz="731520" rtl="0" eaLnBrk="1" latinLnBrk="0" hangingPunct="1">
+        <a:lnSpc>
+          <a:spcPct val="90000"/>
+        </a:lnSpc>
         <a:spcBef>
-          <a:spcPct val="20000"/>
+          <a:spcPts val="400"/>
         </a:spcBef>
-        <a:buFont typeface="Arial"/>
+        <a:buFont typeface="Arial" panose="020B0604020202020204" pitchFamily="34" charset="0"/>
         <a:buChar char="•"/>
-        <a:defRPr sz="2000" kern="1200">
+        <a:defRPr sz="1440" kern="1200">
           <a:solidFill>
             <a:schemeClr val="tx1"/>
           </a:solidFill>
@@ -2943,13 +2815,16 @@
           <a:cs typeface="+mn-cs"/>
         </a:defRPr>
       </a:lvl7pPr>
-      <a:lvl8pPr marL="3429000" indent="-228600" algn="l" defTabSz="457200" rtl="0" eaLnBrk="1" latinLnBrk="0" hangingPunct="1">
+      <a:lvl8pPr marL="2743200" indent="-182880" algn="l" defTabSz="731520" rtl="0" eaLnBrk="1" latinLnBrk="0" hangingPunct="1">
+        <a:lnSpc>
+          <a:spcPct val="90000"/>
+        </a:lnSpc>
         <a:spcBef>
-          <a:spcPct val="20000"/>
+          <a:spcPts val="400"/>
         </a:spcBef>
-        <a:buFont typeface="Arial"/>
+        <a:buFont typeface="Arial" panose="020B0604020202020204" pitchFamily="34" charset="0"/>
         <a:buChar char="•"/>
-        <a:defRPr sz="2000" kern="1200">
+        <a:defRPr sz="1440" kern="1200">
           <a:solidFill>
             <a:schemeClr val="tx1"/>
           </a:solidFill>
@@ -2958,13 +2833,16 @@
           <a:cs typeface="+mn-cs"/>
         </a:defRPr>
       </a:lvl8pPr>
-      <a:lvl9pPr marL="3886200" indent="-228600" algn="l" defTabSz="457200" rtl="0" eaLnBrk="1" latinLnBrk="0" hangingPunct="1">
+      <a:lvl9pPr marL="3108960" indent="-182880" algn="l" defTabSz="731520" rtl="0" eaLnBrk="1" latinLnBrk="0" hangingPunct="1">
+        <a:lnSpc>
+          <a:spcPct val="90000"/>
+        </a:lnSpc>
         <a:spcBef>
-          <a:spcPct val="20000"/>
+          <a:spcPts val="400"/>
         </a:spcBef>
-        <a:buFont typeface="Arial"/>
+        <a:buFont typeface="Arial" panose="020B0604020202020204" pitchFamily="34" charset="0"/>
         <a:buChar char="•"/>
-        <a:defRPr sz="2000" kern="1200">
+        <a:defRPr sz="1440" kern="1200">
           <a:solidFill>
             <a:schemeClr val="tx1"/>
           </a:solidFill>
@@ -2978,8 +2856,8 @@
       <a:defPPr>
         <a:defRPr lang="en-US"/>
       </a:defPPr>
-      <a:lvl1pPr marL="0" algn="l" defTabSz="457200" rtl="0" eaLnBrk="1" latinLnBrk="0" hangingPunct="1">
-        <a:defRPr sz="1800" kern="1200">
+      <a:lvl1pPr marL="0" algn="l" defTabSz="731520" rtl="0" eaLnBrk="1" latinLnBrk="0" hangingPunct="1">
+        <a:defRPr sz="1440" kern="1200">
           <a:solidFill>
             <a:schemeClr val="tx1"/>
           </a:solidFill>
@@ -2988,8 +2866,8 @@
           <a:cs typeface="+mn-cs"/>
         </a:defRPr>
       </a:lvl1pPr>
-      <a:lvl2pPr marL="457200" algn="l" defTabSz="457200" rtl="0" eaLnBrk="1" latinLnBrk="0" hangingPunct="1">
-        <a:defRPr sz="1800" kern="1200">
+      <a:lvl2pPr marL="365760" algn="l" defTabSz="731520" rtl="0" eaLnBrk="1" latinLnBrk="0" hangingPunct="1">
+        <a:defRPr sz="1440" kern="1200">
           <a:solidFill>
             <a:schemeClr val="tx1"/>
           </a:solidFill>
@@ -2998,8 +2876,8 @@
           <a:cs typeface="+mn-cs"/>
         </a:defRPr>
       </a:lvl2pPr>
-      <a:lvl3pPr marL="914400" algn="l" defTabSz="457200" rtl="0" eaLnBrk="1" latinLnBrk="0" hangingPunct="1">
-        <a:defRPr sz="1800" kern="1200">
+      <a:lvl3pPr marL="731520" algn="l" defTabSz="731520" rtl="0" eaLnBrk="1" latinLnBrk="0" hangingPunct="1">
+        <a:defRPr sz="1440" kern="1200">
           <a:solidFill>
             <a:schemeClr val="tx1"/>
           </a:solidFill>
@@ -3008,8 +2886,8 @@
           <a:cs typeface="+mn-cs"/>
         </a:defRPr>
       </a:lvl3pPr>
-      <a:lvl4pPr marL="1371600" algn="l" defTabSz="457200" rtl="0" eaLnBrk="1" latinLnBrk="0" hangingPunct="1">
-        <a:defRPr sz="1800" kern="1200">
+      <a:lvl4pPr marL="1097280" algn="l" defTabSz="731520" rtl="0" eaLnBrk="1" latinLnBrk="0" hangingPunct="1">
+        <a:defRPr sz="1440" kern="1200">
           <a:solidFill>
             <a:schemeClr val="tx1"/>
           </a:solidFill>
@@ -3018,8 +2896,8 @@
           <a:cs typeface="+mn-cs"/>
         </a:defRPr>
       </a:lvl4pPr>
-      <a:lvl5pPr marL="1828800" algn="l" defTabSz="457200" rtl="0" eaLnBrk="1" latinLnBrk="0" hangingPunct="1">
-        <a:defRPr sz="1800" kern="1200">
+      <a:lvl5pPr marL="1463040" algn="l" defTabSz="731520" rtl="0" eaLnBrk="1" latinLnBrk="0" hangingPunct="1">
+        <a:defRPr sz="1440" kern="1200">
           <a:solidFill>
             <a:schemeClr val="tx1"/>
           </a:solidFill>
@@ -3028,8 +2906,8 @@
           <a:cs typeface="+mn-cs"/>
         </a:defRPr>
       </a:lvl5pPr>
-      <a:lvl6pPr marL="2286000" algn="l" defTabSz="457200" rtl="0" eaLnBrk="1" latinLnBrk="0" hangingPunct="1">
-        <a:defRPr sz="1800" kern="1200">
+      <a:lvl6pPr marL="1828800" algn="l" defTabSz="731520" rtl="0" eaLnBrk="1" latinLnBrk="0" hangingPunct="1">
+        <a:defRPr sz="1440" kern="1200">
           <a:solidFill>
             <a:schemeClr val="tx1"/>
           </a:solidFill>
@@ -3038,8 +2916,8 @@
           <a:cs typeface="+mn-cs"/>
         </a:defRPr>
       </a:lvl6pPr>
-      <a:lvl7pPr marL="2743200" algn="l" defTabSz="457200" rtl="0" eaLnBrk="1" latinLnBrk="0" hangingPunct="1">
-        <a:defRPr sz="1800" kern="1200">
+      <a:lvl7pPr marL="2194560" algn="l" defTabSz="731520" rtl="0" eaLnBrk="1" latinLnBrk="0" hangingPunct="1">
+        <a:defRPr sz="1440" kern="1200">
           <a:solidFill>
             <a:schemeClr val="tx1"/>
           </a:solidFill>
@@ -3048,8 +2926,8 @@
           <a:cs typeface="+mn-cs"/>
         </a:defRPr>
       </a:lvl7pPr>
-      <a:lvl8pPr marL="3200400" algn="l" defTabSz="457200" rtl="0" eaLnBrk="1" latinLnBrk="0" hangingPunct="1">
-        <a:defRPr sz="1800" kern="1200">
+      <a:lvl8pPr marL="2560320" algn="l" defTabSz="731520" rtl="0" eaLnBrk="1" latinLnBrk="0" hangingPunct="1">
+        <a:defRPr sz="1440" kern="1200">
           <a:solidFill>
             <a:schemeClr val="tx1"/>
           </a:solidFill>
@@ -3058,8 +2936,8 @@
           <a:cs typeface="+mn-cs"/>
         </a:defRPr>
       </a:lvl8pPr>
-      <a:lvl9pPr marL="3657600" algn="l" defTabSz="457200" rtl="0" eaLnBrk="1" latinLnBrk="0" hangingPunct="1">
-        <a:defRPr sz="1800" kern="1200">
+      <a:lvl9pPr marL="2926080" algn="l" defTabSz="731520" rtl="0" eaLnBrk="1" latinLnBrk="0" hangingPunct="1">
+        <a:defRPr sz="1440" kern="1200">
           <a:solidFill>
             <a:schemeClr val="tx1"/>
           </a:solidFill>
@@ -3092,42 +2970,47 @@
       </p:grpSpPr>
       <p:grpSp>
         <p:nvGrpSpPr>
-          <p:cNvPr id="4" name="Group 3"/>
+          <p:cNvPr id="21" name="Group 20">
+            <a:extLst>
+              <a:ext uri="{FF2B5EF4-FFF2-40B4-BE49-F238E27FC236}">
+                <a16:creationId xmlns:a16="http://schemas.microsoft.com/office/drawing/2014/main" id="{A171DB3E-5BBC-D642-8DF5-6327FD791E6B}"/>
+              </a:ext>
+            </a:extLst>
+          </p:cNvPr>
           <p:cNvGrpSpPr/>
           <p:nvPr/>
         </p:nvGrpSpPr>
         <p:grpSpPr>
           <a:xfrm>
-            <a:off x="-1" y="-1137963"/>
-            <a:ext cx="7315201" cy="8014105"/>
-            <a:chOff x="-1" y="-1137963"/>
-            <a:chExt cx="7315201" cy="8014105"/>
+            <a:off x="9428" y="127242"/>
+            <a:ext cx="12191999" cy="5206524"/>
+            <a:chOff x="551633" y="1071135"/>
+            <a:chExt cx="11094968" cy="4600835"/>
           </a:xfrm>
         </p:grpSpPr>
         <p:pic>
           <p:nvPicPr>
-            <p:cNvPr id="18" name="Picture 17" descr="reflection.pdf"/>
+            <p:cNvPr id="22" name="Picture 21">
+              <a:extLst>
+                <a:ext uri="{FF2B5EF4-FFF2-40B4-BE49-F238E27FC236}">
+                  <a16:creationId xmlns:a16="http://schemas.microsoft.com/office/drawing/2014/main" id="{A91B2C69-7468-DB49-847C-5F453FE937FC}"/>
+                </a:ext>
+              </a:extLst>
+            </p:cNvPr>
             <p:cNvPicPr>
               <a:picLocks noChangeAspect="1"/>
             </p:cNvPicPr>
             <p:nvPr/>
           </p:nvPicPr>
-          <p:blipFill>
-            <a:blip r:embed="rId2">
-              <a:extLst>
-                <a:ext uri="{28A0092B-C50C-407E-A947-70E740481C1C}">
-                  <a14:useLocalDpi xmlns:a14="http://schemas.microsoft.com/office/drawing/2010/main" val="0"/>
-                </a:ext>
-              </a:extLst>
-            </a:blip>
-            <a:stretch>
-              <a:fillRect/>
-            </a:stretch>
+          <p:blipFill rotWithShape="1">
+            <a:blip r:embed="rId2"/>
+            <a:srcRect l="4524" t="11233" r="4473" b="11985"/>
+            <a:stretch/>
           </p:blipFill>
           <p:spPr>
             <a:xfrm>
-              <a:off x="-1" y="-1"/>
-              <a:ext cx="6876143" cy="6876143"/>
+              <a:off x="551633" y="1141581"/>
+              <a:ext cx="11094968" cy="4530389"/>
             </a:xfrm>
             <a:prstGeom prst="rect">
               <a:avLst/>
@@ -3136,21 +3019,29 @@
         </p:pic>
         <p:cxnSp>
           <p:nvCxnSpPr>
-            <p:cNvPr id="19" name="Straight Arrow Connector 18"/>
-            <p:cNvCxnSpPr/>
+            <p:cNvPr id="23" name="Straight Arrow Connector 22">
+              <a:extLst>
+                <a:ext uri="{FF2B5EF4-FFF2-40B4-BE49-F238E27FC236}">
+                  <a16:creationId xmlns:a16="http://schemas.microsoft.com/office/drawing/2014/main" id="{4AAE0C28-1067-1248-B9EC-2FA4ECC67F3F}"/>
+                </a:ext>
+              </a:extLst>
+            </p:cNvPr>
+            <p:cNvCxnSpPr>
+              <a:cxnSpLocks/>
+            </p:cNvCxnSpPr>
             <p:nvPr/>
           </p:nvCxnSpPr>
           <p:spPr>
             <a:xfrm flipV="1">
-              <a:off x="6694714" y="2376714"/>
-              <a:ext cx="526143" cy="489857"/>
+              <a:off x="4896737" y="2666205"/>
+              <a:ext cx="384183" cy="475315"/>
             </a:xfrm>
             <a:prstGeom prst="straightConnector1">
               <a:avLst/>
             </a:prstGeom>
             <a:ln w="38100" cap="flat" cmpd="sng">
               <a:solidFill>
-                <a:srgbClr val="FC28FF"/>
+                <a:srgbClr val="FF0000"/>
               </a:solidFill>
               <a:prstDash val="sysDot"/>
               <a:tailEnd type="stealth" w="med" len="lg"/>
@@ -3173,14 +3064,22 @@
         </p:cxnSp>
         <p:cxnSp>
           <p:nvCxnSpPr>
-            <p:cNvPr id="20" name="Straight Arrow Connector 19"/>
-            <p:cNvCxnSpPr/>
+            <p:cNvPr id="24" name="Straight Arrow Connector 23">
+              <a:extLst>
+                <a:ext uri="{FF2B5EF4-FFF2-40B4-BE49-F238E27FC236}">
+                  <a16:creationId xmlns:a16="http://schemas.microsoft.com/office/drawing/2014/main" id="{BC29BD35-5B00-5B4C-BA05-1398DDF737FF}"/>
+                </a:ext>
+              </a:extLst>
+            </p:cNvPr>
+            <p:cNvCxnSpPr>
+              <a:cxnSpLocks/>
+            </p:cNvCxnSpPr>
             <p:nvPr/>
           </p:nvCxnSpPr>
           <p:spPr>
             <a:xfrm>
-              <a:off x="6150429" y="2376714"/>
-              <a:ext cx="1070428" cy="0"/>
+              <a:off x="4507981" y="2600292"/>
+              <a:ext cx="793487" cy="0"/>
             </a:xfrm>
             <a:prstGeom prst="straightConnector1">
               <a:avLst/>
@@ -3208,14 +3107,20 @@
         </p:cxnSp>
         <p:sp>
           <p:nvSpPr>
-            <p:cNvPr id="21" name="Right Brace 20"/>
+            <p:cNvPr id="25" name="Right Brace 24">
+              <a:extLst>
+                <a:ext uri="{FF2B5EF4-FFF2-40B4-BE49-F238E27FC236}">
+                  <a16:creationId xmlns:a16="http://schemas.microsoft.com/office/drawing/2014/main" id="{112C2D1A-087C-8444-ACBC-D5ACD6699768}"/>
+                </a:ext>
+              </a:extLst>
+            </p:cNvPr>
             <p:cNvSpPr/>
             <p:nvPr/>
           </p:nvSpPr>
           <p:spPr>
             <a:xfrm rot="16200000">
-              <a:off x="6490803" y="1537800"/>
-              <a:ext cx="353398" cy="1070429"/>
+              <a:off x="4755165" y="1875086"/>
+              <a:ext cx="353398" cy="945753"/>
             </a:xfrm>
             <a:prstGeom prst="rightBrace">
               <a:avLst/>
@@ -3249,14 +3154,20 @@
         </p:sp>
         <p:sp>
           <p:nvSpPr>
-            <p:cNvPr id="22" name="TextBox 21"/>
+            <p:cNvPr id="26" name="TextBox 25">
+              <a:extLst>
+                <a:ext uri="{FF2B5EF4-FFF2-40B4-BE49-F238E27FC236}">
+                  <a16:creationId xmlns:a16="http://schemas.microsoft.com/office/drawing/2014/main" id="{45309257-8FB5-FE45-A2AB-C3AB0BA4B7CB}"/>
+                </a:ext>
+              </a:extLst>
+            </p:cNvPr>
             <p:cNvSpPr txBox="1"/>
             <p:nvPr/>
           </p:nvSpPr>
           <p:spPr>
             <a:xfrm rot="16200000">
-              <a:off x="4311335" y="780546"/>
-              <a:ext cx="4452572" cy="615553"/>
+              <a:off x="4069501" y="1574853"/>
+              <a:ext cx="1407546" cy="400110"/>
             </a:xfrm>
             <a:prstGeom prst="rect">
               <a:avLst/>
@@ -3271,7 +3182,7 @@
             <a:p>
               <a:pPr algn="ctr"/>
               <a:r>
-                <a:rPr lang="en-US" sz="3400" b="1" dirty="0">
+                <a:rPr lang="en-US" sz="2000" b="1" dirty="0">
                   <a:effectLst>
                     <a:reflection dist="76200" dir="5400000" sy="-100000" algn="bl" rotWithShape="0"/>
                   </a:effectLst>
@@ -3285,14 +3196,20 @@
         </p:sp>
         <p:sp>
           <p:nvSpPr>
-            <p:cNvPr id="2" name="Oval 1"/>
+            <p:cNvPr id="27" name="Oval 26">
+              <a:extLst>
+                <a:ext uri="{FF2B5EF4-FFF2-40B4-BE49-F238E27FC236}">
+                  <a16:creationId xmlns:a16="http://schemas.microsoft.com/office/drawing/2014/main" id="{1D41E65A-E553-A84C-8D78-A04240CFB59B}"/>
+                </a:ext>
+              </a:extLst>
+            </p:cNvPr>
             <p:cNvSpPr/>
             <p:nvPr/>
           </p:nvSpPr>
           <p:spPr>
             <a:xfrm>
-              <a:off x="6989386" y="2203733"/>
-              <a:ext cx="325814" cy="345962"/>
+              <a:off x="5191409" y="2478681"/>
+              <a:ext cx="213332" cy="187524"/>
             </a:xfrm>
             <a:prstGeom prst="ellipse">
               <a:avLst/>
@@ -3300,7 +3217,7 @@
             <a:noFill/>
             <a:ln w="38100" cmpd="sng">
               <a:solidFill>
-                <a:srgbClr val="FB02FF"/>
+                <a:srgbClr val="FF0000"/>
               </a:solidFill>
             </a:ln>
           </p:spPr>
@@ -3323,20 +3240,30 @@
             <a:lstStyle/>
             <a:p>
               <a:pPr algn="ctr"/>
-              <a:endParaRPr lang="en-US"/>
+              <a:endParaRPr lang="en-US">
+                <a:solidFill>
+                  <a:srgbClr val="FF0000"/>
+                </a:solidFill>
+              </a:endParaRPr>
             </a:p>
           </p:txBody>
         </p:sp>
         <p:sp>
           <p:nvSpPr>
-            <p:cNvPr id="3" name="TextBox 2"/>
+            <p:cNvPr id="28" name="TextBox 27">
+              <a:extLst>
+                <a:ext uri="{FF2B5EF4-FFF2-40B4-BE49-F238E27FC236}">
+                  <a16:creationId xmlns:a16="http://schemas.microsoft.com/office/drawing/2014/main" id="{1D0E57D3-9C29-584C-BD7C-78A91DB284D8}"/>
+                </a:ext>
+              </a:extLst>
+            </p:cNvPr>
             <p:cNvSpPr txBox="1"/>
             <p:nvPr/>
           </p:nvSpPr>
           <p:spPr>
             <a:xfrm>
-              <a:off x="2994840" y="3767802"/>
-              <a:ext cx="991270" cy="830997"/>
+              <a:off x="4255228" y="2714928"/>
+              <a:ext cx="991270" cy="553998"/>
             </a:xfrm>
             <a:prstGeom prst="rect">
               <a:avLst/>
@@ -3350,14 +3277,14 @@
             <a:lstStyle/>
             <a:p>
               <a:r>
-                <a:rPr lang="en-US" sz="4800" i="1" dirty="0">
+                <a:rPr lang="en-US" sz="3000" i="1" dirty="0">
                   <a:latin typeface="Times New Roman"/>
                   <a:cs typeface="Times New Roman"/>
                 </a:rPr>
                 <a:t>m</a:t>
               </a:r>
               <a:r>
-                <a:rPr lang="en-US" sz="4800" i="1" baseline="-25000" dirty="0">
+                <a:rPr lang="en-US" sz="3000" i="1" baseline="-25000" dirty="0">
                   <a:latin typeface="Times New Roman"/>
                   <a:cs typeface="Times New Roman"/>
                 </a:rPr>
@@ -3368,14 +3295,20 @@
         </p:sp>
         <p:sp>
           <p:nvSpPr>
-            <p:cNvPr id="9" name="TextBox 8"/>
+            <p:cNvPr id="29" name="TextBox 28">
+              <a:extLst>
+                <a:ext uri="{FF2B5EF4-FFF2-40B4-BE49-F238E27FC236}">
+                  <a16:creationId xmlns:a16="http://schemas.microsoft.com/office/drawing/2014/main" id="{3A63558E-4D29-2742-989A-F1D57ADE6A2B}"/>
+                </a:ext>
+              </a:extLst>
+            </p:cNvPr>
             <p:cNvSpPr txBox="1"/>
             <p:nvPr/>
           </p:nvSpPr>
           <p:spPr>
             <a:xfrm>
-              <a:off x="2874675" y="2506063"/>
-              <a:ext cx="928620" cy="830997"/>
+              <a:off x="4329138" y="3550153"/>
+              <a:ext cx="1367215" cy="553998"/>
             </a:xfrm>
             <a:prstGeom prst="rect">
               <a:avLst/>
@@ -3389,32 +3322,38 @@
             <a:lstStyle/>
             <a:p>
               <a:r>
-                <a:rPr lang="en-US" sz="4800" i="1" dirty="0">
+                <a:rPr lang="en-US" sz="3000" i="1" dirty="0">
                   <a:latin typeface="Times New Roman"/>
                   <a:cs typeface="Times New Roman"/>
                 </a:rPr>
                 <a:t>m</a:t>
               </a:r>
               <a:r>
-                <a:rPr lang="en-US" sz="4800" i="1" baseline="-25000" dirty="0">
+                <a:rPr lang="en-US" sz="3000" i="1" baseline="-25000" dirty="0">
                   <a:latin typeface="Times New Roman"/>
                   <a:cs typeface="Times New Roman"/>
                 </a:rPr>
-                <a:t>2</a:t>
+                <a:t>1</a:t>
               </a:r>
             </a:p>
           </p:txBody>
         </p:sp>
         <p:sp>
           <p:nvSpPr>
-            <p:cNvPr id="10" name="TextBox 9"/>
+            <p:cNvPr id="30" name="TextBox 29">
+              <a:extLst>
+                <a:ext uri="{FF2B5EF4-FFF2-40B4-BE49-F238E27FC236}">
+                  <a16:creationId xmlns:a16="http://schemas.microsoft.com/office/drawing/2014/main" id="{BD0C0E90-98C7-904D-8C07-A1A609F403E1}"/>
+                </a:ext>
+              </a:extLst>
+            </p:cNvPr>
             <p:cNvSpPr txBox="1"/>
             <p:nvPr/>
           </p:nvSpPr>
           <p:spPr>
             <a:xfrm>
-              <a:off x="1543642" y="2031461"/>
-              <a:ext cx="1367215" cy="830997"/>
+              <a:off x="2556628" y="3485535"/>
+              <a:ext cx="991270" cy="553998"/>
             </a:xfrm>
             <a:prstGeom prst="rect">
               <a:avLst/>
@@ -3428,14 +3367,104 @@
             <a:lstStyle/>
             <a:p>
               <a:r>
-                <a:rPr lang="en-US" sz="4800" i="1" dirty="0">
+                <a:rPr lang="en-US" sz="3000" i="1" dirty="0">
                   <a:latin typeface="Times New Roman"/>
                   <a:cs typeface="Times New Roman"/>
                 </a:rPr>
                 <a:t>m</a:t>
               </a:r>
               <a:r>
-                <a:rPr lang="en-US" sz="4800" i="1" baseline="-25000" dirty="0">
+                <a:rPr lang="en-US" sz="3000" i="1" baseline="-25000" dirty="0">
+                  <a:latin typeface="Times New Roman"/>
+                  <a:cs typeface="Times New Roman"/>
+                </a:rPr>
+                <a:t>3</a:t>
+              </a:r>
+            </a:p>
+          </p:txBody>
+        </p:sp>
+        <p:sp>
+          <p:nvSpPr>
+            <p:cNvPr id="31" name="TextBox 30">
+              <a:extLst>
+                <a:ext uri="{FF2B5EF4-FFF2-40B4-BE49-F238E27FC236}">
+                  <a16:creationId xmlns:a16="http://schemas.microsoft.com/office/drawing/2014/main" id="{F70A0320-0E80-9B4A-BF02-FB8FB36C067C}"/>
+                </a:ext>
+              </a:extLst>
+            </p:cNvPr>
+            <p:cNvSpPr txBox="1"/>
+            <p:nvPr/>
+          </p:nvSpPr>
+          <p:spPr>
+            <a:xfrm>
+              <a:off x="3178969" y="2658540"/>
+              <a:ext cx="928620" cy="553998"/>
+            </a:xfrm>
+            <a:prstGeom prst="rect">
+              <a:avLst/>
+            </a:prstGeom>
+            <a:noFill/>
+          </p:spPr>
+          <p:txBody>
+            <a:bodyPr wrap="square" rtlCol="0">
+              <a:spAutoFit/>
+            </a:bodyPr>
+            <a:lstStyle/>
+            <a:p>
+              <a:r>
+                <a:rPr lang="en-US" sz="3000" i="1" dirty="0">
+                  <a:latin typeface="Times New Roman"/>
+                  <a:cs typeface="Times New Roman"/>
+                </a:rPr>
+                <a:t>m</a:t>
+              </a:r>
+              <a:r>
+                <a:rPr lang="en-US" sz="3000" i="1" baseline="-25000" dirty="0">
+                  <a:latin typeface="Times New Roman"/>
+                  <a:cs typeface="Times New Roman"/>
+                </a:rPr>
+                <a:t>2</a:t>
+              </a:r>
+            </a:p>
+          </p:txBody>
+        </p:sp>
+        <p:sp>
+          <p:nvSpPr>
+            <p:cNvPr id="32" name="TextBox 31">
+              <a:extLst>
+                <a:ext uri="{FF2B5EF4-FFF2-40B4-BE49-F238E27FC236}">
+                  <a16:creationId xmlns:a16="http://schemas.microsoft.com/office/drawing/2014/main" id="{F2B54F79-C5A4-B944-B347-93D3031FEBB0}"/>
+                </a:ext>
+              </a:extLst>
+            </p:cNvPr>
+            <p:cNvSpPr txBox="1"/>
+            <p:nvPr/>
+          </p:nvSpPr>
+          <p:spPr>
+            <a:xfrm>
+              <a:off x="2180683" y="2437929"/>
+              <a:ext cx="1367215" cy="553998"/>
+            </a:xfrm>
+            <a:prstGeom prst="rect">
+              <a:avLst/>
+            </a:prstGeom>
+            <a:noFill/>
+          </p:spPr>
+          <p:txBody>
+            <a:bodyPr wrap="square" rtlCol="0">
+              <a:spAutoFit/>
+            </a:bodyPr>
+            <a:lstStyle/>
+            <a:p>
+              <a:r>
+                <a:rPr lang="en-US" sz="3000" i="1" dirty="0">
+                  <a:latin typeface="Times New Roman"/>
+                  <a:cs typeface="Times New Roman"/>
+                </a:rPr>
+                <a:t>m</a:t>
+              </a:r>
+              <a:r>
+                <a:rPr lang="en-US" sz="3000" i="1" baseline="-25000" dirty="0">
                   <a:latin typeface="Times New Roman"/>
                   <a:cs typeface="Times New Roman"/>
                 </a:rPr>
@@ -3445,88 +3474,22 @@
           </p:txBody>
         </p:sp>
       </p:grpSp>
-      <p:cxnSp>
-        <p:nvCxnSpPr>
-          <p:cNvPr id="6" name="Straight Arrow Connector 5"/>
-          <p:cNvCxnSpPr/>
+      <p:sp>
+        <p:nvSpPr>
+          <p:cNvPr id="33" name="TextBox 32">
+            <a:extLst>
+              <a:ext uri="{FF2B5EF4-FFF2-40B4-BE49-F238E27FC236}">
+                <a16:creationId xmlns:a16="http://schemas.microsoft.com/office/drawing/2014/main" id="{30EEAF83-BDD0-1544-97C3-0BA5213ED311}"/>
+              </a:ext>
+            </a:extLst>
+          </p:cNvPr>
+          <p:cNvSpPr txBox="1"/>
           <p:nvPr/>
-        </p:nvCxnSpPr>
+        </p:nvSpPr>
         <p:spPr>
           <a:xfrm>
-            <a:off x="3592720" y="1759546"/>
-            <a:ext cx="230886" cy="0"/>
-          </a:xfrm>
-          <a:prstGeom prst="straightConnector1">
-            <a:avLst/>
-          </a:prstGeom>
-          <a:ln>
-            <a:solidFill>
-              <a:schemeClr val="tx1"/>
-            </a:solidFill>
-            <a:tailEnd type="arrow"/>
-          </a:ln>
-        </p:spPr>
-        <p:style>
-          <a:lnRef idx="2">
-            <a:schemeClr val="accent1"/>
-          </a:lnRef>
-          <a:fillRef idx="0">
-            <a:schemeClr val="accent1"/>
-          </a:fillRef>
-          <a:effectRef idx="1">
-            <a:schemeClr val="accent1"/>
-          </a:effectRef>
-          <a:fontRef idx="minor">
-            <a:schemeClr val="tx1"/>
-          </a:fontRef>
-        </p:style>
-      </p:cxnSp>
-      <p:cxnSp>
-        <p:nvCxnSpPr>
-          <p:cNvPr id="8" name="Straight Arrow Connector 7"/>
-          <p:cNvCxnSpPr/>
-          <p:nvPr/>
-        </p:nvCxnSpPr>
-        <p:spPr>
-          <a:xfrm>
-            <a:off x="3823606" y="1779084"/>
-            <a:ext cx="0" cy="2421685"/>
-          </a:xfrm>
-          <a:prstGeom prst="straightConnector1">
-            <a:avLst/>
-          </a:prstGeom>
-          <a:ln>
-            <a:solidFill>
-              <a:schemeClr val="tx1"/>
-            </a:solidFill>
-            <a:tailEnd type="arrow"/>
-          </a:ln>
-        </p:spPr>
-        <p:style>
-          <a:lnRef idx="2">
-            <a:schemeClr val="accent1"/>
-          </a:lnRef>
-          <a:fillRef idx="0">
-            <a:schemeClr val="accent1"/>
-          </a:fillRef>
-          <a:effectRef idx="1">
-            <a:schemeClr val="accent1"/>
-          </a:effectRef>
-          <a:fontRef idx="minor">
-            <a:schemeClr val="tx1"/>
-          </a:fontRef>
-        </p:style>
-      </p:cxnSp>
-      <p:sp>
-        <p:nvSpPr>
-          <p:cNvPr id="24" name="TextBox 23"/>
-          <p:cNvSpPr txBox="1"/>
-          <p:nvPr/>
-        </p:nvSpPr>
-        <p:spPr>
-          <a:xfrm>
-            <a:off x="5752494" y="2255692"/>
-            <a:ext cx="991270" cy="830997"/>
+            <a:off x="7286920" y="4062954"/>
+            <a:ext cx="961534" cy="400110"/>
           </a:xfrm>
           <a:prstGeom prst="rect">
             <a:avLst/>
@@ -3540,32 +3503,30 @@
           <a:lstStyle/>
           <a:p>
             <a:r>
-              <a:rPr lang="en-US" sz="4800" i="1" dirty="0">
-                <a:latin typeface="Times New Roman"/>
-                <a:cs typeface="Times New Roman"/>
+              <a:rPr lang="en-US" sz="2000" dirty="0">
+                <a:latin typeface="Times" pitchFamily="2" charset="0"/>
               </a:rPr>
-              <a:t>m</a:t>
-            </a:r>
-            <a:r>
-              <a:rPr lang="en-US" sz="4800" i="1" baseline="-25000" dirty="0">
-                <a:latin typeface="Times New Roman"/>
-                <a:cs typeface="Times New Roman"/>
-              </a:rPr>
-              <a:t>3</a:t>
-            </a:r>
-          </a:p>
-        </p:txBody>
-      </p:sp>
-      <p:sp>
-        <p:nvSpPr>
-          <p:cNvPr id="25" name="TextBox 24"/>
+              <a:t>Right</a:t>
+            </a:r>
+          </a:p>
+        </p:txBody>
+      </p:sp>
+      <p:sp>
+        <p:nvSpPr>
+          <p:cNvPr id="34" name="TextBox 33">
+            <a:extLst>
+              <a:ext uri="{FF2B5EF4-FFF2-40B4-BE49-F238E27FC236}">
+                <a16:creationId xmlns:a16="http://schemas.microsoft.com/office/drawing/2014/main" id="{F4D73269-473A-C345-A030-068FF3E38007}"/>
+              </a:ext>
+            </a:extLst>
+          </p:cNvPr>
           <p:cNvSpPr txBox="1"/>
           <p:nvPr/>
         </p:nvSpPr>
         <p:spPr>
           <a:xfrm>
-            <a:off x="5784686" y="3345789"/>
-            <a:ext cx="1367215" cy="830997"/>
+            <a:off x="8495122" y="4062954"/>
+            <a:ext cx="961534" cy="400110"/>
           </a:xfrm>
           <a:prstGeom prst="rect">
             <a:avLst/>
@@ -3579,18 +3540,414 @@
           <a:lstStyle/>
           <a:p>
             <a:r>
-              <a:rPr lang="en-US" sz="4800" i="1" dirty="0">
-                <a:latin typeface="Times New Roman"/>
-                <a:cs typeface="Times New Roman"/>
+              <a:rPr lang="en-US" sz="2000" dirty="0">
+                <a:latin typeface="Times" pitchFamily="2" charset="0"/>
               </a:rPr>
-              <a:t>m</a:t>
-            </a:r>
-            <a:r>
-              <a:rPr lang="en-US" sz="4800" i="1" baseline="-25000" dirty="0">
-                <a:latin typeface="Times New Roman"/>
-                <a:cs typeface="Times New Roman"/>
+              <a:t>Up</a:t>
+            </a:r>
+          </a:p>
+        </p:txBody>
+      </p:sp>
+      <p:sp>
+        <p:nvSpPr>
+          <p:cNvPr id="35" name="TextBox 34">
+            <a:extLst>
+              <a:ext uri="{FF2B5EF4-FFF2-40B4-BE49-F238E27FC236}">
+                <a16:creationId xmlns:a16="http://schemas.microsoft.com/office/drawing/2014/main" id="{44AA773C-8801-1B44-A544-9E33AA71D63F}"/>
+              </a:ext>
+            </a:extLst>
+          </p:cNvPr>
+          <p:cNvSpPr txBox="1"/>
+          <p:nvPr/>
+        </p:nvSpPr>
+        <p:spPr>
+          <a:xfrm>
+            <a:off x="9777167" y="4062954"/>
+            <a:ext cx="961534" cy="400110"/>
+          </a:xfrm>
+          <a:prstGeom prst="rect">
+            <a:avLst/>
+          </a:prstGeom>
+          <a:noFill/>
+        </p:spPr>
+        <p:txBody>
+          <a:bodyPr wrap="square" rtlCol="0">
+            <a:spAutoFit/>
+          </a:bodyPr>
+          <a:lstStyle/>
+          <a:p>
+            <a:r>
+              <a:rPr lang="en-US" sz="2000" dirty="0">
+                <a:latin typeface="Times" pitchFamily="2" charset="0"/>
               </a:rPr>
-              <a:t>1</a:t>
+              <a:t>Left</a:t>
+            </a:r>
+          </a:p>
+        </p:txBody>
+      </p:sp>
+      <p:sp>
+        <p:nvSpPr>
+          <p:cNvPr id="36" name="TextBox 35">
+            <a:extLst>
+              <a:ext uri="{FF2B5EF4-FFF2-40B4-BE49-F238E27FC236}">
+                <a16:creationId xmlns:a16="http://schemas.microsoft.com/office/drawing/2014/main" id="{9989E36F-D92E-8241-B0BB-BA8EDEA262C5}"/>
+              </a:ext>
+            </a:extLst>
+          </p:cNvPr>
+          <p:cNvSpPr txBox="1"/>
+          <p:nvPr/>
+        </p:nvSpPr>
+        <p:spPr>
+          <a:xfrm>
+            <a:off x="11059212" y="4062954"/>
+            <a:ext cx="961534" cy="400110"/>
+          </a:xfrm>
+          <a:prstGeom prst="rect">
+            <a:avLst/>
+          </a:prstGeom>
+          <a:noFill/>
+        </p:spPr>
+        <p:txBody>
+          <a:bodyPr wrap="square" rtlCol="0">
+            <a:spAutoFit/>
+          </a:bodyPr>
+          <a:lstStyle/>
+          <a:p>
+            <a:r>
+              <a:rPr lang="en-US" sz="2000" dirty="0">
+                <a:latin typeface="Times" pitchFamily="2" charset="0"/>
+              </a:rPr>
+              <a:t>Down</a:t>
+            </a:r>
+          </a:p>
+        </p:txBody>
+      </p:sp>
+      <p:sp>
+        <p:nvSpPr>
+          <p:cNvPr id="38" name="TextBox 37">
+            <a:extLst>
+              <a:ext uri="{FF2B5EF4-FFF2-40B4-BE49-F238E27FC236}">
+                <a16:creationId xmlns:a16="http://schemas.microsoft.com/office/drawing/2014/main" id="{5CBA4903-BB69-EB4D-876B-CE0770E4E2DE}"/>
+              </a:ext>
+            </a:extLst>
+          </p:cNvPr>
+          <p:cNvSpPr txBox="1"/>
+          <p:nvPr/>
+        </p:nvSpPr>
+        <p:spPr>
+          <a:xfrm rot="16200000">
+            <a:off x="7528576" y="2631164"/>
+            <a:ext cx="1259953" cy="400110"/>
+          </a:xfrm>
+          <a:prstGeom prst="rect">
+            <a:avLst/>
+          </a:prstGeom>
+          <a:noFill/>
+        </p:spPr>
+        <p:txBody>
+          <a:bodyPr wrap="square" rtlCol="0">
+            <a:spAutoFit/>
+          </a:bodyPr>
+          <a:lstStyle/>
+          <a:p>
+            <a:r>
+              <a:rPr lang="en-US" sz="2000" dirty="0">
+                <a:latin typeface="Times" pitchFamily="2" charset="0"/>
+              </a:rPr>
+              <a:t>INVLIAD</a:t>
+            </a:r>
+          </a:p>
+        </p:txBody>
+      </p:sp>
+      <p:sp>
+        <p:nvSpPr>
+          <p:cNvPr id="39" name="TextBox 38">
+            <a:extLst>
+              <a:ext uri="{FF2B5EF4-FFF2-40B4-BE49-F238E27FC236}">
+                <a16:creationId xmlns:a16="http://schemas.microsoft.com/office/drawing/2014/main" id="{4513D52D-A797-934B-972E-AEAA4831B11C}"/>
+              </a:ext>
+            </a:extLst>
+          </p:cNvPr>
+          <p:cNvSpPr txBox="1"/>
+          <p:nvPr/>
+        </p:nvSpPr>
+        <p:spPr>
+          <a:xfrm rot="16200000">
+            <a:off x="10024290" y="2631163"/>
+            <a:ext cx="1259953" cy="400110"/>
+          </a:xfrm>
+          <a:prstGeom prst="rect">
+            <a:avLst/>
+          </a:prstGeom>
+          <a:noFill/>
+        </p:spPr>
+        <p:txBody>
+          <a:bodyPr wrap="square" rtlCol="0">
+            <a:spAutoFit/>
+          </a:bodyPr>
+          <a:lstStyle/>
+          <a:p>
+            <a:r>
+              <a:rPr lang="en-US" sz="2000" dirty="0">
+                <a:latin typeface="Times" pitchFamily="2" charset="0"/>
+              </a:rPr>
+              <a:t>INVLIAD</a:t>
+            </a:r>
+          </a:p>
+        </p:txBody>
+      </p:sp>
+      <p:sp>
+        <p:nvSpPr>
+          <p:cNvPr id="40" name="TextBox 39">
+            <a:extLst>
+              <a:ext uri="{FF2B5EF4-FFF2-40B4-BE49-F238E27FC236}">
+                <a16:creationId xmlns:a16="http://schemas.microsoft.com/office/drawing/2014/main" id="{68B4E8F6-91B0-E542-8A4F-D88BC10A2011}"/>
+              </a:ext>
+            </a:extLst>
+          </p:cNvPr>
+          <p:cNvSpPr txBox="1"/>
+          <p:nvPr/>
+        </p:nvSpPr>
+        <p:spPr>
+          <a:xfrm>
+            <a:off x="8358608" y="3035432"/>
+            <a:ext cx="617281" cy="369332"/>
+          </a:xfrm>
+          <a:prstGeom prst="rect">
+            <a:avLst/>
+          </a:prstGeom>
+          <a:noFill/>
+        </p:spPr>
+        <p:txBody>
+          <a:bodyPr wrap="square" rtlCol="0">
+            <a:spAutoFit/>
+          </a:bodyPr>
+          <a:lstStyle/>
+          <a:p>
+            <a:endParaRPr lang="en-US" dirty="0"/>
+          </a:p>
+        </p:txBody>
+      </p:sp>
+      <p:sp>
+        <p:nvSpPr>
+          <p:cNvPr id="41" name="TextBox 40">
+            <a:extLst>
+              <a:ext uri="{FF2B5EF4-FFF2-40B4-BE49-F238E27FC236}">
+                <a16:creationId xmlns:a16="http://schemas.microsoft.com/office/drawing/2014/main" id="{CAB9EA1B-86C2-B348-A69F-29AABA139C8D}"/>
+              </a:ext>
+            </a:extLst>
+          </p:cNvPr>
+          <p:cNvSpPr txBox="1"/>
+          <p:nvPr/>
+        </p:nvSpPr>
+        <p:spPr>
+          <a:xfrm>
+            <a:off x="8043538" y="3437905"/>
+            <a:ext cx="1671512" cy="707886"/>
+          </a:xfrm>
+          <a:prstGeom prst="rect">
+            <a:avLst/>
+          </a:prstGeom>
+          <a:noFill/>
+        </p:spPr>
+        <p:txBody>
+          <a:bodyPr wrap="square" rtlCol="0">
+            <a:spAutoFit/>
+          </a:bodyPr>
+          <a:lstStyle/>
+          <a:p>
+            <a:pPr algn="ctr"/>
+            <a:r>
+              <a:rPr lang="en-US" sz="2000" dirty="0">
+                <a:latin typeface="Times" pitchFamily="2" charset="0"/>
+              </a:rPr>
+              <a:t>Not Achievable</a:t>
+            </a:r>
+          </a:p>
+        </p:txBody>
+      </p:sp>
+      <p:sp>
+        <p:nvSpPr>
+          <p:cNvPr id="42" name="TextBox 41">
+            <a:extLst>
+              <a:ext uri="{FF2B5EF4-FFF2-40B4-BE49-F238E27FC236}">
+                <a16:creationId xmlns:a16="http://schemas.microsoft.com/office/drawing/2014/main" id="{8F928854-459D-6A45-895B-59F2E95FE279}"/>
+              </a:ext>
+            </a:extLst>
+          </p:cNvPr>
+          <p:cNvSpPr txBox="1"/>
+          <p:nvPr/>
+        </p:nvSpPr>
+        <p:spPr>
+          <a:xfrm>
+            <a:off x="10563164" y="3437905"/>
+            <a:ext cx="1671512" cy="707886"/>
+          </a:xfrm>
+          <a:prstGeom prst="rect">
+            <a:avLst/>
+          </a:prstGeom>
+          <a:noFill/>
+        </p:spPr>
+        <p:txBody>
+          <a:bodyPr wrap="square" rtlCol="0">
+            <a:spAutoFit/>
+          </a:bodyPr>
+          <a:lstStyle/>
+          <a:p>
+            <a:pPr algn="ctr"/>
+            <a:r>
+              <a:rPr lang="en-US" sz="2000" dirty="0">
+                <a:latin typeface="Times" pitchFamily="2" charset="0"/>
+              </a:rPr>
+              <a:t>Not Achievable</a:t>
+            </a:r>
+          </a:p>
+        </p:txBody>
+      </p:sp>
+      <p:sp>
+        <p:nvSpPr>
+          <p:cNvPr id="43" name="TextBox 42">
+            <a:extLst>
+              <a:ext uri="{FF2B5EF4-FFF2-40B4-BE49-F238E27FC236}">
+                <a16:creationId xmlns:a16="http://schemas.microsoft.com/office/drawing/2014/main" id="{7BDFA116-9779-FC48-873E-41985736D1CF}"/>
+              </a:ext>
+            </a:extLst>
+          </p:cNvPr>
+          <p:cNvSpPr txBox="1"/>
+          <p:nvPr/>
+        </p:nvSpPr>
+        <p:spPr>
+          <a:xfrm rot="5400000">
+            <a:off x="4587614" y="2989874"/>
+            <a:ext cx="961534" cy="400110"/>
+          </a:xfrm>
+          <a:prstGeom prst="rect">
+            <a:avLst/>
+          </a:prstGeom>
+          <a:noFill/>
+        </p:spPr>
+        <p:txBody>
+          <a:bodyPr wrap="square" rtlCol="0">
+            <a:spAutoFit/>
+          </a:bodyPr>
+          <a:lstStyle/>
+          <a:p>
+            <a:r>
+              <a:rPr lang="en-US" sz="2000" dirty="0">
+                <a:latin typeface="Times" pitchFamily="2" charset="0"/>
+              </a:rPr>
+              <a:t>Right</a:t>
+            </a:r>
+          </a:p>
+        </p:txBody>
+      </p:sp>
+      <p:sp>
+        <p:nvSpPr>
+          <p:cNvPr id="44" name="TextBox 43">
+            <a:extLst>
+              <a:ext uri="{FF2B5EF4-FFF2-40B4-BE49-F238E27FC236}">
+                <a16:creationId xmlns:a16="http://schemas.microsoft.com/office/drawing/2014/main" id="{A3825E61-461D-524D-8C0B-AC90B7D3B353}"/>
+              </a:ext>
+            </a:extLst>
+          </p:cNvPr>
+          <p:cNvSpPr txBox="1"/>
+          <p:nvPr/>
+        </p:nvSpPr>
+        <p:spPr>
+          <a:xfrm>
+            <a:off x="2212670" y="-89515"/>
+            <a:ext cx="961534" cy="400110"/>
+          </a:xfrm>
+          <a:prstGeom prst="rect">
+            <a:avLst/>
+          </a:prstGeom>
+          <a:noFill/>
+        </p:spPr>
+        <p:txBody>
+          <a:bodyPr wrap="square" rtlCol="0">
+            <a:spAutoFit/>
+          </a:bodyPr>
+          <a:lstStyle/>
+          <a:p>
+            <a:r>
+              <a:rPr lang="en-US" sz="2000" dirty="0">
+                <a:latin typeface="Times" pitchFamily="2" charset="0"/>
+              </a:rPr>
+              <a:t>Up</a:t>
+            </a:r>
+          </a:p>
+        </p:txBody>
+      </p:sp>
+      <p:sp>
+        <p:nvSpPr>
+          <p:cNvPr id="45" name="TextBox 44">
+            <a:extLst>
+              <a:ext uri="{FF2B5EF4-FFF2-40B4-BE49-F238E27FC236}">
+                <a16:creationId xmlns:a16="http://schemas.microsoft.com/office/drawing/2014/main" id="{0942FFF1-72BE-DE4E-B85C-BE1CDF1C7F35}"/>
+              </a:ext>
+            </a:extLst>
+          </p:cNvPr>
+          <p:cNvSpPr txBox="1"/>
+          <p:nvPr/>
+        </p:nvSpPr>
+        <p:spPr>
+          <a:xfrm rot="16200000">
+            <a:off x="-213725" y="2414312"/>
+            <a:ext cx="961534" cy="400110"/>
+          </a:xfrm>
+          <a:prstGeom prst="rect">
+            <a:avLst/>
+          </a:prstGeom>
+          <a:noFill/>
+        </p:spPr>
+        <p:txBody>
+          <a:bodyPr wrap="square" rtlCol="0">
+            <a:spAutoFit/>
+          </a:bodyPr>
+          <a:lstStyle/>
+          <a:p>
+            <a:r>
+              <a:rPr lang="en-US" sz="2000" dirty="0">
+                <a:latin typeface="Times" pitchFamily="2" charset="0"/>
+              </a:rPr>
+              <a:t>Left</a:t>
+            </a:r>
+          </a:p>
+        </p:txBody>
+      </p:sp>
+      <p:sp>
+        <p:nvSpPr>
+          <p:cNvPr id="46" name="TextBox 45">
+            <a:extLst>
+              <a:ext uri="{FF2B5EF4-FFF2-40B4-BE49-F238E27FC236}">
+                <a16:creationId xmlns:a16="http://schemas.microsoft.com/office/drawing/2014/main" id="{E4281D74-CA97-0946-91C6-2746BBD14796}"/>
+              </a:ext>
+            </a:extLst>
+          </p:cNvPr>
+          <p:cNvSpPr txBox="1"/>
+          <p:nvPr/>
+        </p:nvSpPr>
+        <p:spPr>
+          <a:xfrm>
+            <a:off x="2069986" y="4858428"/>
+            <a:ext cx="961534" cy="400110"/>
+          </a:xfrm>
+          <a:prstGeom prst="rect">
+            <a:avLst/>
+          </a:prstGeom>
+          <a:noFill/>
+        </p:spPr>
+        <p:txBody>
+          <a:bodyPr wrap="square" rtlCol="0">
+            <a:spAutoFit/>
+          </a:bodyPr>
+          <a:lstStyle/>
+          <a:p>
+            <a:r>
+              <a:rPr lang="en-US" sz="2000" dirty="0">
+                <a:latin typeface="Times" pitchFamily="2" charset="0"/>
+              </a:rPr>
+              <a:t>Down</a:t>
             </a:r>
           </a:p>
         </p:txBody>
@@ -3598,7 +3955,7 @@
     </p:spTree>
     <p:extLst>
       <p:ext uri="{BB962C8B-B14F-4D97-AF65-F5344CB8AC3E}">
-        <p14:creationId xmlns:p14="http://schemas.microsoft.com/office/powerpoint/2010/main" val="1243049444"/>
+        <p14:creationId xmlns:p14="http://schemas.microsoft.com/office/powerpoint/2010/main" val="2379593548"/>
       </p:ext>
     </p:extLst>
   </p:cSld>
@@ -3611,7 +3968,7 @@
 <file path=ppt/theme/theme1.xml><?xml version="1.0" encoding="utf-8"?>
 <a:theme xmlns:a="http://schemas.openxmlformats.org/drawingml/2006/main" name="Office Theme">
   <a:themeElements>
-    <a:clrScheme name="Office">
+    <a:clrScheme name="Office Theme">
       <a:dk1>
         <a:sysClr val="windowText" lastClr="000000"/>
       </a:dk1>
@@ -3619,44 +3976,44 @@
         <a:sysClr val="window" lastClr="FFFFFF"/>
       </a:lt1>
       <a:dk2>
-        <a:srgbClr val="1F497D"/>
+        <a:srgbClr val="44546A"/>
       </a:dk2>
       <a:lt2>
-        <a:srgbClr val="EEECE1"/>
+        <a:srgbClr val="E7E6E6"/>
       </a:lt2>
       <a:accent1>
-        <a:srgbClr val="4F81BD"/>
+        <a:srgbClr val="4472C4"/>
       </a:accent1>
       <a:accent2>
-        <a:srgbClr val="C0504D"/>
+        <a:srgbClr val="ED7D31"/>
       </a:accent2>
       <a:accent3>
-        <a:srgbClr val="9BBB59"/>
+        <a:srgbClr val="A5A5A5"/>
       </a:accent3>
       <a:accent4>
-        <a:srgbClr val="8064A2"/>
+        <a:srgbClr val="FFC000"/>
       </a:accent4>
       <a:accent5>
-        <a:srgbClr val="4BACC6"/>
+        <a:srgbClr val="5B9BD5"/>
       </a:accent5>
       <a:accent6>
-        <a:srgbClr val="F79646"/>
+        <a:srgbClr val="70AD47"/>
       </a:accent6>
       <a:hlink>
-        <a:srgbClr val="0000FF"/>
+        <a:srgbClr val="0563C1"/>
       </a:hlink>
       <a:folHlink>
-        <a:srgbClr val="800080"/>
+        <a:srgbClr val="954F72"/>
       </a:folHlink>
     </a:clrScheme>
-    <a:fontScheme name="Office">
+    <a:fontScheme name="Office Theme">
       <a:majorFont>
-        <a:latin typeface="Calibri"/>
+        <a:latin typeface="Calibri Light" panose="020F0302020204030204"/>
         <a:ea typeface=""/>
         <a:cs typeface=""/>
-        <a:font script="Jpan" typeface="ＭＳ Ｐゴシック"/>
+        <a:font script="Jpan" typeface="游ゴシック Light"/>
         <a:font script="Hang" typeface="맑은 고딕"/>
-        <a:font script="Hans" typeface="宋体"/>
+        <a:font script="Hans" typeface="等线 Light"/>
         <a:font script="Hant" typeface="新細明體"/>
         <a:font script="Arab" typeface="Times New Roman"/>
         <a:font script="Hebr" typeface="Times New Roman"/>
@@ -3686,12 +4043,12 @@
         <a:font script="Geor" typeface="Sylfaen"/>
       </a:majorFont>
       <a:minorFont>
-        <a:latin typeface="Calibri"/>
+        <a:latin typeface="Calibri" panose="020F0502020204030204"/>
         <a:ea typeface=""/>
         <a:cs typeface=""/>
-        <a:font script="Jpan" typeface="ＭＳ Ｐゴシック"/>
+        <a:font script="Jpan" typeface="游ゴシック"/>
         <a:font script="Hang" typeface="맑은 고딕"/>
-        <a:font script="Hans" typeface="宋体"/>
+        <a:font script="Hans" typeface="等线"/>
         <a:font script="Hant" typeface="新細明體"/>
         <a:font script="Arab" typeface="Arial"/>
         <a:font script="Hebr" typeface="Arial"/>
@@ -3721,7 +4078,7 @@
         <a:font script="Geor" typeface="Sylfaen"/>
       </a:minorFont>
     </a:fontScheme>
-    <a:fmtScheme name="Office">
+    <a:fmtScheme name="Office Theme">
       <a:fillStyleLst>
         <a:solidFill>
           <a:schemeClr val="phClr"/>
@@ -3730,200 +4087,141 @@
           <a:gsLst>
             <a:gs pos="0">
               <a:schemeClr val="phClr">
-                <a:tint val="50000"/>
-                <a:satMod val="300000"/>
+                <a:lumMod val="110000"/>
+                <a:satMod val="105000"/>
+                <a:tint val="67000"/>
               </a:schemeClr>
             </a:gs>
-            <a:gs pos="35000">
+            <a:gs pos="50000">
               <a:schemeClr val="phClr">
-                <a:tint val="37000"/>
-                <a:satMod val="300000"/>
+                <a:lumMod val="105000"/>
+                <a:satMod val="103000"/>
+                <a:tint val="73000"/>
               </a:schemeClr>
             </a:gs>
             <a:gs pos="100000">
               <a:schemeClr val="phClr">
-                <a:tint val="15000"/>
-                <a:satMod val="350000"/>
+                <a:lumMod val="105000"/>
+                <a:satMod val="109000"/>
+                <a:tint val="81000"/>
               </a:schemeClr>
             </a:gs>
           </a:gsLst>
-          <a:lin ang="16200000" scaled="1"/>
+          <a:lin ang="5400000" scaled="0"/>
         </a:gradFill>
         <a:gradFill rotWithShape="1">
           <a:gsLst>
             <a:gs pos="0">
               <a:schemeClr val="phClr">
-                <a:tint val="100000"/>
+                <a:satMod val="103000"/>
+                <a:lumMod val="102000"/>
+                <a:tint val="94000"/>
+              </a:schemeClr>
+            </a:gs>
+            <a:gs pos="50000">
+              <a:schemeClr val="phClr">
+                <a:satMod val="110000"/>
+                <a:lumMod val="100000"/>
                 <a:shade val="100000"/>
-                <a:satMod val="130000"/>
               </a:schemeClr>
             </a:gs>
             <a:gs pos="100000">
               <a:schemeClr val="phClr">
-                <a:tint val="50000"/>
-                <a:shade val="100000"/>
-                <a:satMod val="350000"/>
+                <a:lumMod val="99000"/>
+                <a:satMod val="120000"/>
+                <a:shade val="78000"/>
               </a:schemeClr>
             </a:gs>
           </a:gsLst>
-          <a:lin ang="16200000" scaled="0"/>
+          <a:lin ang="5400000" scaled="0"/>
         </a:gradFill>
       </a:fillStyleLst>
       <a:lnStyleLst>
-        <a:ln w="9525" cap="flat" cmpd="sng" algn="ctr">
-          <a:solidFill>
-            <a:schemeClr val="phClr">
-              <a:shade val="95000"/>
-              <a:satMod val="105000"/>
-            </a:schemeClr>
-          </a:solidFill>
-          <a:prstDash val="solid"/>
-        </a:ln>
-        <a:ln w="25400" cap="flat" cmpd="sng" algn="ctr">
+        <a:ln w="6350" cap="flat" cmpd="sng" algn="ctr">
           <a:solidFill>
             <a:schemeClr val="phClr"/>
           </a:solidFill>
           <a:prstDash val="solid"/>
+          <a:miter lim="800000"/>
         </a:ln>
-        <a:ln w="38100" cap="flat" cmpd="sng" algn="ctr">
+        <a:ln w="12700" cap="flat" cmpd="sng" algn="ctr">
           <a:solidFill>
             <a:schemeClr val="phClr"/>
           </a:solidFill>
           <a:prstDash val="solid"/>
+          <a:miter lim="800000"/>
+        </a:ln>
+        <a:ln w="19050" cap="flat" cmpd="sng" algn="ctr">
+          <a:solidFill>
+            <a:schemeClr val="phClr"/>
+          </a:solidFill>
+          <a:prstDash val="solid"/>
+          <a:miter lim="800000"/>
         </a:ln>
       </a:lnStyleLst>
       <a:effectStyleLst>
         <a:effectStyle>
+          <a:effectLst/>
+        </a:effectStyle>
+        <a:effectStyle>
+          <a:effectLst/>
+        </a:effectStyle>
+        <a:effectStyle>
           <a:effectLst>
-            <a:outerShdw blurRad="40000" dist="20000" dir="5400000" rotWithShape="0">
+            <a:outerShdw blurRad="57150" dist="19050" dir="5400000" algn="ctr" rotWithShape="0">
               <a:srgbClr val="000000">
-                <a:alpha val="38000"/>
+                <a:alpha val="63000"/>
               </a:srgbClr>
             </a:outerShdw>
           </a:effectLst>
-        </a:effectStyle>
-        <a:effectStyle>
-          <a:effectLst>
-            <a:outerShdw blurRad="40000" dist="23000" dir="5400000" rotWithShape="0">
-              <a:srgbClr val="000000">
-                <a:alpha val="35000"/>
-              </a:srgbClr>
-            </a:outerShdw>
-          </a:effectLst>
-        </a:effectStyle>
-        <a:effectStyle>
-          <a:effectLst>
-            <a:outerShdw blurRad="40000" dist="23000" dir="5400000" rotWithShape="0">
-              <a:srgbClr val="000000">
-                <a:alpha val="35000"/>
-              </a:srgbClr>
-            </a:outerShdw>
-          </a:effectLst>
-          <a:scene3d>
-            <a:camera prst="orthographicFront">
-              <a:rot lat="0" lon="0" rev="0"/>
-            </a:camera>
-            <a:lightRig rig="threePt" dir="t">
-              <a:rot lat="0" lon="0" rev="1200000"/>
-            </a:lightRig>
-          </a:scene3d>
-          <a:sp3d>
-            <a:bevelT w="63500" h="25400"/>
-          </a:sp3d>
         </a:effectStyle>
       </a:effectStyleLst>
       <a:bgFillStyleLst>
         <a:solidFill>
           <a:schemeClr val="phClr"/>
         </a:solidFill>
+        <a:solidFill>
+          <a:schemeClr val="phClr">
+            <a:tint val="95000"/>
+            <a:satMod val="170000"/>
+          </a:schemeClr>
+        </a:solidFill>
         <a:gradFill rotWithShape="1">
           <a:gsLst>
             <a:gs pos="0">
               <a:schemeClr val="phClr">
-                <a:tint val="40000"/>
-                <a:satMod val="350000"/>
+                <a:tint val="93000"/>
+                <a:satMod val="150000"/>
+                <a:shade val="98000"/>
+                <a:lumMod val="102000"/>
               </a:schemeClr>
             </a:gs>
-            <a:gs pos="40000">
+            <a:gs pos="50000">
               <a:schemeClr val="phClr">
-                <a:tint val="45000"/>
-                <a:shade val="99000"/>
-                <a:satMod val="350000"/>
+                <a:tint val="98000"/>
+                <a:satMod val="130000"/>
+                <a:shade val="90000"/>
+                <a:lumMod val="103000"/>
               </a:schemeClr>
             </a:gs>
             <a:gs pos="100000">
               <a:schemeClr val="phClr">
-                <a:shade val="20000"/>
-                <a:satMod val="255000"/>
+                <a:shade val="63000"/>
+                <a:satMod val="120000"/>
               </a:schemeClr>
             </a:gs>
           </a:gsLst>
-          <a:path path="circle">
-            <a:fillToRect l="50000" t="-80000" r="50000" b="180000"/>
-          </a:path>
-        </a:gradFill>
-        <a:gradFill rotWithShape="1">
-          <a:gsLst>
-            <a:gs pos="0">
-              <a:schemeClr val="phClr">
-                <a:tint val="80000"/>
-                <a:satMod val="300000"/>
-              </a:schemeClr>
-            </a:gs>
-            <a:gs pos="100000">
-              <a:schemeClr val="phClr">
-                <a:shade val="30000"/>
-                <a:satMod val="200000"/>
-              </a:schemeClr>
-            </a:gs>
-          </a:gsLst>
-          <a:path path="circle">
-            <a:fillToRect l="50000" t="50000" r="50000" b="50000"/>
-          </a:path>
+          <a:lin ang="5400000" scaled="0"/>
         </a:gradFill>
       </a:bgFillStyleLst>
     </a:fmtScheme>
   </a:themeElements>
-  <a:objectDefaults>
-    <a:spDef>
-      <a:spPr/>
-      <a:bodyPr/>
-      <a:lstStyle/>
-      <a:style>
-        <a:lnRef idx="1">
-          <a:schemeClr val="accent1"/>
-        </a:lnRef>
-        <a:fillRef idx="3">
-          <a:schemeClr val="accent1"/>
-        </a:fillRef>
-        <a:effectRef idx="2">
-          <a:schemeClr val="accent1"/>
-        </a:effectRef>
-        <a:fontRef idx="minor">
-          <a:schemeClr val="lt1"/>
-        </a:fontRef>
-      </a:style>
-    </a:spDef>
-    <a:lnDef>
-      <a:spPr/>
-      <a:bodyPr/>
-      <a:lstStyle/>
-      <a:style>
-        <a:lnRef idx="2">
-          <a:schemeClr val="accent1"/>
-        </a:lnRef>
-        <a:fillRef idx="0">
-          <a:schemeClr val="accent1"/>
-        </a:fillRef>
-        <a:effectRef idx="1">
-          <a:schemeClr val="accent1"/>
-        </a:effectRef>
-        <a:fontRef idx="minor">
-          <a:schemeClr val="tx1"/>
-        </a:fontRef>
-      </a:style>
-    </a:lnDef>
-  </a:objectDefaults>
+  <a:objectDefaults/>
   <a:extraClrSchemeLst/>
+  <a:extLst>
+    <a:ext uri="{05A4C25C-085E-4340-85A3-A5531E510DB2}">
+      <thm15:themeFamily xmlns:thm15="http://schemas.microsoft.com/office/thememl/2012/main" name="Office Theme" id="{62F939B6-93AF-4DB8-9C6B-D6C7DFDC589F}" vid="{4A3C46E8-61CC-4603-A589-7422A47A8E4A}"/>
+    </a:ext>
+  </a:extLst>
 </a:theme>
 </file>
</xml_diff>

<commit_message>
a very small change.
</commit_message>
<xml_diff>
--- a/journalWallFriction/pictures/pdf/Reflection.pptx
+++ b/journalWallFriction/pictures/pdf/Reflection.pptx
@@ -3525,7 +3525,7 @@
         </p:nvSpPr>
         <p:spPr>
           <a:xfrm>
-            <a:off x="8495122" y="4062954"/>
+            <a:off x="8647188" y="4062954"/>
             <a:ext cx="961534" cy="400110"/>
           </a:xfrm>
           <a:prstGeom prst="rect">
@@ -3949,6 +3949,58 @@
               </a:rPr>
               <a:t>Down</a:t>
             </a:r>
+          </a:p>
+        </p:txBody>
+      </p:sp>
+      <p:sp>
+        <p:nvSpPr>
+          <p:cNvPr id="47" name="7-Point Star 46">
+            <a:extLst>
+              <a:ext uri="{FF2B5EF4-FFF2-40B4-BE49-F238E27FC236}">
+                <a16:creationId xmlns:a16="http://schemas.microsoft.com/office/drawing/2014/main" id="{1B26ADEB-EBD4-F045-B92C-E6E3F95871FF}"/>
+              </a:ext>
+            </a:extLst>
+          </p:cNvPr>
+          <p:cNvSpPr/>
+          <p:nvPr/>
+        </p:nvSpPr>
+        <p:spPr>
+          <a:xfrm>
+            <a:off x="7569421" y="2310328"/>
+            <a:ext cx="75718" cy="117381"/>
+          </a:xfrm>
+          <a:prstGeom prst="star7">
+            <a:avLst/>
+          </a:prstGeom>
+          <a:solidFill>
+            <a:srgbClr val="00B050"/>
+          </a:solidFill>
+          <a:ln>
+            <a:noFill/>
+          </a:ln>
+        </p:spPr>
+        <p:style>
+          <a:lnRef idx="2">
+            <a:schemeClr val="accent1">
+              <a:shade val="50000"/>
+            </a:schemeClr>
+          </a:lnRef>
+          <a:fillRef idx="1">
+            <a:schemeClr val="accent1"/>
+          </a:fillRef>
+          <a:effectRef idx="0">
+            <a:schemeClr val="accent1"/>
+          </a:effectRef>
+          <a:fontRef idx="minor">
+            <a:schemeClr val="lt1"/>
+          </a:fontRef>
+        </p:style>
+        <p:txBody>
+          <a:bodyPr rtlCol="0" anchor="ctr"/>
+          <a:lstStyle/>
+          <a:p>
+            <a:pPr algn="ctr"/>
+            <a:endParaRPr lang="en-US"/>
           </a:p>
         </p:txBody>
       </p:sp>

</xml_diff>

<commit_message>
A lot of edits to the pictures and other stuff
</commit_message>
<xml_diff>
--- a/journalWallFriction/pictures/pdf/Reflection.pptx
+++ b/journalWallFriction/pictures/pdf/Reflection.pptx
@@ -4,6 +4,9 @@
   <p:sldMasterIdLst>
     <p:sldMasterId id="2147483660" r:id="rId1"/>
   </p:sldMasterIdLst>
+  <p:notesMasterIdLst>
+    <p:notesMasterId r:id="rId3"/>
+  </p:notesMasterIdLst>
   <p:sldIdLst>
     <p:sldId id="256" r:id="rId2"/>
   </p:sldIdLst>
@@ -110,6 +113,439 @@
     </p:ext>
   </p:extLst>
 </p:presentation>
+</file>
+
+<file path=ppt/notesMasters/notesMaster1.xml><?xml version="1.0" encoding="utf-8"?>
+<p:notesMaster xmlns:a="http://schemas.openxmlformats.org/drawingml/2006/main" xmlns:r="http://schemas.openxmlformats.org/officeDocument/2006/relationships" xmlns:p="http://schemas.openxmlformats.org/presentationml/2006/main">
+  <p:cSld>
+    <p:bg>
+      <p:bgRef idx="1001">
+        <a:schemeClr val="bg1"/>
+      </p:bgRef>
+    </p:bg>
+    <p:spTree>
+      <p:nvGrpSpPr>
+        <p:cNvPr id="1" name=""/>
+        <p:cNvGrpSpPr/>
+        <p:nvPr/>
+      </p:nvGrpSpPr>
+      <p:grpSpPr>
+        <a:xfrm>
+          <a:off x="0" y="0"/>
+          <a:ext cx="0" cy="0"/>
+          <a:chOff x="0" y="0"/>
+          <a:chExt cx="0" cy="0"/>
+        </a:xfrm>
+      </p:grpSpPr>
+      <p:sp>
+        <p:nvSpPr>
+          <p:cNvPr id="2" name="Header Placeholder 1"/>
+          <p:cNvSpPr>
+            <a:spLocks noGrp="1"/>
+          </p:cNvSpPr>
+          <p:nvPr>
+            <p:ph type="hdr" sz="quarter"/>
+          </p:nvPr>
+        </p:nvSpPr>
+        <p:spPr>
+          <a:xfrm>
+            <a:off x="0" y="0"/>
+            <a:ext cx="2971800" cy="458788"/>
+          </a:xfrm>
+          <a:prstGeom prst="rect">
+            <a:avLst/>
+          </a:prstGeom>
+        </p:spPr>
+        <p:txBody>
+          <a:bodyPr vert="horz" lIns="91440" tIns="45720" rIns="91440" bIns="45720" rtlCol="0"/>
+          <a:lstStyle>
+            <a:lvl1pPr algn="l">
+              <a:defRPr sz="1200"/>
+            </a:lvl1pPr>
+          </a:lstStyle>
+          <a:p>
+            <a:endParaRPr lang="en-US"/>
+          </a:p>
+        </p:txBody>
+      </p:sp>
+      <p:sp>
+        <p:nvSpPr>
+          <p:cNvPr id="3" name="Date Placeholder 2"/>
+          <p:cNvSpPr>
+            <a:spLocks noGrp="1"/>
+          </p:cNvSpPr>
+          <p:nvPr>
+            <p:ph type="dt" idx="1"/>
+          </p:nvPr>
+        </p:nvSpPr>
+        <p:spPr>
+          <a:xfrm>
+            <a:off x="3884613" y="0"/>
+            <a:ext cx="2971800" cy="458788"/>
+          </a:xfrm>
+          <a:prstGeom prst="rect">
+            <a:avLst/>
+          </a:prstGeom>
+        </p:spPr>
+        <p:txBody>
+          <a:bodyPr vert="horz" lIns="91440" tIns="45720" rIns="91440" bIns="45720" rtlCol="0"/>
+          <a:lstStyle>
+            <a:lvl1pPr algn="r">
+              <a:defRPr sz="1200"/>
+            </a:lvl1pPr>
+          </a:lstStyle>
+          <a:p>
+            <a:fld id="{04AB8D65-C370-A548-86E8-A0E663CC7657}" type="datetimeFigureOut">
+              <a:rPr lang="en-US" smtClean="0"/>
+              <a:t>5/13/18</a:t>
+            </a:fld>
+            <a:endParaRPr lang="en-US"/>
+          </a:p>
+        </p:txBody>
+      </p:sp>
+      <p:sp>
+        <p:nvSpPr>
+          <p:cNvPr id="4" name="Slide Image Placeholder 3"/>
+          <p:cNvSpPr>
+            <a:spLocks noGrp="1" noRot="1" noChangeAspect="1"/>
+          </p:cNvSpPr>
+          <p:nvPr>
+            <p:ph type="sldImg" idx="2"/>
+          </p:nvPr>
+        </p:nvSpPr>
+        <p:spPr>
+          <a:xfrm>
+            <a:off x="0" y="1143000"/>
+            <a:ext cx="6858000" cy="3086100"/>
+          </a:xfrm>
+          <a:prstGeom prst="rect">
+            <a:avLst/>
+          </a:prstGeom>
+          <a:noFill/>
+          <a:ln w="12700">
+            <a:solidFill>
+              <a:prstClr val="black"/>
+            </a:solidFill>
+          </a:ln>
+        </p:spPr>
+        <p:txBody>
+          <a:bodyPr vert="horz" lIns="91440" tIns="45720" rIns="91440" bIns="45720" rtlCol="0" anchor="ctr"/>
+          <a:lstStyle/>
+          <a:p>
+            <a:endParaRPr lang="en-US"/>
+          </a:p>
+        </p:txBody>
+      </p:sp>
+      <p:sp>
+        <p:nvSpPr>
+          <p:cNvPr id="5" name="Notes Placeholder 4"/>
+          <p:cNvSpPr>
+            <a:spLocks noGrp="1"/>
+          </p:cNvSpPr>
+          <p:nvPr>
+            <p:ph type="body" sz="quarter" idx="3"/>
+          </p:nvPr>
+        </p:nvSpPr>
+        <p:spPr>
+          <a:xfrm>
+            <a:off x="685800" y="4400550"/>
+            <a:ext cx="5486400" cy="3600450"/>
+          </a:xfrm>
+          <a:prstGeom prst="rect">
+            <a:avLst/>
+          </a:prstGeom>
+        </p:spPr>
+        <p:txBody>
+          <a:bodyPr vert="horz" lIns="91440" tIns="45720" rIns="91440" bIns="45720" rtlCol="0"/>
+          <a:lstStyle/>
+          <a:p>
+            <a:pPr lvl="0"/>
+            <a:r>
+              <a:rPr lang="en-US"/>
+              <a:t>Edit Master text styles</a:t>
+            </a:r>
+          </a:p>
+          <a:p>
+            <a:pPr lvl="1"/>
+            <a:r>
+              <a:rPr lang="en-US"/>
+              <a:t>Second level</a:t>
+            </a:r>
+          </a:p>
+          <a:p>
+            <a:pPr lvl="2"/>
+            <a:r>
+              <a:rPr lang="en-US"/>
+              <a:t>Third level</a:t>
+            </a:r>
+          </a:p>
+          <a:p>
+            <a:pPr lvl="3"/>
+            <a:r>
+              <a:rPr lang="en-US"/>
+              <a:t>Fourth level</a:t>
+            </a:r>
+          </a:p>
+          <a:p>
+            <a:pPr lvl="4"/>
+            <a:r>
+              <a:rPr lang="en-US"/>
+              <a:t>Fifth level</a:t>
+            </a:r>
+          </a:p>
+        </p:txBody>
+      </p:sp>
+      <p:sp>
+        <p:nvSpPr>
+          <p:cNvPr id="6" name="Footer Placeholder 5"/>
+          <p:cNvSpPr>
+            <a:spLocks noGrp="1"/>
+          </p:cNvSpPr>
+          <p:nvPr>
+            <p:ph type="ftr" sz="quarter" idx="4"/>
+          </p:nvPr>
+        </p:nvSpPr>
+        <p:spPr>
+          <a:xfrm>
+            <a:off x="0" y="8685213"/>
+            <a:ext cx="2971800" cy="458787"/>
+          </a:xfrm>
+          <a:prstGeom prst="rect">
+            <a:avLst/>
+          </a:prstGeom>
+        </p:spPr>
+        <p:txBody>
+          <a:bodyPr vert="horz" lIns="91440" tIns="45720" rIns="91440" bIns="45720" rtlCol="0" anchor="b"/>
+          <a:lstStyle>
+            <a:lvl1pPr algn="l">
+              <a:defRPr sz="1200"/>
+            </a:lvl1pPr>
+          </a:lstStyle>
+          <a:p>
+            <a:endParaRPr lang="en-US"/>
+          </a:p>
+        </p:txBody>
+      </p:sp>
+      <p:sp>
+        <p:nvSpPr>
+          <p:cNvPr id="7" name="Slide Number Placeholder 6"/>
+          <p:cNvSpPr>
+            <a:spLocks noGrp="1"/>
+          </p:cNvSpPr>
+          <p:nvPr>
+            <p:ph type="sldNum" sz="quarter" idx="5"/>
+          </p:nvPr>
+        </p:nvSpPr>
+        <p:spPr>
+          <a:xfrm>
+            <a:off x="3884613" y="8685213"/>
+            <a:ext cx="2971800" cy="458787"/>
+          </a:xfrm>
+          <a:prstGeom prst="rect">
+            <a:avLst/>
+          </a:prstGeom>
+        </p:spPr>
+        <p:txBody>
+          <a:bodyPr vert="horz" lIns="91440" tIns="45720" rIns="91440" bIns="45720" rtlCol="0" anchor="b"/>
+          <a:lstStyle>
+            <a:lvl1pPr algn="r">
+              <a:defRPr sz="1200"/>
+            </a:lvl1pPr>
+          </a:lstStyle>
+          <a:p>
+            <a:fld id="{AA5A9494-39FA-5240-AD27-C06F09B5DF8B}" type="slidenum">
+              <a:rPr lang="en-US" smtClean="0"/>
+              <a:t>‹#›</a:t>
+            </a:fld>
+            <a:endParaRPr lang="en-US"/>
+          </a:p>
+        </p:txBody>
+      </p:sp>
+    </p:spTree>
+    <p:extLst>
+      <p:ext uri="{BB962C8B-B14F-4D97-AF65-F5344CB8AC3E}">
+        <p14:creationId xmlns:p14="http://schemas.microsoft.com/office/powerpoint/2010/main" val="493154656"/>
+      </p:ext>
+    </p:extLst>
+  </p:cSld>
+  <p:clrMap bg1="lt1" tx1="dk1" bg2="lt2" tx2="dk2" accent1="accent1" accent2="accent2" accent3="accent3" accent4="accent4" accent5="accent5" accent6="accent6" hlink="hlink" folHlink="folHlink"/>
+  <p:notesStyle>
+    <a:lvl1pPr marL="0" algn="l" defTabSz="914400" rtl="0" eaLnBrk="1" latinLnBrk="0" hangingPunct="1">
+      <a:defRPr sz="1200" kern="1200">
+        <a:solidFill>
+          <a:schemeClr val="tx1"/>
+        </a:solidFill>
+        <a:latin typeface="+mn-lt"/>
+        <a:ea typeface="+mn-ea"/>
+        <a:cs typeface="+mn-cs"/>
+      </a:defRPr>
+    </a:lvl1pPr>
+    <a:lvl2pPr marL="457200" algn="l" defTabSz="914400" rtl="0" eaLnBrk="1" latinLnBrk="0" hangingPunct="1">
+      <a:defRPr sz="1200" kern="1200">
+        <a:solidFill>
+          <a:schemeClr val="tx1"/>
+        </a:solidFill>
+        <a:latin typeface="+mn-lt"/>
+        <a:ea typeface="+mn-ea"/>
+        <a:cs typeface="+mn-cs"/>
+      </a:defRPr>
+    </a:lvl2pPr>
+    <a:lvl3pPr marL="914400" algn="l" defTabSz="914400" rtl="0" eaLnBrk="1" latinLnBrk="0" hangingPunct="1">
+      <a:defRPr sz="1200" kern="1200">
+        <a:solidFill>
+          <a:schemeClr val="tx1"/>
+        </a:solidFill>
+        <a:latin typeface="+mn-lt"/>
+        <a:ea typeface="+mn-ea"/>
+        <a:cs typeface="+mn-cs"/>
+      </a:defRPr>
+    </a:lvl3pPr>
+    <a:lvl4pPr marL="1371600" algn="l" defTabSz="914400" rtl="0" eaLnBrk="1" latinLnBrk="0" hangingPunct="1">
+      <a:defRPr sz="1200" kern="1200">
+        <a:solidFill>
+          <a:schemeClr val="tx1"/>
+        </a:solidFill>
+        <a:latin typeface="+mn-lt"/>
+        <a:ea typeface="+mn-ea"/>
+        <a:cs typeface="+mn-cs"/>
+      </a:defRPr>
+    </a:lvl4pPr>
+    <a:lvl5pPr marL="1828800" algn="l" defTabSz="914400" rtl="0" eaLnBrk="1" latinLnBrk="0" hangingPunct="1">
+      <a:defRPr sz="1200" kern="1200">
+        <a:solidFill>
+          <a:schemeClr val="tx1"/>
+        </a:solidFill>
+        <a:latin typeface="+mn-lt"/>
+        <a:ea typeface="+mn-ea"/>
+        <a:cs typeface="+mn-cs"/>
+      </a:defRPr>
+    </a:lvl5pPr>
+    <a:lvl6pPr marL="2286000" algn="l" defTabSz="914400" rtl="0" eaLnBrk="1" latinLnBrk="0" hangingPunct="1">
+      <a:defRPr sz="1200" kern="1200">
+        <a:solidFill>
+          <a:schemeClr val="tx1"/>
+        </a:solidFill>
+        <a:latin typeface="+mn-lt"/>
+        <a:ea typeface="+mn-ea"/>
+        <a:cs typeface="+mn-cs"/>
+      </a:defRPr>
+    </a:lvl6pPr>
+    <a:lvl7pPr marL="2743200" algn="l" defTabSz="914400" rtl="0" eaLnBrk="1" latinLnBrk="0" hangingPunct="1">
+      <a:defRPr sz="1200" kern="1200">
+        <a:solidFill>
+          <a:schemeClr val="tx1"/>
+        </a:solidFill>
+        <a:latin typeface="+mn-lt"/>
+        <a:ea typeface="+mn-ea"/>
+        <a:cs typeface="+mn-cs"/>
+      </a:defRPr>
+    </a:lvl7pPr>
+    <a:lvl8pPr marL="3200400" algn="l" defTabSz="914400" rtl="0" eaLnBrk="1" latinLnBrk="0" hangingPunct="1">
+      <a:defRPr sz="1200" kern="1200">
+        <a:solidFill>
+          <a:schemeClr val="tx1"/>
+        </a:solidFill>
+        <a:latin typeface="+mn-lt"/>
+        <a:ea typeface="+mn-ea"/>
+        <a:cs typeface="+mn-cs"/>
+      </a:defRPr>
+    </a:lvl8pPr>
+    <a:lvl9pPr marL="3657600" algn="l" defTabSz="914400" rtl="0" eaLnBrk="1" latinLnBrk="0" hangingPunct="1">
+      <a:defRPr sz="1200" kern="1200">
+        <a:solidFill>
+          <a:schemeClr val="tx1"/>
+        </a:solidFill>
+        <a:latin typeface="+mn-lt"/>
+        <a:ea typeface="+mn-ea"/>
+        <a:cs typeface="+mn-cs"/>
+      </a:defRPr>
+    </a:lvl9pPr>
+  </p:notesStyle>
+</p:notesMaster>
+</file>
+
+<file path=ppt/notesSlides/notesSlide1.xml><?xml version="1.0" encoding="utf-8"?>
+<p:notes xmlns:a="http://schemas.openxmlformats.org/drawingml/2006/main" xmlns:r="http://schemas.openxmlformats.org/officeDocument/2006/relationships" xmlns:p="http://schemas.openxmlformats.org/presentationml/2006/main">
+  <p:cSld>
+    <p:spTree>
+      <p:nvGrpSpPr>
+        <p:cNvPr id="1" name=""/>
+        <p:cNvGrpSpPr/>
+        <p:nvPr/>
+      </p:nvGrpSpPr>
+      <p:grpSpPr>
+        <a:xfrm>
+          <a:off x="0" y="0"/>
+          <a:ext cx="0" cy="0"/>
+          <a:chOff x="0" y="0"/>
+          <a:chExt cx="0" cy="0"/>
+        </a:xfrm>
+      </p:grpSpPr>
+      <p:sp>
+        <p:nvSpPr>
+          <p:cNvPr id="2" name="Slide Image Placeholder 1"/>
+          <p:cNvSpPr>
+            <a:spLocks noGrp="1" noRot="1" noChangeAspect="1"/>
+          </p:cNvSpPr>
+          <p:nvPr>
+            <p:ph type="sldImg"/>
+          </p:nvPr>
+        </p:nvSpPr>
+        <p:spPr/>
+      </p:sp>
+      <p:sp>
+        <p:nvSpPr>
+          <p:cNvPr id="3" name="Notes Placeholder 2"/>
+          <p:cNvSpPr>
+            <a:spLocks noGrp="1"/>
+          </p:cNvSpPr>
+          <p:nvPr>
+            <p:ph type="body" idx="1"/>
+          </p:nvPr>
+        </p:nvSpPr>
+        <p:spPr/>
+        <p:txBody>
+          <a:bodyPr/>
+          <a:lstStyle/>
+          <a:p>
+            <a:endParaRPr lang="en-US" dirty="0"/>
+          </a:p>
+        </p:txBody>
+      </p:sp>
+      <p:sp>
+        <p:nvSpPr>
+          <p:cNvPr id="4" name="Slide Number Placeholder 3"/>
+          <p:cNvSpPr>
+            <a:spLocks noGrp="1"/>
+          </p:cNvSpPr>
+          <p:nvPr>
+            <p:ph type="sldNum" sz="quarter" idx="10"/>
+          </p:nvPr>
+        </p:nvSpPr>
+        <p:spPr/>
+        <p:txBody>
+          <a:bodyPr/>
+          <a:lstStyle/>
+          <a:p>
+            <a:fld id="{AA5A9494-39FA-5240-AD27-C06F09B5DF8B}" type="slidenum">
+              <a:rPr lang="en-US" smtClean="0"/>
+              <a:t>1</a:t>
+            </a:fld>
+            <a:endParaRPr lang="en-US"/>
+          </a:p>
+        </p:txBody>
+      </p:sp>
+    </p:spTree>
+    <p:extLst>
+      <p:ext uri="{BB962C8B-B14F-4D97-AF65-F5344CB8AC3E}">
+        <p14:creationId xmlns:p14="http://schemas.microsoft.com/office/powerpoint/2010/main" val="3180032323"/>
+      </p:ext>
+    </p:extLst>
+  </p:cSld>
+  <p:clrMapOvr>
+    <a:masterClrMapping/>
+  </p:clrMapOvr>
+</p:notes>
 </file>
 
 <file path=ppt/slideLayouts/slideLayout1.xml><?xml version="1.0" encoding="utf-8"?>
@@ -2975,6 +3411,456 @@
       </p:grpSpPr>
       <p:grpSp>
         <p:nvGrpSpPr>
+          <p:cNvPr id="2" name="Group 1">
+            <a:extLst>
+              <a:ext uri="{FF2B5EF4-FFF2-40B4-BE49-F238E27FC236}">
+                <a16:creationId xmlns:a16="http://schemas.microsoft.com/office/drawing/2014/main" id="{47A990BB-88AA-B946-BBFD-D9593F608768}"/>
+              </a:ext>
+            </a:extLst>
+          </p:cNvPr>
+          <p:cNvGrpSpPr/>
+          <p:nvPr/>
+        </p:nvGrpSpPr>
+        <p:grpSpPr>
+          <a:xfrm>
+            <a:off x="5268437" y="206962"/>
+            <a:ext cx="7118383" cy="5126803"/>
+            <a:chOff x="6293374" y="688153"/>
+            <a:chExt cx="5825578" cy="4091233"/>
+          </a:xfrm>
+        </p:grpSpPr>
+        <p:pic>
+          <p:nvPicPr>
+            <p:cNvPr id="48" name="Picture 47">
+              <a:extLst>
+                <a:ext uri="{FF2B5EF4-FFF2-40B4-BE49-F238E27FC236}">
+                  <a16:creationId xmlns:a16="http://schemas.microsoft.com/office/drawing/2014/main" id="{C4096D9A-83E4-5C47-BA3B-DD3E0C83BCF7}"/>
+                </a:ext>
+              </a:extLst>
+            </p:cNvPr>
+            <p:cNvPicPr>
+              <a:picLocks noChangeAspect="1"/>
+            </p:cNvPicPr>
+            <p:nvPr/>
+          </p:nvPicPr>
+          <p:blipFill rotWithShape="1">
+            <a:blip r:embed="rId3"/>
+            <a:srcRect l="50664" t="18698" r="5363" b="20030"/>
+            <a:stretch/>
+          </p:blipFill>
+          <p:spPr>
+            <a:xfrm>
+              <a:off x="6293374" y="688153"/>
+              <a:ext cx="5666142" cy="4091233"/>
+            </a:xfrm>
+            <a:prstGeom prst="rect">
+              <a:avLst/>
+            </a:prstGeom>
+          </p:spPr>
+        </p:pic>
+        <p:sp>
+          <p:nvSpPr>
+            <p:cNvPr id="33" name="TextBox 32">
+              <a:extLst>
+                <a:ext uri="{FF2B5EF4-FFF2-40B4-BE49-F238E27FC236}">
+                  <a16:creationId xmlns:a16="http://schemas.microsoft.com/office/drawing/2014/main" id="{30EEAF83-BDD0-1544-97C3-0BA5213ED311}"/>
+                </a:ext>
+              </a:extLst>
+            </p:cNvPr>
+            <p:cNvSpPr txBox="1"/>
+            <p:nvPr/>
+          </p:nvSpPr>
+          <p:spPr>
+            <a:xfrm>
+              <a:off x="7286920" y="4062954"/>
+              <a:ext cx="961534" cy="400110"/>
+            </a:xfrm>
+            <a:prstGeom prst="rect">
+              <a:avLst/>
+            </a:prstGeom>
+            <a:noFill/>
+          </p:spPr>
+          <p:txBody>
+            <a:bodyPr wrap="square" rtlCol="0">
+              <a:spAutoFit/>
+            </a:bodyPr>
+            <a:lstStyle/>
+            <a:p>
+              <a:r>
+                <a:rPr lang="en-US" sz="2000" dirty="0">
+                  <a:latin typeface="Times" pitchFamily="2" charset="0"/>
+                </a:rPr>
+                <a:t>Right</a:t>
+              </a:r>
+            </a:p>
+          </p:txBody>
+        </p:sp>
+        <p:sp>
+          <p:nvSpPr>
+            <p:cNvPr id="34" name="TextBox 33">
+              <a:extLst>
+                <a:ext uri="{FF2B5EF4-FFF2-40B4-BE49-F238E27FC236}">
+                  <a16:creationId xmlns:a16="http://schemas.microsoft.com/office/drawing/2014/main" id="{F4D73269-473A-C345-A030-068FF3E38007}"/>
+                </a:ext>
+              </a:extLst>
+            </p:cNvPr>
+            <p:cNvSpPr txBox="1"/>
+            <p:nvPr/>
+          </p:nvSpPr>
+          <p:spPr>
+            <a:xfrm>
+              <a:off x="8647188" y="4062954"/>
+              <a:ext cx="961534" cy="400110"/>
+            </a:xfrm>
+            <a:prstGeom prst="rect">
+              <a:avLst/>
+            </a:prstGeom>
+            <a:noFill/>
+          </p:spPr>
+          <p:txBody>
+            <a:bodyPr wrap="square" rtlCol="0">
+              <a:spAutoFit/>
+            </a:bodyPr>
+            <a:lstStyle/>
+            <a:p>
+              <a:r>
+                <a:rPr lang="en-US" sz="2000" dirty="0">
+                  <a:latin typeface="Times" pitchFamily="2" charset="0"/>
+                </a:rPr>
+                <a:t>Up</a:t>
+              </a:r>
+            </a:p>
+          </p:txBody>
+        </p:sp>
+        <p:sp>
+          <p:nvSpPr>
+            <p:cNvPr id="35" name="TextBox 34">
+              <a:extLst>
+                <a:ext uri="{FF2B5EF4-FFF2-40B4-BE49-F238E27FC236}">
+                  <a16:creationId xmlns:a16="http://schemas.microsoft.com/office/drawing/2014/main" id="{44AA773C-8801-1B44-A544-9E33AA71D63F}"/>
+                </a:ext>
+              </a:extLst>
+            </p:cNvPr>
+            <p:cNvSpPr txBox="1"/>
+            <p:nvPr/>
+          </p:nvSpPr>
+          <p:spPr>
+            <a:xfrm>
+              <a:off x="9777167" y="4062954"/>
+              <a:ext cx="961534" cy="400110"/>
+            </a:xfrm>
+            <a:prstGeom prst="rect">
+              <a:avLst/>
+            </a:prstGeom>
+            <a:noFill/>
+          </p:spPr>
+          <p:txBody>
+            <a:bodyPr wrap="square" rtlCol="0">
+              <a:spAutoFit/>
+            </a:bodyPr>
+            <a:lstStyle/>
+            <a:p>
+              <a:r>
+                <a:rPr lang="en-US" sz="2000" dirty="0">
+                  <a:latin typeface="Times" pitchFamily="2" charset="0"/>
+                </a:rPr>
+                <a:t>Left</a:t>
+              </a:r>
+            </a:p>
+          </p:txBody>
+        </p:sp>
+        <p:sp>
+          <p:nvSpPr>
+            <p:cNvPr id="36" name="TextBox 35">
+              <a:extLst>
+                <a:ext uri="{FF2B5EF4-FFF2-40B4-BE49-F238E27FC236}">
+                  <a16:creationId xmlns:a16="http://schemas.microsoft.com/office/drawing/2014/main" id="{9989E36F-D92E-8241-B0BB-BA8EDEA262C5}"/>
+                </a:ext>
+              </a:extLst>
+            </p:cNvPr>
+            <p:cNvSpPr txBox="1"/>
+            <p:nvPr/>
+          </p:nvSpPr>
+          <p:spPr>
+            <a:xfrm>
+              <a:off x="11059212" y="4062954"/>
+              <a:ext cx="961534" cy="400110"/>
+            </a:xfrm>
+            <a:prstGeom prst="rect">
+              <a:avLst/>
+            </a:prstGeom>
+            <a:noFill/>
+          </p:spPr>
+          <p:txBody>
+            <a:bodyPr wrap="square" rtlCol="0">
+              <a:spAutoFit/>
+            </a:bodyPr>
+            <a:lstStyle/>
+            <a:p>
+              <a:r>
+                <a:rPr lang="en-US" sz="2000" dirty="0">
+                  <a:latin typeface="Times" pitchFamily="2" charset="0"/>
+                </a:rPr>
+                <a:t>Down</a:t>
+              </a:r>
+            </a:p>
+          </p:txBody>
+        </p:sp>
+        <p:sp>
+          <p:nvSpPr>
+            <p:cNvPr id="38" name="TextBox 37">
+              <a:extLst>
+                <a:ext uri="{FF2B5EF4-FFF2-40B4-BE49-F238E27FC236}">
+                  <a16:creationId xmlns:a16="http://schemas.microsoft.com/office/drawing/2014/main" id="{5CBA4903-BB69-EB4D-876B-CE0770E4E2DE}"/>
+                </a:ext>
+              </a:extLst>
+            </p:cNvPr>
+            <p:cNvSpPr txBox="1"/>
+            <p:nvPr/>
+          </p:nvSpPr>
+          <p:spPr>
+            <a:xfrm rot="16200000">
+              <a:off x="7613440" y="2631164"/>
+              <a:ext cx="1259953" cy="400110"/>
+            </a:xfrm>
+            <a:prstGeom prst="rect">
+              <a:avLst/>
+            </a:prstGeom>
+            <a:noFill/>
+          </p:spPr>
+          <p:txBody>
+            <a:bodyPr wrap="square" rtlCol="0">
+              <a:spAutoFit/>
+            </a:bodyPr>
+            <a:lstStyle/>
+            <a:p>
+              <a:r>
+                <a:rPr lang="en-US" sz="2000" dirty="0">
+                  <a:latin typeface="Times" pitchFamily="2" charset="0"/>
+                </a:rPr>
+                <a:t>INVALID</a:t>
+              </a:r>
+            </a:p>
+          </p:txBody>
+        </p:sp>
+        <p:sp>
+          <p:nvSpPr>
+            <p:cNvPr id="39" name="TextBox 38">
+              <a:extLst>
+                <a:ext uri="{FF2B5EF4-FFF2-40B4-BE49-F238E27FC236}">
+                  <a16:creationId xmlns:a16="http://schemas.microsoft.com/office/drawing/2014/main" id="{4513D52D-A797-934B-972E-AEAA4831B11C}"/>
+                </a:ext>
+              </a:extLst>
+            </p:cNvPr>
+            <p:cNvSpPr txBox="1"/>
+            <p:nvPr/>
+          </p:nvSpPr>
+          <p:spPr>
+            <a:xfrm rot="16200000">
+              <a:off x="9985717" y="2631163"/>
+              <a:ext cx="1259953" cy="400110"/>
+            </a:xfrm>
+            <a:prstGeom prst="rect">
+              <a:avLst/>
+            </a:prstGeom>
+            <a:noFill/>
+          </p:spPr>
+          <p:txBody>
+            <a:bodyPr wrap="square" rtlCol="0">
+              <a:spAutoFit/>
+            </a:bodyPr>
+            <a:lstStyle/>
+            <a:p>
+              <a:r>
+                <a:rPr lang="en-US" sz="2000" dirty="0">
+                  <a:latin typeface="Times" pitchFamily="2" charset="0"/>
+                </a:rPr>
+                <a:t>INVALID</a:t>
+              </a:r>
+            </a:p>
+          </p:txBody>
+        </p:sp>
+        <p:sp>
+          <p:nvSpPr>
+            <p:cNvPr id="40" name="TextBox 39">
+              <a:extLst>
+                <a:ext uri="{FF2B5EF4-FFF2-40B4-BE49-F238E27FC236}">
+                  <a16:creationId xmlns:a16="http://schemas.microsoft.com/office/drawing/2014/main" id="{68B4E8F6-91B0-E542-8A4F-D88BC10A2011}"/>
+                </a:ext>
+              </a:extLst>
+            </p:cNvPr>
+            <p:cNvSpPr txBox="1"/>
+            <p:nvPr/>
+          </p:nvSpPr>
+          <p:spPr>
+            <a:xfrm>
+              <a:off x="8358608" y="3035432"/>
+              <a:ext cx="617281" cy="369332"/>
+            </a:xfrm>
+            <a:prstGeom prst="rect">
+              <a:avLst/>
+            </a:prstGeom>
+            <a:noFill/>
+          </p:spPr>
+          <p:txBody>
+            <a:bodyPr wrap="square" rtlCol="0">
+              <a:spAutoFit/>
+            </a:bodyPr>
+            <a:lstStyle/>
+            <a:p>
+              <a:endParaRPr lang="en-US" dirty="0"/>
+            </a:p>
+          </p:txBody>
+        </p:sp>
+        <p:sp>
+          <p:nvSpPr>
+            <p:cNvPr id="41" name="TextBox 40">
+              <a:extLst>
+                <a:ext uri="{FF2B5EF4-FFF2-40B4-BE49-F238E27FC236}">
+                  <a16:creationId xmlns:a16="http://schemas.microsoft.com/office/drawing/2014/main" id="{CAB9EA1B-86C2-B348-A69F-29AABA139C8D}"/>
+                </a:ext>
+              </a:extLst>
+            </p:cNvPr>
+            <p:cNvSpPr txBox="1"/>
+            <p:nvPr/>
+          </p:nvSpPr>
+          <p:spPr>
+            <a:xfrm>
+              <a:off x="8043538" y="3437905"/>
+              <a:ext cx="1671512" cy="564899"/>
+            </a:xfrm>
+            <a:prstGeom prst="rect">
+              <a:avLst/>
+            </a:prstGeom>
+            <a:noFill/>
+          </p:spPr>
+          <p:txBody>
+            <a:bodyPr wrap="square" rtlCol="0">
+              <a:spAutoFit/>
+            </a:bodyPr>
+            <a:lstStyle/>
+            <a:p>
+              <a:pPr algn="ctr"/>
+              <a:r>
+                <a:rPr lang="en-US" sz="2000" dirty="0">
+                  <a:latin typeface="Times" pitchFamily="2" charset="0"/>
+                </a:rPr>
+                <a:t>Not </a:t>
+              </a:r>
+            </a:p>
+            <a:p>
+              <a:pPr algn="ctr"/>
+              <a:r>
+                <a:rPr lang="en-US" sz="2000" dirty="0">
+                  <a:latin typeface="Times" pitchFamily="2" charset="0"/>
+                </a:rPr>
+                <a:t>Achievable</a:t>
+              </a:r>
+            </a:p>
+          </p:txBody>
+        </p:sp>
+        <p:sp>
+          <p:nvSpPr>
+            <p:cNvPr id="42" name="TextBox 41">
+              <a:extLst>
+                <a:ext uri="{FF2B5EF4-FFF2-40B4-BE49-F238E27FC236}">
+                  <a16:creationId xmlns:a16="http://schemas.microsoft.com/office/drawing/2014/main" id="{8F928854-459D-6A45-895B-59F2E95FE279}"/>
+                </a:ext>
+              </a:extLst>
+            </p:cNvPr>
+            <p:cNvSpPr txBox="1"/>
+            <p:nvPr/>
+          </p:nvSpPr>
+          <p:spPr>
+            <a:xfrm>
+              <a:off x="10447440" y="3437905"/>
+              <a:ext cx="1671512" cy="564899"/>
+            </a:xfrm>
+            <a:prstGeom prst="rect">
+              <a:avLst/>
+            </a:prstGeom>
+            <a:noFill/>
+          </p:spPr>
+          <p:txBody>
+            <a:bodyPr wrap="square" rtlCol="0">
+              <a:spAutoFit/>
+            </a:bodyPr>
+            <a:lstStyle/>
+            <a:p>
+              <a:pPr algn="ctr"/>
+              <a:r>
+                <a:rPr lang="en-US" sz="2000" dirty="0">
+                  <a:latin typeface="Times" pitchFamily="2" charset="0"/>
+                </a:rPr>
+                <a:t>Not </a:t>
+              </a:r>
+            </a:p>
+            <a:p>
+              <a:pPr algn="ctr"/>
+              <a:r>
+                <a:rPr lang="en-US" sz="2000" dirty="0">
+                  <a:latin typeface="Times" pitchFamily="2" charset="0"/>
+                </a:rPr>
+                <a:t>Achievable</a:t>
+              </a:r>
+            </a:p>
+          </p:txBody>
+        </p:sp>
+        <p:sp>
+          <p:nvSpPr>
+            <p:cNvPr id="47" name="7-Point Star 46">
+              <a:extLst>
+                <a:ext uri="{FF2B5EF4-FFF2-40B4-BE49-F238E27FC236}">
+                  <a16:creationId xmlns:a16="http://schemas.microsoft.com/office/drawing/2014/main" id="{1B26ADEB-EBD4-F045-B92C-E6E3F95871FF}"/>
+                </a:ext>
+              </a:extLst>
+            </p:cNvPr>
+            <p:cNvSpPr/>
+            <p:nvPr/>
+          </p:nvSpPr>
+          <p:spPr>
+            <a:xfrm>
+              <a:off x="7569421" y="2310328"/>
+              <a:ext cx="75718" cy="117381"/>
+            </a:xfrm>
+            <a:prstGeom prst="star7">
+              <a:avLst/>
+            </a:prstGeom>
+            <a:solidFill>
+              <a:srgbClr val="00B050"/>
+            </a:solidFill>
+            <a:ln>
+              <a:noFill/>
+            </a:ln>
+          </p:spPr>
+          <p:style>
+            <a:lnRef idx="2">
+              <a:schemeClr val="accent1">
+                <a:shade val="50000"/>
+              </a:schemeClr>
+            </a:lnRef>
+            <a:fillRef idx="1">
+              <a:schemeClr val="accent1"/>
+            </a:fillRef>
+            <a:effectRef idx="0">
+              <a:schemeClr val="accent1"/>
+            </a:effectRef>
+            <a:fontRef idx="minor">
+              <a:schemeClr val="lt1"/>
+            </a:fontRef>
+          </p:style>
+          <p:txBody>
+            <a:bodyPr rtlCol="0" anchor="ctr"/>
+            <a:lstStyle/>
+            <a:p>
+              <a:pPr algn="ctr"/>
+              <a:endParaRPr lang="en-US"/>
+            </a:p>
+          </p:txBody>
+        </p:sp>
+      </p:grpSp>
+      <p:grpSp>
+        <p:nvGrpSpPr>
           <p:cNvPr id="21" name="Group 20">
             <a:extLst>
               <a:ext uri="{FF2B5EF4-FFF2-40B4-BE49-F238E27FC236}">
@@ -2987,10 +3873,10 @@
         </p:nvGrpSpPr>
         <p:grpSpPr>
           <a:xfrm>
-            <a:off x="9428" y="127242"/>
-            <a:ext cx="12191999" cy="5206524"/>
-            <a:chOff x="551633" y="1071135"/>
-            <a:chExt cx="11094968" cy="4600835"/>
+            <a:off x="9429" y="127242"/>
+            <a:ext cx="5653411" cy="5206524"/>
+            <a:chOff x="551634" y="1071135"/>
+            <a:chExt cx="5144719" cy="4600835"/>
           </a:xfrm>
         </p:grpSpPr>
         <p:pic>
@@ -3008,14 +3894,14 @@
             <p:nvPr/>
           </p:nvPicPr>
           <p:blipFill rotWithShape="1">
-            <a:blip r:embed="rId2"/>
-            <a:srcRect l="4524" t="11233" r="4473" b="11985"/>
+            <a:blip r:embed="rId3"/>
+            <a:srcRect l="4524" t="11233" r="54689" b="11985"/>
             <a:stretch/>
           </p:blipFill>
           <p:spPr>
             <a:xfrm>
-              <a:off x="551633" y="1141581"/>
-              <a:ext cx="11094968" cy="4530389"/>
+              <a:off x="551634" y="1141581"/>
+              <a:ext cx="4972706" cy="4530389"/>
             </a:xfrm>
             <a:prstGeom prst="rect">
               <a:avLst/>
@@ -3481,339 +4367,6 @@
       </p:grpSp>
       <p:sp>
         <p:nvSpPr>
-          <p:cNvPr id="33" name="TextBox 32">
-            <a:extLst>
-              <a:ext uri="{FF2B5EF4-FFF2-40B4-BE49-F238E27FC236}">
-                <a16:creationId xmlns:a16="http://schemas.microsoft.com/office/drawing/2014/main" id="{30EEAF83-BDD0-1544-97C3-0BA5213ED311}"/>
-              </a:ext>
-            </a:extLst>
-          </p:cNvPr>
-          <p:cNvSpPr txBox="1"/>
-          <p:nvPr/>
-        </p:nvSpPr>
-        <p:spPr>
-          <a:xfrm>
-            <a:off x="7286920" y="4062954"/>
-            <a:ext cx="961534" cy="400110"/>
-          </a:xfrm>
-          <a:prstGeom prst="rect">
-            <a:avLst/>
-          </a:prstGeom>
-          <a:noFill/>
-        </p:spPr>
-        <p:txBody>
-          <a:bodyPr wrap="square" rtlCol="0">
-            <a:spAutoFit/>
-          </a:bodyPr>
-          <a:lstStyle/>
-          <a:p>
-            <a:r>
-              <a:rPr lang="en-US" sz="2000" dirty="0">
-                <a:latin typeface="Times" pitchFamily="2" charset="0"/>
-              </a:rPr>
-              <a:t>Right</a:t>
-            </a:r>
-          </a:p>
-        </p:txBody>
-      </p:sp>
-      <p:sp>
-        <p:nvSpPr>
-          <p:cNvPr id="34" name="TextBox 33">
-            <a:extLst>
-              <a:ext uri="{FF2B5EF4-FFF2-40B4-BE49-F238E27FC236}">
-                <a16:creationId xmlns:a16="http://schemas.microsoft.com/office/drawing/2014/main" id="{F4D73269-473A-C345-A030-068FF3E38007}"/>
-              </a:ext>
-            </a:extLst>
-          </p:cNvPr>
-          <p:cNvSpPr txBox="1"/>
-          <p:nvPr/>
-        </p:nvSpPr>
-        <p:spPr>
-          <a:xfrm>
-            <a:off x="8647188" y="4062954"/>
-            <a:ext cx="961534" cy="400110"/>
-          </a:xfrm>
-          <a:prstGeom prst="rect">
-            <a:avLst/>
-          </a:prstGeom>
-          <a:noFill/>
-        </p:spPr>
-        <p:txBody>
-          <a:bodyPr wrap="square" rtlCol="0">
-            <a:spAutoFit/>
-          </a:bodyPr>
-          <a:lstStyle/>
-          <a:p>
-            <a:r>
-              <a:rPr lang="en-US" sz="2000" dirty="0">
-                <a:latin typeface="Times" pitchFamily="2" charset="0"/>
-              </a:rPr>
-              <a:t>Up</a:t>
-            </a:r>
-          </a:p>
-        </p:txBody>
-      </p:sp>
-      <p:sp>
-        <p:nvSpPr>
-          <p:cNvPr id="35" name="TextBox 34">
-            <a:extLst>
-              <a:ext uri="{FF2B5EF4-FFF2-40B4-BE49-F238E27FC236}">
-                <a16:creationId xmlns:a16="http://schemas.microsoft.com/office/drawing/2014/main" id="{44AA773C-8801-1B44-A544-9E33AA71D63F}"/>
-              </a:ext>
-            </a:extLst>
-          </p:cNvPr>
-          <p:cNvSpPr txBox="1"/>
-          <p:nvPr/>
-        </p:nvSpPr>
-        <p:spPr>
-          <a:xfrm>
-            <a:off x="9777167" y="4062954"/>
-            <a:ext cx="961534" cy="400110"/>
-          </a:xfrm>
-          <a:prstGeom prst="rect">
-            <a:avLst/>
-          </a:prstGeom>
-          <a:noFill/>
-        </p:spPr>
-        <p:txBody>
-          <a:bodyPr wrap="square" rtlCol="0">
-            <a:spAutoFit/>
-          </a:bodyPr>
-          <a:lstStyle/>
-          <a:p>
-            <a:r>
-              <a:rPr lang="en-US" sz="2000" dirty="0">
-                <a:latin typeface="Times" pitchFamily="2" charset="0"/>
-              </a:rPr>
-              <a:t>Left</a:t>
-            </a:r>
-          </a:p>
-        </p:txBody>
-      </p:sp>
-      <p:sp>
-        <p:nvSpPr>
-          <p:cNvPr id="36" name="TextBox 35">
-            <a:extLst>
-              <a:ext uri="{FF2B5EF4-FFF2-40B4-BE49-F238E27FC236}">
-                <a16:creationId xmlns:a16="http://schemas.microsoft.com/office/drawing/2014/main" id="{9989E36F-D92E-8241-B0BB-BA8EDEA262C5}"/>
-              </a:ext>
-            </a:extLst>
-          </p:cNvPr>
-          <p:cNvSpPr txBox="1"/>
-          <p:nvPr/>
-        </p:nvSpPr>
-        <p:spPr>
-          <a:xfrm>
-            <a:off x="11059212" y="4062954"/>
-            <a:ext cx="961534" cy="400110"/>
-          </a:xfrm>
-          <a:prstGeom prst="rect">
-            <a:avLst/>
-          </a:prstGeom>
-          <a:noFill/>
-        </p:spPr>
-        <p:txBody>
-          <a:bodyPr wrap="square" rtlCol="0">
-            <a:spAutoFit/>
-          </a:bodyPr>
-          <a:lstStyle/>
-          <a:p>
-            <a:r>
-              <a:rPr lang="en-US" sz="2000" dirty="0">
-                <a:latin typeface="Times" pitchFamily="2" charset="0"/>
-              </a:rPr>
-              <a:t>Down</a:t>
-            </a:r>
-          </a:p>
-        </p:txBody>
-      </p:sp>
-      <p:sp>
-        <p:nvSpPr>
-          <p:cNvPr id="38" name="TextBox 37">
-            <a:extLst>
-              <a:ext uri="{FF2B5EF4-FFF2-40B4-BE49-F238E27FC236}">
-                <a16:creationId xmlns:a16="http://schemas.microsoft.com/office/drawing/2014/main" id="{5CBA4903-BB69-EB4D-876B-CE0770E4E2DE}"/>
-              </a:ext>
-            </a:extLst>
-          </p:cNvPr>
-          <p:cNvSpPr txBox="1"/>
-          <p:nvPr/>
-        </p:nvSpPr>
-        <p:spPr>
-          <a:xfrm rot="16200000">
-            <a:off x="7528576" y="2631164"/>
-            <a:ext cx="1259953" cy="400110"/>
-          </a:xfrm>
-          <a:prstGeom prst="rect">
-            <a:avLst/>
-          </a:prstGeom>
-          <a:noFill/>
-        </p:spPr>
-        <p:txBody>
-          <a:bodyPr wrap="square" rtlCol="0">
-            <a:spAutoFit/>
-          </a:bodyPr>
-          <a:lstStyle/>
-          <a:p>
-            <a:r>
-              <a:rPr lang="en-US" sz="2000" dirty="0">
-                <a:latin typeface="Times" pitchFamily="2" charset="0"/>
-              </a:rPr>
-              <a:t>INVALID</a:t>
-            </a:r>
-          </a:p>
-        </p:txBody>
-      </p:sp>
-      <p:sp>
-        <p:nvSpPr>
-          <p:cNvPr id="39" name="TextBox 38">
-            <a:extLst>
-              <a:ext uri="{FF2B5EF4-FFF2-40B4-BE49-F238E27FC236}">
-                <a16:creationId xmlns:a16="http://schemas.microsoft.com/office/drawing/2014/main" id="{4513D52D-A797-934B-972E-AEAA4831B11C}"/>
-              </a:ext>
-            </a:extLst>
-          </p:cNvPr>
-          <p:cNvSpPr txBox="1"/>
-          <p:nvPr/>
-        </p:nvSpPr>
-        <p:spPr>
-          <a:xfrm rot="16200000">
-            <a:off x="10024290" y="2631163"/>
-            <a:ext cx="1259953" cy="400110"/>
-          </a:xfrm>
-          <a:prstGeom prst="rect">
-            <a:avLst/>
-          </a:prstGeom>
-          <a:noFill/>
-        </p:spPr>
-        <p:txBody>
-          <a:bodyPr wrap="square" rtlCol="0">
-            <a:spAutoFit/>
-          </a:bodyPr>
-          <a:lstStyle/>
-          <a:p>
-            <a:r>
-              <a:rPr lang="en-US" sz="2000">
-                <a:latin typeface="Times" pitchFamily="2" charset="0"/>
-              </a:rPr>
-              <a:t>INVALID</a:t>
-            </a:r>
-            <a:endParaRPr lang="en-US" sz="2000" dirty="0">
-              <a:latin typeface="Times" pitchFamily="2" charset="0"/>
-            </a:endParaRPr>
-          </a:p>
-        </p:txBody>
-      </p:sp>
-      <p:sp>
-        <p:nvSpPr>
-          <p:cNvPr id="40" name="TextBox 39">
-            <a:extLst>
-              <a:ext uri="{FF2B5EF4-FFF2-40B4-BE49-F238E27FC236}">
-                <a16:creationId xmlns:a16="http://schemas.microsoft.com/office/drawing/2014/main" id="{68B4E8F6-91B0-E542-8A4F-D88BC10A2011}"/>
-              </a:ext>
-            </a:extLst>
-          </p:cNvPr>
-          <p:cNvSpPr txBox="1"/>
-          <p:nvPr/>
-        </p:nvSpPr>
-        <p:spPr>
-          <a:xfrm>
-            <a:off x="8358608" y="3035432"/>
-            <a:ext cx="617281" cy="369332"/>
-          </a:xfrm>
-          <a:prstGeom prst="rect">
-            <a:avLst/>
-          </a:prstGeom>
-          <a:noFill/>
-        </p:spPr>
-        <p:txBody>
-          <a:bodyPr wrap="square" rtlCol="0">
-            <a:spAutoFit/>
-          </a:bodyPr>
-          <a:lstStyle/>
-          <a:p>
-            <a:endParaRPr lang="en-US" dirty="0"/>
-          </a:p>
-        </p:txBody>
-      </p:sp>
-      <p:sp>
-        <p:nvSpPr>
-          <p:cNvPr id="41" name="TextBox 40">
-            <a:extLst>
-              <a:ext uri="{FF2B5EF4-FFF2-40B4-BE49-F238E27FC236}">
-                <a16:creationId xmlns:a16="http://schemas.microsoft.com/office/drawing/2014/main" id="{CAB9EA1B-86C2-B348-A69F-29AABA139C8D}"/>
-              </a:ext>
-            </a:extLst>
-          </p:cNvPr>
-          <p:cNvSpPr txBox="1"/>
-          <p:nvPr/>
-        </p:nvSpPr>
-        <p:spPr>
-          <a:xfrm>
-            <a:off x="8043538" y="3437905"/>
-            <a:ext cx="1671512" cy="707886"/>
-          </a:xfrm>
-          <a:prstGeom prst="rect">
-            <a:avLst/>
-          </a:prstGeom>
-          <a:noFill/>
-        </p:spPr>
-        <p:txBody>
-          <a:bodyPr wrap="square" rtlCol="0">
-            <a:spAutoFit/>
-          </a:bodyPr>
-          <a:lstStyle/>
-          <a:p>
-            <a:pPr algn="ctr"/>
-            <a:r>
-              <a:rPr lang="en-US" sz="2000" dirty="0">
-                <a:latin typeface="Times" pitchFamily="2" charset="0"/>
-              </a:rPr>
-              <a:t>Not Achievable</a:t>
-            </a:r>
-          </a:p>
-        </p:txBody>
-      </p:sp>
-      <p:sp>
-        <p:nvSpPr>
-          <p:cNvPr id="42" name="TextBox 41">
-            <a:extLst>
-              <a:ext uri="{FF2B5EF4-FFF2-40B4-BE49-F238E27FC236}">
-                <a16:creationId xmlns:a16="http://schemas.microsoft.com/office/drawing/2014/main" id="{8F928854-459D-6A45-895B-59F2E95FE279}"/>
-              </a:ext>
-            </a:extLst>
-          </p:cNvPr>
-          <p:cNvSpPr txBox="1"/>
-          <p:nvPr/>
-        </p:nvSpPr>
-        <p:spPr>
-          <a:xfrm>
-            <a:off x="10563164" y="3437905"/>
-            <a:ext cx="1671512" cy="707886"/>
-          </a:xfrm>
-          <a:prstGeom prst="rect">
-            <a:avLst/>
-          </a:prstGeom>
-          <a:noFill/>
-        </p:spPr>
-        <p:txBody>
-          <a:bodyPr wrap="square" rtlCol="0">
-            <a:spAutoFit/>
-          </a:bodyPr>
-          <a:lstStyle/>
-          <a:p>
-            <a:pPr algn="ctr"/>
-            <a:r>
-              <a:rPr lang="en-US" sz="2000" dirty="0">
-                <a:latin typeface="Times" pitchFamily="2" charset="0"/>
-              </a:rPr>
-              <a:t>Not Achievable</a:t>
-            </a:r>
-          </a:p>
-        </p:txBody>
-      </p:sp>
-      <p:sp>
-        <p:nvSpPr>
           <p:cNvPr id="43" name="TextBox 42">
             <a:extLst>
               <a:ext uri="{FF2B5EF4-FFF2-40B4-BE49-F238E27FC236}">
@@ -3863,7 +4416,7 @@
         </p:nvSpPr>
         <p:spPr>
           <a:xfrm>
-            <a:off x="2212670" y="-89515"/>
+            <a:off x="2069986" y="301966"/>
             <a:ext cx="961534" cy="400110"/>
           </a:xfrm>
           <a:prstGeom prst="rect">
@@ -3957,58 +4510,6 @@
               </a:rPr>
               <a:t>Down</a:t>
             </a:r>
-          </a:p>
-        </p:txBody>
-      </p:sp>
-      <p:sp>
-        <p:nvSpPr>
-          <p:cNvPr id="47" name="7-Point Star 46">
-            <a:extLst>
-              <a:ext uri="{FF2B5EF4-FFF2-40B4-BE49-F238E27FC236}">
-                <a16:creationId xmlns:a16="http://schemas.microsoft.com/office/drawing/2014/main" id="{1B26ADEB-EBD4-F045-B92C-E6E3F95871FF}"/>
-              </a:ext>
-            </a:extLst>
-          </p:cNvPr>
-          <p:cNvSpPr/>
-          <p:nvPr/>
-        </p:nvSpPr>
-        <p:spPr>
-          <a:xfrm>
-            <a:off x="7569421" y="2310328"/>
-            <a:ext cx="75718" cy="117381"/>
-          </a:xfrm>
-          <a:prstGeom prst="star7">
-            <a:avLst/>
-          </a:prstGeom>
-          <a:solidFill>
-            <a:srgbClr val="00B050"/>
-          </a:solidFill>
-          <a:ln>
-            <a:noFill/>
-          </a:ln>
-        </p:spPr>
-        <p:style>
-          <a:lnRef idx="2">
-            <a:schemeClr val="accent1">
-              <a:shade val="50000"/>
-            </a:schemeClr>
-          </a:lnRef>
-          <a:fillRef idx="1">
-            <a:schemeClr val="accent1"/>
-          </a:fillRef>
-          <a:effectRef idx="0">
-            <a:schemeClr val="accent1"/>
-          </a:effectRef>
-          <a:fontRef idx="minor">
-            <a:schemeClr val="lt1"/>
-          </a:fontRef>
-        </p:style>
-        <p:txBody>
-          <a:bodyPr rtlCol="0" anchor="ctr"/>
-          <a:lstStyle/>
-          <a:p>
-            <a:pPr algn="ctr"/>
-            <a:endParaRPr lang="en-US"/>
           </a:p>
         </p:txBody>
       </p:sp>
@@ -4284,4 +4785,299 @@
     </a:ext>
   </a:extLst>
 </a:theme>
+</file>
+
+<file path=ppt/theme/theme2.xml><?xml version="1.0" encoding="utf-8"?>
+<a:theme xmlns:a="http://schemas.openxmlformats.org/drawingml/2006/main" name="Office Theme">
+  <a:themeElements>
+    <a:clrScheme name="Office">
+      <a:dk1>
+        <a:sysClr val="windowText" lastClr="000000"/>
+      </a:dk1>
+      <a:lt1>
+        <a:sysClr val="window" lastClr="FFFFFF"/>
+      </a:lt1>
+      <a:dk2>
+        <a:srgbClr val="44546A"/>
+      </a:dk2>
+      <a:lt2>
+        <a:srgbClr val="E7E6E6"/>
+      </a:lt2>
+      <a:accent1>
+        <a:srgbClr val="4472C4"/>
+      </a:accent1>
+      <a:accent2>
+        <a:srgbClr val="ED7D31"/>
+      </a:accent2>
+      <a:accent3>
+        <a:srgbClr val="A5A5A5"/>
+      </a:accent3>
+      <a:accent4>
+        <a:srgbClr val="FFC000"/>
+      </a:accent4>
+      <a:accent5>
+        <a:srgbClr val="5B9BD5"/>
+      </a:accent5>
+      <a:accent6>
+        <a:srgbClr val="70AD47"/>
+      </a:accent6>
+      <a:hlink>
+        <a:srgbClr val="0563C1"/>
+      </a:hlink>
+      <a:folHlink>
+        <a:srgbClr val="954F72"/>
+      </a:folHlink>
+    </a:clrScheme>
+    <a:fontScheme name="Office">
+      <a:majorFont>
+        <a:latin typeface="Calibri Light" panose="020F0302020204030204"/>
+        <a:ea typeface=""/>
+        <a:cs typeface=""/>
+        <a:font script="Jpan" typeface="游ゴシック Light"/>
+        <a:font script="Hang" typeface="맑은 고딕"/>
+        <a:font script="Hans" typeface="等线 Light"/>
+        <a:font script="Hant" typeface="新細明體"/>
+        <a:font script="Arab" typeface="Times New Roman"/>
+        <a:font script="Hebr" typeface="Times New Roman"/>
+        <a:font script="Thai" typeface="Angsana New"/>
+        <a:font script="Ethi" typeface="Nyala"/>
+        <a:font script="Beng" typeface="Vrinda"/>
+        <a:font script="Gujr" typeface="Shruti"/>
+        <a:font script="Khmr" typeface="MoolBoran"/>
+        <a:font script="Knda" typeface="Tunga"/>
+        <a:font script="Guru" typeface="Raavi"/>
+        <a:font script="Cans" typeface="Euphemia"/>
+        <a:font script="Cher" typeface="Plantagenet Cherokee"/>
+        <a:font script="Yiii" typeface="Microsoft Yi Baiti"/>
+        <a:font script="Tibt" typeface="Microsoft Himalaya"/>
+        <a:font script="Thaa" typeface="MV Boli"/>
+        <a:font script="Deva" typeface="Mangal"/>
+        <a:font script="Telu" typeface="Gautami"/>
+        <a:font script="Taml" typeface="Latha"/>
+        <a:font script="Syrc" typeface="Estrangelo Edessa"/>
+        <a:font script="Orya" typeface="Kalinga"/>
+        <a:font script="Mlym" typeface="Kartika"/>
+        <a:font script="Laoo" typeface="DokChampa"/>
+        <a:font script="Sinh" typeface="Iskoola Pota"/>
+        <a:font script="Mong" typeface="Mongolian Baiti"/>
+        <a:font script="Viet" typeface="Times New Roman"/>
+        <a:font script="Uigh" typeface="Microsoft Uighur"/>
+        <a:font script="Geor" typeface="Sylfaen"/>
+        <a:font script="Armn" typeface="Arial"/>
+        <a:font script="Bugi" typeface="Leelawadee UI"/>
+        <a:font script="Bopo" typeface="Microsoft JhengHei"/>
+        <a:font script="Java" typeface="Javanese Text"/>
+        <a:font script="Lisu" typeface="Segoe UI"/>
+        <a:font script="Mymr" typeface="Myanmar Text"/>
+        <a:font script="Nkoo" typeface="Ebrima"/>
+        <a:font script="Olck" typeface="Nirmala UI"/>
+        <a:font script="Osma" typeface="Ebrima"/>
+        <a:font script="Phag" typeface="Phagspa"/>
+        <a:font script="Syrn" typeface="Estrangelo Edessa"/>
+        <a:font script="Syrj" typeface="Estrangelo Edessa"/>
+        <a:font script="Syre" typeface="Estrangelo Edessa"/>
+        <a:font script="Sora" typeface="Nirmala UI"/>
+        <a:font script="Tale" typeface="Microsoft Tai Le"/>
+        <a:font script="Talu" typeface="Microsoft New Tai Lue"/>
+        <a:font script="Tfng" typeface="Ebrima"/>
+      </a:majorFont>
+      <a:minorFont>
+        <a:latin typeface="Calibri" panose="020F0502020204030204"/>
+        <a:ea typeface=""/>
+        <a:cs typeface=""/>
+        <a:font script="Jpan" typeface="游ゴシック"/>
+        <a:font script="Hang" typeface="맑은 고딕"/>
+        <a:font script="Hans" typeface="等线"/>
+        <a:font script="Hant" typeface="新細明體"/>
+        <a:font script="Arab" typeface="Arial"/>
+        <a:font script="Hebr" typeface="Arial"/>
+        <a:font script="Thai" typeface="Cordia New"/>
+        <a:font script="Ethi" typeface="Nyala"/>
+        <a:font script="Beng" typeface="Vrinda"/>
+        <a:font script="Gujr" typeface="Shruti"/>
+        <a:font script="Khmr" typeface="DaunPenh"/>
+        <a:font script="Knda" typeface="Tunga"/>
+        <a:font script="Guru" typeface="Raavi"/>
+        <a:font script="Cans" typeface="Euphemia"/>
+        <a:font script="Cher" typeface="Plantagenet Cherokee"/>
+        <a:font script="Yiii" typeface="Microsoft Yi Baiti"/>
+        <a:font script="Tibt" typeface="Microsoft Himalaya"/>
+        <a:font script="Thaa" typeface="MV Boli"/>
+        <a:font script="Deva" typeface="Mangal"/>
+        <a:font script="Telu" typeface="Gautami"/>
+        <a:font script="Taml" typeface="Latha"/>
+        <a:font script="Syrc" typeface="Estrangelo Edessa"/>
+        <a:font script="Orya" typeface="Kalinga"/>
+        <a:font script="Mlym" typeface="Kartika"/>
+        <a:font script="Laoo" typeface="DokChampa"/>
+        <a:font script="Sinh" typeface="Iskoola Pota"/>
+        <a:font script="Mong" typeface="Mongolian Baiti"/>
+        <a:font script="Viet" typeface="Arial"/>
+        <a:font script="Uigh" typeface="Microsoft Uighur"/>
+        <a:font script="Geor" typeface="Sylfaen"/>
+        <a:font script="Armn" typeface="Arial"/>
+        <a:font script="Bugi" typeface="Leelawadee UI"/>
+        <a:font script="Bopo" typeface="Microsoft JhengHei"/>
+        <a:font script="Java" typeface="Javanese Text"/>
+        <a:font script="Lisu" typeface="Segoe UI"/>
+        <a:font script="Mymr" typeface="Myanmar Text"/>
+        <a:font script="Nkoo" typeface="Ebrima"/>
+        <a:font script="Olck" typeface="Nirmala UI"/>
+        <a:font script="Osma" typeface="Ebrima"/>
+        <a:font script="Phag" typeface="Phagspa"/>
+        <a:font script="Syrn" typeface="Estrangelo Edessa"/>
+        <a:font script="Syrj" typeface="Estrangelo Edessa"/>
+        <a:font script="Syre" typeface="Estrangelo Edessa"/>
+        <a:font script="Sora" typeface="Nirmala UI"/>
+        <a:font script="Tale" typeface="Microsoft Tai Le"/>
+        <a:font script="Talu" typeface="Microsoft New Tai Lue"/>
+        <a:font script="Tfng" typeface="Ebrima"/>
+      </a:minorFont>
+    </a:fontScheme>
+    <a:fmtScheme name="Office">
+      <a:fillStyleLst>
+        <a:solidFill>
+          <a:schemeClr val="phClr"/>
+        </a:solidFill>
+        <a:gradFill rotWithShape="1">
+          <a:gsLst>
+            <a:gs pos="0">
+              <a:schemeClr val="phClr">
+                <a:lumMod val="110000"/>
+                <a:satMod val="105000"/>
+                <a:tint val="67000"/>
+              </a:schemeClr>
+            </a:gs>
+            <a:gs pos="50000">
+              <a:schemeClr val="phClr">
+                <a:lumMod val="105000"/>
+                <a:satMod val="103000"/>
+                <a:tint val="73000"/>
+              </a:schemeClr>
+            </a:gs>
+            <a:gs pos="100000">
+              <a:schemeClr val="phClr">
+                <a:lumMod val="105000"/>
+                <a:satMod val="109000"/>
+                <a:tint val="81000"/>
+              </a:schemeClr>
+            </a:gs>
+          </a:gsLst>
+          <a:lin ang="5400000" scaled="0"/>
+        </a:gradFill>
+        <a:gradFill rotWithShape="1">
+          <a:gsLst>
+            <a:gs pos="0">
+              <a:schemeClr val="phClr">
+                <a:satMod val="103000"/>
+                <a:lumMod val="102000"/>
+                <a:tint val="94000"/>
+              </a:schemeClr>
+            </a:gs>
+            <a:gs pos="50000">
+              <a:schemeClr val="phClr">
+                <a:satMod val="110000"/>
+                <a:lumMod val="100000"/>
+                <a:shade val="100000"/>
+              </a:schemeClr>
+            </a:gs>
+            <a:gs pos="100000">
+              <a:schemeClr val="phClr">
+                <a:lumMod val="99000"/>
+                <a:satMod val="120000"/>
+                <a:shade val="78000"/>
+              </a:schemeClr>
+            </a:gs>
+          </a:gsLst>
+          <a:lin ang="5400000" scaled="0"/>
+        </a:gradFill>
+      </a:fillStyleLst>
+      <a:lnStyleLst>
+        <a:ln w="6350" cap="flat" cmpd="sng" algn="ctr">
+          <a:solidFill>
+            <a:schemeClr val="phClr"/>
+          </a:solidFill>
+          <a:prstDash val="solid"/>
+          <a:miter lim="800000"/>
+        </a:ln>
+        <a:ln w="12700" cap="flat" cmpd="sng" algn="ctr">
+          <a:solidFill>
+            <a:schemeClr val="phClr"/>
+          </a:solidFill>
+          <a:prstDash val="solid"/>
+          <a:miter lim="800000"/>
+        </a:ln>
+        <a:ln w="19050" cap="flat" cmpd="sng" algn="ctr">
+          <a:solidFill>
+            <a:schemeClr val="phClr"/>
+          </a:solidFill>
+          <a:prstDash val="solid"/>
+          <a:miter lim="800000"/>
+        </a:ln>
+      </a:lnStyleLst>
+      <a:effectStyleLst>
+        <a:effectStyle>
+          <a:effectLst/>
+        </a:effectStyle>
+        <a:effectStyle>
+          <a:effectLst/>
+        </a:effectStyle>
+        <a:effectStyle>
+          <a:effectLst>
+            <a:outerShdw blurRad="57150" dist="19050" dir="5400000" algn="ctr" rotWithShape="0">
+              <a:srgbClr val="000000">
+                <a:alpha val="63000"/>
+              </a:srgbClr>
+            </a:outerShdw>
+          </a:effectLst>
+        </a:effectStyle>
+      </a:effectStyleLst>
+      <a:bgFillStyleLst>
+        <a:solidFill>
+          <a:schemeClr val="phClr"/>
+        </a:solidFill>
+        <a:solidFill>
+          <a:schemeClr val="phClr">
+            <a:tint val="95000"/>
+            <a:satMod val="170000"/>
+          </a:schemeClr>
+        </a:solidFill>
+        <a:gradFill rotWithShape="1">
+          <a:gsLst>
+            <a:gs pos="0">
+              <a:schemeClr val="phClr">
+                <a:tint val="93000"/>
+                <a:satMod val="150000"/>
+                <a:shade val="98000"/>
+                <a:lumMod val="102000"/>
+              </a:schemeClr>
+            </a:gs>
+            <a:gs pos="50000">
+              <a:schemeClr val="phClr">
+                <a:tint val="98000"/>
+                <a:satMod val="130000"/>
+                <a:shade val="90000"/>
+                <a:lumMod val="103000"/>
+              </a:schemeClr>
+            </a:gs>
+            <a:gs pos="100000">
+              <a:schemeClr val="phClr">
+                <a:shade val="63000"/>
+                <a:satMod val="120000"/>
+              </a:schemeClr>
+            </a:gs>
+          </a:gsLst>
+          <a:lin ang="5400000" scaled="0"/>
+        </a:gradFill>
+      </a:bgFillStyleLst>
+    </a:fmtScheme>
+  </a:themeElements>
+  <a:objectDefaults/>
+  <a:extraClrSchemeLst/>
+  <a:extLst>
+    <a:ext uri="{05A4C25C-085E-4340-85A3-A5531E510DB2}">
+      <thm15:themeFamily xmlns:thm15="http://schemas.microsoft.com/office/thememl/2012/main" name="Office Theme" id="{62F939B6-93AF-4DB8-9C6B-D6C7DFDC589F}" vid="{4A3C46E8-61CC-4603-A589-7422A47A8E4A}"/>
+    </a:ext>
+  </a:extLst>
+</a:theme>
 </file>
</xml_diff>

<commit_message>
A lot of changes to figures.
</commit_message>
<xml_diff>
--- a/journalWallFriction/pictures/pdf/Reflection.pptx
+++ b/journalWallFriction/pictures/pdf/Reflection.pptx
@@ -3620,7 +3620,7 @@
           </p:nvSpPr>
           <p:spPr>
             <a:xfrm rot="16200000">
-              <a:off x="7613440" y="2631164"/>
+              <a:off x="7574865" y="2631164"/>
               <a:ext cx="1259953" cy="400110"/>
             </a:xfrm>
             <a:prstGeom prst="rect">
@@ -3820,7 +3820,7 @@
           </p:nvSpPr>
           <p:spPr>
             <a:xfrm>
-              <a:off x="7569421" y="2310328"/>
+              <a:off x="7654286" y="2310328"/>
               <a:ext cx="75718" cy="117381"/>
             </a:xfrm>
             <a:prstGeom prst="star7">

</xml_diff>

<commit_message>
One other image changed.
</commit_message>
<xml_diff>
--- a/journalWallFriction/pictures/pdf/Reflection.pptx
+++ b/journalWallFriction/pictures/pdf/Reflection.pptx
@@ -197,7 +197,7 @@
           <a:p>
             <a:fld id="{04AB8D65-C370-A548-86E8-A0E663CC7657}" type="datetimeFigureOut">
               <a:rPr lang="en-US" smtClean="0"/>
-              <a:t>5/13/18</a:t>
+              <a:t>5/29/18</a:t>
             </a:fld>
             <a:endParaRPr lang="en-US"/>
           </a:p>
@@ -679,7 +679,7 @@
           <a:p>
             <a:fld id="{DCE07B5D-B400-BC43-987A-7D391B225B8E}" type="datetimeFigureOut">
               <a:rPr lang="en-US" smtClean="0"/>
-              <a:t>5/9/18</a:t>
+              <a:t>5/29/18</a:t>
             </a:fld>
             <a:endParaRPr lang="en-US"/>
           </a:p>
@@ -849,7 +849,7 @@
           <a:p>
             <a:fld id="{DCE07B5D-B400-BC43-987A-7D391B225B8E}" type="datetimeFigureOut">
               <a:rPr lang="en-US" smtClean="0"/>
-              <a:t>5/9/18</a:t>
+              <a:t>5/29/18</a:t>
             </a:fld>
             <a:endParaRPr lang="en-US"/>
           </a:p>
@@ -1029,7 +1029,7 @@
           <a:p>
             <a:fld id="{DCE07B5D-B400-BC43-987A-7D391B225B8E}" type="datetimeFigureOut">
               <a:rPr lang="en-US" smtClean="0"/>
-              <a:t>5/9/18</a:t>
+              <a:t>5/29/18</a:t>
             </a:fld>
             <a:endParaRPr lang="en-US"/>
           </a:p>
@@ -1199,7 +1199,7 @@
           <a:p>
             <a:fld id="{DCE07B5D-B400-BC43-987A-7D391B225B8E}" type="datetimeFigureOut">
               <a:rPr lang="en-US" smtClean="0"/>
-              <a:t>5/9/18</a:t>
+              <a:t>5/29/18</a:t>
             </a:fld>
             <a:endParaRPr lang="en-US"/>
           </a:p>
@@ -1445,7 +1445,7 @@
           <a:p>
             <a:fld id="{DCE07B5D-B400-BC43-987A-7D391B225B8E}" type="datetimeFigureOut">
               <a:rPr lang="en-US" smtClean="0"/>
-              <a:t>5/9/18</a:t>
+              <a:t>5/29/18</a:t>
             </a:fld>
             <a:endParaRPr lang="en-US"/>
           </a:p>
@@ -1677,7 +1677,7 @@
           <a:p>
             <a:fld id="{DCE07B5D-B400-BC43-987A-7D391B225B8E}" type="datetimeFigureOut">
               <a:rPr lang="en-US" smtClean="0"/>
-              <a:t>5/9/18</a:t>
+              <a:t>5/29/18</a:t>
             </a:fld>
             <a:endParaRPr lang="en-US"/>
           </a:p>
@@ -2044,7 +2044,7 @@
           <a:p>
             <a:fld id="{DCE07B5D-B400-BC43-987A-7D391B225B8E}" type="datetimeFigureOut">
               <a:rPr lang="en-US" smtClean="0"/>
-              <a:t>5/9/18</a:t>
+              <a:t>5/29/18</a:t>
             </a:fld>
             <a:endParaRPr lang="en-US"/>
           </a:p>
@@ -2162,7 +2162,7 @@
           <a:p>
             <a:fld id="{DCE07B5D-B400-BC43-987A-7D391B225B8E}" type="datetimeFigureOut">
               <a:rPr lang="en-US" smtClean="0"/>
-              <a:t>5/9/18</a:t>
+              <a:t>5/29/18</a:t>
             </a:fld>
             <a:endParaRPr lang="en-US"/>
           </a:p>
@@ -2257,7 +2257,7 @@
           <a:p>
             <a:fld id="{DCE07B5D-B400-BC43-987A-7D391B225B8E}" type="datetimeFigureOut">
               <a:rPr lang="en-US" smtClean="0"/>
-              <a:t>5/9/18</a:t>
+              <a:t>5/29/18</a:t>
             </a:fld>
             <a:endParaRPr lang="en-US"/>
           </a:p>
@@ -2534,7 +2534,7 @@
           <a:p>
             <a:fld id="{DCE07B5D-B400-BC43-987A-7D391B225B8E}" type="datetimeFigureOut">
               <a:rPr lang="en-US" smtClean="0"/>
-              <a:t>5/9/18</a:t>
+              <a:t>5/29/18</a:t>
             </a:fld>
             <a:endParaRPr lang="en-US"/>
           </a:p>
@@ -2791,7 +2791,7 @@
           <a:p>
             <a:fld id="{DCE07B5D-B400-BC43-987A-7D391B225B8E}" type="datetimeFigureOut">
               <a:rPr lang="en-US" smtClean="0"/>
-              <a:t>5/9/18</a:t>
+              <a:t>5/29/18</a:t>
             </a:fld>
             <a:endParaRPr lang="en-US"/>
           </a:p>
@@ -3004,7 +3004,7 @@
           <a:p>
             <a:fld id="{DCE07B5D-B400-BC43-987A-7D391B225B8E}" type="datetimeFigureOut">
               <a:rPr lang="en-US" smtClean="0"/>
-              <a:t>5/9/18</a:t>
+              <a:t>5/29/18</a:t>
             </a:fld>
             <a:endParaRPr lang="en-US"/>
           </a:p>
@@ -3424,9 +3424,9 @@
         <p:grpSpPr>
           <a:xfrm>
             <a:off x="5268437" y="206962"/>
-            <a:ext cx="7118383" cy="5126803"/>
+            <a:ext cx="6998383" cy="5126803"/>
             <a:chOff x="6293374" y="688153"/>
-            <a:chExt cx="5825578" cy="4091233"/>
+            <a:chExt cx="5727372" cy="4091233"/>
           </a:xfrm>
         </p:grpSpPr>
         <p:pic>
@@ -3620,8 +3620,8 @@
           </p:nvSpPr>
           <p:spPr>
             <a:xfrm rot="16200000">
-              <a:off x="7574865" y="2631164"/>
-              <a:ext cx="1259953" cy="400110"/>
+              <a:off x="7421828" y="2463856"/>
+              <a:ext cx="1454191" cy="327444"/>
             </a:xfrm>
             <a:prstGeom prst="rect">
               <a:avLst/>
@@ -3638,44 +3638,19 @@
                 <a:rPr lang="en-US" sz="2000" dirty="0">
                   <a:latin typeface="Times" pitchFamily="2" charset="0"/>
                 </a:rPr>
-                <a:t>INVALID</a:t>
+                <a:t>m</a:t>
               </a:r>
-            </a:p>
-          </p:txBody>
-        </p:sp>
-        <p:sp>
-          <p:nvSpPr>
-            <p:cNvPr id="39" name="TextBox 38">
-              <a:extLst>
-                <a:ext uri="{FF2B5EF4-FFF2-40B4-BE49-F238E27FC236}">
-                  <a16:creationId xmlns:a16="http://schemas.microsoft.com/office/drawing/2014/main" id="{4513D52D-A797-934B-972E-AEAA4831B11C}"/>
-                </a:ext>
-              </a:extLst>
-            </p:cNvPr>
-            <p:cNvSpPr txBox="1"/>
-            <p:nvPr/>
-          </p:nvSpPr>
-          <p:spPr>
-            <a:xfrm rot="16200000">
-              <a:off x="9985717" y="2631163"/>
-              <a:ext cx="1259953" cy="400110"/>
-            </a:xfrm>
-            <a:prstGeom prst="rect">
-              <a:avLst/>
-            </a:prstGeom>
-            <a:noFill/>
-          </p:spPr>
-          <p:txBody>
-            <a:bodyPr wrap="square" rtlCol="0">
-              <a:spAutoFit/>
-            </a:bodyPr>
-            <a:lstStyle/>
-            <a:p>
+              <a:r>
+                <a:rPr lang="en-US" sz="2000" baseline="-25000" dirty="0">
+                  <a:latin typeface="Times" pitchFamily="2" charset="0"/>
+                </a:rPr>
+                <a:t>1 </a:t>
+              </a:r>
               <a:r>
                 <a:rPr lang="en-US" sz="2000" dirty="0">
                   <a:latin typeface="Times" pitchFamily="2" charset="0"/>
                 </a:rPr>
-                <a:t>INVALID</a:t>
+                <a:t>error</a:t>
               </a:r>
             </a:p>
           </p:txBody>
@@ -3709,100 +3684,6 @@
             <a:lstStyle/>
             <a:p>
               <a:endParaRPr lang="en-US" dirty="0"/>
-            </a:p>
-          </p:txBody>
-        </p:sp>
-        <p:sp>
-          <p:nvSpPr>
-            <p:cNvPr id="41" name="TextBox 40">
-              <a:extLst>
-                <a:ext uri="{FF2B5EF4-FFF2-40B4-BE49-F238E27FC236}">
-                  <a16:creationId xmlns:a16="http://schemas.microsoft.com/office/drawing/2014/main" id="{CAB9EA1B-86C2-B348-A69F-29AABA139C8D}"/>
-                </a:ext>
-              </a:extLst>
-            </p:cNvPr>
-            <p:cNvSpPr txBox="1"/>
-            <p:nvPr/>
-          </p:nvSpPr>
-          <p:spPr>
-            <a:xfrm>
-              <a:off x="8043538" y="3437905"/>
-              <a:ext cx="1671512" cy="564899"/>
-            </a:xfrm>
-            <a:prstGeom prst="rect">
-              <a:avLst/>
-            </a:prstGeom>
-            <a:noFill/>
-          </p:spPr>
-          <p:txBody>
-            <a:bodyPr wrap="square" rtlCol="0">
-              <a:spAutoFit/>
-            </a:bodyPr>
-            <a:lstStyle/>
-            <a:p>
-              <a:pPr algn="ctr"/>
-              <a:r>
-                <a:rPr lang="en-US" sz="2000" dirty="0">
-                  <a:latin typeface="Times" pitchFamily="2" charset="0"/>
-                </a:rPr>
-                <a:t>Not </a:t>
-              </a:r>
-            </a:p>
-            <a:p>
-              <a:pPr algn="ctr"/>
-              <a:r>
-                <a:rPr lang="en-US" sz="2000" dirty="0">
-                  <a:latin typeface="Times" pitchFamily="2" charset="0"/>
-                </a:rPr>
-                <a:t>Achievable</a:t>
-              </a:r>
-            </a:p>
-          </p:txBody>
-        </p:sp>
-        <p:sp>
-          <p:nvSpPr>
-            <p:cNvPr id="42" name="TextBox 41">
-              <a:extLst>
-                <a:ext uri="{FF2B5EF4-FFF2-40B4-BE49-F238E27FC236}">
-                  <a16:creationId xmlns:a16="http://schemas.microsoft.com/office/drawing/2014/main" id="{8F928854-459D-6A45-895B-59F2E95FE279}"/>
-                </a:ext>
-              </a:extLst>
-            </p:cNvPr>
-            <p:cNvSpPr txBox="1"/>
-            <p:nvPr/>
-          </p:nvSpPr>
-          <p:spPr>
-            <a:xfrm>
-              <a:off x="10447440" y="3437905"/>
-              <a:ext cx="1671512" cy="564899"/>
-            </a:xfrm>
-            <a:prstGeom prst="rect">
-              <a:avLst/>
-            </a:prstGeom>
-            <a:noFill/>
-          </p:spPr>
-          <p:txBody>
-            <a:bodyPr wrap="square" rtlCol="0">
-              <a:spAutoFit/>
-            </a:bodyPr>
-            <a:lstStyle/>
-            <a:p>
-              <a:pPr algn="ctr"/>
-              <a:r>
-                <a:rPr lang="en-US" sz="2000" dirty="0">
-                  <a:latin typeface="Times" pitchFamily="2" charset="0"/>
-                </a:rPr>
-                <a:t>Not </a:t>
-              </a:r>
-            </a:p>
-            <a:p>
-              <a:pPr algn="ctr"/>
-              <a:r>
-                <a:rPr lang="en-US" sz="2000" dirty="0">
-                  <a:latin typeface="Times" pitchFamily="2" charset="0"/>
-                </a:rPr>
-                <a:t>Achievable</a:t>
-              </a:r>
             </a:p>
           </p:txBody>
         </p:sp>
@@ -3873,7 +3754,7 @@
         </p:nvGrpSpPr>
         <p:grpSpPr>
           <a:xfrm>
-            <a:off x="9429" y="127242"/>
+            <a:off x="9429" y="80107"/>
             <a:ext cx="5653411" cy="5206524"/>
             <a:chOff x="551634" y="1071135"/>
             <a:chExt cx="5144719" cy="4600835"/>
@@ -4509,6 +4390,507 @@
                 <a:latin typeface="Times" pitchFamily="2" charset="0"/>
               </a:rPr>
               <a:t>Down</a:t>
+            </a:r>
+          </a:p>
+        </p:txBody>
+      </p:sp>
+      <p:sp>
+        <p:nvSpPr>
+          <p:cNvPr id="3" name="TextBox 2">
+            <a:extLst>
+              <a:ext uri="{FF2B5EF4-FFF2-40B4-BE49-F238E27FC236}">
+                <a16:creationId xmlns:a16="http://schemas.microsoft.com/office/drawing/2014/main" id="{69C7E762-97F9-4F4D-BD02-048EAFD47C59}"/>
+              </a:ext>
+            </a:extLst>
+          </p:cNvPr>
+          <p:cNvSpPr txBox="1"/>
+          <p:nvPr/>
+        </p:nvSpPr>
+        <p:spPr>
+          <a:xfrm>
+            <a:off x="4747822" y="-119680"/>
+            <a:ext cx="240326" cy="477054"/>
+          </a:xfrm>
+          <a:prstGeom prst="rect">
+            <a:avLst/>
+          </a:prstGeom>
+          <a:noFill/>
+        </p:spPr>
+        <p:txBody>
+          <a:bodyPr wrap="square" rtlCol="0">
+            <a:spAutoFit/>
+          </a:bodyPr>
+          <a:lstStyle/>
+          <a:p>
+            <a:r>
+              <a:rPr lang="en-US" sz="2500" dirty="0">
+                <a:latin typeface="Times" pitchFamily="2" charset="0"/>
+              </a:rPr>
+              <a:t>1</a:t>
+            </a:r>
+          </a:p>
+        </p:txBody>
+      </p:sp>
+      <p:sp>
+        <p:nvSpPr>
+          <p:cNvPr id="37" name="TextBox 36">
+            <a:extLst>
+              <a:ext uri="{FF2B5EF4-FFF2-40B4-BE49-F238E27FC236}">
+                <a16:creationId xmlns:a16="http://schemas.microsoft.com/office/drawing/2014/main" id="{B3D9EBF9-DC43-D649-AD17-0659EE595BB6}"/>
+              </a:ext>
+            </a:extLst>
+          </p:cNvPr>
+          <p:cNvSpPr txBox="1"/>
+          <p:nvPr/>
+        </p:nvSpPr>
+        <p:spPr>
+          <a:xfrm>
+            <a:off x="-83868" y="-111286"/>
+            <a:ext cx="240326" cy="477054"/>
+          </a:xfrm>
+          <a:prstGeom prst="rect">
+            <a:avLst/>
+          </a:prstGeom>
+          <a:noFill/>
+        </p:spPr>
+        <p:txBody>
+          <a:bodyPr wrap="square" rtlCol="0">
+            <a:spAutoFit/>
+          </a:bodyPr>
+          <a:lstStyle/>
+          <a:p>
+            <a:r>
+              <a:rPr lang="en-US" sz="2500" dirty="0">
+                <a:latin typeface="Times" pitchFamily="2" charset="0"/>
+              </a:rPr>
+              <a:t>2</a:t>
+            </a:r>
+          </a:p>
+        </p:txBody>
+      </p:sp>
+      <p:sp>
+        <p:nvSpPr>
+          <p:cNvPr id="49" name="TextBox 48">
+            <a:extLst>
+              <a:ext uri="{FF2B5EF4-FFF2-40B4-BE49-F238E27FC236}">
+                <a16:creationId xmlns:a16="http://schemas.microsoft.com/office/drawing/2014/main" id="{9A0FADDA-87B3-6A45-B755-BF18AC863E63}"/>
+              </a:ext>
+            </a:extLst>
+          </p:cNvPr>
+          <p:cNvSpPr txBox="1"/>
+          <p:nvPr/>
+        </p:nvSpPr>
+        <p:spPr>
+          <a:xfrm>
+            <a:off x="-53176" y="5166901"/>
+            <a:ext cx="240326" cy="477054"/>
+          </a:xfrm>
+          <a:prstGeom prst="rect">
+            <a:avLst/>
+          </a:prstGeom>
+          <a:noFill/>
+        </p:spPr>
+        <p:txBody>
+          <a:bodyPr wrap="square" rtlCol="0">
+            <a:spAutoFit/>
+          </a:bodyPr>
+          <a:lstStyle/>
+          <a:p>
+            <a:r>
+              <a:rPr lang="en-US" sz="2500" dirty="0">
+                <a:latin typeface="Times" pitchFamily="2" charset="0"/>
+              </a:rPr>
+              <a:t>3</a:t>
+            </a:r>
+          </a:p>
+        </p:txBody>
+      </p:sp>
+      <p:sp>
+        <p:nvSpPr>
+          <p:cNvPr id="50" name="TextBox 49">
+            <a:extLst>
+              <a:ext uri="{FF2B5EF4-FFF2-40B4-BE49-F238E27FC236}">
+                <a16:creationId xmlns:a16="http://schemas.microsoft.com/office/drawing/2014/main" id="{3430DE89-5ED6-8E40-9DC4-966F65D7A8E0}"/>
+              </a:ext>
+            </a:extLst>
+          </p:cNvPr>
+          <p:cNvSpPr txBox="1"/>
+          <p:nvPr/>
+        </p:nvSpPr>
+        <p:spPr>
+          <a:xfrm>
+            <a:off x="4673425" y="5155761"/>
+            <a:ext cx="240326" cy="477054"/>
+          </a:xfrm>
+          <a:prstGeom prst="rect">
+            <a:avLst/>
+          </a:prstGeom>
+          <a:noFill/>
+        </p:spPr>
+        <p:txBody>
+          <a:bodyPr wrap="square" rtlCol="0">
+            <a:spAutoFit/>
+          </a:bodyPr>
+          <a:lstStyle/>
+          <a:p>
+            <a:r>
+              <a:rPr lang="en-US" sz="2500" dirty="0">
+                <a:latin typeface="Times" pitchFamily="2" charset="0"/>
+              </a:rPr>
+              <a:t>4</a:t>
+            </a:r>
+          </a:p>
+        </p:txBody>
+      </p:sp>
+      <p:sp>
+        <p:nvSpPr>
+          <p:cNvPr id="52" name="TextBox 51">
+            <a:extLst>
+              <a:ext uri="{FF2B5EF4-FFF2-40B4-BE49-F238E27FC236}">
+                <a16:creationId xmlns:a16="http://schemas.microsoft.com/office/drawing/2014/main" id="{DBB69398-A722-1649-89EB-76485B621DD7}"/>
+              </a:ext>
+            </a:extLst>
+          </p:cNvPr>
+          <p:cNvSpPr txBox="1"/>
+          <p:nvPr/>
+        </p:nvSpPr>
+        <p:spPr>
+          <a:xfrm rot="16200000">
+            <a:off x="9576781" y="2331664"/>
+            <a:ext cx="1822275" cy="400110"/>
+          </a:xfrm>
+          <a:prstGeom prst="rect">
+            <a:avLst/>
+          </a:prstGeom>
+          <a:noFill/>
+        </p:spPr>
+        <p:txBody>
+          <a:bodyPr wrap="square" rtlCol="0">
+            <a:spAutoFit/>
+          </a:bodyPr>
+          <a:lstStyle/>
+          <a:p>
+            <a:r>
+              <a:rPr lang="en-US" sz="2000" dirty="0">
+                <a:latin typeface="Times" pitchFamily="2" charset="0"/>
+              </a:rPr>
+              <a:t>m</a:t>
+            </a:r>
+            <a:r>
+              <a:rPr lang="en-US" sz="2000" baseline="-25000" dirty="0">
+                <a:latin typeface="Times" pitchFamily="2" charset="0"/>
+              </a:rPr>
+              <a:t>1 </a:t>
+            </a:r>
+            <a:r>
+              <a:rPr lang="en-US" sz="2000" dirty="0">
+                <a:latin typeface="Times" pitchFamily="2" charset="0"/>
+              </a:rPr>
+              <a:t>error</a:t>
+            </a:r>
+          </a:p>
+        </p:txBody>
+      </p:sp>
+      <p:sp>
+        <p:nvSpPr>
+          <p:cNvPr id="4" name="Rectangle 3">
+            <a:extLst>
+              <a:ext uri="{FF2B5EF4-FFF2-40B4-BE49-F238E27FC236}">
+                <a16:creationId xmlns:a16="http://schemas.microsoft.com/office/drawing/2014/main" id="{02BEF303-A25F-174D-86F0-660B7D83975F}"/>
+              </a:ext>
+            </a:extLst>
+          </p:cNvPr>
+          <p:cNvSpPr/>
+          <p:nvPr/>
+        </p:nvSpPr>
+        <p:spPr>
+          <a:xfrm>
+            <a:off x="7690068" y="519830"/>
+            <a:ext cx="290938" cy="3968766"/>
+          </a:xfrm>
+          <a:prstGeom prst="rect">
+            <a:avLst/>
+          </a:prstGeom>
+          <a:solidFill>
+            <a:schemeClr val="bg2">
+              <a:alpha val="45000"/>
+            </a:schemeClr>
+          </a:solidFill>
+          <a:ln>
+            <a:noFill/>
+          </a:ln>
+        </p:spPr>
+        <p:style>
+          <a:lnRef idx="2">
+            <a:schemeClr val="accent1">
+              <a:shade val="50000"/>
+            </a:schemeClr>
+          </a:lnRef>
+          <a:fillRef idx="1">
+            <a:schemeClr val="accent1"/>
+          </a:fillRef>
+          <a:effectRef idx="0">
+            <a:schemeClr val="accent1"/>
+          </a:effectRef>
+          <a:fontRef idx="minor">
+            <a:schemeClr val="lt1"/>
+          </a:fontRef>
+        </p:style>
+        <p:txBody>
+          <a:bodyPr rtlCol="0" anchor="ctr"/>
+          <a:lstStyle/>
+          <a:p>
+            <a:pPr algn="ctr"/>
+            <a:endParaRPr lang="en-US"/>
+          </a:p>
+        </p:txBody>
+      </p:sp>
+      <p:sp>
+        <p:nvSpPr>
+          <p:cNvPr id="53" name="TextBox 52">
+            <a:extLst>
+              <a:ext uri="{FF2B5EF4-FFF2-40B4-BE49-F238E27FC236}">
+                <a16:creationId xmlns:a16="http://schemas.microsoft.com/office/drawing/2014/main" id="{F4A90695-571C-D149-9A41-75DEA3A0ECE9}"/>
+              </a:ext>
+            </a:extLst>
+          </p:cNvPr>
+          <p:cNvSpPr txBox="1"/>
+          <p:nvPr/>
+        </p:nvSpPr>
+        <p:spPr>
+          <a:xfrm rot="16200000">
+            <a:off x="6891376" y="2437238"/>
+            <a:ext cx="1822275" cy="400110"/>
+          </a:xfrm>
+          <a:prstGeom prst="rect">
+            <a:avLst/>
+          </a:prstGeom>
+          <a:noFill/>
+        </p:spPr>
+        <p:txBody>
+          <a:bodyPr wrap="square" rtlCol="0">
+            <a:spAutoFit/>
+          </a:bodyPr>
+          <a:lstStyle/>
+          <a:p>
+            <a:r>
+              <a:rPr lang="en-US" sz="2000" dirty="0">
+                <a:latin typeface="Times" pitchFamily="2" charset="0"/>
+              </a:rPr>
+              <a:t>m</a:t>
+            </a:r>
+            <a:r>
+              <a:rPr lang="en-US" sz="2000" baseline="-25000" dirty="0">
+                <a:latin typeface="Times" pitchFamily="2" charset="0"/>
+              </a:rPr>
+              <a:t>1 </a:t>
+            </a:r>
+            <a:r>
+              <a:rPr lang="en-US" sz="2000" dirty="0">
+                <a:latin typeface="Times" pitchFamily="2" charset="0"/>
+              </a:rPr>
+              <a:t>error</a:t>
+            </a:r>
+          </a:p>
+        </p:txBody>
+      </p:sp>
+      <p:sp>
+        <p:nvSpPr>
+          <p:cNvPr id="54" name="TextBox 53">
+            <a:extLst>
+              <a:ext uri="{FF2B5EF4-FFF2-40B4-BE49-F238E27FC236}">
+                <a16:creationId xmlns:a16="http://schemas.microsoft.com/office/drawing/2014/main" id="{BA5552FD-1CE2-B343-AB02-6CEF9E17F1B3}"/>
+              </a:ext>
+            </a:extLst>
+          </p:cNvPr>
+          <p:cNvSpPr txBox="1"/>
+          <p:nvPr/>
+        </p:nvSpPr>
+        <p:spPr>
+          <a:xfrm rot="16200000">
+            <a:off x="7458386" y="2450152"/>
+            <a:ext cx="1822275" cy="400110"/>
+          </a:xfrm>
+          <a:prstGeom prst="rect">
+            <a:avLst/>
+          </a:prstGeom>
+          <a:noFill/>
+        </p:spPr>
+        <p:txBody>
+          <a:bodyPr wrap="square" rtlCol="0">
+            <a:spAutoFit/>
+          </a:bodyPr>
+          <a:lstStyle/>
+          <a:p>
+            <a:r>
+              <a:rPr lang="en-US" sz="2000" dirty="0">
+                <a:latin typeface="Times" pitchFamily="2" charset="0"/>
+              </a:rPr>
+              <a:t>m</a:t>
+            </a:r>
+            <a:r>
+              <a:rPr lang="en-US" sz="2000" baseline="-25000" dirty="0">
+                <a:latin typeface="Times" pitchFamily="2" charset="0"/>
+              </a:rPr>
+              <a:t>2 </a:t>
+            </a:r>
+            <a:r>
+              <a:rPr lang="en-US" sz="2000" dirty="0">
+                <a:latin typeface="Times" pitchFamily="2" charset="0"/>
+              </a:rPr>
+              <a:t>error</a:t>
+            </a:r>
+          </a:p>
+        </p:txBody>
+      </p:sp>
+      <p:sp>
+        <p:nvSpPr>
+          <p:cNvPr id="55" name="Rectangle 54">
+            <a:extLst>
+              <a:ext uri="{FF2B5EF4-FFF2-40B4-BE49-F238E27FC236}">
+                <a16:creationId xmlns:a16="http://schemas.microsoft.com/office/drawing/2014/main" id="{2894DE24-FCA3-A847-A134-B5CE801C9D7C}"/>
+              </a:ext>
+            </a:extLst>
+          </p:cNvPr>
+          <p:cNvSpPr/>
+          <p:nvPr/>
+        </p:nvSpPr>
+        <p:spPr>
+          <a:xfrm>
+            <a:off x="10630910" y="522284"/>
+            <a:ext cx="290938" cy="3968766"/>
+          </a:xfrm>
+          <a:prstGeom prst="rect">
+            <a:avLst/>
+          </a:prstGeom>
+          <a:solidFill>
+            <a:schemeClr val="bg2">
+              <a:alpha val="45000"/>
+            </a:schemeClr>
+          </a:solidFill>
+          <a:ln>
+            <a:noFill/>
+          </a:ln>
+        </p:spPr>
+        <p:style>
+          <a:lnRef idx="2">
+            <a:schemeClr val="accent1">
+              <a:shade val="50000"/>
+            </a:schemeClr>
+          </a:lnRef>
+          <a:fillRef idx="1">
+            <a:schemeClr val="accent1"/>
+          </a:fillRef>
+          <a:effectRef idx="0">
+            <a:schemeClr val="accent1"/>
+          </a:effectRef>
+          <a:fontRef idx="minor">
+            <a:schemeClr val="lt1"/>
+          </a:fontRef>
+        </p:style>
+        <p:txBody>
+          <a:bodyPr rtlCol="0" anchor="ctr"/>
+          <a:lstStyle/>
+          <a:p>
+            <a:pPr algn="ctr"/>
+            <a:endParaRPr lang="en-US"/>
+          </a:p>
+        </p:txBody>
+      </p:sp>
+      <p:sp>
+        <p:nvSpPr>
+          <p:cNvPr id="57" name="TextBox 56">
+            <a:extLst>
+              <a:ext uri="{FF2B5EF4-FFF2-40B4-BE49-F238E27FC236}">
+                <a16:creationId xmlns:a16="http://schemas.microsoft.com/office/drawing/2014/main" id="{58505A8F-E365-0941-BC1A-6FEB77C876D6}"/>
+              </a:ext>
+            </a:extLst>
+          </p:cNvPr>
+          <p:cNvSpPr txBox="1"/>
+          <p:nvPr/>
+        </p:nvSpPr>
+        <p:spPr>
+          <a:xfrm rot="16200000">
+            <a:off x="9857071" y="2328095"/>
+            <a:ext cx="1822275" cy="400110"/>
+          </a:xfrm>
+          <a:prstGeom prst="rect">
+            <a:avLst/>
+          </a:prstGeom>
+          <a:noFill/>
+        </p:spPr>
+        <p:txBody>
+          <a:bodyPr wrap="square" rtlCol="0">
+            <a:spAutoFit/>
+          </a:bodyPr>
+          <a:lstStyle/>
+          <a:p>
+            <a:r>
+              <a:rPr lang="en-US" sz="2000" dirty="0">
+                <a:latin typeface="Times" pitchFamily="2" charset="0"/>
+              </a:rPr>
+              <a:t>m</a:t>
+            </a:r>
+            <a:r>
+              <a:rPr lang="en-US" sz="2000" baseline="-25000" dirty="0">
+                <a:latin typeface="Times" pitchFamily="2" charset="0"/>
+              </a:rPr>
+              <a:t>1 </a:t>
+            </a:r>
+            <a:r>
+              <a:rPr lang="en-US" sz="2000" dirty="0">
+                <a:latin typeface="Times" pitchFamily="2" charset="0"/>
+              </a:rPr>
+              <a:t>error</a:t>
+            </a:r>
+          </a:p>
+        </p:txBody>
+      </p:sp>
+      <p:sp>
+        <p:nvSpPr>
+          <p:cNvPr id="58" name="TextBox 57">
+            <a:extLst>
+              <a:ext uri="{FF2B5EF4-FFF2-40B4-BE49-F238E27FC236}">
+                <a16:creationId xmlns:a16="http://schemas.microsoft.com/office/drawing/2014/main" id="{91C34D7B-282B-BF43-9C1E-A2135FDDCE0C}"/>
+              </a:ext>
+            </a:extLst>
+          </p:cNvPr>
+          <p:cNvSpPr txBox="1"/>
+          <p:nvPr/>
+        </p:nvSpPr>
+        <p:spPr>
+          <a:xfrm rot="16200000">
+            <a:off x="10426313" y="2434815"/>
+            <a:ext cx="1822275" cy="400110"/>
+          </a:xfrm>
+          <a:prstGeom prst="rect">
+            <a:avLst/>
+          </a:prstGeom>
+          <a:noFill/>
+        </p:spPr>
+        <p:txBody>
+          <a:bodyPr wrap="square" rtlCol="0">
+            <a:spAutoFit/>
+          </a:bodyPr>
+          <a:lstStyle/>
+          <a:p>
+            <a:r>
+              <a:rPr lang="en-US" sz="2000" dirty="0">
+                <a:latin typeface="Times" pitchFamily="2" charset="0"/>
+              </a:rPr>
+              <a:t>m</a:t>
+            </a:r>
+            <a:r>
+              <a:rPr lang="en-US" sz="2000" baseline="-25000" dirty="0">
+                <a:latin typeface="Times" pitchFamily="2" charset="0"/>
+              </a:rPr>
+              <a:t>2 </a:t>
+            </a:r>
+            <a:r>
+              <a:rPr lang="en-US" sz="2000" dirty="0">
+                <a:latin typeface="Times" pitchFamily="2" charset="0"/>
+              </a:rPr>
+              <a:t>error</a:t>
             </a:r>
           </a:p>
         </p:txBody>

</xml_diff>

<commit_message>
changed m1 and m2 error
</commit_message>
<xml_diff>
--- a/journalWallFriction/pictures/pdf/Reflection.pptx
+++ b/journalWallFriction/pictures/pdf/Reflection.pptx
@@ -197,7 +197,7 @@
           <a:p>
             <a:fld id="{04AB8D65-C370-A548-86E8-A0E663CC7657}" type="datetimeFigureOut">
               <a:rPr lang="en-US" smtClean="0"/>
-              <a:t>5/29/18</a:t>
+              <a:t>5/30/18</a:t>
             </a:fld>
             <a:endParaRPr lang="en-US"/>
           </a:p>
@@ -679,7 +679,7 @@
           <a:p>
             <a:fld id="{DCE07B5D-B400-BC43-987A-7D391B225B8E}" type="datetimeFigureOut">
               <a:rPr lang="en-US" smtClean="0"/>
-              <a:t>5/29/18</a:t>
+              <a:t>5/30/18</a:t>
             </a:fld>
             <a:endParaRPr lang="en-US"/>
           </a:p>
@@ -849,7 +849,7 @@
           <a:p>
             <a:fld id="{DCE07B5D-B400-BC43-987A-7D391B225B8E}" type="datetimeFigureOut">
               <a:rPr lang="en-US" smtClean="0"/>
-              <a:t>5/29/18</a:t>
+              <a:t>5/30/18</a:t>
             </a:fld>
             <a:endParaRPr lang="en-US"/>
           </a:p>
@@ -1029,7 +1029,7 @@
           <a:p>
             <a:fld id="{DCE07B5D-B400-BC43-987A-7D391B225B8E}" type="datetimeFigureOut">
               <a:rPr lang="en-US" smtClean="0"/>
-              <a:t>5/29/18</a:t>
+              <a:t>5/30/18</a:t>
             </a:fld>
             <a:endParaRPr lang="en-US"/>
           </a:p>
@@ -1199,7 +1199,7 @@
           <a:p>
             <a:fld id="{DCE07B5D-B400-BC43-987A-7D391B225B8E}" type="datetimeFigureOut">
               <a:rPr lang="en-US" smtClean="0"/>
-              <a:t>5/29/18</a:t>
+              <a:t>5/30/18</a:t>
             </a:fld>
             <a:endParaRPr lang="en-US"/>
           </a:p>
@@ -1445,7 +1445,7 @@
           <a:p>
             <a:fld id="{DCE07B5D-B400-BC43-987A-7D391B225B8E}" type="datetimeFigureOut">
               <a:rPr lang="en-US" smtClean="0"/>
-              <a:t>5/29/18</a:t>
+              <a:t>5/30/18</a:t>
             </a:fld>
             <a:endParaRPr lang="en-US"/>
           </a:p>
@@ -1677,7 +1677,7 @@
           <a:p>
             <a:fld id="{DCE07B5D-B400-BC43-987A-7D391B225B8E}" type="datetimeFigureOut">
               <a:rPr lang="en-US" smtClean="0"/>
-              <a:t>5/29/18</a:t>
+              <a:t>5/30/18</a:t>
             </a:fld>
             <a:endParaRPr lang="en-US"/>
           </a:p>
@@ -2044,7 +2044,7 @@
           <a:p>
             <a:fld id="{DCE07B5D-B400-BC43-987A-7D391B225B8E}" type="datetimeFigureOut">
               <a:rPr lang="en-US" smtClean="0"/>
-              <a:t>5/29/18</a:t>
+              <a:t>5/30/18</a:t>
             </a:fld>
             <a:endParaRPr lang="en-US"/>
           </a:p>
@@ -2162,7 +2162,7 @@
           <a:p>
             <a:fld id="{DCE07B5D-B400-BC43-987A-7D391B225B8E}" type="datetimeFigureOut">
               <a:rPr lang="en-US" smtClean="0"/>
-              <a:t>5/29/18</a:t>
+              <a:t>5/30/18</a:t>
             </a:fld>
             <a:endParaRPr lang="en-US"/>
           </a:p>
@@ -2257,7 +2257,7 @@
           <a:p>
             <a:fld id="{DCE07B5D-B400-BC43-987A-7D391B225B8E}" type="datetimeFigureOut">
               <a:rPr lang="en-US" smtClean="0"/>
-              <a:t>5/29/18</a:t>
+              <a:t>5/30/18</a:t>
             </a:fld>
             <a:endParaRPr lang="en-US"/>
           </a:p>
@@ -2534,7 +2534,7 @@
           <a:p>
             <a:fld id="{DCE07B5D-B400-BC43-987A-7D391B225B8E}" type="datetimeFigureOut">
               <a:rPr lang="en-US" smtClean="0"/>
-              <a:t>5/29/18</a:t>
+              <a:t>5/30/18</a:t>
             </a:fld>
             <a:endParaRPr lang="en-US"/>
           </a:p>
@@ -2791,7 +2791,7 @@
           <a:p>
             <a:fld id="{DCE07B5D-B400-BC43-987A-7D391B225B8E}" type="datetimeFigureOut">
               <a:rPr lang="en-US" smtClean="0"/>
-              <a:t>5/29/18</a:t>
+              <a:t>5/30/18</a:t>
             </a:fld>
             <a:endParaRPr lang="en-US"/>
           </a:p>
@@ -3004,7 +3004,7 @@
           <a:p>
             <a:fld id="{DCE07B5D-B400-BC43-987A-7D391B225B8E}" type="datetimeFigureOut">
               <a:rPr lang="en-US" smtClean="0"/>
-              <a:t>5/29/18</a:t>
+              <a:t>5/30/18</a:t>
             </a:fld>
             <a:endParaRPr lang="en-US"/>
           </a:p>
@@ -4659,7 +4659,7 @@
         </p:nvSpPr>
         <p:spPr>
           <a:xfrm rot="16200000">
-            <a:off x="6891376" y="2437238"/>
+            <a:off x="6918993" y="3211356"/>
             <a:ext cx="1822275" cy="400110"/>
           </a:xfrm>
           <a:prstGeom prst="rect">
@@ -4689,7 +4689,19 @@
               <a:rPr lang="en-US" sz="2000" dirty="0">
                 <a:latin typeface="Times" pitchFamily="2" charset="0"/>
               </a:rPr>
-              <a:t>error</a:t>
+              <a:t>and m</a:t>
+            </a:r>
+            <a:r>
+              <a:rPr lang="en-US" sz="2000" baseline="-25000" dirty="0">
+                <a:latin typeface="Times" pitchFamily="2" charset="0"/>
+              </a:rPr>
+              <a:t>2</a:t>
+            </a:r>
+            <a:r>
+              <a:rPr lang="en-US" sz="2000" dirty="0">
+                <a:latin typeface="Times" pitchFamily="2" charset="0"/>
+              </a:rPr>
+              <a:t> error</a:t>
             </a:r>
           </a:p>
         </p:txBody>
@@ -4799,55 +4811,6 @@
       </p:sp>
       <p:sp>
         <p:nvSpPr>
-          <p:cNvPr id="57" name="TextBox 56">
-            <a:extLst>
-              <a:ext uri="{FF2B5EF4-FFF2-40B4-BE49-F238E27FC236}">
-                <a16:creationId xmlns:a16="http://schemas.microsoft.com/office/drawing/2014/main" id="{58505A8F-E365-0941-BC1A-6FEB77C876D6}"/>
-              </a:ext>
-            </a:extLst>
-          </p:cNvPr>
-          <p:cNvSpPr txBox="1"/>
-          <p:nvPr/>
-        </p:nvSpPr>
-        <p:spPr>
-          <a:xfrm rot="16200000">
-            <a:off x="9857071" y="2328095"/>
-            <a:ext cx="1822275" cy="400110"/>
-          </a:xfrm>
-          <a:prstGeom prst="rect">
-            <a:avLst/>
-          </a:prstGeom>
-          <a:noFill/>
-        </p:spPr>
-        <p:txBody>
-          <a:bodyPr wrap="square" rtlCol="0">
-            <a:spAutoFit/>
-          </a:bodyPr>
-          <a:lstStyle/>
-          <a:p>
-            <a:r>
-              <a:rPr lang="en-US" sz="2000" dirty="0">
-                <a:latin typeface="Times" pitchFamily="2" charset="0"/>
-              </a:rPr>
-              <a:t>m</a:t>
-            </a:r>
-            <a:r>
-              <a:rPr lang="en-US" sz="2000" baseline="-25000" dirty="0">
-                <a:latin typeface="Times" pitchFamily="2" charset="0"/>
-              </a:rPr>
-              <a:t>1 </a:t>
-            </a:r>
-            <a:r>
-              <a:rPr lang="en-US" sz="2000" dirty="0">
-                <a:latin typeface="Times" pitchFamily="2" charset="0"/>
-              </a:rPr>
-              <a:t>error</a:t>
-            </a:r>
-          </a:p>
-        </p:txBody>
-      </p:sp>
-      <p:sp>
-        <p:nvSpPr>
           <p:cNvPr id="58" name="TextBox 57">
             <a:extLst>
               <a:ext uri="{FF2B5EF4-FFF2-40B4-BE49-F238E27FC236}">
@@ -4891,6 +4854,67 @@
                 <a:latin typeface="Times" pitchFamily="2" charset="0"/>
               </a:rPr>
               <a:t>error</a:t>
+            </a:r>
+          </a:p>
+        </p:txBody>
+      </p:sp>
+      <p:sp>
+        <p:nvSpPr>
+          <p:cNvPr id="39" name="TextBox 38">
+            <a:extLst>
+              <a:ext uri="{FF2B5EF4-FFF2-40B4-BE49-F238E27FC236}">
+                <a16:creationId xmlns:a16="http://schemas.microsoft.com/office/drawing/2014/main" id="{4287A2E3-EC83-254C-AF79-B4331E9BE463}"/>
+              </a:ext>
+            </a:extLst>
+          </p:cNvPr>
+          <p:cNvSpPr txBox="1"/>
+          <p:nvPr/>
+        </p:nvSpPr>
+        <p:spPr>
+          <a:xfrm rot="16200000">
+            <a:off x="9865242" y="3113240"/>
+            <a:ext cx="1822275" cy="400110"/>
+          </a:xfrm>
+          <a:prstGeom prst="rect">
+            <a:avLst/>
+          </a:prstGeom>
+          <a:noFill/>
+        </p:spPr>
+        <p:txBody>
+          <a:bodyPr wrap="square" rtlCol="0">
+            <a:spAutoFit/>
+          </a:bodyPr>
+          <a:lstStyle/>
+          <a:p>
+            <a:r>
+              <a:rPr lang="en-US" sz="2000" dirty="0">
+                <a:latin typeface="Times" pitchFamily="2" charset="0"/>
+              </a:rPr>
+              <a:t>m</a:t>
+            </a:r>
+            <a:r>
+              <a:rPr lang="en-US" sz="2000" baseline="-25000" dirty="0">
+                <a:latin typeface="Times" pitchFamily="2" charset="0"/>
+              </a:rPr>
+              <a:t>1 </a:t>
+            </a:r>
+            <a:r>
+              <a:rPr lang="en-US" sz="2000" dirty="0">
+                <a:latin typeface="Times" pitchFamily="2" charset="0"/>
+              </a:rPr>
+              <a:t>and m</a:t>
+            </a:r>
+            <a:r>
+              <a:rPr lang="en-US" sz="2000" baseline="-25000" dirty="0">
+                <a:latin typeface="Times" pitchFamily="2" charset="0"/>
+              </a:rPr>
+              <a:t>2</a:t>
+            </a:r>
+            <a:r>
+              <a:rPr lang="en-US" sz="2000" dirty="0">
+                <a:latin typeface="Times" pitchFamily="2" charset="0"/>
+              </a:rPr>
+              <a:t> error</a:t>
             </a:r>
           </a:p>
         </p:txBody>

</xml_diff>

<commit_message>
A lot of images have changed.
</commit_message>
<xml_diff>
--- a/journalWallFriction/pictures/pdf/Reflection.pptx
+++ b/journalWallFriction/pictures/pdf/Reflection.pptx
@@ -3635,16 +3635,22 @@
             <a:lstStyle/>
             <a:p>
               <a:r>
-                <a:rPr lang="en-US" sz="2000" dirty="0">
+                <a:rPr lang="en-US" sz="2000" i="1" dirty="0">
                   <a:latin typeface="Times" pitchFamily="2" charset="0"/>
                 </a:rPr>
                 <a:t>m</a:t>
               </a:r>
               <a:r>
+                <a:rPr lang="en-US" sz="2000" i="1" baseline="-25000" dirty="0">
+                  <a:latin typeface="Times" pitchFamily="2" charset="0"/>
+                </a:rPr>
+                <a:t>1</a:t>
+              </a:r>
+              <a:r>
                 <a:rPr lang="en-US" sz="2000" baseline="-25000" dirty="0">
                   <a:latin typeface="Times" pitchFamily="2" charset="0"/>
                 </a:rPr>
-                <a:t>1 </a:t>
+                <a:t> </a:t>
               </a:r>
               <a:r>
                 <a:rPr lang="en-US" sz="2000" dirty="0">
@@ -4571,16 +4577,22 @@
           <a:lstStyle/>
           <a:p>
             <a:r>
-              <a:rPr lang="en-US" sz="2000" dirty="0">
+              <a:rPr lang="en-US" sz="2000" i="1" dirty="0">
                 <a:latin typeface="Times" pitchFamily="2" charset="0"/>
               </a:rPr>
               <a:t>m</a:t>
             </a:r>
             <a:r>
+              <a:rPr lang="en-US" sz="2000" i="1" baseline="-25000" dirty="0">
+                <a:latin typeface="Times" pitchFamily="2" charset="0"/>
+              </a:rPr>
+              <a:t>1</a:t>
+            </a:r>
+            <a:r>
               <a:rPr lang="en-US" sz="2000" baseline="-25000" dirty="0">
                 <a:latin typeface="Times" pitchFamily="2" charset="0"/>
               </a:rPr>
-              <a:t>1 </a:t>
+              <a:t> </a:t>
             </a:r>
             <a:r>
               <a:rPr lang="en-US" sz="2000" dirty="0">
@@ -4674,25 +4686,37 @@
           <a:lstStyle/>
           <a:p>
             <a:r>
+              <a:rPr lang="en-US" sz="2000" i="1" dirty="0">
+                <a:latin typeface="Times" pitchFamily="2" charset="0"/>
+              </a:rPr>
+              <a:t>m</a:t>
+            </a:r>
+            <a:r>
+              <a:rPr lang="en-US" sz="2000" i="1" baseline="-25000" dirty="0">
+                <a:latin typeface="Times" pitchFamily="2" charset="0"/>
+              </a:rPr>
+              <a:t>1</a:t>
+            </a:r>
+            <a:r>
+              <a:rPr lang="en-US" sz="2000" baseline="-25000" dirty="0">
+                <a:latin typeface="Times" pitchFamily="2" charset="0"/>
+              </a:rPr>
+              <a:t> </a:t>
+            </a:r>
+            <a:r>
               <a:rPr lang="en-US" sz="2000" dirty="0">
                 <a:latin typeface="Times" pitchFamily="2" charset="0"/>
               </a:rPr>
-              <a:t>m</a:t>
-            </a:r>
-            <a:r>
-              <a:rPr lang="en-US" sz="2000" baseline="-25000" dirty="0">
+              <a:t>and </a:t>
+            </a:r>
+            <a:r>
+              <a:rPr lang="en-US" sz="2000" i="1" dirty="0">
                 <a:latin typeface="Times" pitchFamily="2" charset="0"/>
               </a:rPr>
-              <a:t>1 </a:t>
-            </a:r>
-            <a:r>
-              <a:rPr lang="en-US" sz="2000" dirty="0">
-                <a:latin typeface="Times" pitchFamily="2" charset="0"/>
-              </a:rPr>
-              <a:t>and m</a:t>
-            </a:r>
-            <a:r>
-              <a:rPr lang="en-US" sz="2000" baseline="-25000" dirty="0">
+              <a:t>m</a:t>
+            </a:r>
+            <a:r>
+              <a:rPr lang="en-US" sz="2000" i="1" baseline="-25000" dirty="0">
                 <a:latin typeface="Times" pitchFamily="2" charset="0"/>
               </a:rPr>
               <a:t>2</a:t>
@@ -4735,16 +4759,22 @@
           <a:lstStyle/>
           <a:p>
             <a:r>
-              <a:rPr lang="en-US" sz="2000" dirty="0">
+              <a:rPr lang="en-US" sz="2000" i="1" dirty="0">
                 <a:latin typeface="Times" pitchFamily="2" charset="0"/>
               </a:rPr>
               <a:t>m</a:t>
             </a:r>
             <a:r>
+              <a:rPr lang="en-US" sz="2000" i="1" baseline="-25000" dirty="0">
+                <a:latin typeface="Times" pitchFamily="2" charset="0"/>
+              </a:rPr>
+              <a:t>2</a:t>
+            </a:r>
+            <a:r>
               <a:rPr lang="en-US" sz="2000" baseline="-25000" dirty="0">
                 <a:latin typeface="Times" pitchFamily="2" charset="0"/>
               </a:rPr>
-              <a:t>2 </a:t>
+              <a:t> </a:t>
             </a:r>
             <a:r>
               <a:rPr lang="en-US" sz="2000" dirty="0">
@@ -4838,16 +4868,22 @@
           <a:lstStyle/>
           <a:p>
             <a:r>
-              <a:rPr lang="en-US" sz="2000" dirty="0">
+              <a:rPr lang="en-US" sz="2000" i="1" dirty="0">
                 <a:latin typeface="Times" pitchFamily="2" charset="0"/>
               </a:rPr>
               <a:t>m</a:t>
             </a:r>
             <a:r>
+              <a:rPr lang="en-US" sz="2000" i="1" baseline="-25000" dirty="0">
+                <a:latin typeface="Times" pitchFamily="2" charset="0"/>
+              </a:rPr>
+              <a:t>2</a:t>
+            </a:r>
+            <a:r>
               <a:rPr lang="en-US" sz="2000" baseline="-25000" dirty="0">
                 <a:latin typeface="Times" pitchFamily="2" charset="0"/>
               </a:rPr>
-              <a:t>2 </a:t>
+              <a:t> </a:t>
             </a:r>
             <a:r>
               <a:rPr lang="en-US" sz="2000" dirty="0">
@@ -4887,25 +4923,37 @@
           <a:lstStyle/>
           <a:p>
             <a:r>
+              <a:rPr lang="en-US" sz="2000" i="1" dirty="0">
+                <a:latin typeface="Times" pitchFamily="2" charset="0"/>
+              </a:rPr>
+              <a:t>m</a:t>
+            </a:r>
+            <a:r>
+              <a:rPr lang="en-US" sz="2000" i="1" baseline="-25000" dirty="0">
+                <a:latin typeface="Times" pitchFamily="2" charset="0"/>
+              </a:rPr>
+              <a:t>1</a:t>
+            </a:r>
+            <a:r>
+              <a:rPr lang="en-US" sz="2000" baseline="-25000" dirty="0">
+                <a:latin typeface="Times" pitchFamily="2" charset="0"/>
+              </a:rPr>
+              <a:t> </a:t>
+            </a:r>
+            <a:r>
               <a:rPr lang="en-US" sz="2000" dirty="0">
                 <a:latin typeface="Times" pitchFamily="2" charset="0"/>
               </a:rPr>
-              <a:t>m</a:t>
-            </a:r>
-            <a:r>
-              <a:rPr lang="en-US" sz="2000" baseline="-25000" dirty="0">
+              <a:t>and </a:t>
+            </a:r>
+            <a:r>
+              <a:rPr lang="en-US" sz="2000" i="1" dirty="0">
                 <a:latin typeface="Times" pitchFamily="2" charset="0"/>
               </a:rPr>
-              <a:t>1 </a:t>
-            </a:r>
-            <a:r>
-              <a:rPr lang="en-US" sz="2000" dirty="0">
-                <a:latin typeface="Times" pitchFamily="2" charset="0"/>
-              </a:rPr>
-              <a:t>and m</a:t>
-            </a:r>
-            <a:r>
-              <a:rPr lang="en-US" sz="2000" baseline="-25000" dirty="0">
+              <a:t>m</a:t>
+            </a:r>
+            <a:r>
+              <a:rPr lang="en-US" sz="2000" i="1" baseline="-25000" dirty="0">
                 <a:latin typeface="Times" pitchFamily="2" charset="0"/>
               </a:rPr>
               <a:t>2</a:t>

</xml_diff>

<commit_message>
Cleaned up the paper -- full pass
</commit_message>
<xml_diff>
--- a/journalWallFriction/pictures/pdf/Reflection.pptx
+++ b/journalWallFriction/pictures/pdf/Reflection.pptx
@@ -2,7 +2,7 @@
 <file path=ppt/presentation.xml><?xml version="1.0" encoding="utf-8"?>
 <p:presentation xmlns:a="http://schemas.openxmlformats.org/drawingml/2006/main" xmlns:r="http://schemas.openxmlformats.org/officeDocument/2006/relationships" xmlns:p="http://schemas.openxmlformats.org/presentationml/2006/main" saveSubsetFonts="1" autoCompressPictures="0">
   <p:sldMasterIdLst>
-    <p:sldMasterId id="2147483660" r:id="rId1"/>
+    <p:sldMasterId id="2147483696" r:id="rId1"/>
   </p:sldMasterIdLst>
   <p:notesMasterIdLst>
     <p:notesMasterId r:id="rId3"/>
@@ -10,7 +10,7 @@
   <p:sldIdLst>
     <p:sldId id="256" r:id="rId2"/>
   </p:sldIdLst>
-  <p:sldSz cx="12192000" cy="5486400"/>
+  <p:sldSz cx="12573000" cy="5668963"/>
   <p:notesSz cx="6858000" cy="9144000"/>
   <p:defaultTextStyle>
     <a:defPPr>
@@ -197,7 +197,7 @@
           <a:p>
             <a:fld id="{04AB8D65-C370-A548-86E8-A0E663CC7657}" type="datetimeFigureOut">
               <a:rPr lang="en-US" smtClean="0"/>
-              <a:t>5/30/18</a:t>
+              <a:t>10/6/18</a:t>
             </a:fld>
             <a:endParaRPr lang="en-US"/>
           </a:p>
@@ -215,8 +215,8 @@
         </p:nvSpPr>
         <p:spPr>
           <a:xfrm>
-            <a:off x="0" y="1143000"/>
-            <a:ext cx="6858000" cy="3086100"/>
+            <a:off x="6350" y="1143000"/>
+            <a:ext cx="6845300" cy="3086100"/>
           </a:xfrm>
           <a:prstGeom prst="rect">
             <a:avLst/>
@@ -491,7 +491,12 @@
             <p:ph type="sldImg"/>
           </p:nvPr>
         </p:nvSpPr>
-        <p:spPr/>
+        <p:spPr>
+          <a:xfrm>
+            <a:off x="6350" y="1143000"/>
+            <a:ext cx="6845300" cy="3086100"/>
+          </a:xfrm>
+        </p:spPr>
       </p:sp>
       <p:sp>
         <p:nvSpPr>
@@ -577,15 +582,15 @@
         </p:nvSpPr>
         <p:spPr>
           <a:xfrm>
-            <a:off x="1524000" y="897890"/>
-            <a:ext cx="9144000" cy="1910080"/>
+            <a:off x="1571625" y="927768"/>
+            <a:ext cx="9429750" cy="1973639"/>
           </a:xfrm>
         </p:spPr>
         <p:txBody>
           <a:bodyPr anchor="b"/>
           <a:lstStyle>
             <a:lvl1pPr algn="ctr">
-              <a:defRPr sz="4800"/>
+              <a:defRPr sz="4960"/>
             </a:lvl1pPr>
           </a:lstStyle>
           <a:p>
@@ -609,8 +614,8 @@
         </p:nvSpPr>
         <p:spPr>
           <a:xfrm>
-            <a:off x="1524000" y="2881630"/>
-            <a:ext cx="9144000" cy="1324610"/>
+            <a:off x="1571625" y="2977518"/>
+            <a:ext cx="9429750" cy="1368687"/>
           </a:xfrm>
         </p:spPr>
         <p:txBody>
@@ -618,39 +623,39 @@
           <a:lstStyle>
             <a:lvl1pPr marL="0" indent="0" algn="ctr">
               <a:buNone/>
-              <a:defRPr sz="1920"/>
+              <a:defRPr sz="1984"/>
             </a:lvl1pPr>
-            <a:lvl2pPr marL="365760" indent="0" algn="ctr">
+            <a:lvl2pPr marL="377922" indent="0" algn="ctr">
               <a:buNone/>
-              <a:defRPr sz="1600"/>
+              <a:defRPr sz="1653"/>
             </a:lvl2pPr>
-            <a:lvl3pPr marL="731520" indent="0" algn="ctr">
+            <a:lvl3pPr marL="755843" indent="0" algn="ctr">
               <a:buNone/>
-              <a:defRPr sz="1440"/>
+              <a:defRPr sz="1488"/>
             </a:lvl3pPr>
-            <a:lvl4pPr marL="1097280" indent="0" algn="ctr">
+            <a:lvl4pPr marL="1133765" indent="0" algn="ctr">
               <a:buNone/>
-              <a:defRPr sz="1280"/>
+              <a:defRPr sz="1323"/>
             </a:lvl4pPr>
-            <a:lvl5pPr marL="1463040" indent="0" algn="ctr">
+            <a:lvl5pPr marL="1511686" indent="0" algn="ctr">
               <a:buNone/>
-              <a:defRPr sz="1280"/>
+              <a:defRPr sz="1323"/>
             </a:lvl5pPr>
-            <a:lvl6pPr marL="1828800" indent="0" algn="ctr">
+            <a:lvl6pPr marL="1889608" indent="0" algn="ctr">
               <a:buNone/>
-              <a:defRPr sz="1280"/>
+              <a:defRPr sz="1323"/>
             </a:lvl6pPr>
-            <a:lvl7pPr marL="2194560" indent="0" algn="ctr">
+            <a:lvl7pPr marL="2267529" indent="0" algn="ctr">
               <a:buNone/>
-              <a:defRPr sz="1280"/>
+              <a:defRPr sz="1323"/>
             </a:lvl7pPr>
-            <a:lvl8pPr marL="2560320" indent="0" algn="ctr">
+            <a:lvl8pPr marL="2645451" indent="0" algn="ctr">
               <a:buNone/>
-              <a:defRPr sz="1280"/>
+              <a:defRPr sz="1323"/>
             </a:lvl8pPr>
-            <a:lvl9pPr marL="2926080" indent="0" algn="ctr">
+            <a:lvl9pPr marL="3023372" indent="0" algn="ctr">
               <a:buNone/>
-              <a:defRPr sz="1280"/>
+              <a:defRPr sz="1323"/>
             </a:lvl9pPr>
           </a:lstStyle>
           <a:p>
@@ -679,7 +684,7 @@
           <a:p>
             <a:fld id="{DCE07B5D-B400-BC43-987A-7D391B225B8E}" type="datetimeFigureOut">
               <a:rPr lang="en-US" smtClean="0"/>
-              <a:t>5/30/18</a:t>
+              <a:t>10/6/18</a:t>
             </a:fld>
             <a:endParaRPr lang="en-US"/>
           </a:p>
@@ -730,7 +735,7 @@
     </p:spTree>
     <p:extLst>
       <p:ext uri="{BB962C8B-B14F-4D97-AF65-F5344CB8AC3E}">
-        <p14:creationId xmlns:p14="http://schemas.microsoft.com/office/powerpoint/2010/main" val="4023275150"/>
+        <p14:creationId xmlns:p14="http://schemas.microsoft.com/office/powerpoint/2010/main" val="4231663868"/>
       </p:ext>
     </p:extLst>
   </p:cSld>
@@ -849,7 +854,7 @@
           <a:p>
             <a:fld id="{DCE07B5D-B400-BC43-987A-7D391B225B8E}" type="datetimeFigureOut">
               <a:rPr lang="en-US" smtClean="0"/>
-              <a:t>5/30/18</a:t>
+              <a:t>10/6/18</a:t>
             </a:fld>
             <a:endParaRPr lang="en-US"/>
           </a:p>
@@ -900,7 +905,7 @@
     </p:spTree>
     <p:extLst>
       <p:ext uri="{BB962C8B-B14F-4D97-AF65-F5344CB8AC3E}">
-        <p14:creationId xmlns:p14="http://schemas.microsoft.com/office/powerpoint/2010/main" val="600004049"/>
+        <p14:creationId xmlns:p14="http://schemas.microsoft.com/office/powerpoint/2010/main" val="349154192"/>
       </p:ext>
     </p:extLst>
   </p:cSld>
@@ -939,8 +944,8 @@
         </p:nvSpPr>
         <p:spPr>
           <a:xfrm>
-            <a:off x="8724900" y="292100"/>
-            <a:ext cx="2628900" cy="4649470"/>
+            <a:off x="8997553" y="301820"/>
+            <a:ext cx="2711053" cy="4804184"/>
           </a:xfrm>
         </p:spPr>
         <p:txBody>
@@ -967,8 +972,8 @@
         </p:nvSpPr>
         <p:spPr>
           <a:xfrm>
-            <a:off x="838200" y="292100"/>
-            <a:ext cx="7734300" cy="4649470"/>
+            <a:off x="864394" y="301820"/>
+            <a:ext cx="7975997" cy="4804184"/>
           </a:xfrm>
         </p:spPr>
         <p:txBody>
@@ -1029,7 +1034,7 @@
           <a:p>
             <a:fld id="{DCE07B5D-B400-BC43-987A-7D391B225B8E}" type="datetimeFigureOut">
               <a:rPr lang="en-US" smtClean="0"/>
-              <a:t>5/30/18</a:t>
+              <a:t>10/6/18</a:t>
             </a:fld>
             <a:endParaRPr lang="en-US"/>
           </a:p>
@@ -1080,7 +1085,7 @@
     </p:spTree>
     <p:extLst>
       <p:ext uri="{BB962C8B-B14F-4D97-AF65-F5344CB8AC3E}">
-        <p14:creationId xmlns:p14="http://schemas.microsoft.com/office/powerpoint/2010/main" val="803929241"/>
+        <p14:creationId xmlns:p14="http://schemas.microsoft.com/office/powerpoint/2010/main" val="2462548407"/>
       </p:ext>
     </p:extLst>
   </p:cSld>
@@ -1199,7 +1204,7 @@
           <a:p>
             <a:fld id="{DCE07B5D-B400-BC43-987A-7D391B225B8E}" type="datetimeFigureOut">
               <a:rPr lang="en-US" smtClean="0"/>
-              <a:t>5/30/18</a:t>
+              <a:t>10/6/18</a:t>
             </a:fld>
             <a:endParaRPr lang="en-US"/>
           </a:p>
@@ -1250,7 +1255,7 @@
     </p:spTree>
     <p:extLst>
       <p:ext uri="{BB962C8B-B14F-4D97-AF65-F5344CB8AC3E}">
-        <p14:creationId xmlns:p14="http://schemas.microsoft.com/office/powerpoint/2010/main" val="490622949"/>
+        <p14:creationId xmlns:p14="http://schemas.microsoft.com/office/powerpoint/2010/main" val="2422522441"/>
       </p:ext>
     </p:extLst>
   </p:cSld>
@@ -1289,15 +1294,15 @@
         </p:nvSpPr>
         <p:spPr>
           <a:xfrm>
-            <a:off x="831850" y="1367791"/>
-            <a:ext cx="10515600" cy="2282190"/>
+            <a:off x="857845" y="1413305"/>
+            <a:ext cx="10844213" cy="2358131"/>
           </a:xfrm>
         </p:spPr>
         <p:txBody>
           <a:bodyPr anchor="b"/>
           <a:lstStyle>
             <a:lvl1pPr>
-              <a:defRPr sz="4800"/>
+              <a:defRPr sz="4960"/>
             </a:lvl1pPr>
           </a:lstStyle>
           <a:p>
@@ -1321,8 +1326,8 @@
         </p:nvSpPr>
         <p:spPr>
           <a:xfrm>
-            <a:off x="831850" y="3671571"/>
-            <a:ext cx="10515600" cy="1200150"/>
+            <a:off x="857845" y="3793744"/>
+            <a:ext cx="10844213" cy="1240085"/>
           </a:xfrm>
         </p:spPr>
         <p:txBody>
@@ -1330,7 +1335,7 @@
           <a:lstStyle>
             <a:lvl1pPr marL="0" indent="0">
               <a:buNone/>
-              <a:defRPr sz="1920">
+              <a:defRPr sz="1984">
                 <a:solidFill>
                   <a:schemeClr val="tx1">
                     <a:tint val="75000"/>
@@ -1338,9 +1343,9 @@
                 </a:solidFill>
               </a:defRPr>
             </a:lvl1pPr>
-            <a:lvl2pPr marL="365760" indent="0">
+            <a:lvl2pPr marL="377922" indent="0">
               <a:buNone/>
-              <a:defRPr sz="1600">
+              <a:defRPr sz="1653">
                 <a:solidFill>
                   <a:schemeClr val="tx1">
                     <a:tint val="75000"/>
@@ -1348,9 +1353,9 @@
                 </a:solidFill>
               </a:defRPr>
             </a:lvl2pPr>
-            <a:lvl3pPr marL="731520" indent="0">
+            <a:lvl3pPr marL="755843" indent="0">
               <a:buNone/>
-              <a:defRPr sz="1440">
+              <a:defRPr sz="1488">
                 <a:solidFill>
                   <a:schemeClr val="tx1">
                     <a:tint val="75000"/>
@@ -1358,9 +1363,9 @@
                 </a:solidFill>
               </a:defRPr>
             </a:lvl3pPr>
-            <a:lvl4pPr marL="1097280" indent="0">
+            <a:lvl4pPr marL="1133765" indent="0">
               <a:buNone/>
-              <a:defRPr sz="1280">
+              <a:defRPr sz="1323">
                 <a:solidFill>
                   <a:schemeClr val="tx1">
                     <a:tint val="75000"/>
@@ -1368,9 +1373,9 @@
                 </a:solidFill>
               </a:defRPr>
             </a:lvl4pPr>
-            <a:lvl5pPr marL="1463040" indent="0">
+            <a:lvl5pPr marL="1511686" indent="0">
               <a:buNone/>
-              <a:defRPr sz="1280">
+              <a:defRPr sz="1323">
                 <a:solidFill>
                   <a:schemeClr val="tx1">
                     <a:tint val="75000"/>
@@ -1378,9 +1383,9 @@
                 </a:solidFill>
               </a:defRPr>
             </a:lvl5pPr>
-            <a:lvl6pPr marL="1828800" indent="0">
+            <a:lvl6pPr marL="1889608" indent="0">
               <a:buNone/>
-              <a:defRPr sz="1280">
+              <a:defRPr sz="1323">
                 <a:solidFill>
                   <a:schemeClr val="tx1">
                     <a:tint val="75000"/>
@@ -1388,9 +1393,9 @@
                 </a:solidFill>
               </a:defRPr>
             </a:lvl6pPr>
-            <a:lvl7pPr marL="2194560" indent="0">
+            <a:lvl7pPr marL="2267529" indent="0">
               <a:buNone/>
-              <a:defRPr sz="1280">
+              <a:defRPr sz="1323">
                 <a:solidFill>
                   <a:schemeClr val="tx1">
                     <a:tint val="75000"/>
@@ -1398,9 +1403,9 @@
                 </a:solidFill>
               </a:defRPr>
             </a:lvl7pPr>
-            <a:lvl8pPr marL="2560320" indent="0">
+            <a:lvl8pPr marL="2645451" indent="0">
               <a:buNone/>
-              <a:defRPr sz="1280">
+              <a:defRPr sz="1323">
                 <a:solidFill>
                   <a:schemeClr val="tx1">
                     <a:tint val="75000"/>
@@ -1408,9 +1413,9 @@
                 </a:solidFill>
               </a:defRPr>
             </a:lvl8pPr>
-            <a:lvl9pPr marL="2926080" indent="0">
+            <a:lvl9pPr marL="3023372" indent="0">
               <a:buNone/>
-              <a:defRPr sz="1280">
+              <a:defRPr sz="1323">
                 <a:solidFill>
                   <a:schemeClr val="tx1">
                     <a:tint val="75000"/>
@@ -1445,7 +1450,7 @@
           <a:p>
             <a:fld id="{DCE07B5D-B400-BC43-987A-7D391B225B8E}" type="datetimeFigureOut">
               <a:rPr lang="en-US" smtClean="0"/>
-              <a:t>5/30/18</a:t>
+              <a:t>10/6/18</a:t>
             </a:fld>
             <a:endParaRPr lang="en-US"/>
           </a:p>
@@ -1496,7 +1501,7 @@
     </p:spTree>
     <p:extLst>
       <p:ext uri="{BB962C8B-B14F-4D97-AF65-F5344CB8AC3E}">
-        <p14:creationId xmlns:p14="http://schemas.microsoft.com/office/powerpoint/2010/main" val="1244655996"/>
+        <p14:creationId xmlns:p14="http://schemas.microsoft.com/office/powerpoint/2010/main" val="2101234162"/>
       </p:ext>
     </p:extLst>
   </p:cSld>
@@ -1558,8 +1563,8 @@
         </p:nvSpPr>
         <p:spPr>
           <a:xfrm>
-            <a:off x="838200" y="1460500"/>
-            <a:ext cx="5181600" cy="3481070"/>
+            <a:off x="864394" y="1509099"/>
+            <a:ext cx="5343525" cy="3596905"/>
           </a:xfrm>
         </p:spPr>
         <p:txBody>
@@ -1615,8 +1620,8 @@
         </p:nvSpPr>
         <p:spPr>
           <a:xfrm>
-            <a:off x="6172200" y="1460500"/>
-            <a:ext cx="5181600" cy="3481070"/>
+            <a:off x="6365081" y="1509099"/>
+            <a:ext cx="5343525" cy="3596905"/>
           </a:xfrm>
         </p:spPr>
         <p:txBody>
@@ -1677,7 +1682,7 @@
           <a:p>
             <a:fld id="{DCE07B5D-B400-BC43-987A-7D391B225B8E}" type="datetimeFigureOut">
               <a:rPr lang="en-US" smtClean="0"/>
-              <a:t>5/30/18</a:t>
+              <a:t>10/6/18</a:t>
             </a:fld>
             <a:endParaRPr lang="en-US"/>
           </a:p>
@@ -1728,7 +1733,7 @@
     </p:spTree>
     <p:extLst>
       <p:ext uri="{BB962C8B-B14F-4D97-AF65-F5344CB8AC3E}">
-        <p14:creationId xmlns:p14="http://schemas.microsoft.com/office/powerpoint/2010/main" val="2789841517"/>
+        <p14:creationId xmlns:p14="http://schemas.microsoft.com/office/powerpoint/2010/main" val="150666164"/>
       </p:ext>
     </p:extLst>
   </p:cSld>
@@ -1767,8 +1772,8 @@
         </p:nvSpPr>
         <p:spPr>
           <a:xfrm>
-            <a:off x="839788" y="292101"/>
-            <a:ext cx="10515600" cy="1060450"/>
+            <a:off x="866031" y="301820"/>
+            <a:ext cx="10844213" cy="1095737"/>
           </a:xfrm>
         </p:spPr>
         <p:txBody>
@@ -1795,8 +1800,8 @@
         </p:nvSpPr>
         <p:spPr>
           <a:xfrm>
-            <a:off x="839789" y="1344930"/>
-            <a:ext cx="5157787" cy="659130"/>
+            <a:off x="866032" y="1389683"/>
+            <a:ext cx="5318968" cy="681063"/>
           </a:xfrm>
         </p:spPr>
         <p:txBody>
@@ -1804,39 +1809,39 @@
           <a:lstStyle>
             <a:lvl1pPr marL="0" indent="0">
               <a:buNone/>
-              <a:defRPr sz="1920" b="1"/>
+              <a:defRPr sz="1984" b="1"/>
             </a:lvl1pPr>
-            <a:lvl2pPr marL="365760" indent="0">
+            <a:lvl2pPr marL="377922" indent="0">
               <a:buNone/>
-              <a:defRPr sz="1600" b="1"/>
+              <a:defRPr sz="1653" b="1"/>
             </a:lvl2pPr>
-            <a:lvl3pPr marL="731520" indent="0">
+            <a:lvl3pPr marL="755843" indent="0">
               <a:buNone/>
-              <a:defRPr sz="1440" b="1"/>
+              <a:defRPr sz="1488" b="1"/>
             </a:lvl3pPr>
-            <a:lvl4pPr marL="1097280" indent="0">
+            <a:lvl4pPr marL="1133765" indent="0">
               <a:buNone/>
-              <a:defRPr sz="1280" b="1"/>
+              <a:defRPr sz="1323" b="1"/>
             </a:lvl4pPr>
-            <a:lvl5pPr marL="1463040" indent="0">
+            <a:lvl5pPr marL="1511686" indent="0">
               <a:buNone/>
-              <a:defRPr sz="1280" b="1"/>
+              <a:defRPr sz="1323" b="1"/>
             </a:lvl5pPr>
-            <a:lvl6pPr marL="1828800" indent="0">
+            <a:lvl6pPr marL="1889608" indent="0">
               <a:buNone/>
-              <a:defRPr sz="1280" b="1"/>
+              <a:defRPr sz="1323" b="1"/>
             </a:lvl6pPr>
-            <a:lvl7pPr marL="2194560" indent="0">
+            <a:lvl7pPr marL="2267529" indent="0">
               <a:buNone/>
-              <a:defRPr sz="1280" b="1"/>
+              <a:defRPr sz="1323" b="1"/>
             </a:lvl7pPr>
-            <a:lvl8pPr marL="2560320" indent="0">
+            <a:lvl8pPr marL="2645451" indent="0">
               <a:buNone/>
-              <a:defRPr sz="1280" b="1"/>
+              <a:defRPr sz="1323" b="1"/>
             </a:lvl8pPr>
-            <a:lvl9pPr marL="2926080" indent="0">
+            <a:lvl9pPr marL="3023372" indent="0">
               <a:buNone/>
-              <a:defRPr sz="1280" b="1"/>
+              <a:defRPr sz="1323" b="1"/>
             </a:lvl9pPr>
           </a:lstStyle>
           <a:p>
@@ -1860,8 +1865,8 @@
         </p:nvSpPr>
         <p:spPr>
           <a:xfrm>
-            <a:off x="839789" y="2004060"/>
-            <a:ext cx="5157787" cy="2947670"/>
+            <a:off x="866032" y="2070746"/>
+            <a:ext cx="5318968" cy="3045756"/>
           </a:xfrm>
         </p:spPr>
         <p:txBody>
@@ -1917,8 +1922,8 @@
         </p:nvSpPr>
         <p:spPr>
           <a:xfrm>
-            <a:off x="6172200" y="1344930"/>
-            <a:ext cx="5183188" cy="659130"/>
+            <a:off x="6365081" y="1389683"/>
+            <a:ext cx="5345163" cy="681063"/>
           </a:xfrm>
         </p:spPr>
         <p:txBody>
@@ -1926,39 +1931,39 @@
           <a:lstStyle>
             <a:lvl1pPr marL="0" indent="0">
               <a:buNone/>
-              <a:defRPr sz="1920" b="1"/>
+              <a:defRPr sz="1984" b="1"/>
             </a:lvl1pPr>
-            <a:lvl2pPr marL="365760" indent="0">
+            <a:lvl2pPr marL="377922" indent="0">
               <a:buNone/>
-              <a:defRPr sz="1600" b="1"/>
+              <a:defRPr sz="1653" b="1"/>
             </a:lvl2pPr>
-            <a:lvl3pPr marL="731520" indent="0">
+            <a:lvl3pPr marL="755843" indent="0">
               <a:buNone/>
-              <a:defRPr sz="1440" b="1"/>
+              <a:defRPr sz="1488" b="1"/>
             </a:lvl3pPr>
-            <a:lvl4pPr marL="1097280" indent="0">
+            <a:lvl4pPr marL="1133765" indent="0">
               <a:buNone/>
-              <a:defRPr sz="1280" b="1"/>
+              <a:defRPr sz="1323" b="1"/>
             </a:lvl4pPr>
-            <a:lvl5pPr marL="1463040" indent="0">
+            <a:lvl5pPr marL="1511686" indent="0">
               <a:buNone/>
-              <a:defRPr sz="1280" b="1"/>
+              <a:defRPr sz="1323" b="1"/>
             </a:lvl5pPr>
-            <a:lvl6pPr marL="1828800" indent="0">
+            <a:lvl6pPr marL="1889608" indent="0">
               <a:buNone/>
-              <a:defRPr sz="1280" b="1"/>
+              <a:defRPr sz="1323" b="1"/>
             </a:lvl6pPr>
-            <a:lvl7pPr marL="2194560" indent="0">
+            <a:lvl7pPr marL="2267529" indent="0">
               <a:buNone/>
-              <a:defRPr sz="1280" b="1"/>
+              <a:defRPr sz="1323" b="1"/>
             </a:lvl7pPr>
-            <a:lvl8pPr marL="2560320" indent="0">
+            <a:lvl8pPr marL="2645451" indent="0">
               <a:buNone/>
-              <a:defRPr sz="1280" b="1"/>
+              <a:defRPr sz="1323" b="1"/>
             </a:lvl8pPr>
-            <a:lvl9pPr marL="2926080" indent="0">
+            <a:lvl9pPr marL="3023372" indent="0">
               <a:buNone/>
-              <a:defRPr sz="1280" b="1"/>
+              <a:defRPr sz="1323" b="1"/>
             </a:lvl9pPr>
           </a:lstStyle>
           <a:p>
@@ -1982,8 +1987,8 @@
         </p:nvSpPr>
         <p:spPr>
           <a:xfrm>
-            <a:off x="6172200" y="2004060"/>
-            <a:ext cx="5183188" cy="2947670"/>
+            <a:off x="6365081" y="2070746"/>
+            <a:ext cx="5345163" cy="3045756"/>
           </a:xfrm>
         </p:spPr>
         <p:txBody>
@@ -2044,7 +2049,7 @@
           <a:p>
             <a:fld id="{DCE07B5D-B400-BC43-987A-7D391B225B8E}" type="datetimeFigureOut">
               <a:rPr lang="en-US" smtClean="0"/>
-              <a:t>5/30/18</a:t>
+              <a:t>10/6/18</a:t>
             </a:fld>
             <a:endParaRPr lang="en-US"/>
           </a:p>
@@ -2095,7 +2100,7 @@
     </p:spTree>
     <p:extLst>
       <p:ext uri="{BB962C8B-B14F-4D97-AF65-F5344CB8AC3E}">
-        <p14:creationId xmlns:p14="http://schemas.microsoft.com/office/powerpoint/2010/main" val="3966341586"/>
+        <p14:creationId xmlns:p14="http://schemas.microsoft.com/office/powerpoint/2010/main" val="2807202294"/>
       </p:ext>
     </p:extLst>
   </p:cSld>
@@ -2162,7 +2167,7 @@
           <a:p>
             <a:fld id="{DCE07B5D-B400-BC43-987A-7D391B225B8E}" type="datetimeFigureOut">
               <a:rPr lang="en-US" smtClean="0"/>
-              <a:t>5/30/18</a:t>
+              <a:t>10/6/18</a:t>
             </a:fld>
             <a:endParaRPr lang="en-US"/>
           </a:p>
@@ -2213,7 +2218,7 @@
     </p:spTree>
     <p:extLst>
       <p:ext uri="{BB962C8B-B14F-4D97-AF65-F5344CB8AC3E}">
-        <p14:creationId xmlns:p14="http://schemas.microsoft.com/office/powerpoint/2010/main" val="3203756976"/>
+        <p14:creationId xmlns:p14="http://schemas.microsoft.com/office/powerpoint/2010/main" val="1378925449"/>
       </p:ext>
     </p:extLst>
   </p:cSld>
@@ -2257,7 +2262,7 @@
           <a:p>
             <a:fld id="{DCE07B5D-B400-BC43-987A-7D391B225B8E}" type="datetimeFigureOut">
               <a:rPr lang="en-US" smtClean="0"/>
-              <a:t>5/30/18</a:t>
+              <a:t>10/6/18</a:t>
             </a:fld>
             <a:endParaRPr lang="en-US"/>
           </a:p>
@@ -2308,7 +2313,7 @@
     </p:spTree>
     <p:extLst>
       <p:ext uri="{BB962C8B-B14F-4D97-AF65-F5344CB8AC3E}">
-        <p14:creationId xmlns:p14="http://schemas.microsoft.com/office/powerpoint/2010/main" val="4198135225"/>
+        <p14:creationId xmlns:p14="http://schemas.microsoft.com/office/powerpoint/2010/main" val="1924126993"/>
       </p:ext>
     </p:extLst>
   </p:cSld>
@@ -2347,15 +2352,15 @@
         </p:nvSpPr>
         <p:spPr>
           <a:xfrm>
-            <a:off x="839789" y="365760"/>
-            <a:ext cx="3932237" cy="1280160"/>
+            <a:off x="866032" y="377931"/>
+            <a:ext cx="4055119" cy="1322758"/>
           </a:xfrm>
         </p:spPr>
         <p:txBody>
           <a:bodyPr anchor="b"/>
           <a:lstStyle>
             <a:lvl1pPr>
-              <a:defRPr sz="2560"/>
+              <a:defRPr sz="2645"/>
             </a:lvl1pPr>
           </a:lstStyle>
           <a:p>
@@ -2379,39 +2384,39 @@
         </p:nvSpPr>
         <p:spPr>
           <a:xfrm>
-            <a:off x="5183188" y="789940"/>
-            <a:ext cx="6172200" cy="3898900"/>
+            <a:off x="5345163" y="816226"/>
+            <a:ext cx="6365081" cy="4028638"/>
           </a:xfrm>
         </p:spPr>
         <p:txBody>
           <a:bodyPr/>
           <a:lstStyle>
             <a:lvl1pPr>
-              <a:defRPr sz="2560"/>
+              <a:defRPr sz="2645"/>
             </a:lvl1pPr>
             <a:lvl2pPr>
-              <a:defRPr sz="2240"/>
+              <a:defRPr sz="2314"/>
             </a:lvl2pPr>
             <a:lvl3pPr>
-              <a:defRPr sz="1920"/>
+              <a:defRPr sz="1984"/>
             </a:lvl3pPr>
             <a:lvl4pPr>
-              <a:defRPr sz="1600"/>
+              <a:defRPr sz="1653"/>
             </a:lvl4pPr>
             <a:lvl5pPr>
-              <a:defRPr sz="1600"/>
+              <a:defRPr sz="1653"/>
             </a:lvl5pPr>
             <a:lvl6pPr>
-              <a:defRPr sz="1600"/>
+              <a:defRPr sz="1653"/>
             </a:lvl6pPr>
             <a:lvl7pPr>
-              <a:defRPr sz="1600"/>
+              <a:defRPr sz="1653"/>
             </a:lvl7pPr>
             <a:lvl8pPr>
-              <a:defRPr sz="1600"/>
+              <a:defRPr sz="1653"/>
             </a:lvl8pPr>
             <a:lvl9pPr>
-              <a:defRPr sz="1600"/>
+              <a:defRPr sz="1653"/>
             </a:lvl9pPr>
           </a:lstStyle>
           <a:p>
@@ -2464,8 +2469,8 @@
         </p:nvSpPr>
         <p:spPr>
           <a:xfrm>
-            <a:off x="839789" y="1645920"/>
-            <a:ext cx="3932237" cy="3049270"/>
+            <a:off x="866032" y="1700689"/>
+            <a:ext cx="4055119" cy="3150737"/>
           </a:xfrm>
         </p:spPr>
         <p:txBody>
@@ -2473,39 +2478,39 @@
           <a:lstStyle>
             <a:lvl1pPr marL="0" indent="0">
               <a:buNone/>
-              <a:defRPr sz="1280"/>
+              <a:defRPr sz="1323"/>
             </a:lvl1pPr>
-            <a:lvl2pPr marL="365760" indent="0">
+            <a:lvl2pPr marL="377922" indent="0">
               <a:buNone/>
-              <a:defRPr sz="1120"/>
+              <a:defRPr sz="1157"/>
             </a:lvl2pPr>
-            <a:lvl3pPr marL="731520" indent="0">
+            <a:lvl3pPr marL="755843" indent="0">
               <a:buNone/>
-              <a:defRPr sz="960"/>
+              <a:defRPr sz="992"/>
             </a:lvl3pPr>
-            <a:lvl4pPr marL="1097280" indent="0">
+            <a:lvl4pPr marL="1133765" indent="0">
               <a:buNone/>
-              <a:defRPr sz="800"/>
+              <a:defRPr sz="827"/>
             </a:lvl4pPr>
-            <a:lvl5pPr marL="1463040" indent="0">
+            <a:lvl5pPr marL="1511686" indent="0">
               <a:buNone/>
-              <a:defRPr sz="800"/>
+              <a:defRPr sz="827"/>
             </a:lvl5pPr>
-            <a:lvl6pPr marL="1828800" indent="0">
+            <a:lvl6pPr marL="1889608" indent="0">
               <a:buNone/>
-              <a:defRPr sz="800"/>
+              <a:defRPr sz="827"/>
             </a:lvl6pPr>
-            <a:lvl7pPr marL="2194560" indent="0">
+            <a:lvl7pPr marL="2267529" indent="0">
               <a:buNone/>
-              <a:defRPr sz="800"/>
+              <a:defRPr sz="827"/>
             </a:lvl7pPr>
-            <a:lvl8pPr marL="2560320" indent="0">
+            <a:lvl8pPr marL="2645451" indent="0">
               <a:buNone/>
-              <a:defRPr sz="800"/>
+              <a:defRPr sz="827"/>
             </a:lvl8pPr>
-            <a:lvl9pPr marL="2926080" indent="0">
+            <a:lvl9pPr marL="3023372" indent="0">
               <a:buNone/>
-              <a:defRPr sz="800"/>
+              <a:defRPr sz="827"/>
             </a:lvl9pPr>
           </a:lstStyle>
           <a:p>
@@ -2534,7 +2539,7 @@
           <a:p>
             <a:fld id="{DCE07B5D-B400-BC43-987A-7D391B225B8E}" type="datetimeFigureOut">
               <a:rPr lang="en-US" smtClean="0"/>
-              <a:t>5/30/18</a:t>
+              <a:t>10/6/18</a:t>
             </a:fld>
             <a:endParaRPr lang="en-US"/>
           </a:p>
@@ -2585,7 +2590,7 @@
     </p:spTree>
     <p:extLst>
       <p:ext uri="{BB962C8B-B14F-4D97-AF65-F5344CB8AC3E}">
-        <p14:creationId xmlns:p14="http://schemas.microsoft.com/office/powerpoint/2010/main" val="2622330944"/>
+        <p14:creationId xmlns:p14="http://schemas.microsoft.com/office/powerpoint/2010/main" val="1026547533"/>
       </p:ext>
     </p:extLst>
   </p:cSld>
@@ -2624,15 +2629,15 @@
         </p:nvSpPr>
         <p:spPr>
           <a:xfrm>
-            <a:off x="839789" y="365760"/>
-            <a:ext cx="3932237" cy="1280160"/>
+            <a:off x="866032" y="377931"/>
+            <a:ext cx="4055119" cy="1322758"/>
           </a:xfrm>
         </p:spPr>
         <p:txBody>
           <a:bodyPr anchor="b"/>
           <a:lstStyle>
             <a:lvl1pPr>
-              <a:defRPr sz="2560"/>
+              <a:defRPr sz="2645"/>
             </a:lvl1pPr>
           </a:lstStyle>
           <a:p>
@@ -2656,8 +2661,8 @@
         </p:nvSpPr>
         <p:spPr>
           <a:xfrm>
-            <a:off x="5183188" y="789940"/>
-            <a:ext cx="6172200" cy="3898900"/>
+            <a:off x="5345163" y="816226"/>
+            <a:ext cx="6365081" cy="4028638"/>
           </a:xfrm>
         </p:spPr>
         <p:txBody>
@@ -2665,39 +2670,39 @@
           <a:lstStyle>
             <a:lvl1pPr marL="0" indent="0">
               <a:buNone/>
-              <a:defRPr sz="2560"/>
+              <a:defRPr sz="2645"/>
             </a:lvl1pPr>
-            <a:lvl2pPr marL="365760" indent="0">
+            <a:lvl2pPr marL="377922" indent="0">
               <a:buNone/>
-              <a:defRPr sz="2240"/>
+              <a:defRPr sz="2314"/>
             </a:lvl2pPr>
-            <a:lvl3pPr marL="731520" indent="0">
+            <a:lvl3pPr marL="755843" indent="0">
               <a:buNone/>
-              <a:defRPr sz="1920"/>
+              <a:defRPr sz="1984"/>
             </a:lvl3pPr>
-            <a:lvl4pPr marL="1097280" indent="0">
+            <a:lvl4pPr marL="1133765" indent="0">
               <a:buNone/>
-              <a:defRPr sz="1600"/>
+              <a:defRPr sz="1653"/>
             </a:lvl4pPr>
-            <a:lvl5pPr marL="1463040" indent="0">
+            <a:lvl5pPr marL="1511686" indent="0">
               <a:buNone/>
-              <a:defRPr sz="1600"/>
+              <a:defRPr sz="1653"/>
             </a:lvl5pPr>
-            <a:lvl6pPr marL="1828800" indent="0">
+            <a:lvl6pPr marL="1889608" indent="0">
               <a:buNone/>
-              <a:defRPr sz="1600"/>
+              <a:defRPr sz="1653"/>
             </a:lvl6pPr>
-            <a:lvl7pPr marL="2194560" indent="0">
+            <a:lvl7pPr marL="2267529" indent="0">
               <a:buNone/>
-              <a:defRPr sz="1600"/>
+              <a:defRPr sz="1653"/>
             </a:lvl7pPr>
-            <a:lvl8pPr marL="2560320" indent="0">
+            <a:lvl8pPr marL="2645451" indent="0">
               <a:buNone/>
-              <a:defRPr sz="1600"/>
+              <a:defRPr sz="1653"/>
             </a:lvl8pPr>
-            <a:lvl9pPr marL="2926080" indent="0">
+            <a:lvl9pPr marL="3023372" indent="0">
               <a:buNone/>
-              <a:defRPr sz="1600"/>
+              <a:defRPr sz="1653"/>
             </a:lvl9pPr>
           </a:lstStyle>
           <a:p>
@@ -2721,8 +2726,8 @@
         </p:nvSpPr>
         <p:spPr>
           <a:xfrm>
-            <a:off x="839789" y="1645920"/>
-            <a:ext cx="3932237" cy="3049270"/>
+            <a:off x="866032" y="1700689"/>
+            <a:ext cx="4055119" cy="3150737"/>
           </a:xfrm>
         </p:spPr>
         <p:txBody>
@@ -2730,39 +2735,39 @@
           <a:lstStyle>
             <a:lvl1pPr marL="0" indent="0">
               <a:buNone/>
-              <a:defRPr sz="1280"/>
+              <a:defRPr sz="1323"/>
             </a:lvl1pPr>
-            <a:lvl2pPr marL="365760" indent="0">
+            <a:lvl2pPr marL="377922" indent="0">
               <a:buNone/>
-              <a:defRPr sz="1120"/>
+              <a:defRPr sz="1157"/>
             </a:lvl2pPr>
-            <a:lvl3pPr marL="731520" indent="0">
+            <a:lvl3pPr marL="755843" indent="0">
               <a:buNone/>
-              <a:defRPr sz="960"/>
+              <a:defRPr sz="992"/>
             </a:lvl3pPr>
-            <a:lvl4pPr marL="1097280" indent="0">
+            <a:lvl4pPr marL="1133765" indent="0">
               <a:buNone/>
-              <a:defRPr sz="800"/>
+              <a:defRPr sz="827"/>
             </a:lvl4pPr>
-            <a:lvl5pPr marL="1463040" indent="0">
+            <a:lvl5pPr marL="1511686" indent="0">
               <a:buNone/>
-              <a:defRPr sz="800"/>
+              <a:defRPr sz="827"/>
             </a:lvl5pPr>
-            <a:lvl6pPr marL="1828800" indent="0">
+            <a:lvl6pPr marL="1889608" indent="0">
               <a:buNone/>
-              <a:defRPr sz="800"/>
+              <a:defRPr sz="827"/>
             </a:lvl6pPr>
-            <a:lvl7pPr marL="2194560" indent="0">
+            <a:lvl7pPr marL="2267529" indent="0">
               <a:buNone/>
-              <a:defRPr sz="800"/>
+              <a:defRPr sz="827"/>
             </a:lvl7pPr>
-            <a:lvl8pPr marL="2560320" indent="0">
+            <a:lvl8pPr marL="2645451" indent="0">
               <a:buNone/>
-              <a:defRPr sz="800"/>
+              <a:defRPr sz="827"/>
             </a:lvl8pPr>
-            <a:lvl9pPr marL="2926080" indent="0">
+            <a:lvl9pPr marL="3023372" indent="0">
               <a:buNone/>
-              <a:defRPr sz="800"/>
+              <a:defRPr sz="827"/>
             </a:lvl9pPr>
           </a:lstStyle>
           <a:p>
@@ -2791,7 +2796,7 @@
           <a:p>
             <a:fld id="{DCE07B5D-B400-BC43-987A-7D391B225B8E}" type="datetimeFigureOut">
               <a:rPr lang="en-US" smtClean="0"/>
-              <a:t>5/30/18</a:t>
+              <a:t>10/6/18</a:t>
             </a:fld>
             <a:endParaRPr lang="en-US"/>
           </a:p>
@@ -2842,7 +2847,7 @@
     </p:spTree>
     <p:extLst>
       <p:ext uri="{BB962C8B-B14F-4D97-AF65-F5344CB8AC3E}">
-        <p14:creationId xmlns:p14="http://schemas.microsoft.com/office/powerpoint/2010/main" val="3108839005"/>
+        <p14:creationId xmlns:p14="http://schemas.microsoft.com/office/powerpoint/2010/main" val="651477545"/>
       </p:ext>
     </p:extLst>
   </p:cSld>
@@ -2886,8 +2891,8 @@
         </p:nvSpPr>
         <p:spPr>
           <a:xfrm>
-            <a:off x="838200" y="292101"/>
-            <a:ext cx="10515600" cy="1060450"/>
+            <a:off x="864394" y="301820"/>
+            <a:ext cx="10844213" cy="1095737"/>
           </a:xfrm>
           <a:prstGeom prst="rect">
             <a:avLst/>
@@ -2919,8 +2924,8 @@
         </p:nvSpPr>
         <p:spPr>
           <a:xfrm>
-            <a:off x="838200" y="1460500"/>
-            <a:ext cx="10515600" cy="3481070"/>
+            <a:off x="864394" y="1509099"/>
+            <a:ext cx="10844213" cy="3596905"/>
           </a:xfrm>
           <a:prstGeom prst="rect">
             <a:avLst/>
@@ -2981,8 +2986,8 @@
         </p:nvSpPr>
         <p:spPr>
           <a:xfrm>
-            <a:off x="838200" y="5085080"/>
-            <a:ext cx="2743200" cy="292100"/>
+            <a:off x="864394" y="5254289"/>
+            <a:ext cx="2828925" cy="301820"/>
           </a:xfrm>
           <a:prstGeom prst="rect">
             <a:avLst/>
@@ -2992,7 +2997,7 @@
           <a:bodyPr vert="horz" lIns="91440" tIns="45720" rIns="91440" bIns="45720" rtlCol="0" anchor="ctr"/>
           <a:lstStyle>
             <a:lvl1pPr algn="l">
-              <a:defRPr sz="960">
+              <a:defRPr sz="992">
                 <a:solidFill>
                   <a:schemeClr val="tx1">
                     <a:tint val="75000"/>
@@ -3004,7 +3009,7 @@
           <a:p>
             <a:fld id="{DCE07B5D-B400-BC43-987A-7D391B225B8E}" type="datetimeFigureOut">
               <a:rPr lang="en-US" smtClean="0"/>
-              <a:t>5/30/18</a:t>
+              <a:t>10/6/18</a:t>
             </a:fld>
             <a:endParaRPr lang="en-US"/>
           </a:p>
@@ -3022,8 +3027,8 @@
         </p:nvSpPr>
         <p:spPr>
           <a:xfrm>
-            <a:off x="4038600" y="5085080"/>
-            <a:ext cx="4114800" cy="292100"/>
+            <a:off x="4164806" y="5254289"/>
+            <a:ext cx="4243388" cy="301820"/>
           </a:xfrm>
           <a:prstGeom prst="rect">
             <a:avLst/>
@@ -3033,7 +3038,7 @@
           <a:bodyPr vert="horz" lIns="91440" tIns="45720" rIns="91440" bIns="45720" rtlCol="0" anchor="ctr"/>
           <a:lstStyle>
             <a:lvl1pPr algn="ctr">
-              <a:defRPr sz="960">
+              <a:defRPr sz="992">
                 <a:solidFill>
                   <a:schemeClr val="tx1">
                     <a:tint val="75000"/>
@@ -3059,8 +3064,8 @@
         </p:nvSpPr>
         <p:spPr>
           <a:xfrm>
-            <a:off x="8610600" y="5085080"/>
-            <a:ext cx="2743200" cy="292100"/>
+            <a:off x="8879681" y="5254289"/>
+            <a:ext cx="2828925" cy="301820"/>
           </a:xfrm>
           <a:prstGeom prst="rect">
             <a:avLst/>
@@ -3070,7 +3075,7 @@
           <a:bodyPr vert="horz" lIns="91440" tIns="45720" rIns="91440" bIns="45720" rtlCol="0" anchor="ctr"/>
           <a:lstStyle>
             <a:lvl1pPr algn="r">
-              <a:defRPr sz="960">
+              <a:defRPr sz="992">
                 <a:solidFill>
                   <a:schemeClr val="tx1">
                     <a:tint val="75000"/>
@@ -3091,27 +3096,27 @@
     </p:spTree>
     <p:extLst>
       <p:ext uri="{BB962C8B-B14F-4D97-AF65-F5344CB8AC3E}">
-        <p14:creationId xmlns:p14="http://schemas.microsoft.com/office/powerpoint/2010/main" val="4224428619"/>
+        <p14:creationId xmlns:p14="http://schemas.microsoft.com/office/powerpoint/2010/main" val="3231455879"/>
       </p:ext>
     </p:extLst>
   </p:cSld>
   <p:clrMap bg1="lt1" tx1="dk1" bg2="lt2" tx2="dk2" accent1="accent1" accent2="accent2" accent3="accent3" accent4="accent4" accent5="accent5" accent6="accent6" hlink="hlink" folHlink="folHlink"/>
   <p:sldLayoutIdLst>
-    <p:sldLayoutId id="2147483661" r:id="rId1"/>
-    <p:sldLayoutId id="2147483662" r:id="rId2"/>
-    <p:sldLayoutId id="2147483663" r:id="rId3"/>
-    <p:sldLayoutId id="2147483664" r:id="rId4"/>
-    <p:sldLayoutId id="2147483665" r:id="rId5"/>
-    <p:sldLayoutId id="2147483666" r:id="rId6"/>
-    <p:sldLayoutId id="2147483667" r:id="rId7"/>
-    <p:sldLayoutId id="2147483668" r:id="rId8"/>
-    <p:sldLayoutId id="2147483669" r:id="rId9"/>
-    <p:sldLayoutId id="2147483670" r:id="rId10"/>
-    <p:sldLayoutId id="2147483671" r:id="rId11"/>
+    <p:sldLayoutId id="2147483697" r:id="rId1"/>
+    <p:sldLayoutId id="2147483698" r:id="rId2"/>
+    <p:sldLayoutId id="2147483699" r:id="rId3"/>
+    <p:sldLayoutId id="2147483700" r:id="rId4"/>
+    <p:sldLayoutId id="2147483701" r:id="rId5"/>
+    <p:sldLayoutId id="2147483702" r:id="rId6"/>
+    <p:sldLayoutId id="2147483703" r:id="rId7"/>
+    <p:sldLayoutId id="2147483704" r:id="rId8"/>
+    <p:sldLayoutId id="2147483705" r:id="rId9"/>
+    <p:sldLayoutId id="2147483706" r:id="rId10"/>
+    <p:sldLayoutId id="2147483707" r:id="rId11"/>
   </p:sldLayoutIdLst>
   <p:txStyles>
     <p:titleStyle>
-      <a:lvl1pPr algn="l" defTabSz="731520" rtl="0" eaLnBrk="1" latinLnBrk="0" hangingPunct="1">
+      <a:lvl1pPr algn="l" defTabSz="755843" rtl="0" eaLnBrk="1" latinLnBrk="0" hangingPunct="1">
         <a:lnSpc>
           <a:spcPct val="90000"/>
         </a:lnSpc>
@@ -3119,7 +3124,7 @@
           <a:spcPct val="0"/>
         </a:spcBef>
         <a:buNone/>
-        <a:defRPr sz="3520" kern="1200">
+        <a:defRPr sz="3637" kern="1200">
           <a:solidFill>
             <a:schemeClr val="tx1"/>
           </a:solidFill>
@@ -3130,16 +3135,16 @@
       </a:lvl1pPr>
     </p:titleStyle>
     <p:bodyStyle>
-      <a:lvl1pPr marL="182880" indent="-182880" algn="l" defTabSz="731520" rtl="0" eaLnBrk="1" latinLnBrk="0" hangingPunct="1">
+      <a:lvl1pPr marL="188961" indent="-188961" algn="l" defTabSz="755843" rtl="0" eaLnBrk="1" latinLnBrk="0" hangingPunct="1">
         <a:lnSpc>
           <a:spcPct val="90000"/>
         </a:lnSpc>
         <a:spcBef>
-          <a:spcPts val="800"/>
+          <a:spcPts val="827"/>
         </a:spcBef>
         <a:buFont typeface="Arial" panose="020B0604020202020204" pitchFamily="34" charset="0"/>
         <a:buChar char="•"/>
-        <a:defRPr sz="2240" kern="1200">
+        <a:defRPr sz="2314" kern="1200">
           <a:solidFill>
             <a:schemeClr val="tx1"/>
           </a:solidFill>
@@ -3148,16 +3153,16 @@
           <a:cs typeface="+mn-cs"/>
         </a:defRPr>
       </a:lvl1pPr>
-      <a:lvl2pPr marL="548640" indent="-182880" algn="l" defTabSz="731520" rtl="0" eaLnBrk="1" latinLnBrk="0" hangingPunct="1">
+      <a:lvl2pPr marL="566882" indent="-188961" algn="l" defTabSz="755843" rtl="0" eaLnBrk="1" latinLnBrk="0" hangingPunct="1">
         <a:lnSpc>
           <a:spcPct val="90000"/>
         </a:lnSpc>
         <a:spcBef>
-          <a:spcPts val="400"/>
+          <a:spcPts val="413"/>
         </a:spcBef>
         <a:buFont typeface="Arial" panose="020B0604020202020204" pitchFamily="34" charset="0"/>
         <a:buChar char="•"/>
-        <a:defRPr sz="1920" kern="1200">
+        <a:defRPr sz="1984" kern="1200">
           <a:solidFill>
             <a:schemeClr val="tx1"/>
           </a:solidFill>
@@ -3166,16 +3171,16 @@
           <a:cs typeface="+mn-cs"/>
         </a:defRPr>
       </a:lvl2pPr>
-      <a:lvl3pPr marL="914400" indent="-182880" algn="l" defTabSz="731520" rtl="0" eaLnBrk="1" latinLnBrk="0" hangingPunct="1">
+      <a:lvl3pPr marL="944804" indent="-188961" algn="l" defTabSz="755843" rtl="0" eaLnBrk="1" latinLnBrk="0" hangingPunct="1">
         <a:lnSpc>
           <a:spcPct val="90000"/>
         </a:lnSpc>
         <a:spcBef>
-          <a:spcPts val="400"/>
+          <a:spcPts val="413"/>
         </a:spcBef>
         <a:buFont typeface="Arial" panose="020B0604020202020204" pitchFamily="34" charset="0"/>
         <a:buChar char="•"/>
-        <a:defRPr sz="1600" kern="1200">
+        <a:defRPr sz="1653" kern="1200">
           <a:solidFill>
             <a:schemeClr val="tx1"/>
           </a:solidFill>
@@ -3184,16 +3189,16 @@
           <a:cs typeface="+mn-cs"/>
         </a:defRPr>
       </a:lvl3pPr>
-      <a:lvl4pPr marL="1280160" indent="-182880" algn="l" defTabSz="731520" rtl="0" eaLnBrk="1" latinLnBrk="0" hangingPunct="1">
+      <a:lvl4pPr marL="1322725" indent="-188961" algn="l" defTabSz="755843" rtl="0" eaLnBrk="1" latinLnBrk="0" hangingPunct="1">
         <a:lnSpc>
           <a:spcPct val="90000"/>
         </a:lnSpc>
         <a:spcBef>
-          <a:spcPts val="400"/>
+          <a:spcPts val="413"/>
         </a:spcBef>
         <a:buFont typeface="Arial" panose="020B0604020202020204" pitchFamily="34" charset="0"/>
         <a:buChar char="•"/>
-        <a:defRPr sz="1440" kern="1200">
+        <a:defRPr sz="1488" kern="1200">
           <a:solidFill>
             <a:schemeClr val="tx1"/>
           </a:solidFill>
@@ -3202,16 +3207,16 @@
           <a:cs typeface="+mn-cs"/>
         </a:defRPr>
       </a:lvl4pPr>
-      <a:lvl5pPr marL="1645920" indent="-182880" algn="l" defTabSz="731520" rtl="0" eaLnBrk="1" latinLnBrk="0" hangingPunct="1">
+      <a:lvl5pPr marL="1700647" indent="-188961" algn="l" defTabSz="755843" rtl="0" eaLnBrk="1" latinLnBrk="0" hangingPunct="1">
         <a:lnSpc>
           <a:spcPct val="90000"/>
         </a:lnSpc>
         <a:spcBef>
-          <a:spcPts val="400"/>
+          <a:spcPts val="413"/>
         </a:spcBef>
         <a:buFont typeface="Arial" panose="020B0604020202020204" pitchFamily="34" charset="0"/>
         <a:buChar char="•"/>
-        <a:defRPr sz="1440" kern="1200">
+        <a:defRPr sz="1488" kern="1200">
           <a:solidFill>
             <a:schemeClr val="tx1"/>
           </a:solidFill>
@@ -3220,16 +3225,16 @@
           <a:cs typeface="+mn-cs"/>
         </a:defRPr>
       </a:lvl5pPr>
-      <a:lvl6pPr marL="2011680" indent="-182880" algn="l" defTabSz="731520" rtl="0" eaLnBrk="1" latinLnBrk="0" hangingPunct="1">
+      <a:lvl6pPr marL="2078568" indent="-188961" algn="l" defTabSz="755843" rtl="0" eaLnBrk="1" latinLnBrk="0" hangingPunct="1">
         <a:lnSpc>
           <a:spcPct val="90000"/>
         </a:lnSpc>
         <a:spcBef>
-          <a:spcPts val="400"/>
+          <a:spcPts val="413"/>
         </a:spcBef>
         <a:buFont typeface="Arial" panose="020B0604020202020204" pitchFamily="34" charset="0"/>
         <a:buChar char="•"/>
-        <a:defRPr sz="1440" kern="1200">
+        <a:defRPr sz="1488" kern="1200">
           <a:solidFill>
             <a:schemeClr val="tx1"/>
           </a:solidFill>
@@ -3238,16 +3243,16 @@
           <a:cs typeface="+mn-cs"/>
         </a:defRPr>
       </a:lvl6pPr>
-      <a:lvl7pPr marL="2377440" indent="-182880" algn="l" defTabSz="731520" rtl="0" eaLnBrk="1" latinLnBrk="0" hangingPunct="1">
+      <a:lvl7pPr marL="2456490" indent="-188961" algn="l" defTabSz="755843" rtl="0" eaLnBrk="1" latinLnBrk="0" hangingPunct="1">
         <a:lnSpc>
           <a:spcPct val="90000"/>
         </a:lnSpc>
         <a:spcBef>
-          <a:spcPts val="400"/>
+          <a:spcPts val="413"/>
         </a:spcBef>
         <a:buFont typeface="Arial" panose="020B0604020202020204" pitchFamily="34" charset="0"/>
         <a:buChar char="•"/>
-        <a:defRPr sz="1440" kern="1200">
+        <a:defRPr sz="1488" kern="1200">
           <a:solidFill>
             <a:schemeClr val="tx1"/>
           </a:solidFill>
@@ -3256,16 +3261,16 @@
           <a:cs typeface="+mn-cs"/>
         </a:defRPr>
       </a:lvl7pPr>
-      <a:lvl8pPr marL="2743200" indent="-182880" algn="l" defTabSz="731520" rtl="0" eaLnBrk="1" latinLnBrk="0" hangingPunct="1">
+      <a:lvl8pPr marL="2834411" indent="-188961" algn="l" defTabSz="755843" rtl="0" eaLnBrk="1" latinLnBrk="0" hangingPunct="1">
         <a:lnSpc>
           <a:spcPct val="90000"/>
         </a:lnSpc>
         <a:spcBef>
-          <a:spcPts val="400"/>
+          <a:spcPts val="413"/>
         </a:spcBef>
         <a:buFont typeface="Arial" panose="020B0604020202020204" pitchFamily="34" charset="0"/>
         <a:buChar char="•"/>
-        <a:defRPr sz="1440" kern="1200">
+        <a:defRPr sz="1488" kern="1200">
           <a:solidFill>
             <a:schemeClr val="tx1"/>
           </a:solidFill>
@@ -3274,16 +3279,16 @@
           <a:cs typeface="+mn-cs"/>
         </a:defRPr>
       </a:lvl8pPr>
-      <a:lvl9pPr marL="3108960" indent="-182880" algn="l" defTabSz="731520" rtl="0" eaLnBrk="1" latinLnBrk="0" hangingPunct="1">
+      <a:lvl9pPr marL="3212333" indent="-188961" algn="l" defTabSz="755843" rtl="0" eaLnBrk="1" latinLnBrk="0" hangingPunct="1">
         <a:lnSpc>
           <a:spcPct val="90000"/>
         </a:lnSpc>
         <a:spcBef>
-          <a:spcPts val="400"/>
+          <a:spcPts val="413"/>
         </a:spcBef>
         <a:buFont typeface="Arial" panose="020B0604020202020204" pitchFamily="34" charset="0"/>
         <a:buChar char="•"/>
-        <a:defRPr sz="1440" kern="1200">
+        <a:defRPr sz="1488" kern="1200">
           <a:solidFill>
             <a:schemeClr val="tx1"/>
           </a:solidFill>
@@ -3297,8 +3302,8 @@
       <a:defPPr>
         <a:defRPr lang="en-US"/>
       </a:defPPr>
-      <a:lvl1pPr marL="0" algn="l" defTabSz="731520" rtl="0" eaLnBrk="1" latinLnBrk="0" hangingPunct="1">
-        <a:defRPr sz="1440" kern="1200">
+      <a:lvl1pPr marL="0" algn="l" defTabSz="755843" rtl="0" eaLnBrk="1" latinLnBrk="0" hangingPunct="1">
+        <a:defRPr sz="1488" kern="1200">
           <a:solidFill>
             <a:schemeClr val="tx1"/>
           </a:solidFill>
@@ -3307,8 +3312,8 @@
           <a:cs typeface="+mn-cs"/>
         </a:defRPr>
       </a:lvl1pPr>
-      <a:lvl2pPr marL="365760" algn="l" defTabSz="731520" rtl="0" eaLnBrk="1" latinLnBrk="0" hangingPunct="1">
-        <a:defRPr sz="1440" kern="1200">
+      <a:lvl2pPr marL="377922" algn="l" defTabSz="755843" rtl="0" eaLnBrk="1" latinLnBrk="0" hangingPunct="1">
+        <a:defRPr sz="1488" kern="1200">
           <a:solidFill>
             <a:schemeClr val="tx1"/>
           </a:solidFill>
@@ -3317,8 +3322,8 @@
           <a:cs typeface="+mn-cs"/>
         </a:defRPr>
       </a:lvl2pPr>
-      <a:lvl3pPr marL="731520" algn="l" defTabSz="731520" rtl="0" eaLnBrk="1" latinLnBrk="0" hangingPunct="1">
-        <a:defRPr sz="1440" kern="1200">
+      <a:lvl3pPr marL="755843" algn="l" defTabSz="755843" rtl="0" eaLnBrk="1" latinLnBrk="0" hangingPunct="1">
+        <a:defRPr sz="1488" kern="1200">
           <a:solidFill>
             <a:schemeClr val="tx1"/>
           </a:solidFill>
@@ -3327,8 +3332,8 @@
           <a:cs typeface="+mn-cs"/>
         </a:defRPr>
       </a:lvl3pPr>
-      <a:lvl4pPr marL="1097280" algn="l" defTabSz="731520" rtl="0" eaLnBrk="1" latinLnBrk="0" hangingPunct="1">
-        <a:defRPr sz="1440" kern="1200">
+      <a:lvl4pPr marL="1133765" algn="l" defTabSz="755843" rtl="0" eaLnBrk="1" latinLnBrk="0" hangingPunct="1">
+        <a:defRPr sz="1488" kern="1200">
           <a:solidFill>
             <a:schemeClr val="tx1"/>
           </a:solidFill>
@@ -3337,8 +3342,8 @@
           <a:cs typeface="+mn-cs"/>
         </a:defRPr>
       </a:lvl4pPr>
-      <a:lvl5pPr marL="1463040" algn="l" defTabSz="731520" rtl="0" eaLnBrk="1" latinLnBrk="0" hangingPunct="1">
-        <a:defRPr sz="1440" kern="1200">
+      <a:lvl5pPr marL="1511686" algn="l" defTabSz="755843" rtl="0" eaLnBrk="1" latinLnBrk="0" hangingPunct="1">
+        <a:defRPr sz="1488" kern="1200">
           <a:solidFill>
             <a:schemeClr val="tx1"/>
           </a:solidFill>
@@ -3347,8 +3352,8 @@
           <a:cs typeface="+mn-cs"/>
         </a:defRPr>
       </a:lvl5pPr>
-      <a:lvl6pPr marL="1828800" algn="l" defTabSz="731520" rtl="0" eaLnBrk="1" latinLnBrk="0" hangingPunct="1">
-        <a:defRPr sz="1440" kern="1200">
+      <a:lvl6pPr marL="1889608" algn="l" defTabSz="755843" rtl="0" eaLnBrk="1" latinLnBrk="0" hangingPunct="1">
+        <a:defRPr sz="1488" kern="1200">
           <a:solidFill>
             <a:schemeClr val="tx1"/>
           </a:solidFill>
@@ -3357,8 +3362,8 @@
           <a:cs typeface="+mn-cs"/>
         </a:defRPr>
       </a:lvl6pPr>
-      <a:lvl7pPr marL="2194560" algn="l" defTabSz="731520" rtl="0" eaLnBrk="1" latinLnBrk="0" hangingPunct="1">
-        <a:defRPr sz="1440" kern="1200">
+      <a:lvl7pPr marL="2267529" algn="l" defTabSz="755843" rtl="0" eaLnBrk="1" latinLnBrk="0" hangingPunct="1">
+        <a:defRPr sz="1488" kern="1200">
           <a:solidFill>
             <a:schemeClr val="tx1"/>
           </a:solidFill>
@@ -3367,8 +3372,8 @@
           <a:cs typeface="+mn-cs"/>
         </a:defRPr>
       </a:lvl7pPr>
-      <a:lvl8pPr marL="2560320" algn="l" defTabSz="731520" rtl="0" eaLnBrk="1" latinLnBrk="0" hangingPunct="1">
-        <a:defRPr sz="1440" kern="1200">
+      <a:lvl8pPr marL="2645451" algn="l" defTabSz="755843" rtl="0" eaLnBrk="1" latinLnBrk="0" hangingPunct="1">
+        <a:defRPr sz="1488" kern="1200">
           <a:solidFill>
             <a:schemeClr val="tx1"/>
           </a:solidFill>
@@ -3377,8 +3382,8 @@
           <a:cs typeface="+mn-cs"/>
         </a:defRPr>
       </a:lvl8pPr>
-      <a:lvl9pPr marL="2926080" algn="l" defTabSz="731520" rtl="0" eaLnBrk="1" latinLnBrk="0" hangingPunct="1">
-        <a:defRPr sz="1440" kern="1200">
+      <a:lvl9pPr marL="3023372" algn="l" defTabSz="755843" rtl="0" eaLnBrk="1" latinLnBrk="0" hangingPunct="1">
+        <a:defRPr sz="1488" kern="1200">
           <a:solidFill>
             <a:schemeClr val="tx1"/>
           </a:solidFill>
@@ -3423,10 +3428,10 @@
         </p:nvGrpSpPr>
         <p:grpSpPr>
           <a:xfrm>
-            <a:off x="5268437" y="206962"/>
-            <a:ext cx="6998383" cy="5126803"/>
-            <a:chOff x="6293374" y="688153"/>
-            <a:chExt cx="5727372" cy="4091233"/>
+            <a:off x="5791799" y="298246"/>
+            <a:ext cx="6848403" cy="5126803"/>
+            <a:chOff x="6416115" y="688153"/>
+            <a:chExt cx="5604631" cy="4091233"/>
           </a:xfrm>
         </p:grpSpPr>
         <p:pic>
@@ -3445,13 +3450,13 @@
           </p:nvPicPr>
           <p:blipFill rotWithShape="1">
             <a:blip r:embed="rId3"/>
-            <a:srcRect l="50664" t="18698" r="5363" b="20030"/>
+            <a:srcRect l="51617" t="18698" r="5362" b="20030"/>
             <a:stretch/>
           </p:blipFill>
           <p:spPr>
             <a:xfrm>
-              <a:off x="6293374" y="688153"/>
-              <a:ext cx="5666142" cy="4091233"/>
+              <a:off x="6416115" y="688153"/>
+              <a:ext cx="5543401" cy="4091233"/>
             </a:xfrm>
             <a:prstGeom prst="rect">
               <a:avLst/>
@@ -3473,7 +3478,7 @@
           <p:spPr>
             <a:xfrm>
               <a:off x="7286920" y="4062954"/>
-              <a:ext cx="961534" cy="400110"/>
+              <a:ext cx="961534" cy="319291"/>
             </a:xfrm>
             <a:prstGeom prst="rect">
               <a:avLst/>
@@ -3510,7 +3515,7 @@
           <p:spPr>
             <a:xfrm>
               <a:off x="8647188" y="4062954"/>
-              <a:ext cx="961534" cy="400110"/>
+              <a:ext cx="961534" cy="319291"/>
             </a:xfrm>
             <a:prstGeom prst="rect">
               <a:avLst/>
@@ -3547,7 +3552,7 @@
           <p:spPr>
             <a:xfrm>
               <a:off x="9777167" y="4062954"/>
-              <a:ext cx="961534" cy="400110"/>
+              <a:ext cx="961534" cy="319291"/>
             </a:xfrm>
             <a:prstGeom prst="rect">
               <a:avLst/>
@@ -3584,7 +3589,7 @@
           <p:spPr>
             <a:xfrm>
               <a:off x="11059212" y="4062954"/>
-              <a:ext cx="961534" cy="400110"/>
+              <a:ext cx="961534" cy="319291"/>
             </a:xfrm>
             <a:prstGeom prst="rect">
               <a:avLst/>
@@ -3676,7 +3681,7 @@
           <p:spPr>
             <a:xfrm>
               <a:off x="8358608" y="3035432"/>
-              <a:ext cx="617281" cy="369332"/>
+              <a:ext cx="617281" cy="294730"/>
             </a:xfrm>
             <a:prstGeom prst="rect">
               <a:avLst/>
@@ -3690,58 +3695,6 @@
             <a:lstStyle/>
             <a:p>
               <a:endParaRPr lang="en-US" dirty="0"/>
-            </a:p>
-          </p:txBody>
-        </p:sp>
-        <p:sp>
-          <p:nvSpPr>
-            <p:cNvPr id="47" name="7-Point Star 46">
-              <a:extLst>
-                <a:ext uri="{FF2B5EF4-FFF2-40B4-BE49-F238E27FC236}">
-                  <a16:creationId xmlns:a16="http://schemas.microsoft.com/office/drawing/2014/main" id="{1B26ADEB-EBD4-F045-B92C-E6E3F95871FF}"/>
-                </a:ext>
-              </a:extLst>
-            </p:cNvPr>
-            <p:cNvSpPr/>
-            <p:nvPr/>
-          </p:nvSpPr>
-          <p:spPr>
-            <a:xfrm>
-              <a:off x="7654286" y="2310328"/>
-              <a:ext cx="75718" cy="117381"/>
-            </a:xfrm>
-            <a:prstGeom prst="star7">
-              <a:avLst/>
-            </a:prstGeom>
-            <a:solidFill>
-              <a:srgbClr val="00B050"/>
-            </a:solidFill>
-            <a:ln>
-              <a:noFill/>
-            </a:ln>
-          </p:spPr>
-          <p:style>
-            <a:lnRef idx="2">
-              <a:schemeClr val="accent1">
-                <a:shade val="50000"/>
-              </a:schemeClr>
-            </a:lnRef>
-            <a:fillRef idx="1">
-              <a:schemeClr val="accent1"/>
-            </a:fillRef>
-            <a:effectRef idx="0">
-              <a:schemeClr val="accent1"/>
-            </a:effectRef>
-            <a:fontRef idx="minor">
-              <a:schemeClr val="lt1"/>
-            </a:fontRef>
-          </p:style>
-          <p:txBody>
-            <a:bodyPr rtlCol="0" anchor="ctr"/>
-            <a:lstStyle/>
-            <a:p>
-              <a:pPr algn="ctr"/>
-              <a:endParaRPr lang="en-US"/>
             </a:p>
           </p:txBody>
         </p:sp>
@@ -3760,10 +3713,10 @@
         </p:nvGrpSpPr>
         <p:grpSpPr>
           <a:xfrm>
-            <a:off x="9429" y="80107"/>
-            <a:ext cx="5653411" cy="5206524"/>
-            <a:chOff x="551634" y="1071135"/>
-            <a:chExt cx="5144719" cy="4600835"/>
+            <a:off x="321854" y="171390"/>
+            <a:ext cx="5811319" cy="5206525"/>
+            <a:chOff x="551635" y="1071134"/>
+            <a:chExt cx="5144718" cy="4600836"/>
           </a:xfrm>
         </p:grpSpPr>
         <p:pic>
@@ -3782,13 +3735,13 @@
           </p:nvPicPr>
           <p:blipFill rotWithShape="1">
             <a:blip r:embed="rId3"/>
-            <a:srcRect l="4524" t="11233" r="54689" b="11985"/>
+            <a:srcRect l="4524" t="11233" r="57253" b="11985"/>
             <a:stretch/>
           </p:blipFill>
           <p:spPr>
             <a:xfrm>
-              <a:off x="551634" y="1141581"/>
-              <a:ext cx="4972706" cy="4530389"/>
+              <a:off x="551635" y="1141581"/>
+              <a:ext cx="4660043" cy="4530389"/>
             </a:xfrm>
             <a:prstGeom prst="rect">
               <a:avLst/>
@@ -3944,8 +3897,8 @@
           </p:nvSpPr>
           <p:spPr>
             <a:xfrm rot="16200000">
-              <a:off x="4069501" y="1574853"/>
-              <a:ext cx="1407546" cy="400110"/>
+              <a:off x="4069501" y="1592853"/>
+              <a:ext cx="1407546" cy="364108"/>
             </a:xfrm>
             <a:prstGeom prst="rect">
               <a:avLst/>
@@ -4041,7 +3994,7 @@
           <p:spPr>
             <a:xfrm>
               <a:off x="4255228" y="2714928"/>
-              <a:ext cx="991270" cy="553998"/>
+              <a:ext cx="991270" cy="489550"/>
             </a:xfrm>
             <a:prstGeom prst="rect">
               <a:avLst/>
@@ -4086,7 +4039,7 @@
           <p:spPr>
             <a:xfrm>
               <a:off x="4329138" y="3550153"/>
-              <a:ext cx="1367215" cy="553998"/>
+              <a:ext cx="1367215" cy="489550"/>
             </a:xfrm>
             <a:prstGeom prst="rect">
               <a:avLst/>
@@ -4131,7 +4084,7 @@
           <p:spPr>
             <a:xfrm>
               <a:off x="2556628" y="3485535"/>
-              <a:ext cx="991270" cy="553998"/>
+              <a:ext cx="991270" cy="489550"/>
             </a:xfrm>
             <a:prstGeom prst="rect">
               <a:avLst/>
@@ -4176,7 +4129,7 @@
           <p:spPr>
             <a:xfrm>
               <a:off x="3178969" y="2658540"/>
-              <a:ext cx="928620" cy="553998"/>
+              <a:ext cx="928620" cy="489550"/>
             </a:xfrm>
             <a:prstGeom prst="rect">
               <a:avLst/>
@@ -4221,7 +4174,7 @@
           <p:spPr>
             <a:xfrm>
               <a:off x="2180683" y="2437929"/>
-              <a:ext cx="1367215" cy="553998"/>
+              <a:ext cx="1367215" cy="489550"/>
             </a:xfrm>
             <a:prstGeom prst="rect">
               <a:avLst/>
@@ -4266,7 +4219,7 @@
         </p:nvSpPr>
         <p:spPr>
           <a:xfrm rot="5400000">
-            <a:off x="4587614" y="2989874"/>
+            <a:off x="5071646" y="2896312"/>
             <a:ext cx="961534" cy="400110"/>
           </a:xfrm>
           <a:prstGeom prst="rect">
@@ -4303,7 +4256,7 @@
         </p:nvSpPr>
         <p:spPr>
           <a:xfrm>
-            <a:off x="2069986" y="301966"/>
+            <a:off x="2382406" y="393247"/>
             <a:ext cx="961534" cy="400110"/>
           </a:xfrm>
           <a:prstGeom prst="rect">
@@ -4317,6 +4270,7 @@
           </a:bodyPr>
           <a:lstStyle/>
           <a:p>
+            <a:pPr algn="ctr"/>
             <a:r>
               <a:rPr lang="en-US" sz="2000" dirty="0">
                 <a:latin typeface="Times" pitchFamily="2" charset="0"/>
@@ -4340,7 +4294,7 @@
         </p:nvSpPr>
         <p:spPr>
           <a:xfrm rot="16200000">
-            <a:off x="-213725" y="2414312"/>
+            <a:off x="98695" y="2505593"/>
             <a:ext cx="961534" cy="400110"/>
           </a:xfrm>
           <a:prstGeom prst="rect">
@@ -4354,6 +4308,7 @@
           </a:bodyPr>
           <a:lstStyle/>
           <a:p>
+            <a:pPr algn="ctr"/>
             <a:r>
               <a:rPr lang="en-US" sz="2000" dirty="0">
                 <a:latin typeface="Times" pitchFamily="2" charset="0"/>
@@ -4377,7 +4332,7 @@
         </p:nvSpPr>
         <p:spPr>
           <a:xfrm>
-            <a:off x="2069986" y="4858428"/>
+            <a:off x="2382406" y="4949709"/>
             <a:ext cx="961534" cy="400110"/>
           </a:xfrm>
           <a:prstGeom prst="rect">
@@ -4391,6 +4346,7 @@
           </a:bodyPr>
           <a:lstStyle/>
           <a:p>
+            <a:pPr algn="ctr"/>
             <a:r>
               <a:rPr lang="en-US" sz="2000" dirty="0">
                 <a:latin typeface="Times" pitchFamily="2" charset="0"/>
@@ -4414,7 +4370,7 @@
         </p:nvSpPr>
         <p:spPr>
           <a:xfrm>
-            <a:off x="4747822" y="-119680"/>
+            <a:off x="5081204" y="-89851"/>
             <a:ext cx="240326" cy="477054"/>
           </a:xfrm>
           <a:prstGeom prst="rect">
@@ -4451,7 +4407,7 @@
         </p:nvSpPr>
         <p:spPr>
           <a:xfrm>
-            <a:off x="-83868" y="-111286"/>
+            <a:off x="264228" y="-89851"/>
             <a:ext cx="240326" cy="477054"/>
           </a:xfrm>
           <a:prstGeom prst="rect">
@@ -4488,7 +4444,7 @@
         </p:nvSpPr>
         <p:spPr>
           <a:xfrm>
-            <a:off x="-53176" y="5166901"/>
+            <a:off x="264228" y="5328124"/>
             <a:ext cx="240326" cy="477054"/>
           </a:xfrm>
           <a:prstGeom prst="rect">
@@ -4525,7 +4481,7 @@
         </p:nvSpPr>
         <p:spPr>
           <a:xfrm>
-            <a:off x="4673425" y="5155761"/>
+            <a:off x="5068921" y="5312911"/>
             <a:ext cx="240326" cy="477054"/>
           </a:xfrm>
           <a:prstGeom prst="rect">
@@ -4562,7 +4518,7 @@
         </p:nvSpPr>
         <p:spPr>
           <a:xfrm rot="16200000">
-            <a:off x="9576781" y="2331664"/>
+            <a:off x="9950164" y="2422945"/>
             <a:ext cx="1822275" cy="400110"/>
           </a:xfrm>
           <a:prstGeom prst="rect">
@@ -4617,7 +4573,7 @@
         </p:nvSpPr>
         <p:spPr>
           <a:xfrm>
-            <a:off x="7690068" y="519830"/>
+            <a:off x="8063448" y="611111"/>
             <a:ext cx="290938" cy="3968766"/>
           </a:xfrm>
           <a:prstGeom prst="rect">
@@ -4671,7 +4627,7 @@
         </p:nvSpPr>
         <p:spPr>
           <a:xfrm rot="16200000">
-            <a:off x="6918993" y="3211356"/>
+            <a:off x="7292376" y="3302637"/>
             <a:ext cx="1822275" cy="400110"/>
           </a:xfrm>
           <a:prstGeom prst="rect">
@@ -4744,7 +4700,7 @@
         </p:nvSpPr>
         <p:spPr>
           <a:xfrm rot="16200000">
-            <a:off x="7458386" y="2450152"/>
+            <a:off x="7831769" y="2541433"/>
             <a:ext cx="1822275" cy="400110"/>
           </a:xfrm>
           <a:prstGeom prst="rect">
@@ -4799,7 +4755,7 @@
         </p:nvSpPr>
         <p:spPr>
           <a:xfrm>
-            <a:off x="10630910" y="522284"/>
+            <a:off x="11004290" y="613565"/>
             <a:ext cx="290938" cy="3968766"/>
           </a:xfrm>
           <a:prstGeom prst="rect">
@@ -4853,7 +4809,7 @@
         </p:nvSpPr>
         <p:spPr>
           <a:xfrm rot="16200000">
-            <a:off x="10426313" y="2434815"/>
+            <a:off x="10799696" y="2526096"/>
             <a:ext cx="1822275" cy="400110"/>
           </a:xfrm>
           <a:prstGeom prst="rect">
@@ -4908,7 +4864,7 @@
         </p:nvSpPr>
         <p:spPr>
           <a:xfrm rot="16200000">
-            <a:off x="9865242" y="3113240"/>
+            <a:off x="10238625" y="3204521"/>
             <a:ext cx="1822275" cy="400110"/>
           </a:xfrm>
           <a:prstGeom prst="rect">
@@ -4967,6 +4923,2213 @@
           </a:p>
         </p:txBody>
       </p:sp>
+      <p:sp>
+        <p:nvSpPr>
+          <p:cNvPr id="5" name="Oval 4">
+            <a:extLst>
+              <a:ext uri="{FF2B5EF4-FFF2-40B4-BE49-F238E27FC236}">
+                <a16:creationId xmlns:a16="http://schemas.microsoft.com/office/drawing/2014/main" id="{88D86A40-F5E6-764C-A83E-CF4765DB8589}"/>
+              </a:ext>
+            </a:extLst>
+          </p:cNvPr>
+          <p:cNvSpPr/>
+          <p:nvPr/>
+        </p:nvSpPr>
+        <p:spPr>
+          <a:xfrm>
+            <a:off x="7286982" y="2356646"/>
+            <a:ext cx="84779" cy="84779"/>
+          </a:xfrm>
+          <a:prstGeom prst="ellipse">
+            <a:avLst/>
+          </a:prstGeom>
+          <a:solidFill>
+            <a:srgbClr val="00B050"/>
+          </a:solidFill>
+          <a:ln>
+            <a:solidFill>
+              <a:srgbClr val="00B050"/>
+            </a:solidFill>
+          </a:ln>
+        </p:spPr>
+        <p:style>
+          <a:lnRef idx="2">
+            <a:schemeClr val="accent1">
+              <a:shade val="50000"/>
+            </a:schemeClr>
+          </a:lnRef>
+          <a:fillRef idx="1">
+            <a:schemeClr val="accent1"/>
+          </a:fillRef>
+          <a:effectRef idx="0">
+            <a:schemeClr val="accent1"/>
+          </a:effectRef>
+          <a:fontRef idx="minor">
+            <a:schemeClr val="lt1"/>
+          </a:fontRef>
+        </p:style>
+        <p:txBody>
+          <a:bodyPr rot="0" spcFirstLastPara="0" vertOverflow="overflow" horzOverflow="overflow" vert="horz" wrap="square" lIns="91440" tIns="45720" rIns="91440" bIns="45720" numCol="1" spcCol="0" rtlCol="0" fromWordArt="0" anchor="ctr" anchorCtr="0" forceAA="0" compatLnSpc="1">
+            <a:prstTxWarp prst="textNoShape">
+              <a:avLst/>
+            </a:prstTxWarp>
+            <a:noAutofit/>
+          </a:bodyPr>
+          <a:lstStyle/>
+          <a:p>
+            <a:pPr algn="ctr"/>
+            <a:endParaRPr lang="en-US"/>
+          </a:p>
+        </p:txBody>
+      </p:sp>
+      <p:sp>
+        <p:nvSpPr>
+          <p:cNvPr id="41" name="Oval 40">
+            <a:extLst>
+              <a:ext uri="{FF2B5EF4-FFF2-40B4-BE49-F238E27FC236}">
+                <a16:creationId xmlns:a16="http://schemas.microsoft.com/office/drawing/2014/main" id="{E5FC5B3E-3FD8-9749-BAC1-97FB1B9D3C7D}"/>
+              </a:ext>
+            </a:extLst>
+          </p:cNvPr>
+          <p:cNvSpPr/>
+          <p:nvPr/>
+        </p:nvSpPr>
+        <p:spPr>
+          <a:xfrm>
+            <a:off x="5211355" y="2467663"/>
+            <a:ext cx="84779" cy="84779"/>
+          </a:xfrm>
+          <a:prstGeom prst="ellipse">
+            <a:avLst/>
+          </a:prstGeom>
+          <a:solidFill>
+            <a:srgbClr val="00B050"/>
+          </a:solidFill>
+          <a:ln>
+            <a:solidFill>
+              <a:srgbClr val="00B050"/>
+            </a:solidFill>
+          </a:ln>
+        </p:spPr>
+        <p:style>
+          <a:lnRef idx="2">
+            <a:schemeClr val="accent1">
+              <a:shade val="50000"/>
+            </a:schemeClr>
+          </a:lnRef>
+          <a:fillRef idx="1">
+            <a:schemeClr val="accent1"/>
+          </a:fillRef>
+          <a:effectRef idx="0">
+            <a:schemeClr val="accent1"/>
+          </a:effectRef>
+          <a:fontRef idx="minor">
+            <a:schemeClr val="lt1"/>
+          </a:fontRef>
+        </p:style>
+        <p:txBody>
+          <a:bodyPr rot="0" spcFirstLastPara="0" vertOverflow="overflow" horzOverflow="overflow" vert="horz" wrap="square" lIns="91440" tIns="45720" rIns="91440" bIns="45720" numCol="1" spcCol="0" rtlCol="0" fromWordArt="0" anchor="ctr" anchorCtr="0" forceAA="0" compatLnSpc="1">
+            <a:prstTxWarp prst="textNoShape">
+              <a:avLst/>
+            </a:prstTxWarp>
+            <a:noAutofit/>
+          </a:bodyPr>
+          <a:lstStyle/>
+          <a:p>
+            <a:pPr algn="ctr"/>
+            <a:endParaRPr lang="en-US"/>
+          </a:p>
+        </p:txBody>
+      </p:sp>
+      <p:grpSp>
+        <p:nvGrpSpPr>
+          <p:cNvPr id="60" name="Group 59">
+            <a:extLst>
+              <a:ext uri="{FF2B5EF4-FFF2-40B4-BE49-F238E27FC236}">
+                <a16:creationId xmlns:a16="http://schemas.microsoft.com/office/drawing/2014/main" id="{AD4761EE-4FFB-4945-BFFF-83E514F68365}"/>
+              </a:ext>
+            </a:extLst>
+          </p:cNvPr>
+          <p:cNvGrpSpPr/>
+          <p:nvPr/>
+        </p:nvGrpSpPr>
+        <p:grpSpPr>
+          <a:xfrm>
+            <a:off x="271180" y="415550"/>
+            <a:ext cx="156739" cy="4816625"/>
+            <a:chOff x="5108209" y="331702"/>
+            <a:chExt cx="156739" cy="4816625"/>
+          </a:xfrm>
+        </p:grpSpPr>
+        <p:cxnSp>
+          <p:nvCxnSpPr>
+            <p:cNvPr id="61" name="Straight Connector 60">
+              <a:extLst>
+                <a:ext uri="{FF2B5EF4-FFF2-40B4-BE49-F238E27FC236}">
+                  <a16:creationId xmlns:a16="http://schemas.microsoft.com/office/drawing/2014/main" id="{9D40E0C5-02DA-304D-B277-1CBC62ABE96E}"/>
+                </a:ext>
+              </a:extLst>
+            </p:cNvPr>
+            <p:cNvCxnSpPr/>
+            <p:nvPr/>
+          </p:nvCxnSpPr>
+          <p:spPr>
+            <a:xfrm>
+              <a:off x="5108209" y="5148327"/>
+              <a:ext cx="156739" cy="0"/>
+            </a:xfrm>
+            <a:prstGeom prst="line">
+              <a:avLst/>
+            </a:prstGeom>
+            <a:ln w="12700">
+              <a:solidFill>
+                <a:schemeClr val="bg1">
+                  <a:lumMod val="50000"/>
+                </a:schemeClr>
+              </a:solidFill>
+            </a:ln>
+            <a:effectLst/>
+          </p:spPr>
+          <p:style>
+            <a:lnRef idx="1">
+              <a:schemeClr val="accent1"/>
+            </a:lnRef>
+            <a:fillRef idx="0">
+              <a:schemeClr val="accent1"/>
+            </a:fillRef>
+            <a:effectRef idx="0">
+              <a:schemeClr val="accent1"/>
+            </a:effectRef>
+            <a:fontRef idx="minor">
+              <a:schemeClr val="tx1"/>
+            </a:fontRef>
+          </p:style>
+        </p:cxnSp>
+        <p:cxnSp>
+          <p:nvCxnSpPr>
+            <p:cNvPr id="62" name="Straight Connector 61">
+              <a:extLst>
+                <a:ext uri="{FF2B5EF4-FFF2-40B4-BE49-F238E27FC236}">
+                  <a16:creationId xmlns:a16="http://schemas.microsoft.com/office/drawing/2014/main" id="{570F71B5-EC3D-2E45-8AB4-ABA4E8C4215B}"/>
+                </a:ext>
+              </a:extLst>
+            </p:cNvPr>
+            <p:cNvCxnSpPr/>
+            <p:nvPr/>
+          </p:nvCxnSpPr>
+          <p:spPr>
+            <a:xfrm>
+              <a:off x="5108209" y="331702"/>
+              <a:ext cx="156739" cy="0"/>
+            </a:xfrm>
+            <a:prstGeom prst="line">
+              <a:avLst/>
+            </a:prstGeom>
+            <a:ln w="12700">
+              <a:solidFill>
+                <a:schemeClr val="bg1">
+                  <a:lumMod val="50000"/>
+                </a:schemeClr>
+              </a:solidFill>
+            </a:ln>
+            <a:effectLst/>
+          </p:spPr>
+          <p:style>
+            <a:lnRef idx="1">
+              <a:schemeClr val="accent1"/>
+            </a:lnRef>
+            <a:fillRef idx="0">
+              <a:schemeClr val="accent1"/>
+            </a:fillRef>
+            <a:effectRef idx="0">
+              <a:schemeClr val="accent1"/>
+            </a:effectRef>
+            <a:fontRef idx="minor">
+              <a:schemeClr val="tx1"/>
+            </a:fontRef>
+          </p:style>
+        </p:cxnSp>
+        <p:cxnSp>
+          <p:nvCxnSpPr>
+            <p:cNvPr id="63" name="Straight Connector 62">
+              <a:extLst>
+                <a:ext uri="{FF2B5EF4-FFF2-40B4-BE49-F238E27FC236}">
+                  <a16:creationId xmlns:a16="http://schemas.microsoft.com/office/drawing/2014/main" id="{6EBAF477-068C-6D49-8DD8-209CD8ED565E}"/>
+                </a:ext>
+              </a:extLst>
+            </p:cNvPr>
+            <p:cNvCxnSpPr/>
+            <p:nvPr/>
+          </p:nvCxnSpPr>
+          <p:spPr>
+            <a:xfrm>
+              <a:off x="5108209" y="2258352"/>
+              <a:ext cx="156739" cy="0"/>
+            </a:xfrm>
+            <a:prstGeom prst="line">
+              <a:avLst/>
+            </a:prstGeom>
+            <a:ln w="12700">
+              <a:solidFill>
+                <a:schemeClr val="bg1">
+                  <a:lumMod val="50000"/>
+                </a:schemeClr>
+              </a:solidFill>
+            </a:ln>
+            <a:effectLst/>
+          </p:spPr>
+          <p:style>
+            <a:lnRef idx="1">
+              <a:schemeClr val="accent1"/>
+            </a:lnRef>
+            <a:fillRef idx="0">
+              <a:schemeClr val="accent1"/>
+            </a:fillRef>
+            <a:effectRef idx="0">
+              <a:schemeClr val="accent1"/>
+            </a:effectRef>
+            <a:fontRef idx="minor">
+              <a:schemeClr val="tx1"/>
+            </a:fontRef>
+          </p:style>
+        </p:cxnSp>
+        <p:cxnSp>
+          <p:nvCxnSpPr>
+            <p:cNvPr id="64" name="Straight Connector 63">
+              <a:extLst>
+                <a:ext uri="{FF2B5EF4-FFF2-40B4-BE49-F238E27FC236}">
+                  <a16:creationId xmlns:a16="http://schemas.microsoft.com/office/drawing/2014/main" id="{F9175958-6A6E-0C4C-A668-20F988E7273E}"/>
+                </a:ext>
+              </a:extLst>
+            </p:cNvPr>
+            <p:cNvCxnSpPr/>
+            <p:nvPr/>
+          </p:nvCxnSpPr>
+          <p:spPr>
+            <a:xfrm>
+              <a:off x="5108209" y="1295027"/>
+              <a:ext cx="156739" cy="0"/>
+            </a:xfrm>
+            <a:prstGeom prst="line">
+              <a:avLst/>
+            </a:prstGeom>
+            <a:ln w="12700">
+              <a:solidFill>
+                <a:schemeClr val="bg1">
+                  <a:lumMod val="50000"/>
+                </a:schemeClr>
+              </a:solidFill>
+            </a:ln>
+            <a:effectLst/>
+          </p:spPr>
+          <p:style>
+            <a:lnRef idx="1">
+              <a:schemeClr val="accent1"/>
+            </a:lnRef>
+            <a:fillRef idx="0">
+              <a:schemeClr val="accent1"/>
+            </a:fillRef>
+            <a:effectRef idx="0">
+              <a:schemeClr val="accent1"/>
+            </a:effectRef>
+            <a:fontRef idx="minor">
+              <a:schemeClr val="tx1"/>
+            </a:fontRef>
+          </p:style>
+        </p:cxnSp>
+        <p:cxnSp>
+          <p:nvCxnSpPr>
+            <p:cNvPr id="65" name="Straight Connector 64">
+              <a:extLst>
+                <a:ext uri="{FF2B5EF4-FFF2-40B4-BE49-F238E27FC236}">
+                  <a16:creationId xmlns:a16="http://schemas.microsoft.com/office/drawing/2014/main" id="{EE0B9E0F-421F-5D42-AC01-D0503B1E497C}"/>
+                </a:ext>
+              </a:extLst>
+            </p:cNvPr>
+            <p:cNvCxnSpPr/>
+            <p:nvPr/>
+          </p:nvCxnSpPr>
+          <p:spPr>
+            <a:xfrm>
+              <a:off x="5108209" y="3221677"/>
+              <a:ext cx="156739" cy="0"/>
+            </a:xfrm>
+            <a:prstGeom prst="line">
+              <a:avLst/>
+            </a:prstGeom>
+            <a:ln w="12700">
+              <a:solidFill>
+                <a:schemeClr val="bg1">
+                  <a:lumMod val="50000"/>
+                </a:schemeClr>
+              </a:solidFill>
+            </a:ln>
+            <a:effectLst/>
+          </p:spPr>
+          <p:style>
+            <a:lnRef idx="1">
+              <a:schemeClr val="accent1"/>
+            </a:lnRef>
+            <a:fillRef idx="0">
+              <a:schemeClr val="accent1"/>
+            </a:fillRef>
+            <a:effectRef idx="0">
+              <a:schemeClr val="accent1"/>
+            </a:effectRef>
+            <a:fontRef idx="minor">
+              <a:schemeClr val="tx1"/>
+            </a:fontRef>
+          </p:style>
+        </p:cxnSp>
+        <p:cxnSp>
+          <p:nvCxnSpPr>
+            <p:cNvPr id="66" name="Straight Connector 65">
+              <a:extLst>
+                <a:ext uri="{FF2B5EF4-FFF2-40B4-BE49-F238E27FC236}">
+                  <a16:creationId xmlns:a16="http://schemas.microsoft.com/office/drawing/2014/main" id="{4FCAF423-6FE8-ED4B-928E-D13B02AAC88E}"/>
+                </a:ext>
+              </a:extLst>
+            </p:cNvPr>
+            <p:cNvCxnSpPr/>
+            <p:nvPr/>
+          </p:nvCxnSpPr>
+          <p:spPr>
+            <a:xfrm>
+              <a:off x="5108209" y="4185002"/>
+              <a:ext cx="156739" cy="0"/>
+            </a:xfrm>
+            <a:prstGeom prst="line">
+              <a:avLst/>
+            </a:prstGeom>
+            <a:ln w="12700">
+              <a:solidFill>
+                <a:schemeClr val="bg1">
+                  <a:lumMod val="50000"/>
+                </a:schemeClr>
+              </a:solidFill>
+            </a:ln>
+            <a:effectLst/>
+          </p:spPr>
+          <p:style>
+            <a:lnRef idx="1">
+              <a:schemeClr val="accent1"/>
+            </a:lnRef>
+            <a:fillRef idx="0">
+              <a:schemeClr val="accent1"/>
+            </a:fillRef>
+            <a:effectRef idx="0">
+              <a:schemeClr val="accent1"/>
+            </a:effectRef>
+            <a:fontRef idx="minor">
+              <a:schemeClr val="tx1"/>
+            </a:fontRef>
+          </p:style>
+        </p:cxnSp>
+      </p:grpSp>
+      <p:grpSp>
+        <p:nvGrpSpPr>
+          <p:cNvPr id="67" name="Group 66">
+            <a:extLst>
+              <a:ext uri="{FF2B5EF4-FFF2-40B4-BE49-F238E27FC236}">
+                <a16:creationId xmlns:a16="http://schemas.microsoft.com/office/drawing/2014/main" id="{B2942AD1-0FA2-7A4A-AEAF-28930D736150}"/>
+              </a:ext>
+            </a:extLst>
+          </p:cNvPr>
+          <p:cNvGrpSpPr/>
+          <p:nvPr/>
+        </p:nvGrpSpPr>
+        <p:grpSpPr>
+          <a:xfrm>
+            <a:off x="5255358" y="429996"/>
+            <a:ext cx="156739" cy="4816625"/>
+            <a:chOff x="5108209" y="331702"/>
+            <a:chExt cx="156739" cy="4816625"/>
+          </a:xfrm>
+        </p:grpSpPr>
+        <p:cxnSp>
+          <p:nvCxnSpPr>
+            <p:cNvPr id="68" name="Straight Connector 67">
+              <a:extLst>
+                <a:ext uri="{FF2B5EF4-FFF2-40B4-BE49-F238E27FC236}">
+                  <a16:creationId xmlns:a16="http://schemas.microsoft.com/office/drawing/2014/main" id="{15922D5C-0731-6045-9B07-35C1F6C62193}"/>
+                </a:ext>
+              </a:extLst>
+            </p:cNvPr>
+            <p:cNvCxnSpPr/>
+            <p:nvPr/>
+          </p:nvCxnSpPr>
+          <p:spPr>
+            <a:xfrm>
+              <a:off x="5108209" y="5148327"/>
+              <a:ext cx="156739" cy="0"/>
+            </a:xfrm>
+            <a:prstGeom prst="line">
+              <a:avLst/>
+            </a:prstGeom>
+            <a:ln w="12700">
+              <a:solidFill>
+                <a:schemeClr val="bg1">
+                  <a:lumMod val="50000"/>
+                </a:schemeClr>
+              </a:solidFill>
+            </a:ln>
+            <a:effectLst/>
+          </p:spPr>
+          <p:style>
+            <a:lnRef idx="1">
+              <a:schemeClr val="accent1"/>
+            </a:lnRef>
+            <a:fillRef idx="0">
+              <a:schemeClr val="accent1"/>
+            </a:fillRef>
+            <a:effectRef idx="0">
+              <a:schemeClr val="accent1"/>
+            </a:effectRef>
+            <a:fontRef idx="minor">
+              <a:schemeClr val="tx1"/>
+            </a:fontRef>
+          </p:style>
+        </p:cxnSp>
+        <p:cxnSp>
+          <p:nvCxnSpPr>
+            <p:cNvPr id="69" name="Straight Connector 68">
+              <a:extLst>
+                <a:ext uri="{FF2B5EF4-FFF2-40B4-BE49-F238E27FC236}">
+                  <a16:creationId xmlns:a16="http://schemas.microsoft.com/office/drawing/2014/main" id="{E2B7D82B-A7A5-654C-85F8-8DD4ED4D1260}"/>
+                </a:ext>
+              </a:extLst>
+            </p:cNvPr>
+            <p:cNvCxnSpPr/>
+            <p:nvPr/>
+          </p:nvCxnSpPr>
+          <p:spPr>
+            <a:xfrm>
+              <a:off x="5108209" y="331702"/>
+              <a:ext cx="156739" cy="0"/>
+            </a:xfrm>
+            <a:prstGeom prst="line">
+              <a:avLst/>
+            </a:prstGeom>
+            <a:ln w="12700">
+              <a:solidFill>
+                <a:schemeClr val="bg1">
+                  <a:lumMod val="50000"/>
+                </a:schemeClr>
+              </a:solidFill>
+            </a:ln>
+            <a:effectLst/>
+          </p:spPr>
+          <p:style>
+            <a:lnRef idx="1">
+              <a:schemeClr val="accent1"/>
+            </a:lnRef>
+            <a:fillRef idx="0">
+              <a:schemeClr val="accent1"/>
+            </a:fillRef>
+            <a:effectRef idx="0">
+              <a:schemeClr val="accent1"/>
+            </a:effectRef>
+            <a:fontRef idx="minor">
+              <a:schemeClr val="tx1"/>
+            </a:fontRef>
+          </p:style>
+        </p:cxnSp>
+        <p:cxnSp>
+          <p:nvCxnSpPr>
+            <p:cNvPr id="70" name="Straight Connector 69">
+              <a:extLst>
+                <a:ext uri="{FF2B5EF4-FFF2-40B4-BE49-F238E27FC236}">
+                  <a16:creationId xmlns:a16="http://schemas.microsoft.com/office/drawing/2014/main" id="{41B2D045-7279-4845-88B5-314ACE3B83D2}"/>
+                </a:ext>
+              </a:extLst>
+            </p:cNvPr>
+            <p:cNvCxnSpPr/>
+            <p:nvPr/>
+          </p:nvCxnSpPr>
+          <p:spPr>
+            <a:xfrm>
+              <a:off x="5108209" y="2258352"/>
+              <a:ext cx="156739" cy="0"/>
+            </a:xfrm>
+            <a:prstGeom prst="line">
+              <a:avLst/>
+            </a:prstGeom>
+            <a:ln w="12700">
+              <a:solidFill>
+                <a:schemeClr val="bg1">
+                  <a:lumMod val="50000"/>
+                </a:schemeClr>
+              </a:solidFill>
+            </a:ln>
+            <a:effectLst/>
+          </p:spPr>
+          <p:style>
+            <a:lnRef idx="1">
+              <a:schemeClr val="accent1"/>
+            </a:lnRef>
+            <a:fillRef idx="0">
+              <a:schemeClr val="accent1"/>
+            </a:fillRef>
+            <a:effectRef idx="0">
+              <a:schemeClr val="accent1"/>
+            </a:effectRef>
+            <a:fontRef idx="minor">
+              <a:schemeClr val="tx1"/>
+            </a:fontRef>
+          </p:style>
+        </p:cxnSp>
+        <p:cxnSp>
+          <p:nvCxnSpPr>
+            <p:cNvPr id="71" name="Straight Connector 70">
+              <a:extLst>
+                <a:ext uri="{FF2B5EF4-FFF2-40B4-BE49-F238E27FC236}">
+                  <a16:creationId xmlns:a16="http://schemas.microsoft.com/office/drawing/2014/main" id="{5E151DA7-82FC-C34A-9B51-E7B78942BE68}"/>
+                </a:ext>
+              </a:extLst>
+            </p:cNvPr>
+            <p:cNvCxnSpPr/>
+            <p:nvPr/>
+          </p:nvCxnSpPr>
+          <p:spPr>
+            <a:xfrm>
+              <a:off x="5108209" y="1295027"/>
+              <a:ext cx="156739" cy="0"/>
+            </a:xfrm>
+            <a:prstGeom prst="line">
+              <a:avLst/>
+            </a:prstGeom>
+            <a:ln w="12700">
+              <a:solidFill>
+                <a:schemeClr val="bg1">
+                  <a:lumMod val="50000"/>
+                </a:schemeClr>
+              </a:solidFill>
+            </a:ln>
+            <a:effectLst/>
+          </p:spPr>
+          <p:style>
+            <a:lnRef idx="1">
+              <a:schemeClr val="accent1"/>
+            </a:lnRef>
+            <a:fillRef idx="0">
+              <a:schemeClr val="accent1"/>
+            </a:fillRef>
+            <a:effectRef idx="0">
+              <a:schemeClr val="accent1"/>
+            </a:effectRef>
+            <a:fontRef idx="minor">
+              <a:schemeClr val="tx1"/>
+            </a:fontRef>
+          </p:style>
+        </p:cxnSp>
+        <p:cxnSp>
+          <p:nvCxnSpPr>
+            <p:cNvPr id="72" name="Straight Connector 71">
+              <a:extLst>
+                <a:ext uri="{FF2B5EF4-FFF2-40B4-BE49-F238E27FC236}">
+                  <a16:creationId xmlns:a16="http://schemas.microsoft.com/office/drawing/2014/main" id="{53B87DBF-3590-1A4A-A42F-022279017811}"/>
+                </a:ext>
+              </a:extLst>
+            </p:cNvPr>
+            <p:cNvCxnSpPr/>
+            <p:nvPr/>
+          </p:nvCxnSpPr>
+          <p:spPr>
+            <a:xfrm>
+              <a:off x="5108209" y="3221677"/>
+              <a:ext cx="156739" cy="0"/>
+            </a:xfrm>
+            <a:prstGeom prst="line">
+              <a:avLst/>
+            </a:prstGeom>
+            <a:ln w="12700">
+              <a:solidFill>
+                <a:schemeClr val="bg1">
+                  <a:lumMod val="50000"/>
+                </a:schemeClr>
+              </a:solidFill>
+            </a:ln>
+            <a:effectLst/>
+          </p:spPr>
+          <p:style>
+            <a:lnRef idx="1">
+              <a:schemeClr val="accent1"/>
+            </a:lnRef>
+            <a:fillRef idx="0">
+              <a:schemeClr val="accent1"/>
+            </a:fillRef>
+            <a:effectRef idx="0">
+              <a:schemeClr val="accent1"/>
+            </a:effectRef>
+            <a:fontRef idx="minor">
+              <a:schemeClr val="tx1"/>
+            </a:fontRef>
+          </p:style>
+        </p:cxnSp>
+        <p:cxnSp>
+          <p:nvCxnSpPr>
+            <p:cNvPr id="73" name="Straight Connector 72">
+              <a:extLst>
+                <a:ext uri="{FF2B5EF4-FFF2-40B4-BE49-F238E27FC236}">
+                  <a16:creationId xmlns:a16="http://schemas.microsoft.com/office/drawing/2014/main" id="{4991D540-086B-CC48-8790-6856896F9587}"/>
+                </a:ext>
+              </a:extLst>
+            </p:cNvPr>
+            <p:cNvCxnSpPr/>
+            <p:nvPr/>
+          </p:nvCxnSpPr>
+          <p:spPr>
+            <a:xfrm>
+              <a:off x="5108209" y="4185002"/>
+              <a:ext cx="156739" cy="0"/>
+            </a:xfrm>
+            <a:prstGeom prst="line">
+              <a:avLst/>
+            </a:prstGeom>
+            <a:ln w="12700">
+              <a:solidFill>
+                <a:schemeClr val="bg1">
+                  <a:lumMod val="50000"/>
+                </a:schemeClr>
+              </a:solidFill>
+            </a:ln>
+            <a:effectLst/>
+          </p:spPr>
+          <p:style>
+            <a:lnRef idx="1">
+              <a:schemeClr val="accent1"/>
+            </a:lnRef>
+            <a:fillRef idx="0">
+              <a:schemeClr val="accent1"/>
+            </a:fillRef>
+            <a:effectRef idx="0">
+              <a:schemeClr val="accent1"/>
+            </a:effectRef>
+            <a:fontRef idx="minor">
+              <a:schemeClr val="tx1"/>
+            </a:fontRef>
+          </p:style>
+        </p:cxnSp>
+      </p:grpSp>
+      <p:grpSp>
+        <p:nvGrpSpPr>
+          <p:cNvPr id="74" name="Group 73">
+            <a:extLst>
+              <a:ext uri="{FF2B5EF4-FFF2-40B4-BE49-F238E27FC236}">
+                <a16:creationId xmlns:a16="http://schemas.microsoft.com/office/drawing/2014/main" id="{DA69E43B-DBD1-0247-8A00-5A49DD2A884F}"/>
+              </a:ext>
+            </a:extLst>
+          </p:cNvPr>
+          <p:cNvGrpSpPr/>
+          <p:nvPr/>
+        </p:nvGrpSpPr>
+        <p:grpSpPr>
+          <a:xfrm rot="16200000">
+            <a:off x="2768455" y="-2073072"/>
+            <a:ext cx="156739" cy="4816625"/>
+            <a:chOff x="5108209" y="331702"/>
+            <a:chExt cx="156739" cy="4816625"/>
+          </a:xfrm>
+        </p:grpSpPr>
+        <p:cxnSp>
+          <p:nvCxnSpPr>
+            <p:cNvPr id="75" name="Straight Connector 74">
+              <a:extLst>
+                <a:ext uri="{FF2B5EF4-FFF2-40B4-BE49-F238E27FC236}">
+                  <a16:creationId xmlns:a16="http://schemas.microsoft.com/office/drawing/2014/main" id="{D4DE70E0-4794-EA40-80B3-00B31083BBBC}"/>
+                </a:ext>
+              </a:extLst>
+            </p:cNvPr>
+            <p:cNvCxnSpPr/>
+            <p:nvPr/>
+          </p:nvCxnSpPr>
+          <p:spPr>
+            <a:xfrm>
+              <a:off x="5108209" y="5148327"/>
+              <a:ext cx="156739" cy="0"/>
+            </a:xfrm>
+            <a:prstGeom prst="line">
+              <a:avLst/>
+            </a:prstGeom>
+            <a:ln w="12700">
+              <a:solidFill>
+                <a:schemeClr val="bg1">
+                  <a:lumMod val="50000"/>
+                </a:schemeClr>
+              </a:solidFill>
+            </a:ln>
+            <a:effectLst/>
+          </p:spPr>
+          <p:style>
+            <a:lnRef idx="1">
+              <a:schemeClr val="accent1"/>
+            </a:lnRef>
+            <a:fillRef idx="0">
+              <a:schemeClr val="accent1"/>
+            </a:fillRef>
+            <a:effectRef idx="0">
+              <a:schemeClr val="accent1"/>
+            </a:effectRef>
+            <a:fontRef idx="minor">
+              <a:schemeClr val="tx1"/>
+            </a:fontRef>
+          </p:style>
+        </p:cxnSp>
+        <p:cxnSp>
+          <p:nvCxnSpPr>
+            <p:cNvPr id="76" name="Straight Connector 75">
+              <a:extLst>
+                <a:ext uri="{FF2B5EF4-FFF2-40B4-BE49-F238E27FC236}">
+                  <a16:creationId xmlns:a16="http://schemas.microsoft.com/office/drawing/2014/main" id="{BD0E3CC9-0DEF-214A-B21D-31F4EA46E3B4}"/>
+                </a:ext>
+              </a:extLst>
+            </p:cNvPr>
+            <p:cNvCxnSpPr/>
+            <p:nvPr/>
+          </p:nvCxnSpPr>
+          <p:spPr>
+            <a:xfrm>
+              <a:off x="5108209" y="331702"/>
+              <a:ext cx="156739" cy="0"/>
+            </a:xfrm>
+            <a:prstGeom prst="line">
+              <a:avLst/>
+            </a:prstGeom>
+            <a:ln w="12700">
+              <a:solidFill>
+                <a:schemeClr val="bg1">
+                  <a:lumMod val="50000"/>
+                </a:schemeClr>
+              </a:solidFill>
+            </a:ln>
+            <a:effectLst/>
+          </p:spPr>
+          <p:style>
+            <a:lnRef idx="1">
+              <a:schemeClr val="accent1"/>
+            </a:lnRef>
+            <a:fillRef idx="0">
+              <a:schemeClr val="accent1"/>
+            </a:fillRef>
+            <a:effectRef idx="0">
+              <a:schemeClr val="accent1"/>
+            </a:effectRef>
+            <a:fontRef idx="minor">
+              <a:schemeClr val="tx1"/>
+            </a:fontRef>
+          </p:style>
+        </p:cxnSp>
+        <p:cxnSp>
+          <p:nvCxnSpPr>
+            <p:cNvPr id="77" name="Straight Connector 76">
+              <a:extLst>
+                <a:ext uri="{FF2B5EF4-FFF2-40B4-BE49-F238E27FC236}">
+                  <a16:creationId xmlns:a16="http://schemas.microsoft.com/office/drawing/2014/main" id="{A5418D20-8662-4E49-8812-7075DB4BA4C9}"/>
+                </a:ext>
+              </a:extLst>
+            </p:cNvPr>
+            <p:cNvCxnSpPr/>
+            <p:nvPr/>
+          </p:nvCxnSpPr>
+          <p:spPr>
+            <a:xfrm>
+              <a:off x="5108209" y="2258352"/>
+              <a:ext cx="156739" cy="0"/>
+            </a:xfrm>
+            <a:prstGeom prst="line">
+              <a:avLst/>
+            </a:prstGeom>
+            <a:ln w="12700">
+              <a:solidFill>
+                <a:schemeClr val="bg1">
+                  <a:lumMod val="50000"/>
+                </a:schemeClr>
+              </a:solidFill>
+            </a:ln>
+            <a:effectLst/>
+          </p:spPr>
+          <p:style>
+            <a:lnRef idx="1">
+              <a:schemeClr val="accent1"/>
+            </a:lnRef>
+            <a:fillRef idx="0">
+              <a:schemeClr val="accent1"/>
+            </a:fillRef>
+            <a:effectRef idx="0">
+              <a:schemeClr val="accent1"/>
+            </a:effectRef>
+            <a:fontRef idx="minor">
+              <a:schemeClr val="tx1"/>
+            </a:fontRef>
+          </p:style>
+        </p:cxnSp>
+        <p:cxnSp>
+          <p:nvCxnSpPr>
+            <p:cNvPr id="78" name="Straight Connector 77">
+              <a:extLst>
+                <a:ext uri="{FF2B5EF4-FFF2-40B4-BE49-F238E27FC236}">
+                  <a16:creationId xmlns:a16="http://schemas.microsoft.com/office/drawing/2014/main" id="{43697E09-D9CF-B943-A94F-6A887A5F2C2F}"/>
+                </a:ext>
+              </a:extLst>
+            </p:cNvPr>
+            <p:cNvCxnSpPr/>
+            <p:nvPr/>
+          </p:nvCxnSpPr>
+          <p:spPr>
+            <a:xfrm>
+              <a:off x="5108209" y="1295027"/>
+              <a:ext cx="156739" cy="0"/>
+            </a:xfrm>
+            <a:prstGeom prst="line">
+              <a:avLst/>
+            </a:prstGeom>
+            <a:ln w="12700">
+              <a:solidFill>
+                <a:schemeClr val="bg1">
+                  <a:lumMod val="50000"/>
+                </a:schemeClr>
+              </a:solidFill>
+            </a:ln>
+            <a:effectLst/>
+          </p:spPr>
+          <p:style>
+            <a:lnRef idx="1">
+              <a:schemeClr val="accent1"/>
+            </a:lnRef>
+            <a:fillRef idx="0">
+              <a:schemeClr val="accent1"/>
+            </a:fillRef>
+            <a:effectRef idx="0">
+              <a:schemeClr val="accent1"/>
+            </a:effectRef>
+            <a:fontRef idx="minor">
+              <a:schemeClr val="tx1"/>
+            </a:fontRef>
+          </p:style>
+        </p:cxnSp>
+        <p:cxnSp>
+          <p:nvCxnSpPr>
+            <p:cNvPr id="79" name="Straight Connector 78">
+              <a:extLst>
+                <a:ext uri="{FF2B5EF4-FFF2-40B4-BE49-F238E27FC236}">
+                  <a16:creationId xmlns:a16="http://schemas.microsoft.com/office/drawing/2014/main" id="{10EA2538-955C-7940-B07B-A6A7FF758066}"/>
+                </a:ext>
+              </a:extLst>
+            </p:cNvPr>
+            <p:cNvCxnSpPr/>
+            <p:nvPr/>
+          </p:nvCxnSpPr>
+          <p:spPr>
+            <a:xfrm>
+              <a:off x="5108209" y="3221677"/>
+              <a:ext cx="156739" cy="0"/>
+            </a:xfrm>
+            <a:prstGeom prst="line">
+              <a:avLst/>
+            </a:prstGeom>
+            <a:ln w="12700">
+              <a:solidFill>
+                <a:schemeClr val="bg1">
+                  <a:lumMod val="50000"/>
+                </a:schemeClr>
+              </a:solidFill>
+            </a:ln>
+            <a:effectLst/>
+          </p:spPr>
+          <p:style>
+            <a:lnRef idx="1">
+              <a:schemeClr val="accent1"/>
+            </a:lnRef>
+            <a:fillRef idx="0">
+              <a:schemeClr val="accent1"/>
+            </a:fillRef>
+            <a:effectRef idx="0">
+              <a:schemeClr val="accent1"/>
+            </a:effectRef>
+            <a:fontRef idx="minor">
+              <a:schemeClr val="tx1"/>
+            </a:fontRef>
+          </p:style>
+        </p:cxnSp>
+        <p:cxnSp>
+          <p:nvCxnSpPr>
+            <p:cNvPr id="80" name="Straight Connector 79">
+              <a:extLst>
+                <a:ext uri="{FF2B5EF4-FFF2-40B4-BE49-F238E27FC236}">
+                  <a16:creationId xmlns:a16="http://schemas.microsoft.com/office/drawing/2014/main" id="{186320FD-5042-8F44-80A1-91A47F1402CF}"/>
+                </a:ext>
+              </a:extLst>
+            </p:cNvPr>
+            <p:cNvCxnSpPr/>
+            <p:nvPr/>
+          </p:nvCxnSpPr>
+          <p:spPr>
+            <a:xfrm>
+              <a:off x="5108209" y="4185002"/>
+              <a:ext cx="156739" cy="0"/>
+            </a:xfrm>
+            <a:prstGeom prst="line">
+              <a:avLst/>
+            </a:prstGeom>
+            <a:ln w="12700">
+              <a:solidFill>
+                <a:schemeClr val="bg1">
+                  <a:lumMod val="50000"/>
+                </a:schemeClr>
+              </a:solidFill>
+            </a:ln>
+            <a:effectLst/>
+          </p:spPr>
+          <p:style>
+            <a:lnRef idx="1">
+              <a:schemeClr val="accent1"/>
+            </a:lnRef>
+            <a:fillRef idx="0">
+              <a:schemeClr val="accent1"/>
+            </a:fillRef>
+            <a:effectRef idx="0">
+              <a:schemeClr val="accent1"/>
+            </a:effectRef>
+            <a:fontRef idx="minor">
+              <a:schemeClr val="tx1"/>
+            </a:fontRef>
+          </p:style>
+        </p:cxnSp>
+      </p:grpSp>
+      <p:grpSp>
+        <p:nvGrpSpPr>
+          <p:cNvPr id="81" name="Group 80">
+            <a:extLst>
+              <a:ext uri="{FF2B5EF4-FFF2-40B4-BE49-F238E27FC236}">
+                <a16:creationId xmlns:a16="http://schemas.microsoft.com/office/drawing/2014/main" id="{AD4D3933-5C3F-5B4C-A67B-531AA0158331}"/>
+              </a:ext>
+            </a:extLst>
+          </p:cNvPr>
+          <p:cNvGrpSpPr/>
+          <p:nvPr/>
+        </p:nvGrpSpPr>
+        <p:grpSpPr>
+          <a:xfrm rot="16200000">
+            <a:off x="2773113" y="2916678"/>
+            <a:ext cx="156739" cy="4816625"/>
+            <a:chOff x="5108209" y="331702"/>
+            <a:chExt cx="156739" cy="4816625"/>
+          </a:xfrm>
+        </p:grpSpPr>
+        <p:cxnSp>
+          <p:nvCxnSpPr>
+            <p:cNvPr id="82" name="Straight Connector 81">
+              <a:extLst>
+                <a:ext uri="{FF2B5EF4-FFF2-40B4-BE49-F238E27FC236}">
+                  <a16:creationId xmlns:a16="http://schemas.microsoft.com/office/drawing/2014/main" id="{DDC9B483-7627-F740-B107-FF1A63869765}"/>
+                </a:ext>
+              </a:extLst>
+            </p:cNvPr>
+            <p:cNvCxnSpPr/>
+            <p:nvPr/>
+          </p:nvCxnSpPr>
+          <p:spPr>
+            <a:xfrm>
+              <a:off x="5108209" y="5148327"/>
+              <a:ext cx="156739" cy="0"/>
+            </a:xfrm>
+            <a:prstGeom prst="line">
+              <a:avLst/>
+            </a:prstGeom>
+            <a:ln w="12700">
+              <a:solidFill>
+                <a:schemeClr val="bg1">
+                  <a:lumMod val="50000"/>
+                </a:schemeClr>
+              </a:solidFill>
+            </a:ln>
+            <a:effectLst/>
+          </p:spPr>
+          <p:style>
+            <a:lnRef idx="1">
+              <a:schemeClr val="accent1"/>
+            </a:lnRef>
+            <a:fillRef idx="0">
+              <a:schemeClr val="accent1"/>
+            </a:fillRef>
+            <a:effectRef idx="0">
+              <a:schemeClr val="accent1"/>
+            </a:effectRef>
+            <a:fontRef idx="minor">
+              <a:schemeClr val="tx1"/>
+            </a:fontRef>
+          </p:style>
+        </p:cxnSp>
+        <p:cxnSp>
+          <p:nvCxnSpPr>
+            <p:cNvPr id="83" name="Straight Connector 82">
+              <a:extLst>
+                <a:ext uri="{FF2B5EF4-FFF2-40B4-BE49-F238E27FC236}">
+                  <a16:creationId xmlns:a16="http://schemas.microsoft.com/office/drawing/2014/main" id="{3D2E01FC-87AA-DF47-9555-33BB90DD4E1D}"/>
+                </a:ext>
+              </a:extLst>
+            </p:cNvPr>
+            <p:cNvCxnSpPr/>
+            <p:nvPr/>
+          </p:nvCxnSpPr>
+          <p:spPr>
+            <a:xfrm>
+              <a:off x="5108209" y="331702"/>
+              <a:ext cx="156739" cy="0"/>
+            </a:xfrm>
+            <a:prstGeom prst="line">
+              <a:avLst/>
+            </a:prstGeom>
+            <a:ln w="12700">
+              <a:solidFill>
+                <a:schemeClr val="bg1">
+                  <a:lumMod val="50000"/>
+                </a:schemeClr>
+              </a:solidFill>
+            </a:ln>
+            <a:effectLst/>
+          </p:spPr>
+          <p:style>
+            <a:lnRef idx="1">
+              <a:schemeClr val="accent1"/>
+            </a:lnRef>
+            <a:fillRef idx="0">
+              <a:schemeClr val="accent1"/>
+            </a:fillRef>
+            <a:effectRef idx="0">
+              <a:schemeClr val="accent1"/>
+            </a:effectRef>
+            <a:fontRef idx="minor">
+              <a:schemeClr val="tx1"/>
+            </a:fontRef>
+          </p:style>
+        </p:cxnSp>
+        <p:cxnSp>
+          <p:nvCxnSpPr>
+            <p:cNvPr id="84" name="Straight Connector 83">
+              <a:extLst>
+                <a:ext uri="{FF2B5EF4-FFF2-40B4-BE49-F238E27FC236}">
+                  <a16:creationId xmlns:a16="http://schemas.microsoft.com/office/drawing/2014/main" id="{5C399161-9539-3C42-A963-3F24407B69B9}"/>
+                </a:ext>
+              </a:extLst>
+            </p:cNvPr>
+            <p:cNvCxnSpPr/>
+            <p:nvPr/>
+          </p:nvCxnSpPr>
+          <p:spPr>
+            <a:xfrm>
+              <a:off x="5108209" y="2258352"/>
+              <a:ext cx="156739" cy="0"/>
+            </a:xfrm>
+            <a:prstGeom prst="line">
+              <a:avLst/>
+            </a:prstGeom>
+            <a:ln w="12700">
+              <a:solidFill>
+                <a:schemeClr val="bg1">
+                  <a:lumMod val="50000"/>
+                </a:schemeClr>
+              </a:solidFill>
+            </a:ln>
+            <a:effectLst/>
+          </p:spPr>
+          <p:style>
+            <a:lnRef idx="1">
+              <a:schemeClr val="accent1"/>
+            </a:lnRef>
+            <a:fillRef idx="0">
+              <a:schemeClr val="accent1"/>
+            </a:fillRef>
+            <a:effectRef idx="0">
+              <a:schemeClr val="accent1"/>
+            </a:effectRef>
+            <a:fontRef idx="minor">
+              <a:schemeClr val="tx1"/>
+            </a:fontRef>
+          </p:style>
+        </p:cxnSp>
+        <p:cxnSp>
+          <p:nvCxnSpPr>
+            <p:cNvPr id="85" name="Straight Connector 84">
+              <a:extLst>
+                <a:ext uri="{FF2B5EF4-FFF2-40B4-BE49-F238E27FC236}">
+                  <a16:creationId xmlns:a16="http://schemas.microsoft.com/office/drawing/2014/main" id="{2B3DA2D4-50AF-2D47-AF0E-EBBD33D21CCF}"/>
+                </a:ext>
+              </a:extLst>
+            </p:cNvPr>
+            <p:cNvCxnSpPr/>
+            <p:nvPr/>
+          </p:nvCxnSpPr>
+          <p:spPr>
+            <a:xfrm>
+              <a:off x="5108209" y="1295027"/>
+              <a:ext cx="156739" cy="0"/>
+            </a:xfrm>
+            <a:prstGeom prst="line">
+              <a:avLst/>
+            </a:prstGeom>
+            <a:ln w="12700">
+              <a:solidFill>
+                <a:schemeClr val="bg1">
+                  <a:lumMod val="50000"/>
+                </a:schemeClr>
+              </a:solidFill>
+            </a:ln>
+            <a:effectLst/>
+          </p:spPr>
+          <p:style>
+            <a:lnRef idx="1">
+              <a:schemeClr val="accent1"/>
+            </a:lnRef>
+            <a:fillRef idx="0">
+              <a:schemeClr val="accent1"/>
+            </a:fillRef>
+            <a:effectRef idx="0">
+              <a:schemeClr val="accent1"/>
+            </a:effectRef>
+            <a:fontRef idx="minor">
+              <a:schemeClr val="tx1"/>
+            </a:fontRef>
+          </p:style>
+        </p:cxnSp>
+        <p:cxnSp>
+          <p:nvCxnSpPr>
+            <p:cNvPr id="86" name="Straight Connector 85">
+              <a:extLst>
+                <a:ext uri="{FF2B5EF4-FFF2-40B4-BE49-F238E27FC236}">
+                  <a16:creationId xmlns:a16="http://schemas.microsoft.com/office/drawing/2014/main" id="{8578A22B-DF18-8048-8A85-C238FD7CDBA7}"/>
+                </a:ext>
+              </a:extLst>
+            </p:cNvPr>
+            <p:cNvCxnSpPr/>
+            <p:nvPr/>
+          </p:nvCxnSpPr>
+          <p:spPr>
+            <a:xfrm>
+              <a:off x="5108209" y="3221677"/>
+              <a:ext cx="156739" cy="0"/>
+            </a:xfrm>
+            <a:prstGeom prst="line">
+              <a:avLst/>
+            </a:prstGeom>
+            <a:ln w="12700">
+              <a:solidFill>
+                <a:schemeClr val="bg1">
+                  <a:lumMod val="50000"/>
+                </a:schemeClr>
+              </a:solidFill>
+            </a:ln>
+            <a:effectLst/>
+          </p:spPr>
+          <p:style>
+            <a:lnRef idx="1">
+              <a:schemeClr val="accent1"/>
+            </a:lnRef>
+            <a:fillRef idx="0">
+              <a:schemeClr val="accent1"/>
+            </a:fillRef>
+            <a:effectRef idx="0">
+              <a:schemeClr val="accent1"/>
+            </a:effectRef>
+            <a:fontRef idx="minor">
+              <a:schemeClr val="tx1"/>
+            </a:fontRef>
+          </p:style>
+        </p:cxnSp>
+        <p:cxnSp>
+          <p:nvCxnSpPr>
+            <p:cNvPr id="87" name="Straight Connector 86">
+              <a:extLst>
+                <a:ext uri="{FF2B5EF4-FFF2-40B4-BE49-F238E27FC236}">
+                  <a16:creationId xmlns:a16="http://schemas.microsoft.com/office/drawing/2014/main" id="{0117F6C2-5280-A742-9C16-406A7B65A7B5}"/>
+                </a:ext>
+              </a:extLst>
+            </p:cNvPr>
+            <p:cNvCxnSpPr/>
+            <p:nvPr/>
+          </p:nvCxnSpPr>
+          <p:spPr>
+            <a:xfrm>
+              <a:off x="5108209" y="4185002"/>
+              <a:ext cx="156739" cy="0"/>
+            </a:xfrm>
+            <a:prstGeom prst="line">
+              <a:avLst/>
+            </a:prstGeom>
+            <a:ln w="12700">
+              <a:solidFill>
+                <a:schemeClr val="bg1">
+                  <a:lumMod val="50000"/>
+                </a:schemeClr>
+              </a:solidFill>
+            </a:ln>
+            <a:effectLst/>
+          </p:spPr>
+          <p:style>
+            <a:lnRef idx="1">
+              <a:schemeClr val="accent1"/>
+            </a:lnRef>
+            <a:fillRef idx="0">
+              <a:schemeClr val="accent1"/>
+            </a:fillRef>
+            <a:effectRef idx="0">
+              <a:schemeClr val="accent1"/>
+            </a:effectRef>
+            <a:fontRef idx="minor">
+              <a:schemeClr val="tx1"/>
+            </a:fontRef>
+          </p:style>
+        </p:cxnSp>
+      </p:grpSp>
+      <p:sp>
+        <p:nvSpPr>
+          <p:cNvPr id="88" name="TextBox 87">
+            <a:extLst>
+              <a:ext uri="{FF2B5EF4-FFF2-40B4-BE49-F238E27FC236}">
+                <a16:creationId xmlns:a16="http://schemas.microsoft.com/office/drawing/2014/main" id="{276C579A-BA0A-224F-AC05-CAF94E2916B2}"/>
+              </a:ext>
+            </a:extLst>
+          </p:cNvPr>
+          <p:cNvSpPr txBox="1"/>
+          <p:nvPr/>
+        </p:nvSpPr>
+        <p:spPr>
+          <a:xfrm>
+            <a:off x="-28571" y="175084"/>
+            <a:ext cx="240326" cy="477054"/>
+          </a:xfrm>
+          <a:prstGeom prst="rect">
+            <a:avLst/>
+          </a:prstGeom>
+          <a:noFill/>
+        </p:spPr>
+        <p:txBody>
+          <a:bodyPr wrap="square" rtlCol="0">
+            <a:spAutoFit/>
+          </a:bodyPr>
+          <a:lstStyle/>
+          <a:p>
+            <a:r>
+              <a:rPr lang="en-US" sz="2500" dirty="0">
+                <a:latin typeface="Times" pitchFamily="2" charset="0"/>
+              </a:rPr>
+              <a:t>2</a:t>
+            </a:r>
+          </a:p>
+        </p:txBody>
+      </p:sp>
+      <p:sp>
+        <p:nvSpPr>
+          <p:cNvPr id="89" name="TextBox 88">
+            <a:extLst>
+              <a:ext uri="{FF2B5EF4-FFF2-40B4-BE49-F238E27FC236}">
+                <a16:creationId xmlns:a16="http://schemas.microsoft.com/office/drawing/2014/main" id="{5C812B31-5FF2-0F45-BF88-B8F43FCA3585}"/>
+              </a:ext>
+            </a:extLst>
+          </p:cNvPr>
+          <p:cNvSpPr txBox="1"/>
+          <p:nvPr/>
+        </p:nvSpPr>
+        <p:spPr>
+          <a:xfrm>
+            <a:off x="-84843" y="1214244"/>
+            <a:ext cx="656964" cy="338554"/>
+          </a:xfrm>
+          <a:prstGeom prst="rect">
+            <a:avLst/>
+          </a:prstGeom>
+          <a:noFill/>
+        </p:spPr>
+        <p:txBody>
+          <a:bodyPr wrap="square" rtlCol="0">
+            <a:spAutoFit/>
+          </a:bodyPr>
+          <a:lstStyle/>
+          <a:p>
+            <a:r>
+              <a:rPr lang="en-US" sz="1600" dirty="0">
+                <a:latin typeface="Times" pitchFamily="2" charset="0"/>
+              </a:rPr>
+              <a:t>2.2</a:t>
+            </a:r>
+          </a:p>
+        </p:txBody>
+      </p:sp>
+      <p:sp>
+        <p:nvSpPr>
+          <p:cNvPr id="90" name="TextBox 89">
+            <a:extLst>
+              <a:ext uri="{FF2B5EF4-FFF2-40B4-BE49-F238E27FC236}">
+                <a16:creationId xmlns:a16="http://schemas.microsoft.com/office/drawing/2014/main" id="{9A207882-229E-A946-85CA-35E5DA60C4D1}"/>
+              </a:ext>
+            </a:extLst>
+          </p:cNvPr>
+          <p:cNvSpPr txBox="1"/>
+          <p:nvPr/>
+        </p:nvSpPr>
+        <p:spPr>
+          <a:xfrm>
+            <a:off x="-84843" y="2146824"/>
+            <a:ext cx="656964" cy="338554"/>
+          </a:xfrm>
+          <a:prstGeom prst="rect">
+            <a:avLst/>
+          </a:prstGeom>
+          <a:noFill/>
+        </p:spPr>
+        <p:txBody>
+          <a:bodyPr wrap="square" rtlCol="0">
+            <a:spAutoFit/>
+          </a:bodyPr>
+          <a:lstStyle/>
+          <a:p>
+            <a:r>
+              <a:rPr lang="en-US" sz="1600" dirty="0">
+                <a:latin typeface="Times" pitchFamily="2" charset="0"/>
+              </a:rPr>
+              <a:t>2.4</a:t>
+            </a:r>
+          </a:p>
+        </p:txBody>
+      </p:sp>
+      <p:sp>
+        <p:nvSpPr>
+          <p:cNvPr id="91" name="TextBox 90">
+            <a:extLst>
+              <a:ext uri="{FF2B5EF4-FFF2-40B4-BE49-F238E27FC236}">
+                <a16:creationId xmlns:a16="http://schemas.microsoft.com/office/drawing/2014/main" id="{6AA7B09F-FF89-FD4A-A809-096BDC7085CD}"/>
+              </a:ext>
+            </a:extLst>
+          </p:cNvPr>
+          <p:cNvSpPr txBox="1"/>
+          <p:nvPr/>
+        </p:nvSpPr>
+        <p:spPr>
+          <a:xfrm>
+            <a:off x="-84843" y="3140929"/>
+            <a:ext cx="656964" cy="338554"/>
+          </a:xfrm>
+          <a:prstGeom prst="rect">
+            <a:avLst/>
+          </a:prstGeom>
+          <a:noFill/>
+        </p:spPr>
+        <p:txBody>
+          <a:bodyPr wrap="square" rtlCol="0">
+            <a:spAutoFit/>
+          </a:bodyPr>
+          <a:lstStyle/>
+          <a:p>
+            <a:r>
+              <a:rPr lang="en-US" sz="1600" dirty="0">
+                <a:latin typeface="Times" pitchFamily="2" charset="0"/>
+              </a:rPr>
+              <a:t>2.6</a:t>
+            </a:r>
+          </a:p>
+        </p:txBody>
+      </p:sp>
+      <p:sp>
+        <p:nvSpPr>
+          <p:cNvPr id="92" name="TextBox 91">
+            <a:extLst>
+              <a:ext uri="{FF2B5EF4-FFF2-40B4-BE49-F238E27FC236}">
+                <a16:creationId xmlns:a16="http://schemas.microsoft.com/office/drawing/2014/main" id="{2284CC43-C2F9-514A-93AD-9C7D0F87B75B}"/>
+              </a:ext>
+            </a:extLst>
+          </p:cNvPr>
+          <p:cNvSpPr txBox="1"/>
+          <p:nvPr/>
+        </p:nvSpPr>
+        <p:spPr>
+          <a:xfrm>
+            <a:off x="-84843" y="4098164"/>
+            <a:ext cx="656964" cy="338554"/>
+          </a:xfrm>
+          <a:prstGeom prst="rect">
+            <a:avLst/>
+          </a:prstGeom>
+          <a:noFill/>
+        </p:spPr>
+        <p:txBody>
+          <a:bodyPr wrap="square" rtlCol="0">
+            <a:spAutoFit/>
+          </a:bodyPr>
+          <a:lstStyle/>
+          <a:p>
+            <a:r>
+              <a:rPr lang="en-US" sz="1600" dirty="0">
+                <a:latin typeface="Times" pitchFamily="2" charset="0"/>
+              </a:rPr>
+              <a:t>2.8</a:t>
+            </a:r>
+          </a:p>
+        </p:txBody>
+      </p:sp>
+      <p:sp>
+        <p:nvSpPr>
+          <p:cNvPr id="93" name="TextBox 92">
+            <a:extLst>
+              <a:ext uri="{FF2B5EF4-FFF2-40B4-BE49-F238E27FC236}">
+                <a16:creationId xmlns:a16="http://schemas.microsoft.com/office/drawing/2014/main" id="{B469BA85-452E-3641-954A-8A58A0B1F022}"/>
+              </a:ext>
+            </a:extLst>
+          </p:cNvPr>
+          <p:cNvSpPr txBox="1"/>
+          <p:nvPr/>
+        </p:nvSpPr>
+        <p:spPr>
+          <a:xfrm>
+            <a:off x="1183648" y="5328124"/>
+            <a:ext cx="656964" cy="338554"/>
+          </a:xfrm>
+          <a:prstGeom prst="rect">
+            <a:avLst/>
+          </a:prstGeom>
+          <a:noFill/>
+        </p:spPr>
+        <p:txBody>
+          <a:bodyPr wrap="square" rtlCol="0">
+            <a:spAutoFit/>
+          </a:bodyPr>
+          <a:lstStyle/>
+          <a:p>
+            <a:r>
+              <a:rPr lang="en-US" sz="1600" dirty="0">
+                <a:latin typeface="Times" pitchFamily="2" charset="0"/>
+              </a:rPr>
+              <a:t>3.2</a:t>
+            </a:r>
+          </a:p>
+        </p:txBody>
+      </p:sp>
+      <p:sp>
+        <p:nvSpPr>
+          <p:cNvPr id="95" name="TextBox 94">
+            <a:extLst>
+              <a:ext uri="{FF2B5EF4-FFF2-40B4-BE49-F238E27FC236}">
+                <a16:creationId xmlns:a16="http://schemas.microsoft.com/office/drawing/2014/main" id="{1C54CFBC-5962-864D-B892-5143EC872361}"/>
+              </a:ext>
+            </a:extLst>
+          </p:cNvPr>
+          <p:cNvSpPr txBox="1"/>
+          <p:nvPr/>
+        </p:nvSpPr>
+        <p:spPr>
+          <a:xfrm>
+            <a:off x="5330219" y="189819"/>
+            <a:ext cx="240326" cy="477054"/>
+          </a:xfrm>
+          <a:prstGeom prst="rect">
+            <a:avLst/>
+          </a:prstGeom>
+          <a:noFill/>
+        </p:spPr>
+        <p:txBody>
+          <a:bodyPr wrap="square" rtlCol="0">
+            <a:spAutoFit/>
+          </a:bodyPr>
+          <a:lstStyle/>
+          <a:p>
+            <a:r>
+              <a:rPr lang="en-US" sz="2500" dirty="0">
+                <a:latin typeface="Times" pitchFamily="2" charset="0"/>
+              </a:rPr>
+              <a:t>1</a:t>
+            </a:r>
+          </a:p>
+        </p:txBody>
+      </p:sp>
+      <p:sp>
+        <p:nvSpPr>
+          <p:cNvPr id="96" name="TextBox 95">
+            <a:extLst>
+              <a:ext uri="{FF2B5EF4-FFF2-40B4-BE49-F238E27FC236}">
+                <a16:creationId xmlns:a16="http://schemas.microsoft.com/office/drawing/2014/main" id="{328CBAD1-E032-7443-AC53-4D2ADBE092A4}"/>
+              </a:ext>
+            </a:extLst>
+          </p:cNvPr>
+          <p:cNvSpPr txBox="1"/>
+          <p:nvPr/>
+        </p:nvSpPr>
+        <p:spPr>
+          <a:xfrm>
+            <a:off x="5359967" y="5006257"/>
+            <a:ext cx="240326" cy="477054"/>
+          </a:xfrm>
+          <a:prstGeom prst="rect">
+            <a:avLst/>
+          </a:prstGeom>
+          <a:noFill/>
+        </p:spPr>
+        <p:txBody>
+          <a:bodyPr wrap="square" rtlCol="0">
+            <a:spAutoFit/>
+          </a:bodyPr>
+          <a:lstStyle/>
+          <a:p>
+            <a:r>
+              <a:rPr lang="en-US" sz="2500" dirty="0">
+                <a:latin typeface="Times" pitchFamily="2" charset="0"/>
+              </a:rPr>
+              <a:t>0</a:t>
+            </a:r>
+          </a:p>
+        </p:txBody>
+      </p:sp>
+      <p:sp>
+        <p:nvSpPr>
+          <p:cNvPr id="97" name="TextBox 96">
+            <a:extLst>
+              <a:ext uri="{FF2B5EF4-FFF2-40B4-BE49-F238E27FC236}">
+                <a16:creationId xmlns:a16="http://schemas.microsoft.com/office/drawing/2014/main" id="{B018FAF7-6782-3443-AF88-D83D9E635FC5}"/>
+              </a:ext>
+            </a:extLst>
+          </p:cNvPr>
+          <p:cNvSpPr txBox="1"/>
+          <p:nvPr/>
+        </p:nvSpPr>
+        <p:spPr>
+          <a:xfrm>
+            <a:off x="-28571" y="4993648"/>
+            <a:ext cx="240326" cy="477054"/>
+          </a:xfrm>
+          <a:prstGeom prst="rect">
+            <a:avLst/>
+          </a:prstGeom>
+          <a:noFill/>
+        </p:spPr>
+        <p:txBody>
+          <a:bodyPr wrap="square" rtlCol="0">
+            <a:spAutoFit/>
+          </a:bodyPr>
+          <a:lstStyle/>
+          <a:p>
+            <a:r>
+              <a:rPr lang="en-US" sz="2500" dirty="0">
+                <a:latin typeface="Times" pitchFamily="2" charset="0"/>
+              </a:rPr>
+              <a:t>3</a:t>
+            </a:r>
+          </a:p>
+        </p:txBody>
+      </p:sp>
+      <p:sp>
+        <p:nvSpPr>
+          <p:cNvPr id="98" name="TextBox 97">
+            <a:extLst>
+              <a:ext uri="{FF2B5EF4-FFF2-40B4-BE49-F238E27FC236}">
+                <a16:creationId xmlns:a16="http://schemas.microsoft.com/office/drawing/2014/main" id="{AB7D433C-2FAB-D84A-83F3-9BBDEE8C57D6}"/>
+              </a:ext>
+            </a:extLst>
+          </p:cNvPr>
+          <p:cNvSpPr txBox="1"/>
+          <p:nvPr/>
+        </p:nvSpPr>
+        <p:spPr>
+          <a:xfrm>
+            <a:off x="2139357" y="5328124"/>
+            <a:ext cx="656964" cy="338554"/>
+          </a:xfrm>
+          <a:prstGeom prst="rect">
+            <a:avLst/>
+          </a:prstGeom>
+          <a:noFill/>
+        </p:spPr>
+        <p:txBody>
+          <a:bodyPr wrap="square" rtlCol="0">
+            <a:spAutoFit/>
+          </a:bodyPr>
+          <a:lstStyle/>
+          <a:p>
+            <a:r>
+              <a:rPr lang="en-US" sz="1600" dirty="0">
+                <a:latin typeface="Times" pitchFamily="2" charset="0"/>
+              </a:rPr>
+              <a:t>3.4</a:t>
+            </a:r>
+          </a:p>
+        </p:txBody>
+      </p:sp>
+      <p:sp>
+        <p:nvSpPr>
+          <p:cNvPr id="99" name="TextBox 98">
+            <a:extLst>
+              <a:ext uri="{FF2B5EF4-FFF2-40B4-BE49-F238E27FC236}">
+                <a16:creationId xmlns:a16="http://schemas.microsoft.com/office/drawing/2014/main" id="{1DE5E51B-19DB-2D43-8776-FD913D90F46A}"/>
+              </a:ext>
+            </a:extLst>
+          </p:cNvPr>
+          <p:cNvSpPr txBox="1"/>
+          <p:nvPr/>
+        </p:nvSpPr>
+        <p:spPr>
+          <a:xfrm>
+            <a:off x="3095066" y="5328124"/>
+            <a:ext cx="656964" cy="338554"/>
+          </a:xfrm>
+          <a:prstGeom prst="rect">
+            <a:avLst/>
+          </a:prstGeom>
+          <a:noFill/>
+        </p:spPr>
+        <p:txBody>
+          <a:bodyPr wrap="square" rtlCol="0">
+            <a:spAutoFit/>
+          </a:bodyPr>
+          <a:lstStyle/>
+          <a:p>
+            <a:r>
+              <a:rPr lang="en-US" sz="1600" dirty="0">
+                <a:latin typeface="Times" pitchFamily="2" charset="0"/>
+              </a:rPr>
+              <a:t>3.6</a:t>
+            </a:r>
+          </a:p>
+        </p:txBody>
+      </p:sp>
+      <p:sp>
+        <p:nvSpPr>
+          <p:cNvPr id="100" name="TextBox 99">
+            <a:extLst>
+              <a:ext uri="{FF2B5EF4-FFF2-40B4-BE49-F238E27FC236}">
+                <a16:creationId xmlns:a16="http://schemas.microsoft.com/office/drawing/2014/main" id="{371BA833-1F70-7649-9F70-69CD28D17519}"/>
+              </a:ext>
+            </a:extLst>
+          </p:cNvPr>
+          <p:cNvSpPr txBox="1"/>
+          <p:nvPr/>
+        </p:nvSpPr>
+        <p:spPr>
+          <a:xfrm>
+            <a:off x="4079080" y="5328124"/>
+            <a:ext cx="656964" cy="338554"/>
+          </a:xfrm>
+          <a:prstGeom prst="rect">
+            <a:avLst/>
+          </a:prstGeom>
+          <a:noFill/>
+        </p:spPr>
+        <p:txBody>
+          <a:bodyPr wrap="square" rtlCol="0">
+            <a:spAutoFit/>
+          </a:bodyPr>
+          <a:lstStyle/>
+          <a:p>
+            <a:r>
+              <a:rPr lang="en-US" sz="1600" dirty="0">
+                <a:latin typeface="Times" pitchFamily="2" charset="0"/>
+              </a:rPr>
+              <a:t>3.8</a:t>
+            </a:r>
+          </a:p>
+        </p:txBody>
+      </p:sp>
+      <p:sp>
+        <p:nvSpPr>
+          <p:cNvPr id="101" name="TextBox 100">
+            <a:extLst>
+              <a:ext uri="{FF2B5EF4-FFF2-40B4-BE49-F238E27FC236}">
+                <a16:creationId xmlns:a16="http://schemas.microsoft.com/office/drawing/2014/main" id="{ECA65304-2C30-8D4A-8D3A-9F68DA926605}"/>
+              </a:ext>
+            </a:extLst>
+          </p:cNvPr>
+          <p:cNvSpPr txBox="1"/>
+          <p:nvPr/>
+        </p:nvSpPr>
+        <p:spPr>
+          <a:xfrm>
+            <a:off x="5372425" y="4105182"/>
+            <a:ext cx="656964" cy="338554"/>
+          </a:xfrm>
+          <a:prstGeom prst="rect">
+            <a:avLst/>
+          </a:prstGeom>
+          <a:noFill/>
+        </p:spPr>
+        <p:txBody>
+          <a:bodyPr wrap="square" rtlCol="0">
+            <a:spAutoFit/>
+          </a:bodyPr>
+          <a:lstStyle/>
+          <a:p>
+            <a:r>
+              <a:rPr lang="en-US" sz="1600" dirty="0">
+                <a:latin typeface="Times" pitchFamily="2" charset="0"/>
+              </a:rPr>
+              <a:t>0.2</a:t>
+            </a:r>
+          </a:p>
+        </p:txBody>
+      </p:sp>
+      <p:sp>
+        <p:nvSpPr>
+          <p:cNvPr id="102" name="TextBox 101">
+            <a:extLst>
+              <a:ext uri="{FF2B5EF4-FFF2-40B4-BE49-F238E27FC236}">
+                <a16:creationId xmlns:a16="http://schemas.microsoft.com/office/drawing/2014/main" id="{B60B665F-CA92-4140-8469-F01A28ED10AA}"/>
+              </a:ext>
+            </a:extLst>
+          </p:cNvPr>
+          <p:cNvSpPr txBox="1"/>
+          <p:nvPr/>
+        </p:nvSpPr>
+        <p:spPr>
+          <a:xfrm>
+            <a:off x="4081920" y="-7623"/>
+            <a:ext cx="656964" cy="338554"/>
+          </a:xfrm>
+          <a:prstGeom prst="rect">
+            <a:avLst/>
+          </a:prstGeom>
+          <a:noFill/>
+        </p:spPr>
+        <p:txBody>
+          <a:bodyPr wrap="square" rtlCol="0">
+            <a:spAutoFit/>
+          </a:bodyPr>
+          <a:lstStyle/>
+          <a:p>
+            <a:r>
+              <a:rPr lang="en-US" sz="1600" dirty="0">
+                <a:latin typeface="Times" pitchFamily="2" charset="0"/>
+              </a:rPr>
+              <a:t>1.2</a:t>
+            </a:r>
+          </a:p>
+        </p:txBody>
+      </p:sp>
+      <p:sp>
+        <p:nvSpPr>
+          <p:cNvPr id="103" name="TextBox 102">
+            <a:extLst>
+              <a:ext uri="{FF2B5EF4-FFF2-40B4-BE49-F238E27FC236}">
+                <a16:creationId xmlns:a16="http://schemas.microsoft.com/office/drawing/2014/main" id="{CE7780EF-94A4-E44A-8E89-4EF5D1457B4E}"/>
+              </a:ext>
+            </a:extLst>
+          </p:cNvPr>
+          <p:cNvSpPr txBox="1"/>
+          <p:nvPr/>
+        </p:nvSpPr>
+        <p:spPr>
+          <a:xfrm>
+            <a:off x="3079432" y="-7623"/>
+            <a:ext cx="656964" cy="338554"/>
+          </a:xfrm>
+          <a:prstGeom prst="rect">
+            <a:avLst/>
+          </a:prstGeom>
+          <a:noFill/>
+        </p:spPr>
+        <p:txBody>
+          <a:bodyPr wrap="square" rtlCol="0">
+            <a:spAutoFit/>
+          </a:bodyPr>
+          <a:lstStyle/>
+          <a:p>
+            <a:r>
+              <a:rPr lang="en-US" sz="1600" dirty="0">
+                <a:latin typeface="Times" pitchFamily="2" charset="0"/>
+              </a:rPr>
+              <a:t>1.4</a:t>
+            </a:r>
+          </a:p>
+        </p:txBody>
+      </p:sp>
+      <p:sp>
+        <p:nvSpPr>
+          <p:cNvPr id="104" name="TextBox 103">
+            <a:extLst>
+              <a:ext uri="{FF2B5EF4-FFF2-40B4-BE49-F238E27FC236}">
+                <a16:creationId xmlns:a16="http://schemas.microsoft.com/office/drawing/2014/main" id="{E0394F5C-E276-D94E-84D0-60CFEEA4A591}"/>
+              </a:ext>
+            </a:extLst>
+          </p:cNvPr>
+          <p:cNvSpPr txBox="1"/>
+          <p:nvPr/>
+        </p:nvSpPr>
+        <p:spPr>
+          <a:xfrm>
+            <a:off x="2139357" y="-7623"/>
+            <a:ext cx="656964" cy="338554"/>
+          </a:xfrm>
+          <a:prstGeom prst="rect">
+            <a:avLst/>
+          </a:prstGeom>
+          <a:noFill/>
+        </p:spPr>
+        <p:txBody>
+          <a:bodyPr wrap="square" rtlCol="0">
+            <a:spAutoFit/>
+          </a:bodyPr>
+          <a:lstStyle/>
+          <a:p>
+            <a:r>
+              <a:rPr lang="en-US" sz="1600" dirty="0">
+                <a:latin typeface="Times" pitchFamily="2" charset="0"/>
+              </a:rPr>
+              <a:t>1.6</a:t>
+            </a:r>
+          </a:p>
+        </p:txBody>
+      </p:sp>
+      <p:sp>
+        <p:nvSpPr>
+          <p:cNvPr id="105" name="TextBox 104">
+            <a:extLst>
+              <a:ext uri="{FF2B5EF4-FFF2-40B4-BE49-F238E27FC236}">
+                <a16:creationId xmlns:a16="http://schemas.microsoft.com/office/drawing/2014/main" id="{A6B3B7B9-776F-194F-B373-19F8AC2541BC}"/>
+              </a:ext>
+            </a:extLst>
+          </p:cNvPr>
+          <p:cNvSpPr txBox="1"/>
+          <p:nvPr/>
+        </p:nvSpPr>
+        <p:spPr>
+          <a:xfrm>
+            <a:off x="1176982" y="-7623"/>
+            <a:ext cx="656964" cy="338554"/>
+          </a:xfrm>
+          <a:prstGeom prst="rect">
+            <a:avLst/>
+          </a:prstGeom>
+          <a:noFill/>
+        </p:spPr>
+        <p:txBody>
+          <a:bodyPr wrap="square" rtlCol="0">
+            <a:spAutoFit/>
+          </a:bodyPr>
+          <a:lstStyle/>
+          <a:p>
+            <a:r>
+              <a:rPr lang="en-US" sz="1600" dirty="0">
+                <a:latin typeface="Times" pitchFamily="2" charset="0"/>
+              </a:rPr>
+              <a:t>1.8</a:t>
+            </a:r>
+          </a:p>
+        </p:txBody>
+      </p:sp>
+      <p:sp>
+        <p:nvSpPr>
+          <p:cNvPr id="9" name="Arc 8">
+            <a:extLst>
+              <a:ext uri="{FF2B5EF4-FFF2-40B4-BE49-F238E27FC236}">
+                <a16:creationId xmlns:a16="http://schemas.microsoft.com/office/drawing/2014/main" id="{CC6D18AD-C7B4-994E-8461-169631708957}"/>
+              </a:ext>
+            </a:extLst>
+          </p:cNvPr>
+          <p:cNvSpPr/>
+          <p:nvPr/>
+        </p:nvSpPr>
+        <p:spPr>
+          <a:xfrm>
+            <a:off x="4822381" y="2084641"/>
+            <a:ext cx="878526" cy="862109"/>
+          </a:xfrm>
+          <a:prstGeom prst="arc">
+            <a:avLst>
+              <a:gd name="adj1" fmla="val 14005778"/>
+              <a:gd name="adj2" fmla="val 16260159"/>
+            </a:avLst>
+          </a:prstGeom>
+          <a:ln w="19050">
+            <a:solidFill>
+              <a:srgbClr val="FF0000"/>
+            </a:solidFill>
+          </a:ln>
+          <a:effectLst/>
+        </p:spPr>
+        <p:style>
+          <a:lnRef idx="1">
+            <a:schemeClr val="accent1"/>
+          </a:lnRef>
+          <a:fillRef idx="0">
+            <a:schemeClr val="accent1"/>
+          </a:fillRef>
+          <a:effectRef idx="0">
+            <a:schemeClr val="accent1"/>
+          </a:effectRef>
+          <a:fontRef idx="minor">
+            <a:schemeClr val="tx1"/>
+          </a:fontRef>
+        </p:style>
+        <p:txBody>
+          <a:bodyPr rtlCol="0" anchor="ctr"/>
+          <a:lstStyle/>
+          <a:p>
+            <a:pPr algn="ctr"/>
+            <a:endParaRPr lang="en-US"/>
+          </a:p>
+        </p:txBody>
+      </p:sp>
+      <p:sp>
+        <p:nvSpPr>
+          <p:cNvPr id="106" name="Arc 105">
+            <a:extLst>
+              <a:ext uri="{FF2B5EF4-FFF2-40B4-BE49-F238E27FC236}">
+                <a16:creationId xmlns:a16="http://schemas.microsoft.com/office/drawing/2014/main" id="{C3B2D423-28C2-CB47-83E6-CD9C9D53F25E}"/>
+              </a:ext>
+            </a:extLst>
+          </p:cNvPr>
+          <p:cNvSpPr/>
+          <p:nvPr/>
+        </p:nvSpPr>
+        <p:spPr>
+          <a:xfrm>
+            <a:off x="4817342" y="2088501"/>
+            <a:ext cx="878526" cy="862109"/>
+          </a:xfrm>
+          <a:prstGeom prst="arc">
+            <a:avLst>
+              <a:gd name="adj1" fmla="val 5390911"/>
+              <a:gd name="adj2" fmla="val 7654205"/>
+            </a:avLst>
+          </a:prstGeom>
+          <a:ln w="19050">
+            <a:solidFill>
+              <a:srgbClr val="FF0000"/>
+            </a:solidFill>
+          </a:ln>
+          <a:effectLst/>
+        </p:spPr>
+        <p:style>
+          <a:lnRef idx="1">
+            <a:schemeClr val="accent1"/>
+          </a:lnRef>
+          <a:fillRef idx="0">
+            <a:schemeClr val="accent1"/>
+          </a:fillRef>
+          <a:effectRef idx="0">
+            <a:schemeClr val="accent1"/>
+          </a:effectRef>
+          <a:fontRef idx="minor">
+            <a:schemeClr val="tx1"/>
+          </a:fontRef>
+        </p:style>
+        <p:txBody>
+          <a:bodyPr rtlCol="0" anchor="ctr"/>
+          <a:lstStyle/>
+          <a:p>
+            <a:pPr algn="ctr"/>
+            <a:endParaRPr lang="en-US"/>
+          </a:p>
+        </p:txBody>
+      </p:sp>
+      <p:grpSp>
+        <p:nvGrpSpPr>
+          <p:cNvPr id="12" name="Group 11">
+            <a:extLst>
+              <a:ext uri="{FF2B5EF4-FFF2-40B4-BE49-F238E27FC236}">
+                <a16:creationId xmlns:a16="http://schemas.microsoft.com/office/drawing/2014/main" id="{A88547D5-F249-F344-BF5E-75314EE9B598}"/>
+              </a:ext>
+            </a:extLst>
+          </p:cNvPr>
+          <p:cNvGrpSpPr/>
+          <p:nvPr/>
+        </p:nvGrpSpPr>
+        <p:grpSpPr>
+          <a:xfrm>
+            <a:off x="5082407" y="2018937"/>
+            <a:ext cx="92578" cy="158500"/>
+            <a:chOff x="5082407" y="2018937"/>
+            <a:chExt cx="92578" cy="158500"/>
+          </a:xfrm>
+        </p:grpSpPr>
+        <p:cxnSp>
+          <p:nvCxnSpPr>
+            <p:cNvPr id="11" name="Straight Connector 10">
+              <a:extLst>
+                <a:ext uri="{FF2B5EF4-FFF2-40B4-BE49-F238E27FC236}">
+                  <a16:creationId xmlns:a16="http://schemas.microsoft.com/office/drawing/2014/main" id="{2C60913A-8EE5-EC41-B046-16B32A8D6D1A}"/>
+                </a:ext>
+              </a:extLst>
+            </p:cNvPr>
+            <p:cNvCxnSpPr>
+              <a:cxnSpLocks/>
+            </p:cNvCxnSpPr>
+            <p:nvPr/>
+          </p:nvCxnSpPr>
+          <p:spPr>
+            <a:xfrm>
+              <a:off x="5082407" y="2031586"/>
+              <a:ext cx="53311" cy="145851"/>
+            </a:xfrm>
+            <a:prstGeom prst="line">
+              <a:avLst/>
+            </a:prstGeom>
+            <a:ln w="19050">
+              <a:solidFill>
+                <a:srgbClr val="FF0000"/>
+              </a:solidFill>
+            </a:ln>
+          </p:spPr>
+          <p:style>
+            <a:lnRef idx="1">
+              <a:schemeClr val="accent1"/>
+            </a:lnRef>
+            <a:fillRef idx="0">
+              <a:schemeClr val="accent1"/>
+            </a:fillRef>
+            <a:effectRef idx="0">
+              <a:schemeClr val="accent1"/>
+            </a:effectRef>
+            <a:fontRef idx="minor">
+              <a:schemeClr val="tx1"/>
+            </a:fontRef>
+          </p:style>
+        </p:cxnSp>
+        <p:cxnSp>
+          <p:nvCxnSpPr>
+            <p:cNvPr id="108" name="Straight Connector 107">
+              <a:extLst>
+                <a:ext uri="{FF2B5EF4-FFF2-40B4-BE49-F238E27FC236}">
+                  <a16:creationId xmlns:a16="http://schemas.microsoft.com/office/drawing/2014/main" id="{D32C4D0F-3BA9-B84D-93B1-652445135F44}"/>
+                </a:ext>
+              </a:extLst>
+            </p:cNvPr>
+            <p:cNvCxnSpPr>
+              <a:cxnSpLocks/>
+            </p:cNvCxnSpPr>
+            <p:nvPr/>
+          </p:nvCxnSpPr>
+          <p:spPr>
+            <a:xfrm>
+              <a:off x="5121674" y="2018937"/>
+              <a:ext cx="53311" cy="145851"/>
+            </a:xfrm>
+            <a:prstGeom prst="line">
+              <a:avLst/>
+            </a:prstGeom>
+            <a:ln w="19050">
+              <a:solidFill>
+                <a:srgbClr val="FF0000"/>
+              </a:solidFill>
+            </a:ln>
+          </p:spPr>
+          <p:style>
+            <a:lnRef idx="1">
+              <a:schemeClr val="accent1"/>
+            </a:lnRef>
+            <a:fillRef idx="0">
+              <a:schemeClr val="accent1"/>
+            </a:fillRef>
+            <a:effectRef idx="0">
+              <a:schemeClr val="accent1"/>
+            </a:effectRef>
+            <a:fontRef idx="minor">
+              <a:schemeClr val="tx1"/>
+            </a:fontRef>
+          </p:style>
+        </p:cxnSp>
+      </p:grpSp>
+      <p:grpSp>
+        <p:nvGrpSpPr>
+          <p:cNvPr id="109" name="Group 108">
+            <a:extLst>
+              <a:ext uri="{FF2B5EF4-FFF2-40B4-BE49-F238E27FC236}">
+                <a16:creationId xmlns:a16="http://schemas.microsoft.com/office/drawing/2014/main" id="{F9210AFA-9E6B-6548-AB7B-D31BF06F12BB}"/>
+              </a:ext>
+            </a:extLst>
+          </p:cNvPr>
+          <p:cNvGrpSpPr/>
+          <p:nvPr/>
+        </p:nvGrpSpPr>
+        <p:grpSpPr>
+          <a:xfrm flipV="1">
+            <a:off x="5081204" y="2850224"/>
+            <a:ext cx="92578" cy="158500"/>
+            <a:chOff x="5082407" y="2018937"/>
+            <a:chExt cx="92578" cy="158500"/>
+          </a:xfrm>
+        </p:grpSpPr>
+        <p:cxnSp>
+          <p:nvCxnSpPr>
+            <p:cNvPr id="110" name="Straight Connector 109">
+              <a:extLst>
+                <a:ext uri="{FF2B5EF4-FFF2-40B4-BE49-F238E27FC236}">
+                  <a16:creationId xmlns:a16="http://schemas.microsoft.com/office/drawing/2014/main" id="{C16F1A16-D43B-164A-92A0-D3F35BFAEE24}"/>
+                </a:ext>
+              </a:extLst>
+            </p:cNvPr>
+            <p:cNvCxnSpPr>
+              <a:cxnSpLocks/>
+            </p:cNvCxnSpPr>
+            <p:nvPr/>
+          </p:nvCxnSpPr>
+          <p:spPr>
+            <a:xfrm>
+              <a:off x="5082407" y="2031586"/>
+              <a:ext cx="53311" cy="145851"/>
+            </a:xfrm>
+            <a:prstGeom prst="line">
+              <a:avLst/>
+            </a:prstGeom>
+            <a:ln w="19050">
+              <a:solidFill>
+                <a:srgbClr val="FF0000"/>
+              </a:solidFill>
+            </a:ln>
+          </p:spPr>
+          <p:style>
+            <a:lnRef idx="1">
+              <a:schemeClr val="accent1"/>
+            </a:lnRef>
+            <a:fillRef idx="0">
+              <a:schemeClr val="accent1"/>
+            </a:fillRef>
+            <a:effectRef idx="0">
+              <a:schemeClr val="accent1"/>
+            </a:effectRef>
+            <a:fontRef idx="minor">
+              <a:schemeClr val="tx1"/>
+            </a:fontRef>
+          </p:style>
+        </p:cxnSp>
+        <p:cxnSp>
+          <p:nvCxnSpPr>
+            <p:cNvPr id="111" name="Straight Connector 110">
+              <a:extLst>
+                <a:ext uri="{FF2B5EF4-FFF2-40B4-BE49-F238E27FC236}">
+                  <a16:creationId xmlns:a16="http://schemas.microsoft.com/office/drawing/2014/main" id="{A13BB53F-7828-0146-8BCE-AF57C958DCCE}"/>
+                </a:ext>
+              </a:extLst>
+            </p:cNvPr>
+            <p:cNvCxnSpPr>
+              <a:cxnSpLocks/>
+            </p:cNvCxnSpPr>
+            <p:nvPr/>
+          </p:nvCxnSpPr>
+          <p:spPr>
+            <a:xfrm>
+              <a:off x="5121674" y="2018937"/>
+              <a:ext cx="53311" cy="145851"/>
+            </a:xfrm>
+            <a:prstGeom prst="line">
+              <a:avLst/>
+            </a:prstGeom>
+            <a:ln w="19050">
+              <a:solidFill>
+                <a:srgbClr val="FF0000"/>
+              </a:solidFill>
+            </a:ln>
+          </p:spPr>
+          <p:style>
+            <a:lnRef idx="1">
+              <a:schemeClr val="accent1"/>
+            </a:lnRef>
+            <a:fillRef idx="0">
+              <a:schemeClr val="accent1"/>
+            </a:fillRef>
+            <a:effectRef idx="0">
+              <a:schemeClr val="accent1"/>
+            </a:effectRef>
+            <a:fontRef idx="minor">
+              <a:schemeClr val="tx1"/>
+            </a:fontRef>
+          </p:style>
+        </p:cxnSp>
+      </p:grpSp>
     </p:spTree>
     <p:extLst>
       <p:ext uri="{BB962C8B-B14F-4D97-AF65-F5344CB8AC3E}">

</xml_diff>